<commit_message>
add hw 5-7 worksheets
</commit_message>
<xml_diff>
--- a/public/img/youtube_thumbnails/video_thumbnail_building.pptx
+++ b/public/img/youtube_thumbnails/video_thumbnail_building.pptx
@@ -8,10 +8,11 @@
     <p:sldId id="259" r:id="rId2"/>
     <p:sldId id="261" r:id="rId3"/>
     <p:sldId id="260" r:id="rId4"/>
-    <p:sldId id="262" r:id="rId5"/>
-    <p:sldId id="257" r:id="rId6"/>
-    <p:sldId id="256" r:id="rId7"/>
-    <p:sldId id="258" r:id="rId8"/>
+    <p:sldId id="263" r:id="rId5"/>
+    <p:sldId id="262" r:id="rId6"/>
+    <p:sldId id="257" r:id="rId7"/>
+    <p:sldId id="256" r:id="rId8"/>
+    <p:sldId id="258" r:id="rId9"/>
   </p:sldIdLst>
   <p:sldSz cx="12192000" cy="6858000"/>
   <p:notesSz cx="6858000" cy="9144000"/>
@@ -249,7 +250,7 @@
           <a:p>
             <a:fld id="{3C68F153-927F-4ADA-A90F-AFD816292B90}" type="datetimeFigureOut">
               <a:rPr lang="en-US" smtClean="0"/>
-              <a:t>2/4/2020</a:t>
+              <a:t>2/5/2020</a:t>
             </a:fld>
             <a:endParaRPr lang="en-US"/>
           </a:p>
@@ -419,7 +420,7 @@
           <a:p>
             <a:fld id="{3C68F153-927F-4ADA-A90F-AFD816292B90}" type="datetimeFigureOut">
               <a:rPr lang="en-US" smtClean="0"/>
-              <a:t>2/4/2020</a:t>
+              <a:t>2/5/2020</a:t>
             </a:fld>
             <a:endParaRPr lang="en-US"/>
           </a:p>
@@ -599,7 +600,7 @@
           <a:p>
             <a:fld id="{3C68F153-927F-4ADA-A90F-AFD816292B90}" type="datetimeFigureOut">
               <a:rPr lang="en-US" smtClean="0"/>
-              <a:t>2/4/2020</a:t>
+              <a:t>2/5/2020</a:t>
             </a:fld>
             <a:endParaRPr lang="en-US"/>
           </a:p>
@@ -769,7 +770,7 @@
           <a:p>
             <a:fld id="{3C68F153-927F-4ADA-A90F-AFD816292B90}" type="datetimeFigureOut">
               <a:rPr lang="en-US" smtClean="0"/>
-              <a:t>2/4/2020</a:t>
+              <a:t>2/5/2020</a:t>
             </a:fld>
             <a:endParaRPr lang="en-US"/>
           </a:p>
@@ -1015,7 +1016,7 @@
           <a:p>
             <a:fld id="{3C68F153-927F-4ADA-A90F-AFD816292B90}" type="datetimeFigureOut">
               <a:rPr lang="en-US" smtClean="0"/>
-              <a:t>2/4/2020</a:t>
+              <a:t>2/5/2020</a:t>
             </a:fld>
             <a:endParaRPr lang="en-US"/>
           </a:p>
@@ -1247,7 +1248,7 @@
           <a:p>
             <a:fld id="{3C68F153-927F-4ADA-A90F-AFD816292B90}" type="datetimeFigureOut">
               <a:rPr lang="en-US" smtClean="0"/>
-              <a:t>2/4/2020</a:t>
+              <a:t>2/5/2020</a:t>
             </a:fld>
             <a:endParaRPr lang="en-US"/>
           </a:p>
@@ -1614,7 +1615,7 @@
           <a:p>
             <a:fld id="{3C68F153-927F-4ADA-A90F-AFD816292B90}" type="datetimeFigureOut">
               <a:rPr lang="en-US" smtClean="0"/>
-              <a:t>2/4/2020</a:t>
+              <a:t>2/5/2020</a:t>
             </a:fld>
             <a:endParaRPr lang="en-US"/>
           </a:p>
@@ -1732,7 +1733,7 @@
           <a:p>
             <a:fld id="{3C68F153-927F-4ADA-A90F-AFD816292B90}" type="datetimeFigureOut">
               <a:rPr lang="en-US" smtClean="0"/>
-              <a:t>2/4/2020</a:t>
+              <a:t>2/5/2020</a:t>
             </a:fld>
             <a:endParaRPr lang="en-US"/>
           </a:p>
@@ -1827,7 +1828,7 @@
           <a:p>
             <a:fld id="{3C68F153-927F-4ADA-A90F-AFD816292B90}" type="datetimeFigureOut">
               <a:rPr lang="en-US" smtClean="0"/>
-              <a:t>2/4/2020</a:t>
+              <a:t>2/5/2020</a:t>
             </a:fld>
             <a:endParaRPr lang="en-US"/>
           </a:p>
@@ -2104,7 +2105,7 @@
           <a:p>
             <a:fld id="{3C68F153-927F-4ADA-A90F-AFD816292B90}" type="datetimeFigureOut">
               <a:rPr lang="en-US" smtClean="0"/>
-              <a:t>2/4/2020</a:t>
+              <a:t>2/5/2020</a:t>
             </a:fld>
             <a:endParaRPr lang="en-US"/>
           </a:p>
@@ -2357,7 +2358,7 @@
           <a:p>
             <a:fld id="{3C68F153-927F-4ADA-A90F-AFD816292B90}" type="datetimeFigureOut">
               <a:rPr lang="en-US" smtClean="0"/>
-              <a:t>2/4/2020</a:t>
+              <a:t>2/5/2020</a:t>
             </a:fld>
             <a:endParaRPr lang="en-US"/>
           </a:p>
@@ -2570,7 +2571,7 @@
           <a:p>
             <a:fld id="{3C68F153-927F-4ADA-A90F-AFD816292B90}" type="datetimeFigureOut">
               <a:rPr lang="en-US" smtClean="0"/>
-              <a:t>2/4/2020</a:t>
+              <a:t>2/5/2020</a:t>
             </a:fld>
             <a:endParaRPr lang="en-US"/>
           </a:p>
@@ -4056,7 +4057,11 @@
             <a:pPr algn="ctr"/>
             <a:r>
               <a:rPr lang="en-US" dirty="0" smtClean="0"/>
-              <a:t>Feb. 3, </a:t>
+              <a:t>Feb. </a:t>
+            </a:r>
+            <a:r>
+              <a:rPr lang="en-US" dirty="0" smtClean="0"/>
+              <a:t>5, </a:t>
             </a:r>
             <a:r>
               <a:rPr lang="en-US" dirty="0" smtClean="0"/>
@@ -4075,7 +4080,7 @@
         <p:spPr>
           <a:xfrm>
             <a:off x="2035110" y="3043759"/>
-            <a:ext cx="5005769" cy="2585323"/>
+            <a:ext cx="5005769" cy="1477328"/>
           </a:xfrm>
           <a:prstGeom prst="rect">
             <a:avLst/>
@@ -4090,56 +4095,13 @@
           <a:p>
             <a:pPr algn="ctr"/>
             <a:r>
-              <a:rPr lang="en-US" dirty="0"/>
-              <a:t>Chapter </a:t>
-            </a:r>
-            <a:r>
               <a:rPr lang="en-US" dirty="0" smtClean="0"/>
-              <a:t>5</a:t>
-            </a:r>
-            <a:endParaRPr lang="en-US" dirty="0"/>
-          </a:p>
-          <a:p>
-            <a:pPr algn="ctr"/>
-            <a:r>
-              <a:rPr lang="en-US" b="1" u="sng" dirty="0" smtClean="0"/>
-              <a:t>Intro to Hypothesis Testing: 1 sample z-Test</a:t>
-            </a:r>
-            <a:endParaRPr lang="en-US" b="1" u="sng" dirty="0"/>
-          </a:p>
-          <a:p>
-            <a:pPr algn="ctr"/>
-            <a:r>
-              <a:rPr lang="en-US" i="1" dirty="0" smtClean="0"/>
-              <a:t>Finish </a:t>
-            </a:r>
-            <a:r>
-              <a:rPr lang="en-US" i="1" dirty="0"/>
-              <a:t>discussion</a:t>
-            </a:r>
-          </a:p>
-          <a:p>
-            <a:pPr algn="ctr"/>
-            <a:r>
-              <a:rPr lang="en-US" i="1" dirty="0"/>
-              <a:t>Homework questions</a:t>
-            </a:r>
-          </a:p>
-          <a:p>
-            <a:pPr algn="ctr"/>
-            <a:endParaRPr lang="en-US" i="1" dirty="0"/>
-          </a:p>
-          <a:p>
-            <a:pPr algn="ctr"/>
-            <a:r>
-              <a:rPr lang="en-US" dirty="0"/>
               <a:t>Chapter </a:t>
             </a:r>
             <a:r>
               <a:rPr lang="en-US" dirty="0"/>
               <a:t>6</a:t>
             </a:r>
-            <a:endParaRPr lang="en-US" dirty="0"/>
           </a:p>
           <a:p>
             <a:pPr algn="ctr"/>
@@ -4161,7 +4123,22 @@
             <a:pPr algn="ctr"/>
             <a:r>
               <a:rPr lang="en-US" i="1" dirty="0" smtClean="0"/>
-              <a:t>(first half)</a:t>
+              <a:t>(second </a:t>
+            </a:r>
+            <a:r>
+              <a:rPr lang="en-US" i="1" dirty="0" smtClean="0"/>
+              <a:t>half</a:t>
+            </a:r>
+            <a:r>
+              <a:rPr lang="en-US" i="1" dirty="0" smtClean="0"/>
+              <a:t>)</a:t>
+            </a:r>
+          </a:p>
+          <a:p>
+            <a:pPr algn="ctr"/>
+            <a:r>
+              <a:rPr lang="en-US" i="1" dirty="0" smtClean="0"/>
+              <a:t>Homework Helps</a:t>
             </a:r>
             <a:endParaRPr lang="en-US" i="1" dirty="0"/>
           </a:p>
@@ -4305,7 +4282,7 @@
     </p:spTree>
     <p:extLst>
       <p:ext uri="{BB962C8B-B14F-4D97-AF65-F5344CB8AC3E}">
-        <p14:creationId xmlns:p14="http://schemas.microsoft.com/office/powerpoint/2010/main" val="1136618621"/>
+        <p14:creationId xmlns:p14="http://schemas.microsoft.com/office/powerpoint/2010/main" val="4154058086"/>
       </p:ext>
     </p:extLst>
   </p:cSld>
@@ -4433,7 +4410,7 @@
             <a:pPr algn="ctr"/>
             <a:r>
               <a:rPr lang="en-US" dirty="0" smtClean="0"/>
-              <a:t>Jan. 22, 2020</a:t>
+              <a:t>Feb. 3, 2020</a:t>
             </a:r>
             <a:endParaRPr lang="en-US" dirty="0"/>
           </a:p>
@@ -4464,15 +4441,21 @@
             <a:pPr algn="ctr"/>
             <a:r>
               <a:rPr lang="en-US" dirty="0"/>
-              <a:t>Chapter 3</a:t>
-            </a:r>
+              <a:t>Chapter </a:t>
+            </a:r>
+            <a:r>
+              <a:rPr lang="en-US" dirty="0" smtClean="0"/>
+              <a:t>5</a:t>
+            </a:r>
+            <a:endParaRPr lang="en-US" dirty="0"/>
           </a:p>
           <a:p>
             <a:pPr algn="ctr"/>
             <a:r>
-              <a:rPr lang="en-US" b="1" u="sng" dirty="0"/>
-              <a:t>Variable/Scale, Rounding &amp; Summation</a:t>
-            </a:r>
+              <a:rPr lang="en-US" b="1" u="sng" dirty="0" smtClean="0"/>
+              <a:t>Intro to Hypothesis Testing: 1 sample z-Test</a:t>
+            </a:r>
+            <a:endParaRPr lang="en-US" b="1" u="sng" dirty="0"/>
           </a:p>
           <a:p>
             <a:pPr algn="ctr"/>
@@ -4500,19 +4483,14 @@
             <a:pPr algn="ctr"/>
             <a:r>
               <a:rPr lang="en-US" dirty="0"/>
-              <a:t>Chapter </a:t>
-            </a:r>
-            <a:r>
-              <a:rPr lang="en-US" dirty="0" smtClean="0"/>
-              <a:t>4</a:t>
-            </a:r>
-            <a:endParaRPr lang="en-US" dirty="0"/>
+              <a:t>Chapter 6</a:t>
+            </a:r>
           </a:p>
           <a:p>
             <a:pPr algn="ctr"/>
             <a:r>
               <a:rPr lang="en-US" b="1" u="sng" dirty="0" smtClean="0"/>
-              <a:t>Standardized Scores &amp; the Normal Distribution</a:t>
+              <a:t>Confidence Interval Estimation: The t Distribution</a:t>
             </a:r>
             <a:endParaRPr lang="en-US" b="1" u="sng" dirty="0"/>
           </a:p>
@@ -4672,7 +4650,7 @@
     </p:spTree>
     <p:extLst>
       <p:ext uri="{BB962C8B-B14F-4D97-AF65-F5344CB8AC3E}">
-        <p14:creationId xmlns:p14="http://schemas.microsoft.com/office/powerpoint/2010/main" val="2900019700"/>
+        <p14:creationId xmlns:p14="http://schemas.microsoft.com/office/powerpoint/2010/main" val="1136618621"/>
       </p:ext>
     </p:extLst>
   </p:cSld>
@@ -4800,7 +4778,7 @@
             <a:pPr algn="ctr"/>
             <a:r>
               <a:rPr lang="en-US" dirty="0" smtClean="0"/>
-              <a:t>Jan. 15, 2020</a:t>
+              <a:t>Jan. 22, 2020</a:t>
             </a:r>
             <a:endParaRPr lang="en-US" dirty="0"/>
           </a:p>
@@ -4814,8 +4792,8 @@
         </p:nvSpPr>
         <p:spPr>
           <a:xfrm>
-            <a:off x="2318419" y="3043759"/>
-            <a:ext cx="4212906" cy="2585323"/>
+            <a:off x="2035110" y="3043759"/>
+            <a:ext cx="5005769" cy="2585323"/>
           </a:xfrm>
           <a:prstGeom prst="rect">
             <a:avLst/>
@@ -4830,48 +4808,58 @@
           <a:p>
             <a:pPr algn="ctr"/>
             <a:r>
+              <a:rPr lang="en-US" dirty="0"/>
+              <a:t>Chapter 3</a:t>
+            </a:r>
+          </a:p>
+          <a:p>
+            <a:pPr algn="ctr"/>
+            <a:r>
+              <a:rPr lang="en-US" b="1" u="sng" dirty="0"/>
+              <a:t>Variable/Scale, Rounding &amp; Summation</a:t>
+            </a:r>
+          </a:p>
+          <a:p>
+            <a:pPr algn="ctr"/>
+            <a:r>
+              <a:rPr lang="en-US" i="1" dirty="0" smtClean="0"/>
+              <a:t>Finish </a:t>
+            </a:r>
+            <a:r>
+              <a:rPr lang="en-US" i="1" dirty="0"/>
+              <a:t>discussion</a:t>
+            </a:r>
+          </a:p>
+          <a:p>
+            <a:pPr algn="ctr"/>
+            <a:r>
+              <a:rPr lang="en-US" i="1" dirty="0"/>
+              <a:t>Homework questions</a:t>
+            </a:r>
+          </a:p>
+          <a:p>
+            <a:pPr algn="ctr"/>
+            <a:endParaRPr lang="en-US" i="1" dirty="0"/>
+          </a:p>
+          <a:p>
+            <a:pPr algn="ctr"/>
+            <a:r>
+              <a:rPr lang="en-US" dirty="0"/>
+              <a:t>Chapter </a:t>
+            </a:r>
+            <a:r>
               <a:rPr lang="en-US" dirty="0" smtClean="0"/>
-              <a:t>Chapter 1</a:t>
-            </a:r>
+              <a:t>4</a:t>
+            </a:r>
+            <a:endParaRPr lang="en-US" dirty="0"/>
           </a:p>
           <a:p>
             <a:pPr algn="ctr"/>
             <a:r>
               <a:rPr lang="en-US" b="1" u="sng" dirty="0" smtClean="0"/>
-              <a:t>Variable/Scale, Rounding &amp; Summation</a:t>
-            </a:r>
-          </a:p>
-          <a:p>
-            <a:pPr algn="ctr"/>
-            <a:r>
-              <a:rPr lang="en-US" i="1" dirty="0" smtClean="0"/>
-              <a:t>Finish discussion</a:t>
-            </a:r>
-          </a:p>
-          <a:p>
-            <a:pPr algn="ctr"/>
-            <a:r>
-              <a:rPr lang="en-US" i="1" dirty="0" smtClean="0"/>
-              <a:t>Homework questions</a:t>
-            </a:r>
-          </a:p>
-          <a:p>
-            <a:pPr algn="ctr"/>
-            <a:endParaRPr lang="en-US" i="1" dirty="0" smtClean="0"/>
-          </a:p>
-          <a:p>
-            <a:pPr algn="ctr"/>
-            <a:r>
-              <a:rPr lang="en-US" dirty="0"/>
-              <a:t>Chapter 2 </a:t>
-            </a:r>
-          </a:p>
-          <a:p>
-            <a:pPr algn="ctr"/>
-            <a:r>
-              <a:rPr lang="en-US" b="1" u="sng" dirty="0"/>
-              <a:t>Exploring Data with Plots</a:t>
-            </a:r>
+              <a:t>Standardized Scores &amp; the Normal Distribution</a:t>
+            </a:r>
+            <a:endParaRPr lang="en-US" b="1" u="sng" dirty="0"/>
           </a:p>
           <a:p>
             <a:pPr algn="ctr"/>
@@ -4884,12 +4872,8 @@
           <a:p>
             <a:pPr algn="ctr"/>
             <a:r>
-              <a:rPr lang="en-US" i="1" dirty="0"/>
-              <a:t>Homework </a:t>
-            </a:r>
-            <a:r>
               <a:rPr lang="en-US" i="1" dirty="0" smtClean="0"/>
-              <a:t>questions</a:t>
+              <a:t>(first half)</a:t>
             </a:r>
             <a:endParaRPr lang="en-US" i="1" dirty="0"/>
           </a:p>
@@ -5033,6 +5017,367 @@
     </p:spTree>
     <p:extLst>
       <p:ext uri="{BB962C8B-B14F-4D97-AF65-F5344CB8AC3E}">
+        <p14:creationId xmlns:p14="http://schemas.microsoft.com/office/powerpoint/2010/main" val="2900019700"/>
+      </p:ext>
+    </p:extLst>
+  </p:cSld>
+  <p:clrMapOvr>
+    <a:masterClrMapping/>
+  </p:clrMapOvr>
+</p:sld>
+</file>
+
+<file path=ppt/slides/slide7.xml><?xml version="1.0" encoding="utf-8"?>
+<p:sld xmlns:a="http://schemas.openxmlformats.org/drawingml/2006/main" xmlns:r="http://schemas.openxmlformats.org/officeDocument/2006/relationships" xmlns:p="http://schemas.openxmlformats.org/presentationml/2006/main">
+  <p:cSld>
+    <p:spTree>
+      <p:nvGrpSpPr>
+        <p:cNvPr id="1" name=""/>
+        <p:cNvGrpSpPr/>
+        <p:nvPr/>
+      </p:nvGrpSpPr>
+      <p:grpSpPr>
+        <a:xfrm>
+          <a:off x="0" y="0"/>
+          <a:ext cx="0" cy="0"/>
+          <a:chOff x="0" y="0"/>
+          <a:chExt cx="0" cy="0"/>
+        </a:xfrm>
+      </p:grpSpPr>
+      <p:sp>
+        <p:nvSpPr>
+          <p:cNvPr id="4" name="Rectangle 3"/>
+          <p:cNvSpPr/>
+          <p:nvPr/>
+        </p:nvSpPr>
+        <p:spPr>
+          <a:xfrm>
+            <a:off x="1808702" y="824230"/>
+            <a:ext cx="8778240" cy="5010912"/>
+          </a:xfrm>
+          <a:prstGeom prst="rect">
+            <a:avLst/>
+          </a:prstGeom>
+          <a:solidFill>
+            <a:schemeClr val="bg1">
+              <a:lumMod val="95000"/>
+            </a:schemeClr>
+          </a:solidFill>
+          <a:ln w="38100"/>
+        </p:spPr>
+        <p:style>
+          <a:lnRef idx="2">
+            <a:schemeClr val="accent1">
+              <a:shade val="50000"/>
+            </a:schemeClr>
+          </a:lnRef>
+          <a:fillRef idx="1">
+            <a:schemeClr val="accent1"/>
+          </a:fillRef>
+          <a:effectRef idx="0">
+            <a:schemeClr val="accent1"/>
+          </a:effectRef>
+          <a:fontRef idx="minor">
+            <a:schemeClr val="lt1"/>
+          </a:fontRef>
+        </p:style>
+        <p:txBody>
+          <a:bodyPr rtlCol="0" anchor="ctr"/>
+          <a:lstStyle/>
+          <a:p>
+            <a:pPr algn="ctr"/>
+            <a:endParaRPr lang="en-US"/>
+          </a:p>
+        </p:txBody>
+      </p:sp>
+      <p:sp>
+        <p:nvSpPr>
+          <p:cNvPr id="7" name="TextBox 6"/>
+          <p:cNvSpPr txBox="1"/>
+          <p:nvPr/>
+        </p:nvSpPr>
+        <p:spPr>
+          <a:xfrm>
+            <a:off x="3840385" y="1213849"/>
+            <a:ext cx="5712369" cy="923330"/>
+          </a:xfrm>
+          <a:prstGeom prst="rect">
+            <a:avLst/>
+          </a:prstGeom>
+          <a:noFill/>
+        </p:spPr>
+        <p:txBody>
+          <a:bodyPr wrap="square" rtlCol="0">
+            <a:spAutoFit/>
+          </a:bodyPr>
+          <a:lstStyle/>
+          <a:p>
+            <a:r>
+              <a:rPr lang="en-US" sz="5400" dirty="0" smtClean="0"/>
+              <a:t>INCLASS LECTURES</a:t>
+            </a:r>
+            <a:endParaRPr lang="en-US" sz="5400" dirty="0"/>
+          </a:p>
+        </p:txBody>
+      </p:sp>
+      <p:sp>
+        <p:nvSpPr>
+          <p:cNvPr id="8" name="TextBox 7"/>
+          <p:cNvSpPr txBox="1"/>
+          <p:nvPr/>
+        </p:nvSpPr>
+        <p:spPr>
+          <a:xfrm>
+            <a:off x="7731444" y="5278932"/>
+            <a:ext cx="2076450" cy="369332"/>
+          </a:xfrm>
+          <a:prstGeom prst="rect">
+            <a:avLst/>
+          </a:prstGeom>
+          <a:noFill/>
+        </p:spPr>
+        <p:txBody>
+          <a:bodyPr wrap="square" rtlCol="0">
+            <a:spAutoFit/>
+          </a:bodyPr>
+          <a:lstStyle/>
+          <a:p>
+            <a:pPr algn="ctr"/>
+            <a:r>
+              <a:rPr lang="en-US" dirty="0" smtClean="0"/>
+              <a:t>Jan. 15, 2020</a:t>
+            </a:r>
+            <a:endParaRPr lang="en-US" dirty="0"/>
+          </a:p>
+        </p:txBody>
+      </p:sp>
+      <p:sp>
+        <p:nvSpPr>
+          <p:cNvPr id="9" name="TextBox 8"/>
+          <p:cNvSpPr txBox="1"/>
+          <p:nvPr/>
+        </p:nvSpPr>
+        <p:spPr>
+          <a:xfrm>
+            <a:off x="2318419" y="3043759"/>
+            <a:ext cx="4212906" cy="2585323"/>
+          </a:xfrm>
+          <a:prstGeom prst="rect">
+            <a:avLst/>
+          </a:prstGeom>
+          <a:noFill/>
+        </p:spPr>
+        <p:txBody>
+          <a:bodyPr wrap="square" rtlCol="0">
+            <a:spAutoFit/>
+          </a:bodyPr>
+          <a:lstStyle/>
+          <a:p>
+            <a:pPr algn="ctr"/>
+            <a:r>
+              <a:rPr lang="en-US" dirty="0" smtClean="0"/>
+              <a:t>Chapter 1</a:t>
+            </a:r>
+          </a:p>
+          <a:p>
+            <a:pPr algn="ctr"/>
+            <a:r>
+              <a:rPr lang="en-US" b="1" u="sng" dirty="0" smtClean="0"/>
+              <a:t>Variable/Scale, Rounding &amp; Summation</a:t>
+            </a:r>
+          </a:p>
+          <a:p>
+            <a:pPr algn="ctr"/>
+            <a:r>
+              <a:rPr lang="en-US" i="1" dirty="0" smtClean="0"/>
+              <a:t>Finish discussion</a:t>
+            </a:r>
+          </a:p>
+          <a:p>
+            <a:pPr algn="ctr"/>
+            <a:r>
+              <a:rPr lang="en-US" i="1" dirty="0" smtClean="0"/>
+              <a:t>Homework questions</a:t>
+            </a:r>
+          </a:p>
+          <a:p>
+            <a:pPr algn="ctr"/>
+            <a:endParaRPr lang="en-US" i="1" dirty="0" smtClean="0"/>
+          </a:p>
+          <a:p>
+            <a:pPr algn="ctr"/>
+            <a:r>
+              <a:rPr lang="en-US" dirty="0"/>
+              <a:t>Chapter 2 </a:t>
+            </a:r>
+          </a:p>
+          <a:p>
+            <a:pPr algn="ctr"/>
+            <a:r>
+              <a:rPr lang="en-US" b="1" u="sng" dirty="0"/>
+              <a:t>Exploring Data with Plots</a:t>
+            </a:r>
+          </a:p>
+          <a:p>
+            <a:pPr algn="ctr"/>
+            <a:r>
+              <a:rPr lang="en-US" i="1" dirty="0" smtClean="0"/>
+              <a:t>Lecture slides</a:t>
+            </a:r>
+            <a:endParaRPr lang="en-US" i="1" dirty="0"/>
+          </a:p>
+          <a:p>
+            <a:pPr algn="ctr"/>
+            <a:r>
+              <a:rPr lang="en-US" i="1" dirty="0"/>
+              <a:t>Homework </a:t>
+            </a:r>
+            <a:r>
+              <a:rPr lang="en-US" i="1" dirty="0" smtClean="0"/>
+              <a:t>questions</a:t>
+            </a:r>
+            <a:endParaRPr lang="en-US" i="1" dirty="0"/>
+          </a:p>
+        </p:txBody>
+      </p:sp>
+      <p:grpSp>
+        <p:nvGrpSpPr>
+          <p:cNvPr id="14" name="Group 13"/>
+          <p:cNvGrpSpPr/>
+          <p:nvPr/>
+        </p:nvGrpSpPr>
+        <p:grpSpPr>
+          <a:xfrm>
+            <a:off x="7198839" y="2137179"/>
+            <a:ext cx="3141660" cy="3193339"/>
+            <a:chOff x="7047391" y="1961976"/>
+            <a:chExt cx="3141660" cy="3193339"/>
+          </a:xfrm>
+        </p:grpSpPr>
+        <p:pic>
+          <p:nvPicPr>
+            <p:cNvPr id="2" name="Picture 1"/>
+            <p:cNvPicPr>
+              <a:picLocks noChangeAspect="1"/>
+            </p:cNvPicPr>
+            <p:nvPr/>
+          </p:nvPicPr>
+          <p:blipFill>
+            <a:blip r:embed="rId2" cstate="print">
+              <a:extLst>
+                <a:ext uri="{28A0092B-C50C-407E-A947-70E740481C1C}">
+                  <a14:useLocalDpi xmlns:a14="http://schemas.microsoft.com/office/drawing/2010/main" val="0"/>
+                </a:ext>
+              </a:extLst>
+            </a:blip>
+            <a:stretch>
+              <a:fillRect/>
+            </a:stretch>
+          </p:blipFill>
+          <p:spPr>
+            <a:xfrm>
+              <a:off x="7047391" y="3320161"/>
+              <a:ext cx="1578867" cy="1828804"/>
+            </a:xfrm>
+            <a:prstGeom prst="rect">
+              <a:avLst/>
+            </a:prstGeom>
+          </p:spPr>
+        </p:pic>
+        <p:pic>
+          <p:nvPicPr>
+            <p:cNvPr id="3" name="Picture 2"/>
+            <p:cNvPicPr>
+              <a:picLocks noChangeAspect="1"/>
+            </p:cNvPicPr>
+            <p:nvPr/>
+          </p:nvPicPr>
+          <p:blipFill>
+            <a:blip r:embed="rId3" cstate="print">
+              <a:extLst>
+                <a:ext uri="{28A0092B-C50C-407E-A947-70E740481C1C}">
+                  <a14:useLocalDpi xmlns:a14="http://schemas.microsoft.com/office/drawing/2010/main" val="0"/>
+                </a:ext>
+              </a:extLst>
+            </a:blip>
+            <a:stretch>
+              <a:fillRect/>
+            </a:stretch>
+          </p:blipFill>
+          <p:spPr>
+            <a:xfrm>
+              <a:off x="7830475" y="1961976"/>
+              <a:ext cx="1578867" cy="1828804"/>
+            </a:xfrm>
+            <a:prstGeom prst="rect">
+              <a:avLst/>
+            </a:prstGeom>
+          </p:spPr>
+        </p:pic>
+        <p:pic>
+          <p:nvPicPr>
+            <p:cNvPr id="11" name="Picture 10"/>
+            <p:cNvPicPr>
+              <a:picLocks noChangeAspect="1"/>
+            </p:cNvPicPr>
+            <p:nvPr/>
+          </p:nvPicPr>
+          <p:blipFill>
+            <a:blip r:embed="rId4" cstate="print">
+              <a:extLst>
+                <a:ext uri="{28A0092B-C50C-407E-A947-70E740481C1C}">
+                  <a14:useLocalDpi xmlns:a14="http://schemas.microsoft.com/office/drawing/2010/main" val="0"/>
+                </a:ext>
+              </a:extLst>
+            </a:blip>
+            <a:stretch>
+              <a:fillRect/>
+            </a:stretch>
+          </p:blipFill>
+          <p:spPr>
+            <a:xfrm>
+              <a:off x="8610184" y="3326511"/>
+              <a:ext cx="1578867" cy="1828804"/>
+            </a:xfrm>
+            <a:prstGeom prst="rect">
+              <a:avLst/>
+            </a:prstGeom>
+          </p:spPr>
+        </p:pic>
+      </p:grpSp>
+      <p:pic>
+        <p:nvPicPr>
+          <p:cNvPr id="12" name="Picture 11"/>
+          <p:cNvPicPr>
+            <a:picLocks noChangeAspect="1"/>
+          </p:cNvPicPr>
+          <p:nvPr/>
+        </p:nvPicPr>
+        <p:blipFill>
+          <a:blip r:embed="rId5" cstate="print">
+            <a:extLst>
+              <a:ext uri="{28A0092B-C50C-407E-A947-70E740481C1C}">
+                <a14:useLocalDpi xmlns:a14="http://schemas.microsoft.com/office/drawing/2010/main" val="0"/>
+              </a:ext>
+            </a:extLst>
+          </a:blip>
+          <a:stretch>
+            <a:fillRect/>
+          </a:stretch>
+        </p:blipFill>
+        <p:spPr>
+          <a:xfrm>
+            <a:off x="2035110" y="1019593"/>
+            <a:ext cx="1578867" cy="1828804"/>
+          </a:xfrm>
+          <a:prstGeom prst="rect">
+            <a:avLst/>
+          </a:prstGeom>
+        </p:spPr>
+      </p:pic>
+    </p:spTree>
+    <p:extLst>
+      <p:ext uri="{BB962C8B-B14F-4D97-AF65-F5344CB8AC3E}">
         <p14:creationId xmlns:p14="http://schemas.microsoft.com/office/powerpoint/2010/main" val="3290463226"/>
       </p:ext>
     </p:extLst>
@@ -5043,7 +5388,7 @@
 </p:sld>
 </file>
 
-<file path=ppt/slides/slide7.xml><?xml version="1.0" encoding="utf-8"?>
+<file path=ppt/slides/slide8.xml><?xml version="1.0" encoding="utf-8"?>
 <p:sld xmlns:a="http://schemas.openxmlformats.org/drawingml/2006/main" xmlns:r="http://schemas.openxmlformats.org/officeDocument/2006/relationships" xmlns:p="http://schemas.openxmlformats.org/presentationml/2006/main">
   <p:cSld>
     <p:spTree>

</xml_diff>

<commit_message>
add links for 6600
</commit_message>
<xml_diff>
--- a/public/img/youtube_thumbnails/video_thumbnail_building.pptx
+++ b/public/img/youtube_thumbnails/video_thumbnail_building.pptx
@@ -8,11 +8,14 @@
     <p:sldId id="259" r:id="rId2"/>
     <p:sldId id="261" r:id="rId3"/>
     <p:sldId id="260" r:id="rId4"/>
-    <p:sldId id="263" r:id="rId5"/>
-    <p:sldId id="262" r:id="rId6"/>
-    <p:sldId id="257" r:id="rId7"/>
-    <p:sldId id="256" r:id="rId8"/>
-    <p:sldId id="258" r:id="rId9"/>
+    <p:sldId id="266" r:id="rId5"/>
+    <p:sldId id="265" r:id="rId6"/>
+    <p:sldId id="264" r:id="rId7"/>
+    <p:sldId id="263" r:id="rId8"/>
+    <p:sldId id="262" r:id="rId9"/>
+    <p:sldId id="257" r:id="rId10"/>
+    <p:sldId id="256" r:id="rId11"/>
+    <p:sldId id="258" r:id="rId12"/>
   </p:sldIdLst>
   <p:sldSz cx="12192000" cy="6858000"/>
   <p:notesSz cx="6858000" cy="9144000"/>
@@ -250,7 +253,7 @@
           <a:p>
             <a:fld id="{3C68F153-927F-4ADA-A90F-AFD816292B90}" type="datetimeFigureOut">
               <a:rPr lang="en-US" smtClean="0"/>
-              <a:t>2/5/2020</a:t>
+              <a:t>2/19/2020</a:t>
             </a:fld>
             <a:endParaRPr lang="en-US"/>
           </a:p>
@@ -420,7 +423,7 @@
           <a:p>
             <a:fld id="{3C68F153-927F-4ADA-A90F-AFD816292B90}" type="datetimeFigureOut">
               <a:rPr lang="en-US" smtClean="0"/>
-              <a:t>2/5/2020</a:t>
+              <a:t>2/19/2020</a:t>
             </a:fld>
             <a:endParaRPr lang="en-US"/>
           </a:p>
@@ -600,7 +603,7 @@
           <a:p>
             <a:fld id="{3C68F153-927F-4ADA-A90F-AFD816292B90}" type="datetimeFigureOut">
               <a:rPr lang="en-US" smtClean="0"/>
-              <a:t>2/5/2020</a:t>
+              <a:t>2/19/2020</a:t>
             </a:fld>
             <a:endParaRPr lang="en-US"/>
           </a:p>
@@ -770,7 +773,7 @@
           <a:p>
             <a:fld id="{3C68F153-927F-4ADA-A90F-AFD816292B90}" type="datetimeFigureOut">
               <a:rPr lang="en-US" smtClean="0"/>
-              <a:t>2/5/2020</a:t>
+              <a:t>2/19/2020</a:t>
             </a:fld>
             <a:endParaRPr lang="en-US"/>
           </a:p>
@@ -1016,7 +1019,7 @@
           <a:p>
             <a:fld id="{3C68F153-927F-4ADA-A90F-AFD816292B90}" type="datetimeFigureOut">
               <a:rPr lang="en-US" smtClean="0"/>
-              <a:t>2/5/2020</a:t>
+              <a:t>2/19/2020</a:t>
             </a:fld>
             <a:endParaRPr lang="en-US"/>
           </a:p>
@@ -1248,7 +1251,7 @@
           <a:p>
             <a:fld id="{3C68F153-927F-4ADA-A90F-AFD816292B90}" type="datetimeFigureOut">
               <a:rPr lang="en-US" smtClean="0"/>
-              <a:t>2/5/2020</a:t>
+              <a:t>2/19/2020</a:t>
             </a:fld>
             <a:endParaRPr lang="en-US"/>
           </a:p>
@@ -1615,7 +1618,7 @@
           <a:p>
             <a:fld id="{3C68F153-927F-4ADA-A90F-AFD816292B90}" type="datetimeFigureOut">
               <a:rPr lang="en-US" smtClean="0"/>
-              <a:t>2/5/2020</a:t>
+              <a:t>2/19/2020</a:t>
             </a:fld>
             <a:endParaRPr lang="en-US"/>
           </a:p>
@@ -1733,7 +1736,7 @@
           <a:p>
             <a:fld id="{3C68F153-927F-4ADA-A90F-AFD816292B90}" type="datetimeFigureOut">
               <a:rPr lang="en-US" smtClean="0"/>
-              <a:t>2/5/2020</a:t>
+              <a:t>2/19/2020</a:t>
             </a:fld>
             <a:endParaRPr lang="en-US"/>
           </a:p>
@@ -1828,7 +1831,7 @@
           <a:p>
             <a:fld id="{3C68F153-927F-4ADA-A90F-AFD816292B90}" type="datetimeFigureOut">
               <a:rPr lang="en-US" smtClean="0"/>
-              <a:t>2/5/2020</a:t>
+              <a:t>2/19/2020</a:t>
             </a:fld>
             <a:endParaRPr lang="en-US"/>
           </a:p>
@@ -2105,7 +2108,7 @@
           <a:p>
             <a:fld id="{3C68F153-927F-4ADA-A90F-AFD816292B90}" type="datetimeFigureOut">
               <a:rPr lang="en-US" smtClean="0"/>
-              <a:t>2/5/2020</a:t>
+              <a:t>2/19/2020</a:t>
             </a:fld>
             <a:endParaRPr lang="en-US"/>
           </a:p>
@@ -2358,7 +2361,7 @@
           <a:p>
             <a:fld id="{3C68F153-927F-4ADA-A90F-AFD816292B90}" type="datetimeFigureOut">
               <a:rPr lang="en-US" smtClean="0"/>
-              <a:t>2/5/2020</a:t>
+              <a:t>2/19/2020</a:t>
             </a:fld>
             <a:endParaRPr lang="en-US"/>
           </a:p>
@@ -2571,7 +2574,7 @@
           <a:p>
             <a:fld id="{3C68F153-927F-4ADA-A90F-AFD816292B90}" type="datetimeFigureOut">
               <a:rPr lang="en-US" smtClean="0"/>
-              <a:t>2/5/2020</a:t>
+              <a:t>2/19/2020</a:t>
             </a:fld>
             <a:endParaRPr lang="en-US"/>
           </a:p>
@@ -3294,7 +3297,7 @@
 </p:sld>
 </file>
 
-<file path=ppt/slides/slide2.xml><?xml version="1.0" encoding="utf-8"?>
+<file path=ppt/slides/slide10.xml><?xml version="1.0" encoding="utf-8"?>
 <p:sld xmlns:a="http://schemas.openxmlformats.org/drawingml/2006/main" xmlns:r="http://schemas.openxmlformats.org/officeDocument/2006/relationships" xmlns:p="http://schemas.openxmlformats.org/presentationml/2006/main">
   <p:cSld>
     <p:spTree>
@@ -3365,8 +3368,8 @@
         </p:nvSpPr>
         <p:spPr>
           <a:xfrm>
-            <a:off x="4003824" y="1483154"/>
-            <a:ext cx="5712369" cy="1754326"/>
+            <a:off x="3840385" y="1213849"/>
+            <a:ext cx="5712369" cy="923330"/>
           </a:xfrm>
           <a:prstGeom prst="rect">
             <a:avLst/>
@@ -3381,7 +3384,7 @@
           <a:p>
             <a:r>
               <a:rPr lang="en-US" sz="5400" dirty="0" smtClean="0"/>
-              <a:t>OUT-OF-CLASS LECTURES</a:t>
+              <a:t>INCLASS LECTURES</a:t>
             </a:r>
             <a:endParaRPr lang="en-US" sz="5400" dirty="0"/>
           </a:p>
@@ -3412,7 +3415,7 @@
             <a:pPr algn="ctr"/>
             <a:r>
               <a:rPr lang="en-US" dirty="0" smtClean="0"/>
-              <a:t>Jan. 24, 2020</a:t>
+              <a:t>Jan. 15, 2020</a:t>
             </a:r>
             <a:endParaRPr lang="en-US" dirty="0"/>
           </a:p>
@@ -3426,8 +3429,8 @@
         </p:nvSpPr>
         <p:spPr>
           <a:xfrm>
-            <a:off x="2000886" y="3743671"/>
-            <a:ext cx="5005769" cy="923330"/>
+            <a:off x="2318419" y="3043759"/>
+            <a:ext cx="4212906" cy="2585323"/>
           </a:xfrm>
           <a:prstGeom prst="rect">
             <a:avLst/>
@@ -3443,24 +3446,67 @@
             <a:pPr algn="ctr"/>
             <a:r>
               <a:rPr lang="en-US" dirty="0" smtClean="0"/>
-              <a:t>Chapter 4</a:t>
-            </a:r>
-            <a:endParaRPr lang="en-US" dirty="0"/>
+              <a:t>Chapter 1</a:t>
+            </a:r>
           </a:p>
           <a:p>
             <a:pPr algn="ctr"/>
             <a:r>
               <a:rPr lang="en-US" b="1" u="sng" dirty="0" smtClean="0"/>
-              <a:t>Standardized Scores &amp; the Normal Distribution</a:t>
-            </a:r>
-            <a:endParaRPr lang="en-US" b="1" u="sng" dirty="0"/>
+              <a:t>Variable/Scale, Rounding &amp; Summation</a:t>
+            </a:r>
           </a:p>
           <a:p>
             <a:pPr algn="ctr"/>
             <a:r>
               <a:rPr lang="en-US" i="1" dirty="0" smtClean="0"/>
-              <a:t>Lecture Slide Examples Worked</a:t>
-            </a:r>
+              <a:t>Finish discussion</a:t>
+            </a:r>
+          </a:p>
+          <a:p>
+            <a:pPr algn="ctr"/>
+            <a:r>
+              <a:rPr lang="en-US" i="1" dirty="0" smtClean="0"/>
+              <a:t>Homework questions</a:t>
+            </a:r>
+          </a:p>
+          <a:p>
+            <a:pPr algn="ctr"/>
+            <a:endParaRPr lang="en-US" i="1" dirty="0" smtClean="0"/>
+          </a:p>
+          <a:p>
+            <a:pPr algn="ctr"/>
+            <a:r>
+              <a:rPr lang="en-US" dirty="0"/>
+              <a:t>Chapter 2 </a:t>
+            </a:r>
+          </a:p>
+          <a:p>
+            <a:pPr algn="ctr"/>
+            <a:r>
+              <a:rPr lang="en-US" b="1" u="sng" dirty="0"/>
+              <a:t>Exploring Data with Plots</a:t>
+            </a:r>
+          </a:p>
+          <a:p>
+            <a:pPr algn="ctr"/>
+            <a:r>
+              <a:rPr lang="en-US" i="1" dirty="0" smtClean="0"/>
+              <a:t>Lecture slides</a:t>
+            </a:r>
+            <a:endParaRPr lang="en-US" i="1" dirty="0"/>
+          </a:p>
+          <a:p>
+            <a:pPr algn="ctr"/>
+            <a:r>
+              <a:rPr lang="en-US" i="1" dirty="0"/>
+              <a:t>Homework </a:t>
+            </a:r>
+            <a:r>
+              <a:rPr lang="en-US" i="1" dirty="0" smtClean="0"/>
+              <a:t>questions</a:t>
+            </a:r>
+            <a:endParaRPr lang="en-US" i="1" dirty="0"/>
           </a:p>
         </p:txBody>
       </p:sp>
@@ -3602,7 +3648,7 @@
     </p:spTree>
     <p:extLst>
       <p:ext uri="{BB962C8B-B14F-4D97-AF65-F5344CB8AC3E}">
-        <p14:creationId xmlns:p14="http://schemas.microsoft.com/office/powerpoint/2010/main" val="267042058"/>
+        <p14:creationId xmlns:p14="http://schemas.microsoft.com/office/powerpoint/2010/main" val="3290463226"/>
       </p:ext>
     </p:extLst>
   </p:cSld>
@@ -3612,7 +3658,7 @@
 </p:sld>
 </file>
 
-<file path=ppt/slides/slide3.xml><?xml version="1.0" encoding="utf-8"?>
+<file path=ppt/slides/slide11.xml><?xml version="1.0" encoding="utf-8"?>
 <p:sld xmlns:a="http://schemas.openxmlformats.org/drawingml/2006/main" xmlns:r="http://schemas.openxmlformats.org/officeDocument/2006/relationships" xmlns:p="http://schemas.openxmlformats.org/presentationml/2006/main">
   <p:cSld>
     <p:spTree>
@@ -3629,26 +3675,51 @@
           <a:chExt cx="0" cy="0"/>
         </a:xfrm>
       </p:grpSpPr>
-      <p:sp>
-        <p:nvSpPr>
-          <p:cNvPr id="4" name="Rectangle 3"/>
-          <p:cNvSpPr/>
+      <p:pic>
+        <p:nvPicPr>
+          <p:cNvPr id="2" name="Picture 1"/>
+          <p:cNvPicPr>
+            <a:picLocks noChangeAspect="1"/>
+          </p:cNvPicPr>
           <p:nvPr/>
-        </p:nvSpPr>
-        <p:spPr>
-          <a:xfrm>
-            <a:off x="1808702" y="824230"/>
-            <a:ext cx="8778240" cy="5010912"/>
+        </p:nvPicPr>
+        <p:blipFill>
+          <a:blip r:embed="rId2" cstate="print">
+            <a:extLst>
+              <a:ext uri="{28A0092B-C50C-407E-A947-70E740481C1C}">
+                <a14:useLocalDpi xmlns:a14="http://schemas.microsoft.com/office/drawing/2010/main" val="0"/>
+              </a:ext>
+            </a:extLst>
+          </a:blip>
+          <a:stretch>
+            <a:fillRect/>
+          </a:stretch>
+        </p:blipFill>
+        <p:spPr>
+          <a:xfrm>
+            <a:off x="5306566" y="2514598"/>
+            <a:ext cx="1578867" cy="1828804"/>
           </a:xfrm>
           <a:prstGeom prst="rect">
             <a:avLst/>
           </a:prstGeom>
-          <a:solidFill>
-            <a:schemeClr val="bg1">
-              <a:lumMod val="95000"/>
-            </a:schemeClr>
-          </a:solidFill>
-          <a:ln w="38100"/>
+        </p:spPr>
+      </p:pic>
+      <p:sp>
+        <p:nvSpPr>
+          <p:cNvPr id="3" name="Rectangle 2"/>
+          <p:cNvSpPr/>
+          <p:nvPr/>
+        </p:nvSpPr>
+        <p:spPr>
+          <a:xfrm>
+            <a:off x="5054138" y="2394066"/>
+            <a:ext cx="2094807" cy="2078182"/>
+          </a:xfrm>
+          <a:prstGeom prst="rect">
+            <a:avLst/>
+          </a:prstGeom>
+          <a:noFill/>
         </p:spPr>
         <p:style>
           <a:lnRef idx="2">
@@ -3675,6 +3746,82 @@
           </a:p>
         </p:txBody>
       </p:sp>
+    </p:spTree>
+    <p:extLst>
+      <p:ext uri="{BB962C8B-B14F-4D97-AF65-F5344CB8AC3E}">
+        <p14:creationId xmlns:p14="http://schemas.microsoft.com/office/powerpoint/2010/main" val="2048573925"/>
+      </p:ext>
+    </p:extLst>
+  </p:cSld>
+  <p:clrMapOvr>
+    <a:masterClrMapping/>
+  </p:clrMapOvr>
+</p:sld>
+</file>
+
+<file path=ppt/slides/slide2.xml><?xml version="1.0" encoding="utf-8"?>
+<p:sld xmlns:a="http://schemas.openxmlformats.org/drawingml/2006/main" xmlns:r="http://schemas.openxmlformats.org/officeDocument/2006/relationships" xmlns:p="http://schemas.openxmlformats.org/presentationml/2006/main">
+  <p:cSld>
+    <p:spTree>
+      <p:nvGrpSpPr>
+        <p:cNvPr id="1" name=""/>
+        <p:cNvGrpSpPr/>
+        <p:nvPr/>
+      </p:nvGrpSpPr>
+      <p:grpSpPr>
+        <a:xfrm>
+          <a:off x="0" y="0"/>
+          <a:ext cx="0" cy="0"/>
+          <a:chOff x="0" y="0"/>
+          <a:chExt cx="0" cy="0"/>
+        </a:xfrm>
+      </p:grpSpPr>
+      <p:sp>
+        <p:nvSpPr>
+          <p:cNvPr id="4" name="Rectangle 3"/>
+          <p:cNvSpPr/>
+          <p:nvPr/>
+        </p:nvSpPr>
+        <p:spPr>
+          <a:xfrm>
+            <a:off x="1808702" y="824230"/>
+            <a:ext cx="8778240" cy="5010912"/>
+          </a:xfrm>
+          <a:prstGeom prst="rect">
+            <a:avLst/>
+          </a:prstGeom>
+          <a:solidFill>
+            <a:schemeClr val="bg1">
+              <a:lumMod val="95000"/>
+            </a:schemeClr>
+          </a:solidFill>
+          <a:ln w="38100"/>
+        </p:spPr>
+        <p:style>
+          <a:lnRef idx="2">
+            <a:schemeClr val="accent1">
+              <a:shade val="50000"/>
+            </a:schemeClr>
+          </a:lnRef>
+          <a:fillRef idx="1">
+            <a:schemeClr val="accent1"/>
+          </a:fillRef>
+          <a:effectRef idx="0">
+            <a:schemeClr val="accent1"/>
+          </a:effectRef>
+          <a:fontRef idx="minor">
+            <a:schemeClr val="lt1"/>
+          </a:fontRef>
+        </p:style>
+        <p:txBody>
+          <a:bodyPr rtlCol="0" anchor="ctr"/>
+          <a:lstStyle/>
+          <a:p>
+            <a:pPr algn="ctr"/>
+            <a:endParaRPr lang="en-US"/>
+          </a:p>
+        </p:txBody>
+      </p:sp>
       <p:sp>
         <p:nvSpPr>
           <p:cNvPr id="7" name="TextBox 6"/>
@@ -3683,7 +3830,7 @@
         </p:nvSpPr>
         <p:spPr>
           <a:xfrm>
-            <a:off x="4184694" y="1065121"/>
+            <a:off x="4003824" y="1483154"/>
             <a:ext cx="5712369" cy="1754326"/>
           </a:xfrm>
           <a:prstGeom prst="rect">
@@ -3744,8 +3891,8 @@
         </p:nvSpPr>
         <p:spPr>
           <a:xfrm>
-            <a:off x="2035110" y="3043759"/>
-            <a:ext cx="5005769" cy="1200329"/>
+            <a:off x="2000886" y="3743671"/>
+            <a:ext cx="5005769" cy="923330"/>
           </a:xfrm>
           <a:prstGeom prst="rect">
             <a:avLst/>
@@ -3777,17 +3924,8 @@
             <a:pPr algn="ctr"/>
             <a:r>
               <a:rPr lang="en-US" i="1" dirty="0" smtClean="0"/>
-              <a:t>Lecture slides 25-43</a:t>
-            </a:r>
-            <a:endParaRPr lang="en-US" i="1" dirty="0"/>
-          </a:p>
-          <a:p>
-            <a:pPr algn="ctr"/>
-            <a:r>
-              <a:rPr lang="en-US" i="1" dirty="0" smtClean="0"/>
-              <a:t>(Second half)</a:t>
-            </a:r>
-            <a:endParaRPr lang="en-US" i="1" dirty="0"/>
+              <a:t>Lecture Slide Examples Worked</a:t>
+            </a:r>
           </a:p>
         </p:txBody>
       </p:sp>
@@ -3929,7 +4067,7 @@
     </p:spTree>
     <p:extLst>
       <p:ext uri="{BB962C8B-B14F-4D97-AF65-F5344CB8AC3E}">
-        <p14:creationId xmlns:p14="http://schemas.microsoft.com/office/powerpoint/2010/main" val="1429724622"/>
+        <p14:creationId xmlns:p14="http://schemas.microsoft.com/office/powerpoint/2010/main" val="267042058"/>
       </p:ext>
     </p:extLst>
   </p:cSld>
@@ -3939,7 +4077,7 @@
 </p:sld>
 </file>
 
-<file path=ppt/slides/slide4.xml><?xml version="1.0" encoding="utf-8"?>
+<file path=ppt/slides/slide3.xml><?xml version="1.0" encoding="utf-8"?>
 <p:sld xmlns:a="http://schemas.openxmlformats.org/drawingml/2006/main" xmlns:r="http://schemas.openxmlformats.org/officeDocument/2006/relationships" xmlns:p="http://schemas.openxmlformats.org/presentationml/2006/main">
   <p:cSld>
     <p:spTree>
@@ -4010,8 +4148,8 @@
         </p:nvSpPr>
         <p:spPr>
           <a:xfrm>
-            <a:off x="3840385" y="1213849"/>
-            <a:ext cx="5712369" cy="923330"/>
+            <a:off x="4184694" y="1065121"/>
+            <a:ext cx="5712369" cy="1754326"/>
           </a:xfrm>
           <a:prstGeom prst="rect">
             <a:avLst/>
@@ -4026,7 +4164,7 @@
           <a:p>
             <a:r>
               <a:rPr lang="en-US" sz="5400" dirty="0" smtClean="0"/>
-              <a:t>INCLASS LECTURES</a:t>
+              <a:t>OUT-OF-CLASS LECTURES</a:t>
             </a:r>
             <a:endParaRPr lang="en-US" sz="5400" dirty="0"/>
           </a:p>
@@ -4057,15 +4195,7 @@
             <a:pPr algn="ctr"/>
             <a:r>
               <a:rPr lang="en-US" dirty="0" smtClean="0"/>
-              <a:t>Feb. </a:t>
-            </a:r>
-            <a:r>
-              <a:rPr lang="en-US" dirty="0" smtClean="0"/>
-              <a:t>5, </a:t>
-            </a:r>
-            <a:r>
-              <a:rPr lang="en-US" dirty="0" smtClean="0"/>
-              <a:t>2020</a:t>
+              <a:t>Jan. 24, 2020</a:t>
             </a:r>
             <a:endParaRPr lang="en-US" dirty="0"/>
           </a:p>
@@ -4080,7 +4210,7 @@
         <p:spPr>
           <a:xfrm>
             <a:off x="2035110" y="3043759"/>
-            <a:ext cx="5005769" cy="1477328"/>
+            <a:ext cx="5005769" cy="1200329"/>
           </a:xfrm>
           <a:prstGeom prst="rect">
             <a:avLst/>
@@ -4096,18 +4226,15 @@
             <a:pPr algn="ctr"/>
             <a:r>
               <a:rPr lang="en-US" dirty="0" smtClean="0"/>
-              <a:t>Chapter </a:t>
-            </a:r>
-            <a:r>
-              <a:rPr lang="en-US" dirty="0"/>
-              <a:t>6</a:t>
-            </a:r>
+              <a:t>Chapter 4</a:t>
+            </a:r>
+            <a:endParaRPr lang="en-US" dirty="0"/>
           </a:p>
           <a:p>
             <a:pPr algn="ctr"/>
             <a:r>
               <a:rPr lang="en-US" b="1" u="sng" dirty="0" smtClean="0"/>
-              <a:t>Confidence Interval Estimation: The t Distribution</a:t>
+              <a:t>Standardized Scores &amp; the Normal Distribution</a:t>
             </a:r>
             <a:endParaRPr lang="en-US" b="1" u="sng" dirty="0"/>
           </a:p>
@@ -4115,7 +4242,7 @@
             <a:pPr algn="ctr"/>
             <a:r>
               <a:rPr lang="en-US" i="1" dirty="0" smtClean="0"/>
-              <a:t>Lecture slides</a:t>
+              <a:t>Lecture slides 25-43</a:t>
             </a:r>
             <a:endParaRPr lang="en-US" i="1" dirty="0"/>
           </a:p>
@@ -4123,22 +4250,7 @@
             <a:pPr algn="ctr"/>
             <a:r>
               <a:rPr lang="en-US" i="1" dirty="0" smtClean="0"/>
-              <a:t>(second </a:t>
-            </a:r>
-            <a:r>
-              <a:rPr lang="en-US" i="1" dirty="0" smtClean="0"/>
-              <a:t>half</a:t>
-            </a:r>
-            <a:r>
-              <a:rPr lang="en-US" i="1" dirty="0" smtClean="0"/>
-              <a:t>)</a:t>
-            </a:r>
-          </a:p>
-          <a:p>
-            <a:pPr algn="ctr"/>
-            <a:r>
-              <a:rPr lang="en-US" i="1" dirty="0" smtClean="0"/>
-              <a:t>Homework Helps</a:t>
+              <a:t>(Second half)</a:t>
             </a:r>
             <a:endParaRPr lang="en-US" i="1" dirty="0"/>
           </a:p>
@@ -4282,7 +4394,7 @@
     </p:spTree>
     <p:extLst>
       <p:ext uri="{BB962C8B-B14F-4D97-AF65-F5344CB8AC3E}">
-        <p14:creationId xmlns:p14="http://schemas.microsoft.com/office/powerpoint/2010/main" val="4154058086"/>
+        <p14:creationId xmlns:p14="http://schemas.microsoft.com/office/powerpoint/2010/main" val="1429724622"/>
       </p:ext>
     </p:extLst>
   </p:cSld>
@@ -4292,7 +4404,7 @@
 </p:sld>
 </file>
 
-<file path=ppt/slides/slide5.xml><?xml version="1.0" encoding="utf-8"?>
+<file path=ppt/slides/slide4.xml><?xml version="1.0" encoding="utf-8"?>
 <p:sld xmlns:a="http://schemas.openxmlformats.org/drawingml/2006/main" xmlns:r="http://schemas.openxmlformats.org/officeDocument/2006/relationships" xmlns:p="http://schemas.openxmlformats.org/presentationml/2006/main">
   <p:cSld>
     <p:spTree>
@@ -4410,7 +4522,15 @@
             <a:pPr algn="ctr"/>
             <a:r>
               <a:rPr lang="en-US" dirty="0" smtClean="0"/>
-              <a:t>Feb. 3, 2020</a:t>
+              <a:t>Feb. </a:t>
+            </a:r>
+            <a:r>
+              <a:rPr lang="en-US" dirty="0" smtClean="0"/>
+              <a:t>12, </a:t>
+            </a:r>
+            <a:r>
+              <a:rPr lang="en-US" dirty="0" smtClean="0"/>
+              <a:t>2020</a:t>
             </a:r>
             <a:endParaRPr lang="en-US" dirty="0"/>
           </a:p>
@@ -4424,8 +4544,8 @@
         </p:nvSpPr>
         <p:spPr>
           <a:xfrm>
-            <a:off x="2035110" y="3043759"/>
-            <a:ext cx="5005769" cy="2585323"/>
+            <a:off x="2175357" y="4235713"/>
+            <a:ext cx="5005769" cy="923330"/>
           </a:xfrm>
           <a:prstGeom prst="rect">
             <a:avLst/>
@@ -4440,12 +4560,12 @@
           <a:p>
             <a:pPr algn="ctr"/>
             <a:r>
+              <a:rPr lang="en-US" dirty="0" smtClean="0"/>
+              <a:t>Chapter </a:t>
+            </a:r>
+            <a:r>
               <a:rPr lang="en-US" dirty="0"/>
-              <a:t>Chapter </a:t>
-            </a:r>
-            <a:r>
-              <a:rPr lang="en-US" dirty="0" smtClean="0"/>
-              <a:t>5</a:t>
+              <a:t>9</a:t>
             </a:r>
             <a:endParaRPr lang="en-US" dirty="0"/>
           </a:p>
@@ -4453,62 +4573,17 @@
             <a:pPr algn="ctr"/>
             <a:r>
               <a:rPr lang="en-US" b="1" u="sng" dirty="0" smtClean="0"/>
-              <a:t>Intro to Hypothesis Testing: 1 sample z-Test</a:t>
-            </a:r>
-            <a:endParaRPr lang="en-US" b="1" u="sng" dirty="0"/>
+              <a:t>Correlation</a:t>
+            </a:r>
+            <a:endParaRPr lang="en-US" dirty="0" smtClean="0"/>
           </a:p>
           <a:p>
             <a:pPr algn="ctr"/>
             <a:r>
               <a:rPr lang="en-US" i="1" dirty="0" smtClean="0"/>
-              <a:t>Finish </a:t>
-            </a:r>
-            <a:r>
-              <a:rPr lang="en-US" i="1" dirty="0"/>
-              <a:t>discussion</a:t>
-            </a:r>
-          </a:p>
-          <a:p>
-            <a:pPr algn="ctr"/>
-            <a:r>
-              <a:rPr lang="en-US" i="1" dirty="0"/>
-              <a:t>Homework questions</a:t>
-            </a:r>
-          </a:p>
-          <a:p>
-            <a:pPr algn="ctr"/>
-            <a:endParaRPr lang="en-US" i="1" dirty="0"/>
-          </a:p>
-          <a:p>
-            <a:pPr algn="ctr"/>
-            <a:r>
-              <a:rPr lang="en-US" dirty="0"/>
-              <a:t>Chapter 6</a:t>
-            </a:r>
-          </a:p>
-          <a:p>
-            <a:pPr algn="ctr"/>
-            <a:r>
-              <a:rPr lang="en-US" b="1" u="sng" dirty="0" smtClean="0"/>
-              <a:t>Confidence Interval Estimation: The t Distribution</a:t>
-            </a:r>
-            <a:endParaRPr lang="en-US" b="1" u="sng" dirty="0"/>
-          </a:p>
-          <a:p>
-            <a:pPr algn="ctr"/>
-            <a:r>
-              <a:rPr lang="en-US" i="1" dirty="0" smtClean="0"/>
-              <a:t>Lecture slides</a:t>
-            </a:r>
-            <a:endParaRPr lang="en-US" i="1" dirty="0"/>
-          </a:p>
-          <a:p>
-            <a:pPr algn="ctr"/>
-            <a:r>
-              <a:rPr lang="en-US" i="1" dirty="0" smtClean="0"/>
-              <a:t>(first half)</a:t>
-            </a:r>
-            <a:endParaRPr lang="en-US" i="1" dirty="0"/>
+              <a:t>First half, chapter slides</a:t>
+            </a:r>
+            <a:endParaRPr lang="en-US" i="1" dirty="0" smtClean="0"/>
           </a:p>
         </p:txBody>
       </p:sp>
@@ -4647,10 +4722,74 @@
           </a:prstGeom>
         </p:spPr>
       </p:pic>
+      <p:sp>
+        <p:nvSpPr>
+          <p:cNvPr id="13" name="TextBox 12"/>
+          <p:cNvSpPr txBox="1"/>
+          <p:nvPr/>
+        </p:nvSpPr>
+        <p:spPr>
+          <a:xfrm>
+            <a:off x="2175358" y="2646127"/>
+            <a:ext cx="5005769" cy="1477328"/>
+          </a:xfrm>
+          <a:prstGeom prst="rect">
+            <a:avLst/>
+          </a:prstGeom>
+          <a:noFill/>
+        </p:spPr>
+        <p:txBody>
+          <a:bodyPr wrap="square" rtlCol="0">
+            <a:spAutoFit/>
+          </a:bodyPr>
+          <a:lstStyle/>
+          <a:p>
+            <a:pPr algn="ctr"/>
+            <a:r>
+              <a:rPr lang="en-US" dirty="0" smtClean="0"/>
+              <a:t>Chapter </a:t>
+            </a:r>
+            <a:r>
+              <a:rPr lang="en-US" dirty="0"/>
+              <a:t>8</a:t>
+            </a:r>
+          </a:p>
+          <a:p>
+            <a:pPr algn="ctr"/>
+            <a:r>
+              <a:rPr lang="en-US" b="1" u="sng" dirty="0" smtClean="0"/>
+              <a:t>Effect Size &amp; Power Analysis</a:t>
+            </a:r>
+            <a:endParaRPr lang="en-US" dirty="0" smtClean="0"/>
+          </a:p>
+          <a:p>
+            <a:pPr algn="ctr"/>
+            <a:r>
+              <a:rPr lang="en-US" i="1" dirty="0" smtClean="0"/>
+              <a:t>Chapter slides</a:t>
+            </a:r>
+          </a:p>
+          <a:p>
+            <a:pPr algn="ctr"/>
+            <a:r>
+              <a:rPr lang="en-US" i="1" dirty="0" smtClean="0"/>
+              <a:t>Demo G*Power software</a:t>
+            </a:r>
+          </a:p>
+          <a:p>
+            <a:pPr algn="ctr"/>
+            <a:r>
+              <a:rPr lang="en-US" i="1" dirty="0" smtClean="0"/>
+              <a:t>Homework Help</a:t>
+            </a:r>
+            <a:endParaRPr lang="en-US" i="1" dirty="0" smtClean="0"/>
+          </a:p>
+        </p:txBody>
+      </p:sp>
     </p:spTree>
     <p:extLst>
       <p:ext uri="{BB962C8B-B14F-4D97-AF65-F5344CB8AC3E}">
-        <p14:creationId xmlns:p14="http://schemas.microsoft.com/office/powerpoint/2010/main" val="1136618621"/>
+        <p14:creationId xmlns:p14="http://schemas.microsoft.com/office/powerpoint/2010/main" val="3221510669"/>
       </p:ext>
     </p:extLst>
   </p:cSld>
@@ -4660,7 +4799,7 @@
 </p:sld>
 </file>
 
-<file path=ppt/slides/slide6.xml><?xml version="1.0" encoding="utf-8"?>
+<file path=ppt/slides/slide5.xml><?xml version="1.0" encoding="utf-8"?>
 <p:sld xmlns:a="http://schemas.openxmlformats.org/drawingml/2006/main" xmlns:r="http://schemas.openxmlformats.org/officeDocument/2006/relationships" xmlns:p="http://schemas.openxmlformats.org/presentationml/2006/main">
   <p:cSld>
     <p:spTree>
@@ -4778,7 +4917,15 @@
             <a:pPr algn="ctr"/>
             <a:r>
               <a:rPr lang="en-US" dirty="0" smtClean="0"/>
-              <a:t>Jan. 22, 2020</a:t>
+              <a:t>Feb. </a:t>
+            </a:r>
+            <a:r>
+              <a:rPr lang="en-US" dirty="0" smtClean="0"/>
+              <a:t>10, </a:t>
+            </a:r>
+            <a:r>
+              <a:rPr lang="en-US" dirty="0" smtClean="0"/>
+              <a:t>2020</a:t>
             </a:r>
             <a:endParaRPr lang="en-US" dirty="0"/>
           </a:p>
@@ -4793,7 +4940,7 @@
         <p:spPr>
           <a:xfrm>
             <a:off x="2035110" y="3043759"/>
-            <a:ext cx="5005769" cy="2585323"/>
+            <a:ext cx="5005769" cy="923330"/>
           </a:xfrm>
           <a:prstGeom prst="rect">
             <a:avLst/>
@@ -4808,72 +4955,35 @@
           <a:p>
             <a:pPr algn="ctr"/>
             <a:r>
+              <a:rPr lang="en-US" dirty="0" smtClean="0"/>
+              <a:t>Chapter </a:t>
+            </a:r>
+            <a:r>
               <a:rPr lang="en-US" dirty="0"/>
-              <a:t>Chapter 3</a:t>
-            </a:r>
+              <a:t>7</a:t>
+            </a:r>
+            <a:endParaRPr lang="en-US" dirty="0"/>
           </a:p>
           <a:p>
             <a:pPr algn="ctr"/>
             <a:r>
               <a:rPr lang="en-US" b="1" u="sng" dirty="0"/>
-              <a:t>Variable/Scale, Rounding &amp; Summation</a:t>
+              <a:t>Independent Samples t-Test for </a:t>
+            </a:r>
+            <a:r>
+              <a:rPr lang="en-US" b="1" u="sng" dirty="0" smtClean="0"/>
+              <a:t>Means</a:t>
             </a:r>
           </a:p>
           <a:p>
             <a:pPr algn="ctr"/>
             <a:r>
               <a:rPr lang="en-US" i="1" dirty="0" smtClean="0"/>
-              <a:t>Finish </a:t>
-            </a:r>
-            <a:r>
-              <a:rPr lang="en-US" i="1" dirty="0"/>
-              <a:t>discussion</a:t>
-            </a:r>
-          </a:p>
-          <a:p>
-            <a:pPr algn="ctr"/>
-            <a:r>
-              <a:rPr lang="en-US" i="1" dirty="0"/>
-              <a:t>Homework questions</a:t>
-            </a:r>
-          </a:p>
-          <a:p>
-            <a:pPr algn="ctr"/>
-            <a:endParaRPr lang="en-US" i="1" dirty="0"/>
-          </a:p>
-          <a:p>
-            <a:pPr algn="ctr"/>
-            <a:r>
-              <a:rPr lang="en-US" dirty="0"/>
-              <a:t>Chapter </a:t>
-            </a:r>
-            <a:r>
-              <a:rPr lang="en-US" dirty="0" smtClean="0"/>
-              <a:t>4</a:t>
-            </a:r>
-            <a:endParaRPr lang="en-US" dirty="0"/>
-          </a:p>
-          <a:p>
-            <a:pPr algn="ctr"/>
-            <a:r>
-              <a:rPr lang="en-US" b="1" u="sng" dirty="0" smtClean="0"/>
-              <a:t>Standardized Scores &amp; the Normal Distribution</a:t>
-            </a:r>
-            <a:endParaRPr lang="en-US" b="1" u="sng" dirty="0"/>
-          </a:p>
-          <a:p>
-            <a:pPr algn="ctr"/>
+              <a:t>Mostly Homework </a:t>
+            </a:r>
             <a:r>
               <a:rPr lang="en-US" i="1" dirty="0" smtClean="0"/>
-              <a:t>Lecture slides</a:t>
-            </a:r>
-            <a:endParaRPr lang="en-US" i="1" dirty="0"/>
-          </a:p>
-          <a:p>
-            <a:pPr algn="ctr"/>
-            <a:r>
-              <a:rPr lang="en-US" i="1" dirty="0" smtClean="0"/>
-              <a:t>(first half)</a:t>
+              <a:t>Helps</a:t>
             </a:r>
             <a:endParaRPr lang="en-US" i="1" dirty="0"/>
           </a:p>
@@ -5017,7 +5127,7 @@
     </p:spTree>
     <p:extLst>
       <p:ext uri="{BB962C8B-B14F-4D97-AF65-F5344CB8AC3E}">
-        <p14:creationId xmlns:p14="http://schemas.microsoft.com/office/powerpoint/2010/main" val="2900019700"/>
+        <p14:creationId xmlns:p14="http://schemas.microsoft.com/office/powerpoint/2010/main" val="2916572011"/>
       </p:ext>
     </p:extLst>
   </p:cSld>
@@ -5027,7 +5137,7 @@
 </p:sld>
 </file>
 
-<file path=ppt/slides/slide7.xml><?xml version="1.0" encoding="utf-8"?>
+<file path=ppt/slides/slide6.xml><?xml version="1.0" encoding="utf-8"?>
 <p:sld xmlns:a="http://schemas.openxmlformats.org/drawingml/2006/main" xmlns:r="http://schemas.openxmlformats.org/officeDocument/2006/relationships" xmlns:p="http://schemas.openxmlformats.org/presentationml/2006/main">
   <p:cSld>
     <p:spTree>
@@ -5145,7 +5255,7 @@
             <a:pPr algn="ctr"/>
             <a:r>
               <a:rPr lang="en-US" dirty="0" smtClean="0"/>
-              <a:t>Jan. 15, 2020</a:t>
+              <a:t>Feb. 5, 2020</a:t>
             </a:r>
             <a:endParaRPr lang="en-US" dirty="0"/>
           </a:p>
@@ -5159,8 +5269,8 @@
         </p:nvSpPr>
         <p:spPr>
           <a:xfrm>
-            <a:off x="2318419" y="3043759"/>
-            <a:ext cx="4212906" cy="2585323"/>
+            <a:off x="2035110" y="3043759"/>
+            <a:ext cx="5005769" cy="1477328"/>
           </a:xfrm>
           <a:prstGeom prst="rect">
             <a:avLst/>
@@ -5176,47 +5286,20 @@
             <a:pPr algn="ctr"/>
             <a:r>
               <a:rPr lang="en-US" dirty="0" smtClean="0"/>
-              <a:t>Chapter 1</a:t>
+              <a:t>Chapter </a:t>
+            </a:r>
+            <a:r>
+              <a:rPr lang="en-US" dirty="0"/>
+              <a:t>6</a:t>
             </a:r>
           </a:p>
           <a:p>
             <a:pPr algn="ctr"/>
             <a:r>
               <a:rPr lang="en-US" b="1" u="sng" dirty="0" smtClean="0"/>
-              <a:t>Variable/Scale, Rounding &amp; Summation</a:t>
-            </a:r>
-          </a:p>
-          <a:p>
-            <a:pPr algn="ctr"/>
-            <a:r>
-              <a:rPr lang="en-US" i="1" dirty="0" smtClean="0"/>
-              <a:t>Finish discussion</a:t>
-            </a:r>
-          </a:p>
-          <a:p>
-            <a:pPr algn="ctr"/>
-            <a:r>
-              <a:rPr lang="en-US" i="1" dirty="0" smtClean="0"/>
-              <a:t>Homework questions</a:t>
-            </a:r>
-          </a:p>
-          <a:p>
-            <a:pPr algn="ctr"/>
-            <a:endParaRPr lang="en-US" i="1" dirty="0" smtClean="0"/>
-          </a:p>
-          <a:p>
-            <a:pPr algn="ctr"/>
-            <a:r>
-              <a:rPr lang="en-US" dirty="0"/>
-              <a:t>Chapter 2 </a:t>
-            </a:r>
-          </a:p>
-          <a:p>
-            <a:pPr algn="ctr"/>
-            <a:r>
-              <a:rPr lang="en-US" b="1" u="sng" dirty="0"/>
-              <a:t>Exploring Data with Plots</a:t>
-            </a:r>
+              <a:t>Confidence Interval Estimation: The t Distribution</a:t>
+            </a:r>
+            <a:endParaRPr lang="en-US" b="1" u="sng" dirty="0"/>
           </a:p>
           <a:p>
             <a:pPr algn="ctr"/>
@@ -5229,12 +5312,15 @@
           <a:p>
             <a:pPr algn="ctr"/>
             <a:r>
-              <a:rPr lang="en-US" i="1" dirty="0"/>
-              <a:t>Homework </a:t>
-            </a:r>
-            <a:r>
               <a:rPr lang="en-US" i="1" dirty="0" smtClean="0"/>
-              <a:t>questions</a:t>
+              <a:t>(second half)</a:t>
+            </a:r>
+          </a:p>
+          <a:p>
+            <a:pPr algn="ctr"/>
+            <a:r>
+              <a:rPr lang="en-US" i="1" dirty="0" smtClean="0"/>
+              <a:t>Homework Helps</a:t>
             </a:r>
             <a:endParaRPr lang="en-US" i="1" dirty="0"/>
           </a:p>
@@ -5378,7 +5464,344 @@
     </p:spTree>
     <p:extLst>
       <p:ext uri="{BB962C8B-B14F-4D97-AF65-F5344CB8AC3E}">
-        <p14:creationId xmlns:p14="http://schemas.microsoft.com/office/powerpoint/2010/main" val="3290463226"/>
+        <p14:creationId xmlns:p14="http://schemas.microsoft.com/office/powerpoint/2010/main" val="3019460125"/>
+      </p:ext>
+    </p:extLst>
+  </p:cSld>
+  <p:clrMapOvr>
+    <a:masterClrMapping/>
+  </p:clrMapOvr>
+</p:sld>
+</file>
+
+<file path=ppt/slides/slide7.xml><?xml version="1.0" encoding="utf-8"?>
+<p:sld xmlns:a="http://schemas.openxmlformats.org/drawingml/2006/main" xmlns:r="http://schemas.openxmlformats.org/officeDocument/2006/relationships" xmlns:p="http://schemas.openxmlformats.org/presentationml/2006/main">
+  <p:cSld>
+    <p:spTree>
+      <p:nvGrpSpPr>
+        <p:cNvPr id="1" name=""/>
+        <p:cNvGrpSpPr/>
+        <p:nvPr/>
+      </p:nvGrpSpPr>
+      <p:grpSpPr>
+        <a:xfrm>
+          <a:off x="0" y="0"/>
+          <a:ext cx="0" cy="0"/>
+          <a:chOff x="0" y="0"/>
+          <a:chExt cx="0" cy="0"/>
+        </a:xfrm>
+      </p:grpSpPr>
+      <p:sp>
+        <p:nvSpPr>
+          <p:cNvPr id="4" name="Rectangle 3"/>
+          <p:cNvSpPr/>
+          <p:nvPr/>
+        </p:nvSpPr>
+        <p:spPr>
+          <a:xfrm>
+            <a:off x="1808702" y="824230"/>
+            <a:ext cx="8778240" cy="5010912"/>
+          </a:xfrm>
+          <a:prstGeom prst="rect">
+            <a:avLst/>
+          </a:prstGeom>
+          <a:solidFill>
+            <a:schemeClr val="bg1">
+              <a:lumMod val="95000"/>
+            </a:schemeClr>
+          </a:solidFill>
+          <a:ln w="38100"/>
+        </p:spPr>
+        <p:style>
+          <a:lnRef idx="2">
+            <a:schemeClr val="accent1">
+              <a:shade val="50000"/>
+            </a:schemeClr>
+          </a:lnRef>
+          <a:fillRef idx="1">
+            <a:schemeClr val="accent1"/>
+          </a:fillRef>
+          <a:effectRef idx="0">
+            <a:schemeClr val="accent1"/>
+          </a:effectRef>
+          <a:fontRef idx="minor">
+            <a:schemeClr val="lt1"/>
+          </a:fontRef>
+        </p:style>
+        <p:txBody>
+          <a:bodyPr rtlCol="0" anchor="ctr"/>
+          <a:lstStyle/>
+          <a:p>
+            <a:pPr algn="ctr"/>
+            <a:endParaRPr lang="en-US"/>
+          </a:p>
+        </p:txBody>
+      </p:sp>
+      <p:sp>
+        <p:nvSpPr>
+          <p:cNvPr id="7" name="TextBox 6"/>
+          <p:cNvSpPr txBox="1"/>
+          <p:nvPr/>
+        </p:nvSpPr>
+        <p:spPr>
+          <a:xfrm>
+            <a:off x="3840385" y="1213849"/>
+            <a:ext cx="5712369" cy="923330"/>
+          </a:xfrm>
+          <a:prstGeom prst="rect">
+            <a:avLst/>
+          </a:prstGeom>
+          <a:noFill/>
+        </p:spPr>
+        <p:txBody>
+          <a:bodyPr wrap="square" rtlCol="0">
+            <a:spAutoFit/>
+          </a:bodyPr>
+          <a:lstStyle/>
+          <a:p>
+            <a:r>
+              <a:rPr lang="en-US" sz="5400" dirty="0" smtClean="0"/>
+              <a:t>INCLASS LECTURES</a:t>
+            </a:r>
+            <a:endParaRPr lang="en-US" sz="5400" dirty="0"/>
+          </a:p>
+        </p:txBody>
+      </p:sp>
+      <p:sp>
+        <p:nvSpPr>
+          <p:cNvPr id="8" name="TextBox 7"/>
+          <p:cNvSpPr txBox="1"/>
+          <p:nvPr/>
+        </p:nvSpPr>
+        <p:spPr>
+          <a:xfrm>
+            <a:off x="7731444" y="5278932"/>
+            <a:ext cx="2076450" cy="369332"/>
+          </a:xfrm>
+          <a:prstGeom prst="rect">
+            <a:avLst/>
+          </a:prstGeom>
+          <a:noFill/>
+        </p:spPr>
+        <p:txBody>
+          <a:bodyPr wrap="square" rtlCol="0">
+            <a:spAutoFit/>
+          </a:bodyPr>
+          <a:lstStyle/>
+          <a:p>
+            <a:pPr algn="ctr"/>
+            <a:r>
+              <a:rPr lang="en-US" dirty="0" smtClean="0"/>
+              <a:t>Feb. 5, 2020</a:t>
+            </a:r>
+            <a:endParaRPr lang="en-US" dirty="0"/>
+          </a:p>
+        </p:txBody>
+      </p:sp>
+      <p:sp>
+        <p:nvSpPr>
+          <p:cNvPr id="9" name="TextBox 8"/>
+          <p:cNvSpPr txBox="1"/>
+          <p:nvPr/>
+        </p:nvSpPr>
+        <p:spPr>
+          <a:xfrm>
+            <a:off x="2035110" y="3043759"/>
+            <a:ext cx="5005769" cy="1477328"/>
+          </a:xfrm>
+          <a:prstGeom prst="rect">
+            <a:avLst/>
+          </a:prstGeom>
+          <a:noFill/>
+        </p:spPr>
+        <p:txBody>
+          <a:bodyPr wrap="square" rtlCol="0">
+            <a:spAutoFit/>
+          </a:bodyPr>
+          <a:lstStyle/>
+          <a:p>
+            <a:pPr algn="ctr"/>
+            <a:r>
+              <a:rPr lang="en-US" dirty="0" smtClean="0"/>
+              <a:t>Chapter </a:t>
+            </a:r>
+            <a:r>
+              <a:rPr lang="en-US" dirty="0"/>
+              <a:t>6</a:t>
+            </a:r>
+          </a:p>
+          <a:p>
+            <a:pPr algn="ctr"/>
+            <a:r>
+              <a:rPr lang="en-US" b="1" u="sng" dirty="0" smtClean="0"/>
+              <a:t>Confidence Interval Estimation: The t Distribution</a:t>
+            </a:r>
+            <a:endParaRPr lang="en-US" b="1" u="sng" dirty="0"/>
+          </a:p>
+          <a:p>
+            <a:pPr algn="ctr"/>
+            <a:r>
+              <a:rPr lang="en-US" i="1" dirty="0" smtClean="0"/>
+              <a:t>Lecture slides</a:t>
+            </a:r>
+            <a:endParaRPr lang="en-US" i="1" dirty="0"/>
+          </a:p>
+          <a:p>
+            <a:pPr algn="ctr"/>
+            <a:r>
+              <a:rPr lang="en-US" i="1" dirty="0" smtClean="0"/>
+              <a:t>(second half)</a:t>
+            </a:r>
+          </a:p>
+          <a:p>
+            <a:pPr algn="ctr"/>
+            <a:r>
+              <a:rPr lang="en-US" i="1" dirty="0" smtClean="0"/>
+              <a:t>Homework Helps</a:t>
+            </a:r>
+            <a:endParaRPr lang="en-US" i="1" dirty="0"/>
+          </a:p>
+        </p:txBody>
+      </p:sp>
+      <p:grpSp>
+        <p:nvGrpSpPr>
+          <p:cNvPr id="14" name="Group 13"/>
+          <p:cNvGrpSpPr/>
+          <p:nvPr/>
+        </p:nvGrpSpPr>
+        <p:grpSpPr>
+          <a:xfrm>
+            <a:off x="7198839" y="2137179"/>
+            <a:ext cx="3141660" cy="3193339"/>
+            <a:chOff x="7047391" y="1961976"/>
+            <a:chExt cx="3141660" cy="3193339"/>
+          </a:xfrm>
+        </p:grpSpPr>
+        <p:pic>
+          <p:nvPicPr>
+            <p:cNvPr id="2" name="Picture 1"/>
+            <p:cNvPicPr>
+              <a:picLocks noChangeAspect="1"/>
+            </p:cNvPicPr>
+            <p:nvPr/>
+          </p:nvPicPr>
+          <p:blipFill>
+            <a:blip r:embed="rId2" cstate="print">
+              <a:extLst>
+                <a:ext uri="{28A0092B-C50C-407E-A947-70E740481C1C}">
+                  <a14:useLocalDpi xmlns:a14="http://schemas.microsoft.com/office/drawing/2010/main" val="0"/>
+                </a:ext>
+              </a:extLst>
+            </a:blip>
+            <a:stretch>
+              <a:fillRect/>
+            </a:stretch>
+          </p:blipFill>
+          <p:spPr>
+            <a:xfrm>
+              <a:off x="7047391" y="3320161"/>
+              <a:ext cx="1578867" cy="1828804"/>
+            </a:xfrm>
+            <a:prstGeom prst="rect">
+              <a:avLst/>
+            </a:prstGeom>
+          </p:spPr>
+        </p:pic>
+        <p:pic>
+          <p:nvPicPr>
+            <p:cNvPr id="3" name="Picture 2"/>
+            <p:cNvPicPr>
+              <a:picLocks noChangeAspect="1"/>
+            </p:cNvPicPr>
+            <p:nvPr/>
+          </p:nvPicPr>
+          <p:blipFill>
+            <a:blip r:embed="rId3" cstate="print">
+              <a:extLst>
+                <a:ext uri="{28A0092B-C50C-407E-A947-70E740481C1C}">
+                  <a14:useLocalDpi xmlns:a14="http://schemas.microsoft.com/office/drawing/2010/main" val="0"/>
+                </a:ext>
+              </a:extLst>
+            </a:blip>
+            <a:stretch>
+              <a:fillRect/>
+            </a:stretch>
+          </p:blipFill>
+          <p:spPr>
+            <a:xfrm>
+              <a:off x="7830475" y="1961976"/>
+              <a:ext cx="1578867" cy="1828804"/>
+            </a:xfrm>
+            <a:prstGeom prst="rect">
+              <a:avLst/>
+            </a:prstGeom>
+          </p:spPr>
+        </p:pic>
+        <p:pic>
+          <p:nvPicPr>
+            <p:cNvPr id="11" name="Picture 10"/>
+            <p:cNvPicPr>
+              <a:picLocks noChangeAspect="1"/>
+            </p:cNvPicPr>
+            <p:nvPr/>
+          </p:nvPicPr>
+          <p:blipFill>
+            <a:blip r:embed="rId4" cstate="print">
+              <a:extLst>
+                <a:ext uri="{28A0092B-C50C-407E-A947-70E740481C1C}">
+                  <a14:useLocalDpi xmlns:a14="http://schemas.microsoft.com/office/drawing/2010/main" val="0"/>
+                </a:ext>
+              </a:extLst>
+            </a:blip>
+            <a:stretch>
+              <a:fillRect/>
+            </a:stretch>
+          </p:blipFill>
+          <p:spPr>
+            <a:xfrm>
+              <a:off x="8610184" y="3326511"/>
+              <a:ext cx="1578867" cy="1828804"/>
+            </a:xfrm>
+            <a:prstGeom prst="rect">
+              <a:avLst/>
+            </a:prstGeom>
+          </p:spPr>
+        </p:pic>
+      </p:grpSp>
+      <p:pic>
+        <p:nvPicPr>
+          <p:cNvPr id="12" name="Picture 11"/>
+          <p:cNvPicPr>
+            <a:picLocks noChangeAspect="1"/>
+          </p:cNvPicPr>
+          <p:nvPr/>
+        </p:nvPicPr>
+        <p:blipFill>
+          <a:blip r:embed="rId5" cstate="print">
+            <a:extLst>
+              <a:ext uri="{28A0092B-C50C-407E-A947-70E740481C1C}">
+                <a14:useLocalDpi xmlns:a14="http://schemas.microsoft.com/office/drawing/2010/main" val="0"/>
+              </a:ext>
+            </a:extLst>
+          </a:blip>
+          <a:stretch>
+            <a:fillRect/>
+          </a:stretch>
+        </p:blipFill>
+        <p:spPr>
+          <a:xfrm>
+            <a:off x="2035110" y="1019593"/>
+            <a:ext cx="1578867" cy="1828804"/>
+          </a:xfrm>
+          <a:prstGeom prst="rect">
+            <a:avLst/>
+          </a:prstGeom>
+        </p:spPr>
+      </p:pic>
+    </p:spTree>
+    <p:extLst>
+      <p:ext uri="{BB962C8B-B14F-4D97-AF65-F5344CB8AC3E}">
+        <p14:creationId xmlns:p14="http://schemas.microsoft.com/office/powerpoint/2010/main" val="4154058086"/>
       </p:ext>
     </p:extLst>
   </p:cSld>
@@ -5405,51 +5828,26 @@
           <a:chExt cx="0" cy="0"/>
         </a:xfrm>
       </p:grpSpPr>
-      <p:pic>
-        <p:nvPicPr>
-          <p:cNvPr id="2" name="Picture 1"/>
-          <p:cNvPicPr>
-            <a:picLocks noChangeAspect="1"/>
-          </p:cNvPicPr>
+      <p:sp>
+        <p:nvSpPr>
+          <p:cNvPr id="4" name="Rectangle 3"/>
+          <p:cNvSpPr/>
           <p:nvPr/>
-        </p:nvPicPr>
-        <p:blipFill>
-          <a:blip r:embed="rId2" cstate="print">
-            <a:extLst>
-              <a:ext uri="{28A0092B-C50C-407E-A947-70E740481C1C}">
-                <a14:useLocalDpi xmlns:a14="http://schemas.microsoft.com/office/drawing/2010/main" val="0"/>
-              </a:ext>
-            </a:extLst>
-          </a:blip>
-          <a:stretch>
-            <a:fillRect/>
-          </a:stretch>
-        </p:blipFill>
-        <p:spPr>
-          <a:xfrm>
-            <a:off x="5306566" y="2514598"/>
-            <a:ext cx="1578867" cy="1828804"/>
+        </p:nvSpPr>
+        <p:spPr>
+          <a:xfrm>
+            <a:off x="1808702" y="824230"/>
+            <a:ext cx="8778240" cy="5010912"/>
           </a:xfrm>
           <a:prstGeom prst="rect">
             <a:avLst/>
           </a:prstGeom>
-        </p:spPr>
-      </p:pic>
-      <p:sp>
-        <p:nvSpPr>
-          <p:cNvPr id="3" name="Rectangle 2"/>
-          <p:cNvSpPr/>
-          <p:nvPr/>
-        </p:nvSpPr>
-        <p:spPr>
-          <a:xfrm>
-            <a:off x="5054138" y="2394066"/>
-            <a:ext cx="2094807" cy="2078182"/>
-          </a:xfrm>
-          <a:prstGeom prst="rect">
-            <a:avLst/>
-          </a:prstGeom>
-          <a:noFill/>
+          <a:solidFill>
+            <a:schemeClr val="bg1">
+              <a:lumMod val="95000"/>
+            </a:schemeClr>
+          </a:solidFill>
+          <a:ln w="38100"/>
         </p:spPr>
         <p:style>
           <a:lnRef idx="2">
@@ -5476,10 +5874,669 @@
           </a:p>
         </p:txBody>
       </p:sp>
+      <p:sp>
+        <p:nvSpPr>
+          <p:cNvPr id="7" name="TextBox 6"/>
+          <p:cNvSpPr txBox="1"/>
+          <p:nvPr/>
+        </p:nvSpPr>
+        <p:spPr>
+          <a:xfrm>
+            <a:off x="3840385" y="1213849"/>
+            <a:ext cx="5712369" cy="923330"/>
+          </a:xfrm>
+          <a:prstGeom prst="rect">
+            <a:avLst/>
+          </a:prstGeom>
+          <a:noFill/>
+        </p:spPr>
+        <p:txBody>
+          <a:bodyPr wrap="square" rtlCol="0">
+            <a:spAutoFit/>
+          </a:bodyPr>
+          <a:lstStyle/>
+          <a:p>
+            <a:r>
+              <a:rPr lang="en-US" sz="5400" dirty="0" smtClean="0"/>
+              <a:t>INCLASS LECTURES</a:t>
+            </a:r>
+            <a:endParaRPr lang="en-US" sz="5400" dirty="0"/>
+          </a:p>
+        </p:txBody>
+      </p:sp>
+      <p:sp>
+        <p:nvSpPr>
+          <p:cNvPr id="8" name="TextBox 7"/>
+          <p:cNvSpPr txBox="1"/>
+          <p:nvPr/>
+        </p:nvSpPr>
+        <p:spPr>
+          <a:xfrm>
+            <a:off x="7731444" y="5278932"/>
+            <a:ext cx="2076450" cy="369332"/>
+          </a:xfrm>
+          <a:prstGeom prst="rect">
+            <a:avLst/>
+          </a:prstGeom>
+          <a:noFill/>
+        </p:spPr>
+        <p:txBody>
+          <a:bodyPr wrap="square" rtlCol="0">
+            <a:spAutoFit/>
+          </a:bodyPr>
+          <a:lstStyle/>
+          <a:p>
+            <a:pPr algn="ctr"/>
+            <a:r>
+              <a:rPr lang="en-US" dirty="0" smtClean="0"/>
+              <a:t>Feb. 3, 2020</a:t>
+            </a:r>
+            <a:endParaRPr lang="en-US" dirty="0"/>
+          </a:p>
+        </p:txBody>
+      </p:sp>
+      <p:sp>
+        <p:nvSpPr>
+          <p:cNvPr id="9" name="TextBox 8"/>
+          <p:cNvSpPr txBox="1"/>
+          <p:nvPr/>
+        </p:nvSpPr>
+        <p:spPr>
+          <a:xfrm>
+            <a:off x="2035110" y="3043759"/>
+            <a:ext cx="5005769" cy="2585323"/>
+          </a:xfrm>
+          <a:prstGeom prst="rect">
+            <a:avLst/>
+          </a:prstGeom>
+          <a:noFill/>
+        </p:spPr>
+        <p:txBody>
+          <a:bodyPr wrap="square" rtlCol="0">
+            <a:spAutoFit/>
+          </a:bodyPr>
+          <a:lstStyle/>
+          <a:p>
+            <a:pPr algn="ctr"/>
+            <a:r>
+              <a:rPr lang="en-US" dirty="0"/>
+              <a:t>Chapter </a:t>
+            </a:r>
+            <a:r>
+              <a:rPr lang="en-US" dirty="0" smtClean="0"/>
+              <a:t>5</a:t>
+            </a:r>
+            <a:endParaRPr lang="en-US" dirty="0"/>
+          </a:p>
+          <a:p>
+            <a:pPr algn="ctr"/>
+            <a:r>
+              <a:rPr lang="en-US" b="1" u="sng" dirty="0" smtClean="0"/>
+              <a:t>Intro to Hypothesis Testing: 1 sample z-Test</a:t>
+            </a:r>
+            <a:endParaRPr lang="en-US" b="1" u="sng" dirty="0"/>
+          </a:p>
+          <a:p>
+            <a:pPr algn="ctr"/>
+            <a:r>
+              <a:rPr lang="en-US" i="1" dirty="0" smtClean="0"/>
+              <a:t>Finish </a:t>
+            </a:r>
+            <a:r>
+              <a:rPr lang="en-US" i="1" dirty="0"/>
+              <a:t>discussion</a:t>
+            </a:r>
+          </a:p>
+          <a:p>
+            <a:pPr algn="ctr"/>
+            <a:r>
+              <a:rPr lang="en-US" i="1" dirty="0"/>
+              <a:t>Homework questions</a:t>
+            </a:r>
+          </a:p>
+          <a:p>
+            <a:pPr algn="ctr"/>
+            <a:endParaRPr lang="en-US" i="1" dirty="0"/>
+          </a:p>
+          <a:p>
+            <a:pPr algn="ctr"/>
+            <a:r>
+              <a:rPr lang="en-US" dirty="0"/>
+              <a:t>Chapter 6</a:t>
+            </a:r>
+          </a:p>
+          <a:p>
+            <a:pPr algn="ctr"/>
+            <a:r>
+              <a:rPr lang="en-US" b="1" u="sng" dirty="0" smtClean="0"/>
+              <a:t>Confidence Interval Estimation: The t Distribution</a:t>
+            </a:r>
+            <a:endParaRPr lang="en-US" b="1" u="sng" dirty="0"/>
+          </a:p>
+          <a:p>
+            <a:pPr algn="ctr"/>
+            <a:r>
+              <a:rPr lang="en-US" i="1" dirty="0" smtClean="0"/>
+              <a:t>Lecture slides</a:t>
+            </a:r>
+            <a:endParaRPr lang="en-US" i="1" dirty="0"/>
+          </a:p>
+          <a:p>
+            <a:pPr algn="ctr"/>
+            <a:r>
+              <a:rPr lang="en-US" i="1" dirty="0" smtClean="0"/>
+              <a:t>(first half)</a:t>
+            </a:r>
+            <a:endParaRPr lang="en-US" i="1" dirty="0"/>
+          </a:p>
+        </p:txBody>
+      </p:sp>
+      <p:grpSp>
+        <p:nvGrpSpPr>
+          <p:cNvPr id="14" name="Group 13"/>
+          <p:cNvGrpSpPr/>
+          <p:nvPr/>
+        </p:nvGrpSpPr>
+        <p:grpSpPr>
+          <a:xfrm>
+            <a:off x="7198839" y="2137179"/>
+            <a:ext cx="3141660" cy="3193339"/>
+            <a:chOff x="7047391" y="1961976"/>
+            <a:chExt cx="3141660" cy="3193339"/>
+          </a:xfrm>
+        </p:grpSpPr>
+        <p:pic>
+          <p:nvPicPr>
+            <p:cNvPr id="2" name="Picture 1"/>
+            <p:cNvPicPr>
+              <a:picLocks noChangeAspect="1"/>
+            </p:cNvPicPr>
+            <p:nvPr/>
+          </p:nvPicPr>
+          <p:blipFill>
+            <a:blip r:embed="rId2" cstate="print">
+              <a:extLst>
+                <a:ext uri="{28A0092B-C50C-407E-A947-70E740481C1C}">
+                  <a14:useLocalDpi xmlns:a14="http://schemas.microsoft.com/office/drawing/2010/main" val="0"/>
+                </a:ext>
+              </a:extLst>
+            </a:blip>
+            <a:stretch>
+              <a:fillRect/>
+            </a:stretch>
+          </p:blipFill>
+          <p:spPr>
+            <a:xfrm>
+              <a:off x="7047391" y="3320161"/>
+              <a:ext cx="1578867" cy="1828804"/>
+            </a:xfrm>
+            <a:prstGeom prst="rect">
+              <a:avLst/>
+            </a:prstGeom>
+          </p:spPr>
+        </p:pic>
+        <p:pic>
+          <p:nvPicPr>
+            <p:cNvPr id="3" name="Picture 2"/>
+            <p:cNvPicPr>
+              <a:picLocks noChangeAspect="1"/>
+            </p:cNvPicPr>
+            <p:nvPr/>
+          </p:nvPicPr>
+          <p:blipFill>
+            <a:blip r:embed="rId3" cstate="print">
+              <a:extLst>
+                <a:ext uri="{28A0092B-C50C-407E-A947-70E740481C1C}">
+                  <a14:useLocalDpi xmlns:a14="http://schemas.microsoft.com/office/drawing/2010/main" val="0"/>
+                </a:ext>
+              </a:extLst>
+            </a:blip>
+            <a:stretch>
+              <a:fillRect/>
+            </a:stretch>
+          </p:blipFill>
+          <p:spPr>
+            <a:xfrm>
+              <a:off x="7830475" y="1961976"/>
+              <a:ext cx="1578867" cy="1828804"/>
+            </a:xfrm>
+            <a:prstGeom prst="rect">
+              <a:avLst/>
+            </a:prstGeom>
+          </p:spPr>
+        </p:pic>
+        <p:pic>
+          <p:nvPicPr>
+            <p:cNvPr id="11" name="Picture 10"/>
+            <p:cNvPicPr>
+              <a:picLocks noChangeAspect="1"/>
+            </p:cNvPicPr>
+            <p:nvPr/>
+          </p:nvPicPr>
+          <p:blipFill>
+            <a:blip r:embed="rId4" cstate="print">
+              <a:extLst>
+                <a:ext uri="{28A0092B-C50C-407E-A947-70E740481C1C}">
+                  <a14:useLocalDpi xmlns:a14="http://schemas.microsoft.com/office/drawing/2010/main" val="0"/>
+                </a:ext>
+              </a:extLst>
+            </a:blip>
+            <a:stretch>
+              <a:fillRect/>
+            </a:stretch>
+          </p:blipFill>
+          <p:spPr>
+            <a:xfrm>
+              <a:off x="8610184" y="3326511"/>
+              <a:ext cx="1578867" cy="1828804"/>
+            </a:xfrm>
+            <a:prstGeom prst="rect">
+              <a:avLst/>
+            </a:prstGeom>
+          </p:spPr>
+        </p:pic>
+      </p:grpSp>
+      <p:pic>
+        <p:nvPicPr>
+          <p:cNvPr id="12" name="Picture 11"/>
+          <p:cNvPicPr>
+            <a:picLocks noChangeAspect="1"/>
+          </p:cNvPicPr>
+          <p:nvPr/>
+        </p:nvPicPr>
+        <p:blipFill>
+          <a:blip r:embed="rId5" cstate="print">
+            <a:extLst>
+              <a:ext uri="{28A0092B-C50C-407E-A947-70E740481C1C}">
+                <a14:useLocalDpi xmlns:a14="http://schemas.microsoft.com/office/drawing/2010/main" val="0"/>
+              </a:ext>
+            </a:extLst>
+          </a:blip>
+          <a:stretch>
+            <a:fillRect/>
+          </a:stretch>
+        </p:blipFill>
+        <p:spPr>
+          <a:xfrm>
+            <a:off x="2035110" y="1019593"/>
+            <a:ext cx="1578867" cy="1828804"/>
+          </a:xfrm>
+          <a:prstGeom prst="rect">
+            <a:avLst/>
+          </a:prstGeom>
+        </p:spPr>
+      </p:pic>
     </p:spTree>
     <p:extLst>
       <p:ext uri="{BB962C8B-B14F-4D97-AF65-F5344CB8AC3E}">
-        <p14:creationId xmlns:p14="http://schemas.microsoft.com/office/powerpoint/2010/main" val="2048573925"/>
+        <p14:creationId xmlns:p14="http://schemas.microsoft.com/office/powerpoint/2010/main" val="1136618621"/>
+      </p:ext>
+    </p:extLst>
+  </p:cSld>
+  <p:clrMapOvr>
+    <a:masterClrMapping/>
+  </p:clrMapOvr>
+</p:sld>
+</file>
+
+<file path=ppt/slides/slide9.xml><?xml version="1.0" encoding="utf-8"?>
+<p:sld xmlns:a="http://schemas.openxmlformats.org/drawingml/2006/main" xmlns:r="http://schemas.openxmlformats.org/officeDocument/2006/relationships" xmlns:p="http://schemas.openxmlformats.org/presentationml/2006/main">
+  <p:cSld>
+    <p:spTree>
+      <p:nvGrpSpPr>
+        <p:cNvPr id="1" name=""/>
+        <p:cNvGrpSpPr/>
+        <p:nvPr/>
+      </p:nvGrpSpPr>
+      <p:grpSpPr>
+        <a:xfrm>
+          <a:off x="0" y="0"/>
+          <a:ext cx="0" cy="0"/>
+          <a:chOff x="0" y="0"/>
+          <a:chExt cx="0" cy="0"/>
+        </a:xfrm>
+      </p:grpSpPr>
+      <p:sp>
+        <p:nvSpPr>
+          <p:cNvPr id="4" name="Rectangle 3"/>
+          <p:cNvSpPr/>
+          <p:nvPr/>
+        </p:nvSpPr>
+        <p:spPr>
+          <a:xfrm>
+            <a:off x="1808702" y="824230"/>
+            <a:ext cx="8778240" cy="5010912"/>
+          </a:xfrm>
+          <a:prstGeom prst="rect">
+            <a:avLst/>
+          </a:prstGeom>
+          <a:solidFill>
+            <a:schemeClr val="bg1">
+              <a:lumMod val="95000"/>
+            </a:schemeClr>
+          </a:solidFill>
+          <a:ln w="38100"/>
+        </p:spPr>
+        <p:style>
+          <a:lnRef idx="2">
+            <a:schemeClr val="accent1">
+              <a:shade val="50000"/>
+            </a:schemeClr>
+          </a:lnRef>
+          <a:fillRef idx="1">
+            <a:schemeClr val="accent1"/>
+          </a:fillRef>
+          <a:effectRef idx="0">
+            <a:schemeClr val="accent1"/>
+          </a:effectRef>
+          <a:fontRef idx="minor">
+            <a:schemeClr val="lt1"/>
+          </a:fontRef>
+        </p:style>
+        <p:txBody>
+          <a:bodyPr rtlCol="0" anchor="ctr"/>
+          <a:lstStyle/>
+          <a:p>
+            <a:pPr algn="ctr"/>
+            <a:endParaRPr lang="en-US"/>
+          </a:p>
+        </p:txBody>
+      </p:sp>
+      <p:sp>
+        <p:nvSpPr>
+          <p:cNvPr id="7" name="TextBox 6"/>
+          <p:cNvSpPr txBox="1"/>
+          <p:nvPr/>
+        </p:nvSpPr>
+        <p:spPr>
+          <a:xfrm>
+            <a:off x="3840385" y="1213849"/>
+            <a:ext cx="5712369" cy="923330"/>
+          </a:xfrm>
+          <a:prstGeom prst="rect">
+            <a:avLst/>
+          </a:prstGeom>
+          <a:noFill/>
+        </p:spPr>
+        <p:txBody>
+          <a:bodyPr wrap="square" rtlCol="0">
+            <a:spAutoFit/>
+          </a:bodyPr>
+          <a:lstStyle/>
+          <a:p>
+            <a:r>
+              <a:rPr lang="en-US" sz="5400" dirty="0" smtClean="0"/>
+              <a:t>INCLASS LECTURES</a:t>
+            </a:r>
+            <a:endParaRPr lang="en-US" sz="5400" dirty="0"/>
+          </a:p>
+        </p:txBody>
+      </p:sp>
+      <p:sp>
+        <p:nvSpPr>
+          <p:cNvPr id="8" name="TextBox 7"/>
+          <p:cNvSpPr txBox="1"/>
+          <p:nvPr/>
+        </p:nvSpPr>
+        <p:spPr>
+          <a:xfrm>
+            <a:off x="7731444" y="5278932"/>
+            <a:ext cx="2076450" cy="369332"/>
+          </a:xfrm>
+          <a:prstGeom prst="rect">
+            <a:avLst/>
+          </a:prstGeom>
+          <a:noFill/>
+        </p:spPr>
+        <p:txBody>
+          <a:bodyPr wrap="square" rtlCol="0">
+            <a:spAutoFit/>
+          </a:bodyPr>
+          <a:lstStyle/>
+          <a:p>
+            <a:pPr algn="ctr"/>
+            <a:r>
+              <a:rPr lang="en-US" dirty="0" smtClean="0"/>
+              <a:t>Jan. 22, 2020</a:t>
+            </a:r>
+            <a:endParaRPr lang="en-US" dirty="0"/>
+          </a:p>
+        </p:txBody>
+      </p:sp>
+      <p:sp>
+        <p:nvSpPr>
+          <p:cNvPr id="9" name="TextBox 8"/>
+          <p:cNvSpPr txBox="1"/>
+          <p:nvPr/>
+        </p:nvSpPr>
+        <p:spPr>
+          <a:xfrm>
+            <a:off x="2035110" y="3043759"/>
+            <a:ext cx="5005769" cy="2585323"/>
+          </a:xfrm>
+          <a:prstGeom prst="rect">
+            <a:avLst/>
+          </a:prstGeom>
+          <a:noFill/>
+        </p:spPr>
+        <p:txBody>
+          <a:bodyPr wrap="square" rtlCol="0">
+            <a:spAutoFit/>
+          </a:bodyPr>
+          <a:lstStyle/>
+          <a:p>
+            <a:pPr algn="ctr"/>
+            <a:r>
+              <a:rPr lang="en-US" dirty="0"/>
+              <a:t>Chapter 3</a:t>
+            </a:r>
+          </a:p>
+          <a:p>
+            <a:pPr algn="ctr"/>
+            <a:r>
+              <a:rPr lang="en-US" b="1" u="sng" dirty="0"/>
+              <a:t>Variable/Scale, Rounding &amp; Summation</a:t>
+            </a:r>
+          </a:p>
+          <a:p>
+            <a:pPr algn="ctr"/>
+            <a:r>
+              <a:rPr lang="en-US" i="1" dirty="0" smtClean="0"/>
+              <a:t>Finish </a:t>
+            </a:r>
+            <a:r>
+              <a:rPr lang="en-US" i="1" dirty="0"/>
+              <a:t>discussion</a:t>
+            </a:r>
+          </a:p>
+          <a:p>
+            <a:pPr algn="ctr"/>
+            <a:r>
+              <a:rPr lang="en-US" i="1" dirty="0"/>
+              <a:t>Homework questions</a:t>
+            </a:r>
+          </a:p>
+          <a:p>
+            <a:pPr algn="ctr"/>
+            <a:endParaRPr lang="en-US" i="1" dirty="0"/>
+          </a:p>
+          <a:p>
+            <a:pPr algn="ctr"/>
+            <a:r>
+              <a:rPr lang="en-US" dirty="0"/>
+              <a:t>Chapter </a:t>
+            </a:r>
+            <a:r>
+              <a:rPr lang="en-US" dirty="0" smtClean="0"/>
+              <a:t>4</a:t>
+            </a:r>
+            <a:endParaRPr lang="en-US" dirty="0"/>
+          </a:p>
+          <a:p>
+            <a:pPr algn="ctr"/>
+            <a:r>
+              <a:rPr lang="en-US" b="1" u="sng" dirty="0" smtClean="0"/>
+              <a:t>Standardized Scores &amp; the Normal Distribution</a:t>
+            </a:r>
+            <a:endParaRPr lang="en-US" b="1" u="sng" dirty="0"/>
+          </a:p>
+          <a:p>
+            <a:pPr algn="ctr"/>
+            <a:r>
+              <a:rPr lang="en-US" i="1" dirty="0" smtClean="0"/>
+              <a:t>Lecture slides</a:t>
+            </a:r>
+            <a:endParaRPr lang="en-US" i="1" dirty="0"/>
+          </a:p>
+          <a:p>
+            <a:pPr algn="ctr"/>
+            <a:r>
+              <a:rPr lang="en-US" i="1" dirty="0" smtClean="0"/>
+              <a:t>(first half)</a:t>
+            </a:r>
+            <a:endParaRPr lang="en-US" i="1" dirty="0"/>
+          </a:p>
+        </p:txBody>
+      </p:sp>
+      <p:grpSp>
+        <p:nvGrpSpPr>
+          <p:cNvPr id="14" name="Group 13"/>
+          <p:cNvGrpSpPr/>
+          <p:nvPr/>
+        </p:nvGrpSpPr>
+        <p:grpSpPr>
+          <a:xfrm>
+            <a:off x="7198839" y="2137179"/>
+            <a:ext cx="3141660" cy="3193339"/>
+            <a:chOff x="7047391" y="1961976"/>
+            <a:chExt cx="3141660" cy="3193339"/>
+          </a:xfrm>
+        </p:grpSpPr>
+        <p:pic>
+          <p:nvPicPr>
+            <p:cNvPr id="2" name="Picture 1"/>
+            <p:cNvPicPr>
+              <a:picLocks noChangeAspect="1"/>
+            </p:cNvPicPr>
+            <p:nvPr/>
+          </p:nvPicPr>
+          <p:blipFill>
+            <a:blip r:embed="rId2" cstate="print">
+              <a:extLst>
+                <a:ext uri="{28A0092B-C50C-407E-A947-70E740481C1C}">
+                  <a14:useLocalDpi xmlns:a14="http://schemas.microsoft.com/office/drawing/2010/main" val="0"/>
+                </a:ext>
+              </a:extLst>
+            </a:blip>
+            <a:stretch>
+              <a:fillRect/>
+            </a:stretch>
+          </p:blipFill>
+          <p:spPr>
+            <a:xfrm>
+              <a:off x="7047391" y="3320161"/>
+              <a:ext cx="1578867" cy="1828804"/>
+            </a:xfrm>
+            <a:prstGeom prst="rect">
+              <a:avLst/>
+            </a:prstGeom>
+          </p:spPr>
+        </p:pic>
+        <p:pic>
+          <p:nvPicPr>
+            <p:cNvPr id="3" name="Picture 2"/>
+            <p:cNvPicPr>
+              <a:picLocks noChangeAspect="1"/>
+            </p:cNvPicPr>
+            <p:nvPr/>
+          </p:nvPicPr>
+          <p:blipFill>
+            <a:blip r:embed="rId3" cstate="print">
+              <a:extLst>
+                <a:ext uri="{28A0092B-C50C-407E-A947-70E740481C1C}">
+                  <a14:useLocalDpi xmlns:a14="http://schemas.microsoft.com/office/drawing/2010/main" val="0"/>
+                </a:ext>
+              </a:extLst>
+            </a:blip>
+            <a:stretch>
+              <a:fillRect/>
+            </a:stretch>
+          </p:blipFill>
+          <p:spPr>
+            <a:xfrm>
+              <a:off x="7830475" y="1961976"/>
+              <a:ext cx="1578867" cy="1828804"/>
+            </a:xfrm>
+            <a:prstGeom prst="rect">
+              <a:avLst/>
+            </a:prstGeom>
+          </p:spPr>
+        </p:pic>
+        <p:pic>
+          <p:nvPicPr>
+            <p:cNvPr id="11" name="Picture 10"/>
+            <p:cNvPicPr>
+              <a:picLocks noChangeAspect="1"/>
+            </p:cNvPicPr>
+            <p:nvPr/>
+          </p:nvPicPr>
+          <p:blipFill>
+            <a:blip r:embed="rId4" cstate="print">
+              <a:extLst>
+                <a:ext uri="{28A0092B-C50C-407E-A947-70E740481C1C}">
+                  <a14:useLocalDpi xmlns:a14="http://schemas.microsoft.com/office/drawing/2010/main" val="0"/>
+                </a:ext>
+              </a:extLst>
+            </a:blip>
+            <a:stretch>
+              <a:fillRect/>
+            </a:stretch>
+          </p:blipFill>
+          <p:spPr>
+            <a:xfrm>
+              <a:off x="8610184" y="3326511"/>
+              <a:ext cx="1578867" cy="1828804"/>
+            </a:xfrm>
+            <a:prstGeom prst="rect">
+              <a:avLst/>
+            </a:prstGeom>
+          </p:spPr>
+        </p:pic>
+      </p:grpSp>
+      <p:pic>
+        <p:nvPicPr>
+          <p:cNvPr id="12" name="Picture 11"/>
+          <p:cNvPicPr>
+            <a:picLocks noChangeAspect="1"/>
+          </p:cNvPicPr>
+          <p:nvPr/>
+        </p:nvPicPr>
+        <p:blipFill>
+          <a:blip r:embed="rId5" cstate="print">
+            <a:extLst>
+              <a:ext uri="{28A0092B-C50C-407E-A947-70E740481C1C}">
+                <a14:useLocalDpi xmlns:a14="http://schemas.microsoft.com/office/drawing/2010/main" val="0"/>
+              </a:ext>
+            </a:extLst>
+          </a:blip>
+          <a:stretch>
+            <a:fillRect/>
+          </a:stretch>
+        </p:blipFill>
+        <p:spPr>
+          <a:xfrm>
+            <a:off x="2035110" y="1019593"/>
+            <a:ext cx="1578867" cy="1828804"/>
+          </a:xfrm>
+          <a:prstGeom prst="rect">
+            <a:avLst/>
+          </a:prstGeom>
+        </p:spPr>
+      </p:pic>
+    </p:spTree>
+    <p:extLst>
+      <p:ext uri="{BB962C8B-B14F-4D97-AF65-F5344CB8AC3E}">
+        <p14:creationId xmlns:p14="http://schemas.microsoft.com/office/powerpoint/2010/main" val="2900019700"/>
       </p:ext>
     </p:extLst>
   </p:cSld>

</xml_diff>

<commit_message>
Link more 6600 HW rmd skeletons
</commit_message>
<xml_diff>
--- a/public/img/youtube_thumbnails/video_thumbnail_building.pptx
+++ b/public/img/youtube_thumbnails/video_thumbnail_building.pptx
@@ -8,14 +8,15 @@
     <p:sldId id="259" r:id="rId2"/>
     <p:sldId id="261" r:id="rId3"/>
     <p:sldId id="260" r:id="rId4"/>
-    <p:sldId id="266" r:id="rId5"/>
-    <p:sldId id="265" r:id="rId6"/>
-    <p:sldId id="264" r:id="rId7"/>
-    <p:sldId id="263" r:id="rId8"/>
-    <p:sldId id="262" r:id="rId9"/>
-    <p:sldId id="257" r:id="rId10"/>
-    <p:sldId id="256" r:id="rId11"/>
-    <p:sldId id="258" r:id="rId12"/>
+    <p:sldId id="267" r:id="rId5"/>
+    <p:sldId id="266" r:id="rId6"/>
+    <p:sldId id="265" r:id="rId7"/>
+    <p:sldId id="264" r:id="rId8"/>
+    <p:sldId id="263" r:id="rId9"/>
+    <p:sldId id="262" r:id="rId10"/>
+    <p:sldId id="257" r:id="rId11"/>
+    <p:sldId id="256" r:id="rId12"/>
+    <p:sldId id="258" r:id="rId13"/>
   </p:sldIdLst>
   <p:sldSz cx="12192000" cy="6858000"/>
   <p:notesSz cx="6858000" cy="9144000"/>
@@ -253,7 +254,7 @@
           <a:p>
             <a:fld id="{3C68F153-927F-4ADA-A90F-AFD816292B90}" type="datetimeFigureOut">
               <a:rPr lang="en-US" smtClean="0"/>
-              <a:t>2/19/2020</a:t>
+              <a:t>2/20/2020</a:t>
             </a:fld>
             <a:endParaRPr lang="en-US"/>
           </a:p>
@@ -423,7 +424,7 @@
           <a:p>
             <a:fld id="{3C68F153-927F-4ADA-A90F-AFD816292B90}" type="datetimeFigureOut">
               <a:rPr lang="en-US" smtClean="0"/>
-              <a:t>2/19/2020</a:t>
+              <a:t>2/20/2020</a:t>
             </a:fld>
             <a:endParaRPr lang="en-US"/>
           </a:p>
@@ -603,7 +604,7 @@
           <a:p>
             <a:fld id="{3C68F153-927F-4ADA-A90F-AFD816292B90}" type="datetimeFigureOut">
               <a:rPr lang="en-US" smtClean="0"/>
-              <a:t>2/19/2020</a:t>
+              <a:t>2/20/2020</a:t>
             </a:fld>
             <a:endParaRPr lang="en-US"/>
           </a:p>
@@ -773,7 +774,7 @@
           <a:p>
             <a:fld id="{3C68F153-927F-4ADA-A90F-AFD816292B90}" type="datetimeFigureOut">
               <a:rPr lang="en-US" smtClean="0"/>
-              <a:t>2/19/2020</a:t>
+              <a:t>2/20/2020</a:t>
             </a:fld>
             <a:endParaRPr lang="en-US"/>
           </a:p>
@@ -1019,7 +1020,7 @@
           <a:p>
             <a:fld id="{3C68F153-927F-4ADA-A90F-AFD816292B90}" type="datetimeFigureOut">
               <a:rPr lang="en-US" smtClean="0"/>
-              <a:t>2/19/2020</a:t>
+              <a:t>2/20/2020</a:t>
             </a:fld>
             <a:endParaRPr lang="en-US"/>
           </a:p>
@@ -1251,7 +1252,7 @@
           <a:p>
             <a:fld id="{3C68F153-927F-4ADA-A90F-AFD816292B90}" type="datetimeFigureOut">
               <a:rPr lang="en-US" smtClean="0"/>
-              <a:t>2/19/2020</a:t>
+              <a:t>2/20/2020</a:t>
             </a:fld>
             <a:endParaRPr lang="en-US"/>
           </a:p>
@@ -1618,7 +1619,7 @@
           <a:p>
             <a:fld id="{3C68F153-927F-4ADA-A90F-AFD816292B90}" type="datetimeFigureOut">
               <a:rPr lang="en-US" smtClean="0"/>
-              <a:t>2/19/2020</a:t>
+              <a:t>2/20/2020</a:t>
             </a:fld>
             <a:endParaRPr lang="en-US"/>
           </a:p>
@@ -1736,7 +1737,7 @@
           <a:p>
             <a:fld id="{3C68F153-927F-4ADA-A90F-AFD816292B90}" type="datetimeFigureOut">
               <a:rPr lang="en-US" smtClean="0"/>
-              <a:t>2/19/2020</a:t>
+              <a:t>2/20/2020</a:t>
             </a:fld>
             <a:endParaRPr lang="en-US"/>
           </a:p>
@@ -1831,7 +1832,7 @@
           <a:p>
             <a:fld id="{3C68F153-927F-4ADA-A90F-AFD816292B90}" type="datetimeFigureOut">
               <a:rPr lang="en-US" smtClean="0"/>
-              <a:t>2/19/2020</a:t>
+              <a:t>2/20/2020</a:t>
             </a:fld>
             <a:endParaRPr lang="en-US"/>
           </a:p>
@@ -2108,7 +2109,7 @@
           <a:p>
             <a:fld id="{3C68F153-927F-4ADA-A90F-AFD816292B90}" type="datetimeFigureOut">
               <a:rPr lang="en-US" smtClean="0"/>
-              <a:t>2/19/2020</a:t>
+              <a:t>2/20/2020</a:t>
             </a:fld>
             <a:endParaRPr lang="en-US"/>
           </a:p>
@@ -2361,7 +2362,7 @@
           <a:p>
             <a:fld id="{3C68F153-927F-4ADA-A90F-AFD816292B90}" type="datetimeFigureOut">
               <a:rPr lang="en-US" smtClean="0"/>
-              <a:t>2/19/2020</a:t>
+              <a:t>2/20/2020</a:t>
             </a:fld>
             <a:endParaRPr lang="en-US"/>
           </a:p>
@@ -2574,7 +2575,7 @@
           <a:p>
             <a:fld id="{3C68F153-927F-4ADA-A90F-AFD816292B90}" type="datetimeFigureOut">
               <a:rPr lang="en-US" smtClean="0"/>
-              <a:t>2/19/2020</a:t>
+              <a:t>2/20/2020</a:t>
             </a:fld>
             <a:endParaRPr lang="en-US"/>
           </a:p>
@@ -3415,7 +3416,7 @@
             <a:pPr algn="ctr"/>
             <a:r>
               <a:rPr lang="en-US" dirty="0" smtClean="0"/>
-              <a:t>Jan. 15, 2020</a:t>
+              <a:t>Jan. 22, 2020</a:t>
             </a:r>
             <a:endParaRPr lang="en-US" dirty="0"/>
           </a:p>
@@ -3429,8 +3430,8 @@
         </p:nvSpPr>
         <p:spPr>
           <a:xfrm>
-            <a:off x="2318419" y="3043759"/>
-            <a:ext cx="4212906" cy="2585323"/>
+            <a:off x="2035110" y="3043759"/>
+            <a:ext cx="5005769" cy="2585323"/>
           </a:xfrm>
           <a:prstGeom prst="rect">
             <a:avLst/>
@@ -3445,48 +3446,58 @@
           <a:p>
             <a:pPr algn="ctr"/>
             <a:r>
+              <a:rPr lang="en-US" dirty="0"/>
+              <a:t>Chapter 3</a:t>
+            </a:r>
+          </a:p>
+          <a:p>
+            <a:pPr algn="ctr"/>
+            <a:r>
+              <a:rPr lang="en-US" b="1" u="sng" dirty="0"/>
+              <a:t>Variable/Scale, Rounding &amp; Summation</a:t>
+            </a:r>
+          </a:p>
+          <a:p>
+            <a:pPr algn="ctr"/>
+            <a:r>
+              <a:rPr lang="en-US" i="1" dirty="0" smtClean="0"/>
+              <a:t>Finish </a:t>
+            </a:r>
+            <a:r>
+              <a:rPr lang="en-US" i="1" dirty="0"/>
+              <a:t>discussion</a:t>
+            </a:r>
+          </a:p>
+          <a:p>
+            <a:pPr algn="ctr"/>
+            <a:r>
+              <a:rPr lang="en-US" i="1" dirty="0"/>
+              <a:t>Homework questions</a:t>
+            </a:r>
+          </a:p>
+          <a:p>
+            <a:pPr algn="ctr"/>
+            <a:endParaRPr lang="en-US" i="1" dirty="0"/>
+          </a:p>
+          <a:p>
+            <a:pPr algn="ctr"/>
+            <a:r>
+              <a:rPr lang="en-US" dirty="0"/>
+              <a:t>Chapter </a:t>
+            </a:r>
+            <a:r>
               <a:rPr lang="en-US" dirty="0" smtClean="0"/>
-              <a:t>Chapter 1</a:t>
-            </a:r>
+              <a:t>4</a:t>
+            </a:r>
+            <a:endParaRPr lang="en-US" dirty="0"/>
           </a:p>
           <a:p>
             <a:pPr algn="ctr"/>
             <a:r>
               <a:rPr lang="en-US" b="1" u="sng" dirty="0" smtClean="0"/>
-              <a:t>Variable/Scale, Rounding &amp; Summation</a:t>
-            </a:r>
-          </a:p>
-          <a:p>
-            <a:pPr algn="ctr"/>
-            <a:r>
-              <a:rPr lang="en-US" i="1" dirty="0" smtClean="0"/>
-              <a:t>Finish discussion</a:t>
-            </a:r>
-          </a:p>
-          <a:p>
-            <a:pPr algn="ctr"/>
-            <a:r>
-              <a:rPr lang="en-US" i="1" dirty="0" smtClean="0"/>
-              <a:t>Homework questions</a:t>
-            </a:r>
-          </a:p>
-          <a:p>
-            <a:pPr algn="ctr"/>
-            <a:endParaRPr lang="en-US" i="1" dirty="0" smtClean="0"/>
-          </a:p>
-          <a:p>
-            <a:pPr algn="ctr"/>
-            <a:r>
-              <a:rPr lang="en-US" dirty="0"/>
-              <a:t>Chapter 2 </a:t>
-            </a:r>
-          </a:p>
-          <a:p>
-            <a:pPr algn="ctr"/>
-            <a:r>
-              <a:rPr lang="en-US" b="1" u="sng" dirty="0"/>
-              <a:t>Exploring Data with Plots</a:t>
-            </a:r>
+              <a:t>Standardized Scores &amp; the Normal Distribution</a:t>
+            </a:r>
+            <a:endParaRPr lang="en-US" b="1" u="sng" dirty="0"/>
           </a:p>
           <a:p>
             <a:pPr algn="ctr"/>
@@ -3499,12 +3510,8 @@
           <a:p>
             <a:pPr algn="ctr"/>
             <a:r>
-              <a:rPr lang="en-US" i="1" dirty="0"/>
-              <a:t>Homework </a:t>
-            </a:r>
-            <a:r>
               <a:rPr lang="en-US" i="1" dirty="0" smtClean="0"/>
-              <a:t>questions</a:t>
+              <a:t>(first half)</a:t>
             </a:r>
             <a:endParaRPr lang="en-US" i="1" dirty="0"/>
           </a:p>
@@ -3648,7 +3655,7 @@
     </p:spTree>
     <p:extLst>
       <p:ext uri="{BB962C8B-B14F-4D97-AF65-F5344CB8AC3E}">
-        <p14:creationId xmlns:p14="http://schemas.microsoft.com/office/powerpoint/2010/main" val="3290463226"/>
+        <p14:creationId xmlns:p14="http://schemas.microsoft.com/office/powerpoint/2010/main" val="2900019700"/>
       </p:ext>
     </p:extLst>
   </p:cSld>
@@ -3675,51 +3682,26 @@
           <a:chExt cx="0" cy="0"/>
         </a:xfrm>
       </p:grpSpPr>
-      <p:pic>
-        <p:nvPicPr>
-          <p:cNvPr id="2" name="Picture 1"/>
-          <p:cNvPicPr>
-            <a:picLocks noChangeAspect="1"/>
-          </p:cNvPicPr>
+      <p:sp>
+        <p:nvSpPr>
+          <p:cNvPr id="4" name="Rectangle 3"/>
+          <p:cNvSpPr/>
           <p:nvPr/>
-        </p:nvPicPr>
-        <p:blipFill>
-          <a:blip r:embed="rId2" cstate="print">
-            <a:extLst>
-              <a:ext uri="{28A0092B-C50C-407E-A947-70E740481C1C}">
-                <a14:useLocalDpi xmlns:a14="http://schemas.microsoft.com/office/drawing/2010/main" val="0"/>
-              </a:ext>
-            </a:extLst>
-          </a:blip>
-          <a:stretch>
-            <a:fillRect/>
-          </a:stretch>
-        </p:blipFill>
-        <p:spPr>
-          <a:xfrm>
-            <a:off x="5306566" y="2514598"/>
-            <a:ext cx="1578867" cy="1828804"/>
+        </p:nvSpPr>
+        <p:spPr>
+          <a:xfrm>
+            <a:off x="1808702" y="824230"/>
+            <a:ext cx="8778240" cy="5010912"/>
           </a:xfrm>
           <a:prstGeom prst="rect">
             <a:avLst/>
           </a:prstGeom>
-        </p:spPr>
-      </p:pic>
-      <p:sp>
-        <p:nvSpPr>
-          <p:cNvPr id="3" name="Rectangle 2"/>
-          <p:cNvSpPr/>
-          <p:nvPr/>
-        </p:nvSpPr>
-        <p:spPr>
-          <a:xfrm>
-            <a:off x="5054138" y="2394066"/>
-            <a:ext cx="2094807" cy="2078182"/>
-          </a:xfrm>
-          <a:prstGeom prst="rect">
-            <a:avLst/>
-          </a:prstGeom>
-          <a:noFill/>
+          <a:solidFill>
+            <a:schemeClr val="bg1">
+              <a:lumMod val="95000"/>
+            </a:schemeClr>
+          </a:solidFill>
+          <a:ln w="38100"/>
         </p:spPr>
         <p:style>
           <a:lnRef idx="2">
@@ -3746,82 +3728,6 @@
           </a:p>
         </p:txBody>
       </p:sp>
-    </p:spTree>
-    <p:extLst>
-      <p:ext uri="{BB962C8B-B14F-4D97-AF65-F5344CB8AC3E}">
-        <p14:creationId xmlns:p14="http://schemas.microsoft.com/office/powerpoint/2010/main" val="2048573925"/>
-      </p:ext>
-    </p:extLst>
-  </p:cSld>
-  <p:clrMapOvr>
-    <a:masterClrMapping/>
-  </p:clrMapOvr>
-</p:sld>
-</file>
-
-<file path=ppt/slides/slide2.xml><?xml version="1.0" encoding="utf-8"?>
-<p:sld xmlns:a="http://schemas.openxmlformats.org/drawingml/2006/main" xmlns:r="http://schemas.openxmlformats.org/officeDocument/2006/relationships" xmlns:p="http://schemas.openxmlformats.org/presentationml/2006/main">
-  <p:cSld>
-    <p:spTree>
-      <p:nvGrpSpPr>
-        <p:cNvPr id="1" name=""/>
-        <p:cNvGrpSpPr/>
-        <p:nvPr/>
-      </p:nvGrpSpPr>
-      <p:grpSpPr>
-        <a:xfrm>
-          <a:off x="0" y="0"/>
-          <a:ext cx="0" cy="0"/>
-          <a:chOff x="0" y="0"/>
-          <a:chExt cx="0" cy="0"/>
-        </a:xfrm>
-      </p:grpSpPr>
-      <p:sp>
-        <p:nvSpPr>
-          <p:cNvPr id="4" name="Rectangle 3"/>
-          <p:cNvSpPr/>
-          <p:nvPr/>
-        </p:nvSpPr>
-        <p:spPr>
-          <a:xfrm>
-            <a:off x="1808702" y="824230"/>
-            <a:ext cx="8778240" cy="5010912"/>
-          </a:xfrm>
-          <a:prstGeom prst="rect">
-            <a:avLst/>
-          </a:prstGeom>
-          <a:solidFill>
-            <a:schemeClr val="bg1">
-              <a:lumMod val="95000"/>
-            </a:schemeClr>
-          </a:solidFill>
-          <a:ln w="38100"/>
-        </p:spPr>
-        <p:style>
-          <a:lnRef idx="2">
-            <a:schemeClr val="accent1">
-              <a:shade val="50000"/>
-            </a:schemeClr>
-          </a:lnRef>
-          <a:fillRef idx="1">
-            <a:schemeClr val="accent1"/>
-          </a:fillRef>
-          <a:effectRef idx="0">
-            <a:schemeClr val="accent1"/>
-          </a:effectRef>
-          <a:fontRef idx="minor">
-            <a:schemeClr val="lt1"/>
-          </a:fontRef>
-        </p:style>
-        <p:txBody>
-          <a:bodyPr rtlCol="0" anchor="ctr"/>
-          <a:lstStyle/>
-          <a:p>
-            <a:pPr algn="ctr"/>
-            <a:endParaRPr lang="en-US"/>
-          </a:p>
-        </p:txBody>
-      </p:sp>
       <p:sp>
         <p:nvSpPr>
           <p:cNvPr id="7" name="TextBox 6"/>
@@ -3830,8 +3736,8 @@
         </p:nvSpPr>
         <p:spPr>
           <a:xfrm>
-            <a:off x="4003824" y="1483154"/>
-            <a:ext cx="5712369" cy="1754326"/>
+            <a:off x="3840385" y="1213849"/>
+            <a:ext cx="5712369" cy="923330"/>
           </a:xfrm>
           <a:prstGeom prst="rect">
             <a:avLst/>
@@ -3846,7 +3752,7 @@
           <a:p>
             <a:r>
               <a:rPr lang="en-US" sz="5400" dirty="0" smtClean="0"/>
-              <a:t>OUT-OF-CLASS LECTURES</a:t>
+              <a:t>INCLASS LECTURES</a:t>
             </a:r>
             <a:endParaRPr lang="en-US" sz="5400" dirty="0"/>
           </a:p>
@@ -3877,7 +3783,7 @@
             <a:pPr algn="ctr"/>
             <a:r>
               <a:rPr lang="en-US" dirty="0" smtClean="0"/>
-              <a:t>Jan. 24, 2020</a:t>
+              <a:t>Jan. 15, 2020</a:t>
             </a:r>
             <a:endParaRPr lang="en-US" dirty="0"/>
           </a:p>
@@ -3891,8 +3797,8 @@
         </p:nvSpPr>
         <p:spPr>
           <a:xfrm>
-            <a:off x="2000886" y="3743671"/>
-            <a:ext cx="5005769" cy="923330"/>
+            <a:off x="2318419" y="3043759"/>
+            <a:ext cx="4212906" cy="2585323"/>
           </a:xfrm>
           <a:prstGeom prst="rect">
             <a:avLst/>
@@ -3908,24 +3814,67 @@
             <a:pPr algn="ctr"/>
             <a:r>
               <a:rPr lang="en-US" dirty="0" smtClean="0"/>
-              <a:t>Chapter 4</a:t>
-            </a:r>
-            <a:endParaRPr lang="en-US" dirty="0"/>
+              <a:t>Chapter 1</a:t>
+            </a:r>
           </a:p>
           <a:p>
             <a:pPr algn="ctr"/>
             <a:r>
               <a:rPr lang="en-US" b="1" u="sng" dirty="0" smtClean="0"/>
-              <a:t>Standardized Scores &amp; the Normal Distribution</a:t>
-            </a:r>
-            <a:endParaRPr lang="en-US" b="1" u="sng" dirty="0"/>
+              <a:t>Variable/Scale, Rounding &amp; Summation</a:t>
+            </a:r>
           </a:p>
           <a:p>
             <a:pPr algn="ctr"/>
             <a:r>
               <a:rPr lang="en-US" i="1" dirty="0" smtClean="0"/>
-              <a:t>Lecture Slide Examples Worked</a:t>
-            </a:r>
+              <a:t>Finish discussion</a:t>
+            </a:r>
+          </a:p>
+          <a:p>
+            <a:pPr algn="ctr"/>
+            <a:r>
+              <a:rPr lang="en-US" i="1" dirty="0" smtClean="0"/>
+              <a:t>Homework questions</a:t>
+            </a:r>
+          </a:p>
+          <a:p>
+            <a:pPr algn="ctr"/>
+            <a:endParaRPr lang="en-US" i="1" dirty="0" smtClean="0"/>
+          </a:p>
+          <a:p>
+            <a:pPr algn="ctr"/>
+            <a:r>
+              <a:rPr lang="en-US" dirty="0"/>
+              <a:t>Chapter 2 </a:t>
+            </a:r>
+          </a:p>
+          <a:p>
+            <a:pPr algn="ctr"/>
+            <a:r>
+              <a:rPr lang="en-US" b="1" u="sng" dirty="0"/>
+              <a:t>Exploring Data with Plots</a:t>
+            </a:r>
+          </a:p>
+          <a:p>
+            <a:pPr algn="ctr"/>
+            <a:r>
+              <a:rPr lang="en-US" i="1" dirty="0" smtClean="0"/>
+              <a:t>Lecture slides</a:t>
+            </a:r>
+            <a:endParaRPr lang="en-US" i="1" dirty="0"/>
+          </a:p>
+          <a:p>
+            <a:pPr algn="ctr"/>
+            <a:r>
+              <a:rPr lang="en-US" i="1" dirty="0"/>
+              <a:t>Homework </a:t>
+            </a:r>
+            <a:r>
+              <a:rPr lang="en-US" i="1" dirty="0" smtClean="0"/>
+              <a:t>questions</a:t>
+            </a:r>
+            <a:endParaRPr lang="en-US" i="1" dirty="0"/>
           </a:p>
         </p:txBody>
       </p:sp>
@@ -4067,7 +4016,7 @@
     </p:spTree>
     <p:extLst>
       <p:ext uri="{BB962C8B-B14F-4D97-AF65-F5344CB8AC3E}">
-        <p14:creationId xmlns:p14="http://schemas.microsoft.com/office/powerpoint/2010/main" val="267042058"/>
+        <p14:creationId xmlns:p14="http://schemas.microsoft.com/office/powerpoint/2010/main" val="3290463226"/>
       </p:ext>
     </p:extLst>
   </p:cSld>
@@ -4077,7 +4026,7 @@
 </p:sld>
 </file>
 
-<file path=ppt/slides/slide3.xml><?xml version="1.0" encoding="utf-8"?>
+<file path=ppt/slides/slide12.xml><?xml version="1.0" encoding="utf-8"?>
 <p:sld xmlns:a="http://schemas.openxmlformats.org/drawingml/2006/main" xmlns:r="http://schemas.openxmlformats.org/officeDocument/2006/relationships" xmlns:p="http://schemas.openxmlformats.org/presentationml/2006/main">
   <p:cSld>
     <p:spTree>
@@ -4094,26 +4043,51 @@
           <a:chExt cx="0" cy="0"/>
         </a:xfrm>
       </p:grpSpPr>
-      <p:sp>
-        <p:nvSpPr>
-          <p:cNvPr id="4" name="Rectangle 3"/>
-          <p:cNvSpPr/>
+      <p:pic>
+        <p:nvPicPr>
+          <p:cNvPr id="2" name="Picture 1"/>
+          <p:cNvPicPr>
+            <a:picLocks noChangeAspect="1"/>
+          </p:cNvPicPr>
           <p:nvPr/>
-        </p:nvSpPr>
-        <p:spPr>
-          <a:xfrm>
-            <a:off x="1808702" y="824230"/>
-            <a:ext cx="8778240" cy="5010912"/>
+        </p:nvPicPr>
+        <p:blipFill>
+          <a:blip r:embed="rId2" cstate="print">
+            <a:extLst>
+              <a:ext uri="{28A0092B-C50C-407E-A947-70E740481C1C}">
+                <a14:useLocalDpi xmlns:a14="http://schemas.microsoft.com/office/drawing/2010/main" val="0"/>
+              </a:ext>
+            </a:extLst>
+          </a:blip>
+          <a:stretch>
+            <a:fillRect/>
+          </a:stretch>
+        </p:blipFill>
+        <p:spPr>
+          <a:xfrm>
+            <a:off x="5306566" y="2514598"/>
+            <a:ext cx="1578867" cy="1828804"/>
           </a:xfrm>
           <a:prstGeom prst="rect">
             <a:avLst/>
           </a:prstGeom>
-          <a:solidFill>
-            <a:schemeClr val="bg1">
-              <a:lumMod val="95000"/>
-            </a:schemeClr>
-          </a:solidFill>
-          <a:ln w="38100"/>
+        </p:spPr>
+      </p:pic>
+      <p:sp>
+        <p:nvSpPr>
+          <p:cNvPr id="3" name="Rectangle 2"/>
+          <p:cNvSpPr/>
+          <p:nvPr/>
+        </p:nvSpPr>
+        <p:spPr>
+          <a:xfrm>
+            <a:off x="5054138" y="2394066"/>
+            <a:ext cx="2094807" cy="2078182"/>
+          </a:xfrm>
+          <a:prstGeom prst="rect">
+            <a:avLst/>
+          </a:prstGeom>
+          <a:noFill/>
         </p:spPr>
         <p:style>
           <a:lnRef idx="2">
@@ -4140,6 +4114,82 @@
           </a:p>
         </p:txBody>
       </p:sp>
+    </p:spTree>
+    <p:extLst>
+      <p:ext uri="{BB962C8B-B14F-4D97-AF65-F5344CB8AC3E}">
+        <p14:creationId xmlns:p14="http://schemas.microsoft.com/office/powerpoint/2010/main" val="2048573925"/>
+      </p:ext>
+    </p:extLst>
+  </p:cSld>
+  <p:clrMapOvr>
+    <a:masterClrMapping/>
+  </p:clrMapOvr>
+</p:sld>
+</file>
+
+<file path=ppt/slides/slide2.xml><?xml version="1.0" encoding="utf-8"?>
+<p:sld xmlns:a="http://schemas.openxmlformats.org/drawingml/2006/main" xmlns:r="http://schemas.openxmlformats.org/officeDocument/2006/relationships" xmlns:p="http://schemas.openxmlformats.org/presentationml/2006/main">
+  <p:cSld>
+    <p:spTree>
+      <p:nvGrpSpPr>
+        <p:cNvPr id="1" name=""/>
+        <p:cNvGrpSpPr/>
+        <p:nvPr/>
+      </p:nvGrpSpPr>
+      <p:grpSpPr>
+        <a:xfrm>
+          <a:off x="0" y="0"/>
+          <a:ext cx="0" cy="0"/>
+          <a:chOff x="0" y="0"/>
+          <a:chExt cx="0" cy="0"/>
+        </a:xfrm>
+      </p:grpSpPr>
+      <p:sp>
+        <p:nvSpPr>
+          <p:cNvPr id="4" name="Rectangle 3"/>
+          <p:cNvSpPr/>
+          <p:nvPr/>
+        </p:nvSpPr>
+        <p:spPr>
+          <a:xfrm>
+            <a:off x="1808702" y="824230"/>
+            <a:ext cx="8778240" cy="5010912"/>
+          </a:xfrm>
+          <a:prstGeom prst="rect">
+            <a:avLst/>
+          </a:prstGeom>
+          <a:solidFill>
+            <a:schemeClr val="bg1">
+              <a:lumMod val="95000"/>
+            </a:schemeClr>
+          </a:solidFill>
+          <a:ln w="38100"/>
+        </p:spPr>
+        <p:style>
+          <a:lnRef idx="2">
+            <a:schemeClr val="accent1">
+              <a:shade val="50000"/>
+            </a:schemeClr>
+          </a:lnRef>
+          <a:fillRef idx="1">
+            <a:schemeClr val="accent1"/>
+          </a:fillRef>
+          <a:effectRef idx="0">
+            <a:schemeClr val="accent1"/>
+          </a:effectRef>
+          <a:fontRef idx="minor">
+            <a:schemeClr val="lt1"/>
+          </a:fontRef>
+        </p:style>
+        <p:txBody>
+          <a:bodyPr rtlCol="0" anchor="ctr"/>
+          <a:lstStyle/>
+          <a:p>
+            <a:pPr algn="ctr"/>
+            <a:endParaRPr lang="en-US"/>
+          </a:p>
+        </p:txBody>
+      </p:sp>
       <p:sp>
         <p:nvSpPr>
           <p:cNvPr id="7" name="TextBox 6"/>
@@ -4148,7 +4198,7 @@
         </p:nvSpPr>
         <p:spPr>
           <a:xfrm>
-            <a:off x="4184694" y="1065121"/>
+            <a:off x="4003824" y="1483154"/>
             <a:ext cx="5712369" cy="1754326"/>
           </a:xfrm>
           <a:prstGeom prst="rect">
@@ -4209,8 +4259,8 @@
         </p:nvSpPr>
         <p:spPr>
           <a:xfrm>
-            <a:off x="2035110" y="3043759"/>
-            <a:ext cx="5005769" cy="1200329"/>
+            <a:off x="2000886" y="3743671"/>
+            <a:ext cx="5005769" cy="923330"/>
           </a:xfrm>
           <a:prstGeom prst="rect">
             <a:avLst/>
@@ -4242,17 +4292,8 @@
             <a:pPr algn="ctr"/>
             <a:r>
               <a:rPr lang="en-US" i="1" dirty="0" smtClean="0"/>
-              <a:t>Lecture slides 25-43</a:t>
-            </a:r>
-            <a:endParaRPr lang="en-US" i="1" dirty="0"/>
-          </a:p>
-          <a:p>
-            <a:pPr algn="ctr"/>
-            <a:r>
-              <a:rPr lang="en-US" i="1" dirty="0" smtClean="0"/>
-              <a:t>(Second half)</a:t>
-            </a:r>
-            <a:endParaRPr lang="en-US" i="1" dirty="0"/>
+              <a:t>Lecture Slide Examples Worked</a:t>
+            </a:r>
           </a:p>
         </p:txBody>
       </p:sp>
@@ -4394,7 +4435,7 @@
     </p:spTree>
     <p:extLst>
       <p:ext uri="{BB962C8B-B14F-4D97-AF65-F5344CB8AC3E}">
-        <p14:creationId xmlns:p14="http://schemas.microsoft.com/office/powerpoint/2010/main" val="1429724622"/>
+        <p14:creationId xmlns:p14="http://schemas.microsoft.com/office/powerpoint/2010/main" val="267042058"/>
       </p:ext>
     </p:extLst>
   </p:cSld>
@@ -4404,7 +4445,7 @@
 </p:sld>
 </file>
 
-<file path=ppt/slides/slide4.xml><?xml version="1.0" encoding="utf-8"?>
+<file path=ppt/slides/slide3.xml><?xml version="1.0" encoding="utf-8"?>
 <p:sld xmlns:a="http://schemas.openxmlformats.org/drawingml/2006/main" xmlns:r="http://schemas.openxmlformats.org/officeDocument/2006/relationships" xmlns:p="http://schemas.openxmlformats.org/presentationml/2006/main">
   <p:cSld>
     <p:spTree>
@@ -4475,8 +4516,8 @@
         </p:nvSpPr>
         <p:spPr>
           <a:xfrm>
-            <a:off x="3840385" y="1213849"/>
-            <a:ext cx="5712369" cy="923330"/>
+            <a:off x="4184694" y="1065121"/>
+            <a:ext cx="5712369" cy="1754326"/>
           </a:xfrm>
           <a:prstGeom prst="rect">
             <a:avLst/>
@@ -4491,7 +4532,7 @@
           <a:p>
             <a:r>
               <a:rPr lang="en-US" sz="5400" dirty="0" smtClean="0"/>
-              <a:t>INCLASS LECTURES</a:t>
+              <a:t>OUT-OF-CLASS LECTURES</a:t>
             </a:r>
             <a:endParaRPr lang="en-US" sz="5400" dirty="0"/>
           </a:p>
@@ -4522,15 +4563,7 @@
             <a:pPr algn="ctr"/>
             <a:r>
               <a:rPr lang="en-US" dirty="0" smtClean="0"/>
-              <a:t>Feb. </a:t>
-            </a:r>
-            <a:r>
-              <a:rPr lang="en-US" dirty="0" smtClean="0"/>
-              <a:t>12, </a:t>
-            </a:r>
-            <a:r>
-              <a:rPr lang="en-US" dirty="0" smtClean="0"/>
-              <a:t>2020</a:t>
+              <a:t>Jan. 24, 2020</a:t>
             </a:r>
             <a:endParaRPr lang="en-US" dirty="0"/>
           </a:p>
@@ -4544,8 +4577,8 @@
         </p:nvSpPr>
         <p:spPr>
           <a:xfrm>
-            <a:off x="2175357" y="4235713"/>
-            <a:ext cx="5005769" cy="923330"/>
+            <a:off x="2035110" y="3043759"/>
+            <a:ext cx="5005769" cy="1200329"/>
           </a:xfrm>
           <a:prstGeom prst="rect">
             <a:avLst/>
@@ -4561,11 +4594,7 @@
             <a:pPr algn="ctr"/>
             <a:r>
               <a:rPr lang="en-US" dirty="0" smtClean="0"/>
-              <a:t>Chapter </a:t>
-            </a:r>
-            <a:r>
-              <a:rPr lang="en-US" dirty="0"/>
-              <a:t>9</a:t>
+              <a:t>Chapter 4</a:t>
             </a:r>
             <a:endParaRPr lang="en-US" dirty="0"/>
           </a:p>
@@ -4573,17 +4602,25 @@
             <a:pPr algn="ctr"/>
             <a:r>
               <a:rPr lang="en-US" b="1" u="sng" dirty="0" smtClean="0"/>
-              <a:t>Correlation</a:t>
-            </a:r>
-            <a:endParaRPr lang="en-US" dirty="0" smtClean="0"/>
+              <a:t>Standardized Scores &amp; the Normal Distribution</a:t>
+            </a:r>
+            <a:endParaRPr lang="en-US" b="1" u="sng" dirty="0"/>
           </a:p>
           <a:p>
             <a:pPr algn="ctr"/>
             <a:r>
               <a:rPr lang="en-US" i="1" dirty="0" smtClean="0"/>
-              <a:t>First half, chapter slides</a:t>
-            </a:r>
-            <a:endParaRPr lang="en-US" i="1" dirty="0" smtClean="0"/>
+              <a:t>Lecture slides 25-43</a:t>
+            </a:r>
+            <a:endParaRPr lang="en-US" i="1" dirty="0"/>
+          </a:p>
+          <a:p>
+            <a:pPr algn="ctr"/>
+            <a:r>
+              <a:rPr lang="en-US" i="1" dirty="0" smtClean="0"/>
+              <a:t>(Second half)</a:t>
+            </a:r>
+            <a:endParaRPr lang="en-US" i="1" dirty="0"/>
           </a:p>
         </p:txBody>
       </p:sp>
@@ -4722,74 +4759,10 @@
           </a:prstGeom>
         </p:spPr>
       </p:pic>
-      <p:sp>
-        <p:nvSpPr>
-          <p:cNvPr id="13" name="TextBox 12"/>
-          <p:cNvSpPr txBox="1"/>
-          <p:nvPr/>
-        </p:nvSpPr>
-        <p:spPr>
-          <a:xfrm>
-            <a:off x="2175358" y="2646127"/>
-            <a:ext cx="5005769" cy="1477328"/>
-          </a:xfrm>
-          <a:prstGeom prst="rect">
-            <a:avLst/>
-          </a:prstGeom>
-          <a:noFill/>
-        </p:spPr>
-        <p:txBody>
-          <a:bodyPr wrap="square" rtlCol="0">
-            <a:spAutoFit/>
-          </a:bodyPr>
-          <a:lstStyle/>
-          <a:p>
-            <a:pPr algn="ctr"/>
-            <a:r>
-              <a:rPr lang="en-US" dirty="0" smtClean="0"/>
-              <a:t>Chapter </a:t>
-            </a:r>
-            <a:r>
-              <a:rPr lang="en-US" dirty="0"/>
-              <a:t>8</a:t>
-            </a:r>
-          </a:p>
-          <a:p>
-            <a:pPr algn="ctr"/>
-            <a:r>
-              <a:rPr lang="en-US" b="1" u="sng" dirty="0" smtClean="0"/>
-              <a:t>Effect Size &amp; Power Analysis</a:t>
-            </a:r>
-            <a:endParaRPr lang="en-US" dirty="0" smtClean="0"/>
-          </a:p>
-          <a:p>
-            <a:pPr algn="ctr"/>
-            <a:r>
-              <a:rPr lang="en-US" i="1" dirty="0" smtClean="0"/>
-              <a:t>Chapter slides</a:t>
-            </a:r>
-          </a:p>
-          <a:p>
-            <a:pPr algn="ctr"/>
-            <a:r>
-              <a:rPr lang="en-US" i="1" dirty="0" smtClean="0"/>
-              <a:t>Demo G*Power software</a:t>
-            </a:r>
-          </a:p>
-          <a:p>
-            <a:pPr algn="ctr"/>
-            <a:r>
-              <a:rPr lang="en-US" i="1" dirty="0" smtClean="0"/>
-              <a:t>Homework Help</a:t>
-            </a:r>
-            <a:endParaRPr lang="en-US" i="1" dirty="0" smtClean="0"/>
-          </a:p>
-        </p:txBody>
-      </p:sp>
     </p:spTree>
     <p:extLst>
       <p:ext uri="{BB962C8B-B14F-4D97-AF65-F5344CB8AC3E}">
-        <p14:creationId xmlns:p14="http://schemas.microsoft.com/office/powerpoint/2010/main" val="3221510669"/>
+        <p14:creationId xmlns:p14="http://schemas.microsoft.com/office/powerpoint/2010/main" val="1429724622"/>
       </p:ext>
     </p:extLst>
   </p:cSld>
@@ -4799,7 +4772,7 @@
 </p:sld>
 </file>
 
-<file path=ppt/slides/slide5.xml><?xml version="1.0" encoding="utf-8"?>
+<file path=ppt/slides/slide4.xml><?xml version="1.0" encoding="utf-8"?>
 <p:sld xmlns:a="http://schemas.openxmlformats.org/drawingml/2006/main" xmlns:r="http://schemas.openxmlformats.org/officeDocument/2006/relationships" xmlns:p="http://schemas.openxmlformats.org/presentationml/2006/main">
   <p:cSld>
     <p:spTree>
@@ -4921,7 +4894,7 @@
             </a:r>
             <a:r>
               <a:rPr lang="en-US" dirty="0" smtClean="0"/>
-              <a:t>10, </a:t>
+              <a:t>19, </a:t>
             </a:r>
             <a:r>
               <a:rPr lang="en-US" dirty="0" smtClean="0"/>
@@ -4939,7 +4912,7 @@
         </p:nvSpPr>
         <p:spPr>
           <a:xfrm>
-            <a:off x="2035110" y="3043759"/>
+            <a:off x="2130478" y="2956774"/>
             <a:ext cx="5005769" cy="923330"/>
           </a:xfrm>
           <a:prstGeom prst="rect">
@@ -4960,32 +4933,31 @@
             </a:r>
             <a:r>
               <a:rPr lang="en-US" dirty="0"/>
-              <a:t>7</a:t>
-            </a:r>
-            <a:endParaRPr lang="en-US" dirty="0"/>
-          </a:p>
-          <a:p>
-            <a:pPr algn="ctr"/>
-            <a:r>
-              <a:rPr lang="en-US" b="1" u="sng" dirty="0"/>
-              <a:t>Independent Samples t-Test for </a:t>
-            </a:r>
+              <a:t>9</a:t>
+            </a:r>
+          </a:p>
+          <a:p>
+            <a:pPr algn="ctr"/>
             <a:r>
               <a:rPr lang="en-US" b="1" u="sng" dirty="0" smtClean="0"/>
-              <a:t>Means</a:t>
-            </a:r>
+              <a:t>Correlation</a:t>
+            </a:r>
+            <a:endParaRPr lang="en-US" dirty="0" smtClean="0"/>
           </a:p>
           <a:p>
             <a:pPr algn="ctr"/>
             <a:r>
               <a:rPr lang="en-US" i="1" dirty="0" smtClean="0"/>
-              <a:t>Mostly Homework </a:t>
+              <a:t>Second </a:t>
             </a:r>
             <a:r>
               <a:rPr lang="en-US" i="1" dirty="0" smtClean="0"/>
-              <a:t>Helps</a:t>
-            </a:r>
-            <a:endParaRPr lang="en-US" i="1" dirty="0"/>
+              <a:t>half</a:t>
+            </a:r>
+            <a:r>
+              <a:rPr lang="en-US" i="1" dirty="0" smtClean="0"/>
+              <a:t>, chapter slides</a:t>
+            </a:r>
           </a:p>
         </p:txBody>
       </p:sp>
@@ -5124,10 +5096,65 @@
           </a:prstGeom>
         </p:spPr>
       </p:pic>
+      <p:sp>
+        <p:nvSpPr>
+          <p:cNvPr id="15" name="TextBox 14"/>
+          <p:cNvSpPr txBox="1"/>
+          <p:nvPr/>
+        </p:nvSpPr>
+        <p:spPr>
+          <a:xfrm>
+            <a:off x="2107241" y="4130160"/>
+            <a:ext cx="5005769" cy="923330"/>
+          </a:xfrm>
+          <a:prstGeom prst="rect">
+            <a:avLst/>
+          </a:prstGeom>
+          <a:noFill/>
+        </p:spPr>
+        <p:txBody>
+          <a:bodyPr wrap="square" rtlCol="0">
+            <a:spAutoFit/>
+          </a:bodyPr>
+          <a:lstStyle/>
+          <a:p>
+            <a:pPr algn="ctr"/>
+            <a:r>
+              <a:rPr lang="en-US" dirty="0" smtClean="0"/>
+              <a:t>Chapter </a:t>
+            </a:r>
+            <a:r>
+              <a:rPr lang="en-US" dirty="0" smtClean="0"/>
+              <a:t>10</a:t>
+            </a:r>
+            <a:endParaRPr lang="en-US" dirty="0"/>
+          </a:p>
+          <a:p>
+            <a:pPr algn="ctr"/>
+            <a:r>
+              <a:rPr lang="en-US" b="1" u="sng" dirty="0" smtClean="0"/>
+              <a:t>Simple Linear </a:t>
+            </a:r>
+            <a:r>
+              <a:rPr lang="en-US" b="1" u="sng" dirty="0" smtClean="0"/>
+              <a:t>Regression</a:t>
+            </a:r>
+            <a:endParaRPr lang="en-US" dirty="0" smtClean="0"/>
+          </a:p>
+          <a:p>
+            <a:pPr algn="ctr"/>
+            <a:r>
+              <a:rPr lang="en-US" i="1" dirty="0" smtClean="0"/>
+              <a:t>chapter slides (majority)</a:t>
+            </a:r>
+            <a:endParaRPr lang="en-US" i="1" dirty="0" smtClean="0"/>
+          </a:p>
+        </p:txBody>
+      </p:sp>
     </p:spTree>
     <p:extLst>
       <p:ext uri="{BB962C8B-B14F-4D97-AF65-F5344CB8AC3E}">
-        <p14:creationId xmlns:p14="http://schemas.microsoft.com/office/powerpoint/2010/main" val="2916572011"/>
+        <p14:creationId xmlns:p14="http://schemas.microsoft.com/office/powerpoint/2010/main" val="2730707931"/>
       </p:ext>
     </p:extLst>
   </p:cSld>
@@ -5137,7 +5164,7 @@
 </p:sld>
 </file>
 
-<file path=ppt/slides/slide6.xml><?xml version="1.0" encoding="utf-8"?>
+<file path=ppt/slides/slide5.xml><?xml version="1.0" encoding="utf-8"?>
 <p:sld xmlns:a="http://schemas.openxmlformats.org/drawingml/2006/main" xmlns:r="http://schemas.openxmlformats.org/officeDocument/2006/relationships" xmlns:p="http://schemas.openxmlformats.org/presentationml/2006/main">
   <p:cSld>
     <p:spTree>
@@ -5255,7 +5282,7 @@
             <a:pPr algn="ctr"/>
             <a:r>
               <a:rPr lang="en-US" dirty="0" smtClean="0"/>
-              <a:t>Feb. 5, 2020</a:t>
+              <a:t>Feb. 12, 2020</a:t>
             </a:r>
             <a:endParaRPr lang="en-US" dirty="0"/>
           </a:p>
@@ -5269,8 +5296,8 @@
         </p:nvSpPr>
         <p:spPr>
           <a:xfrm>
-            <a:off x="2035110" y="3043759"/>
-            <a:ext cx="5005769" cy="1477328"/>
+            <a:off x="2175357" y="4235713"/>
+            <a:ext cx="5005769" cy="923330"/>
           </a:xfrm>
           <a:prstGeom prst="rect">
             <a:avLst/>
@@ -5290,39 +5317,23 @@
             </a:r>
             <a:r>
               <a:rPr lang="en-US" dirty="0"/>
-              <a:t>6</a:t>
+              <a:t>9</a:t>
             </a:r>
           </a:p>
           <a:p>
             <a:pPr algn="ctr"/>
             <a:r>
               <a:rPr lang="en-US" b="1" u="sng" dirty="0" smtClean="0"/>
-              <a:t>Confidence Interval Estimation: The t Distribution</a:t>
-            </a:r>
-            <a:endParaRPr lang="en-US" b="1" u="sng" dirty="0"/>
+              <a:t>Correlation</a:t>
+            </a:r>
+            <a:endParaRPr lang="en-US" dirty="0" smtClean="0"/>
           </a:p>
           <a:p>
             <a:pPr algn="ctr"/>
             <a:r>
               <a:rPr lang="en-US" i="1" dirty="0" smtClean="0"/>
-              <a:t>Lecture slides</a:t>
-            </a:r>
-            <a:endParaRPr lang="en-US" i="1" dirty="0"/>
-          </a:p>
-          <a:p>
-            <a:pPr algn="ctr"/>
-            <a:r>
-              <a:rPr lang="en-US" i="1" dirty="0" smtClean="0"/>
-              <a:t>(second half)</a:t>
-            </a:r>
-          </a:p>
-          <a:p>
-            <a:pPr algn="ctr"/>
-            <a:r>
-              <a:rPr lang="en-US" i="1" dirty="0" smtClean="0"/>
-              <a:t>Homework Helps</a:t>
-            </a:r>
-            <a:endParaRPr lang="en-US" i="1" dirty="0"/>
+              <a:t>First half, chapter slides</a:t>
+            </a:r>
           </a:p>
         </p:txBody>
       </p:sp>
@@ -5461,10 +5472,73 @@
           </a:prstGeom>
         </p:spPr>
       </p:pic>
+      <p:sp>
+        <p:nvSpPr>
+          <p:cNvPr id="13" name="TextBox 12"/>
+          <p:cNvSpPr txBox="1"/>
+          <p:nvPr/>
+        </p:nvSpPr>
+        <p:spPr>
+          <a:xfrm>
+            <a:off x="2175358" y="2646127"/>
+            <a:ext cx="5005769" cy="1477328"/>
+          </a:xfrm>
+          <a:prstGeom prst="rect">
+            <a:avLst/>
+          </a:prstGeom>
+          <a:noFill/>
+        </p:spPr>
+        <p:txBody>
+          <a:bodyPr wrap="square" rtlCol="0">
+            <a:spAutoFit/>
+          </a:bodyPr>
+          <a:lstStyle/>
+          <a:p>
+            <a:pPr algn="ctr"/>
+            <a:r>
+              <a:rPr lang="en-US" dirty="0" smtClean="0"/>
+              <a:t>Chapter </a:t>
+            </a:r>
+            <a:r>
+              <a:rPr lang="en-US" dirty="0"/>
+              <a:t>8</a:t>
+            </a:r>
+          </a:p>
+          <a:p>
+            <a:pPr algn="ctr"/>
+            <a:r>
+              <a:rPr lang="en-US" b="1" u="sng" dirty="0" smtClean="0"/>
+              <a:t>Effect Size &amp; Power Analysis</a:t>
+            </a:r>
+            <a:endParaRPr lang="en-US" dirty="0" smtClean="0"/>
+          </a:p>
+          <a:p>
+            <a:pPr algn="ctr"/>
+            <a:r>
+              <a:rPr lang="en-US" i="1" dirty="0" smtClean="0"/>
+              <a:t>Chapter slides</a:t>
+            </a:r>
+          </a:p>
+          <a:p>
+            <a:pPr algn="ctr"/>
+            <a:r>
+              <a:rPr lang="en-US" i="1" dirty="0" smtClean="0"/>
+              <a:t>Demo G*Power software</a:t>
+            </a:r>
+          </a:p>
+          <a:p>
+            <a:pPr algn="ctr"/>
+            <a:r>
+              <a:rPr lang="en-US" i="1" dirty="0" smtClean="0"/>
+              <a:t>Homework Help</a:t>
+            </a:r>
+          </a:p>
+        </p:txBody>
+      </p:sp>
     </p:spTree>
     <p:extLst>
       <p:ext uri="{BB962C8B-B14F-4D97-AF65-F5344CB8AC3E}">
-        <p14:creationId xmlns:p14="http://schemas.microsoft.com/office/powerpoint/2010/main" val="3019460125"/>
+        <p14:creationId xmlns:p14="http://schemas.microsoft.com/office/powerpoint/2010/main" val="3221510669"/>
       </p:ext>
     </p:extLst>
   </p:cSld>
@@ -5474,7 +5548,7 @@
 </p:sld>
 </file>
 
-<file path=ppt/slides/slide7.xml><?xml version="1.0" encoding="utf-8"?>
+<file path=ppt/slides/slide6.xml><?xml version="1.0" encoding="utf-8"?>
 <p:sld xmlns:a="http://schemas.openxmlformats.org/drawingml/2006/main" xmlns:r="http://schemas.openxmlformats.org/officeDocument/2006/relationships" xmlns:p="http://schemas.openxmlformats.org/presentationml/2006/main">
   <p:cSld>
     <p:spTree>
@@ -5592,7 +5666,7 @@
             <a:pPr algn="ctr"/>
             <a:r>
               <a:rPr lang="en-US" dirty="0" smtClean="0"/>
-              <a:t>Feb. 5, 2020</a:t>
+              <a:t>Feb. 10, 2020</a:t>
             </a:r>
             <a:endParaRPr lang="en-US" dirty="0"/>
           </a:p>
@@ -5607,7 +5681,7 @@
         <p:spPr>
           <a:xfrm>
             <a:off x="2035110" y="3043759"/>
-            <a:ext cx="5005769" cy="1477328"/>
+            <a:ext cx="5005769" cy="923330"/>
           </a:xfrm>
           <a:prstGeom prst="rect">
             <a:avLst/>
@@ -5627,37 +5701,25 @@
             </a:r>
             <a:r>
               <a:rPr lang="en-US" dirty="0"/>
-              <a:t>6</a:t>
-            </a:r>
-          </a:p>
-          <a:p>
-            <a:pPr algn="ctr"/>
+              <a:t>7</a:t>
+            </a:r>
+          </a:p>
+          <a:p>
+            <a:pPr algn="ctr"/>
+            <a:r>
+              <a:rPr lang="en-US" b="1" u="sng" dirty="0"/>
+              <a:t>Independent Samples t-Test for </a:t>
+            </a:r>
             <a:r>
               <a:rPr lang="en-US" b="1" u="sng" dirty="0" smtClean="0"/>
-              <a:t>Confidence Interval Estimation: The t Distribution</a:t>
-            </a:r>
-            <a:endParaRPr lang="en-US" b="1" u="sng" dirty="0"/>
+              <a:t>Means</a:t>
+            </a:r>
           </a:p>
           <a:p>
             <a:pPr algn="ctr"/>
             <a:r>
               <a:rPr lang="en-US" i="1" dirty="0" smtClean="0"/>
-              <a:t>Lecture slides</a:t>
-            </a:r>
-            <a:endParaRPr lang="en-US" i="1" dirty="0"/>
-          </a:p>
-          <a:p>
-            <a:pPr algn="ctr"/>
-            <a:r>
-              <a:rPr lang="en-US" i="1" dirty="0" smtClean="0"/>
-              <a:t>(second half)</a:t>
-            </a:r>
-          </a:p>
-          <a:p>
-            <a:pPr algn="ctr"/>
-            <a:r>
-              <a:rPr lang="en-US" i="1" dirty="0" smtClean="0"/>
-              <a:t>Homework Helps</a:t>
+              <a:t>Mostly Homework Helps</a:t>
             </a:r>
             <a:endParaRPr lang="en-US" i="1" dirty="0"/>
           </a:p>
@@ -5801,7 +5863,7 @@
     </p:spTree>
     <p:extLst>
       <p:ext uri="{BB962C8B-B14F-4D97-AF65-F5344CB8AC3E}">
-        <p14:creationId xmlns:p14="http://schemas.microsoft.com/office/powerpoint/2010/main" val="4154058086"/>
+        <p14:creationId xmlns:p14="http://schemas.microsoft.com/office/powerpoint/2010/main" val="2916572011"/>
       </p:ext>
     </p:extLst>
   </p:cSld>
@@ -5811,7 +5873,7 @@
 </p:sld>
 </file>
 
-<file path=ppt/slides/slide8.xml><?xml version="1.0" encoding="utf-8"?>
+<file path=ppt/slides/slide7.xml><?xml version="1.0" encoding="utf-8"?>
 <p:sld xmlns:a="http://schemas.openxmlformats.org/drawingml/2006/main" xmlns:r="http://schemas.openxmlformats.org/officeDocument/2006/relationships" xmlns:p="http://schemas.openxmlformats.org/presentationml/2006/main">
   <p:cSld>
     <p:spTree>
@@ -5929,7 +5991,7 @@
             <a:pPr algn="ctr"/>
             <a:r>
               <a:rPr lang="en-US" dirty="0" smtClean="0"/>
-              <a:t>Feb. 3, 2020</a:t>
+              <a:t>Feb. 5, 2020</a:t>
             </a:r>
             <a:endParaRPr lang="en-US" dirty="0"/>
           </a:p>
@@ -5944,7 +6006,7 @@
         <p:spPr>
           <a:xfrm>
             <a:off x="2035110" y="3043759"/>
-            <a:ext cx="5005769" cy="2585323"/>
+            <a:ext cx="5005769" cy="1477328"/>
           </a:xfrm>
           <a:prstGeom prst="rect">
             <a:avLst/>
@@ -5959,50 +6021,12 @@
           <a:p>
             <a:pPr algn="ctr"/>
             <a:r>
+              <a:rPr lang="en-US" dirty="0" smtClean="0"/>
+              <a:t>Chapter </a:t>
+            </a:r>
+            <a:r>
               <a:rPr lang="en-US" dirty="0"/>
-              <a:t>Chapter </a:t>
-            </a:r>
-            <a:r>
-              <a:rPr lang="en-US" dirty="0" smtClean="0"/>
-              <a:t>5</a:t>
-            </a:r>
-            <a:endParaRPr lang="en-US" dirty="0"/>
-          </a:p>
-          <a:p>
-            <a:pPr algn="ctr"/>
-            <a:r>
-              <a:rPr lang="en-US" b="1" u="sng" dirty="0" smtClean="0"/>
-              <a:t>Intro to Hypothesis Testing: 1 sample z-Test</a:t>
-            </a:r>
-            <a:endParaRPr lang="en-US" b="1" u="sng" dirty="0"/>
-          </a:p>
-          <a:p>
-            <a:pPr algn="ctr"/>
-            <a:r>
-              <a:rPr lang="en-US" i="1" dirty="0" smtClean="0"/>
-              <a:t>Finish </a:t>
-            </a:r>
-            <a:r>
-              <a:rPr lang="en-US" i="1" dirty="0"/>
-              <a:t>discussion</a:t>
-            </a:r>
-          </a:p>
-          <a:p>
-            <a:pPr algn="ctr"/>
-            <a:r>
-              <a:rPr lang="en-US" i="1" dirty="0"/>
-              <a:t>Homework questions</a:t>
-            </a:r>
-          </a:p>
-          <a:p>
-            <a:pPr algn="ctr"/>
-            <a:endParaRPr lang="en-US" i="1" dirty="0"/>
-          </a:p>
-          <a:p>
-            <a:pPr algn="ctr"/>
-            <a:r>
-              <a:rPr lang="en-US" dirty="0"/>
-              <a:t>Chapter 6</a:t>
+              <a:t>6</a:t>
             </a:r>
           </a:p>
           <a:p>
@@ -6025,7 +6049,14 @@
             <a:pPr algn="ctr"/>
             <a:r>
               <a:rPr lang="en-US" i="1" dirty="0" smtClean="0"/>
-              <a:t>(first half)</a:t>
+              <a:t>(second half)</a:t>
+            </a:r>
+          </a:p>
+          <a:p>
+            <a:pPr algn="ctr"/>
+            <a:r>
+              <a:rPr lang="en-US" i="1" dirty="0" smtClean="0"/>
+              <a:t>Homework Helps</a:t>
             </a:r>
             <a:endParaRPr lang="en-US" i="1" dirty="0"/>
           </a:p>
@@ -6169,7 +6200,7 @@
     </p:spTree>
     <p:extLst>
       <p:ext uri="{BB962C8B-B14F-4D97-AF65-F5344CB8AC3E}">
-        <p14:creationId xmlns:p14="http://schemas.microsoft.com/office/powerpoint/2010/main" val="1136618621"/>
+        <p14:creationId xmlns:p14="http://schemas.microsoft.com/office/powerpoint/2010/main" val="3019460125"/>
       </p:ext>
     </p:extLst>
   </p:cSld>
@@ -6179,7 +6210,7 @@
 </p:sld>
 </file>
 
-<file path=ppt/slides/slide9.xml><?xml version="1.0" encoding="utf-8"?>
+<file path=ppt/slides/slide8.xml><?xml version="1.0" encoding="utf-8"?>
 <p:sld xmlns:a="http://schemas.openxmlformats.org/drawingml/2006/main" xmlns:r="http://schemas.openxmlformats.org/officeDocument/2006/relationships" xmlns:p="http://schemas.openxmlformats.org/presentationml/2006/main">
   <p:cSld>
     <p:spTree>
@@ -6297,7 +6328,7 @@
             <a:pPr algn="ctr"/>
             <a:r>
               <a:rPr lang="en-US" dirty="0" smtClean="0"/>
-              <a:t>Jan. 22, 2020</a:t>
+              <a:t>Feb. 5, 2020</a:t>
             </a:r>
             <a:endParaRPr lang="en-US" dirty="0"/>
           </a:p>
@@ -6312,7 +6343,7 @@
         <p:spPr>
           <a:xfrm>
             <a:off x="2035110" y="3043759"/>
-            <a:ext cx="5005769" cy="2585323"/>
+            <a:ext cx="5005769" cy="1477328"/>
           </a:xfrm>
           <a:prstGeom prst="rect">
             <a:avLst/>
@@ -6327,56 +6358,19 @@
           <a:p>
             <a:pPr algn="ctr"/>
             <a:r>
+              <a:rPr lang="en-US" dirty="0" smtClean="0"/>
+              <a:t>Chapter </a:t>
+            </a:r>
+            <a:r>
               <a:rPr lang="en-US" dirty="0"/>
-              <a:t>Chapter 3</a:t>
-            </a:r>
-          </a:p>
-          <a:p>
-            <a:pPr algn="ctr"/>
-            <a:r>
-              <a:rPr lang="en-US" b="1" u="sng" dirty="0"/>
-              <a:t>Variable/Scale, Rounding &amp; Summation</a:t>
-            </a:r>
-          </a:p>
-          <a:p>
-            <a:pPr algn="ctr"/>
-            <a:r>
-              <a:rPr lang="en-US" i="1" dirty="0" smtClean="0"/>
-              <a:t>Finish </a:t>
-            </a:r>
-            <a:r>
-              <a:rPr lang="en-US" i="1" dirty="0"/>
-              <a:t>discussion</a:t>
-            </a:r>
-          </a:p>
-          <a:p>
-            <a:pPr algn="ctr"/>
-            <a:r>
-              <a:rPr lang="en-US" i="1" dirty="0"/>
-              <a:t>Homework questions</a:t>
-            </a:r>
-          </a:p>
-          <a:p>
-            <a:pPr algn="ctr"/>
-            <a:endParaRPr lang="en-US" i="1" dirty="0"/>
-          </a:p>
-          <a:p>
-            <a:pPr algn="ctr"/>
-            <a:r>
-              <a:rPr lang="en-US" dirty="0"/>
-              <a:t>Chapter </a:t>
-            </a:r>
-            <a:r>
-              <a:rPr lang="en-US" dirty="0" smtClean="0"/>
-              <a:t>4</a:t>
-            </a:r>
-            <a:endParaRPr lang="en-US" dirty="0"/>
+              <a:t>6</a:t>
+            </a:r>
           </a:p>
           <a:p>
             <a:pPr algn="ctr"/>
             <a:r>
               <a:rPr lang="en-US" b="1" u="sng" dirty="0" smtClean="0"/>
-              <a:t>Standardized Scores &amp; the Normal Distribution</a:t>
+              <a:t>Confidence Interval Estimation: The t Distribution</a:t>
             </a:r>
             <a:endParaRPr lang="en-US" b="1" u="sng" dirty="0"/>
           </a:p>
@@ -6392,7 +6386,14 @@
             <a:pPr algn="ctr"/>
             <a:r>
               <a:rPr lang="en-US" i="1" dirty="0" smtClean="0"/>
-              <a:t>(first half)</a:t>
+              <a:t>(second half)</a:t>
+            </a:r>
+          </a:p>
+          <a:p>
+            <a:pPr algn="ctr"/>
+            <a:r>
+              <a:rPr lang="en-US" i="1" dirty="0" smtClean="0"/>
+              <a:t>Homework Helps</a:t>
             </a:r>
             <a:endParaRPr lang="en-US" i="1" dirty="0"/>
           </a:p>
@@ -6536,7 +6537,375 @@
     </p:spTree>
     <p:extLst>
       <p:ext uri="{BB962C8B-B14F-4D97-AF65-F5344CB8AC3E}">
-        <p14:creationId xmlns:p14="http://schemas.microsoft.com/office/powerpoint/2010/main" val="2900019700"/>
+        <p14:creationId xmlns:p14="http://schemas.microsoft.com/office/powerpoint/2010/main" val="4154058086"/>
+      </p:ext>
+    </p:extLst>
+  </p:cSld>
+  <p:clrMapOvr>
+    <a:masterClrMapping/>
+  </p:clrMapOvr>
+</p:sld>
+</file>
+
+<file path=ppt/slides/slide9.xml><?xml version="1.0" encoding="utf-8"?>
+<p:sld xmlns:a="http://schemas.openxmlformats.org/drawingml/2006/main" xmlns:r="http://schemas.openxmlformats.org/officeDocument/2006/relationships" xmlns:p="http://schemas.openxmlformats.org/presentationml/2006/main">
+  <p:cSld>
+    <p:spTree>
+      <p:nvGrpSpPr>
+        <p:cNvPr id="1" name=""/>
+        <p:cNvGrpSpPr/>
+        <p:nvPr/>
+      </p:nvGrpSpPr>
+      <p:grpSpPr>
+        <a:xfrm>
+          <a:off x="0" y="0"/>
+          <a:ext cx="0" cy="0"/>
+          <a:chOff x="0" y="0"/>
+          <a:chExt cx="0" cy="0"/>
+        </a:xfrm>
+      </p:grpSpPr>
+      <p:sp>
+        <p:nvSpPr>
+          <p:cNvPr id="4" name="Rectangle 3"/>
+          <p:cNvSpPr/>
+          <p:nvPr/>
+        </p:nvSpPr>
+        <p:spPr>
+          <a:xfrm>
+            <a:off x="1808702" y="824230"/>
+            <a:ext cx="8778240" cy="5010912"/>
+          </a:xfrm>
+          <a:prstGeom prst="rect">
+            <a:avLst/>
+          </a:prstGeom>
+          <a:solidFill>
+            <a:schemeClr val="bg1">
+              <a:lumMod val="95000"/>
+            </a:schemeClr>
+          </a:solidFill>
+          <a:ln w="38100"/>
+        </p:spPr>
+        <p:style>
+          <a:lnRef idx="2">
+            <a:schemeClr val="accent1">
+              <a:shade val="50000"/>
+            </a:schemeClr>
+          </a:lnRef>
+          <a:fillRef idx="1">
+            <a:schemeClr val="accent1"/>
+          </a:fillRef>
+          <a:effectRef idx="0">
+            <a:schemeClr val="accent1"/>
+          </a:effectRef>
+          <a:fontRef idx="minor">
+            <a:schemeClr val="lt1"/>
+          </a:fontRef>
+        </p:style>
+        <p:txBody>
+          <a:bodyPr rtlCol="0" anchor="ctr"/>
+          <a:lstStyle/>
+          <a:p>
+            <a:pPr algn="ctr"/>
+            <a:endParaRPr lang="en-US"/>
+          </a:p>
+        </p:txBody>
+      </p:sp>
+      <p:sp>
+        <p:nvSpPr>
+          <p:cNvPr id="7" name="TextBox 6"/>
+          <p:cNvSpPr txBox="1"/>
+          <p:nvPr/>
+        </p:nvSpPr>
+        <p:spPr>
+          <a:xfrm>
+            <a:off x="3840385" y="1213849"/>
+            <a:ext cx="5712369" cy="923330"/>
+          </a:xfrm>
+          <a:prstGeom prst="rect">
+            <a:avLst/>
+          </a:prstGeom>
+          <a:noFill/>
+        </p:spPr>
+        <p:txBody>
+          <a:bodyPr wrap="square" rtlCol="0">
+            <a:spAutoFit/>
+          </a:bodyPr>
+          <a:lstStyle/>
+          <a:p>
+            <a:r>
+              <a:rPr lang="en-US" sz="5400" dirty="0" smtClean="0"/>
+              <a:t>INCLASS LECTURES</a:t>
+            </a:r>
+            <a:endParaRPr lang="en-US" sz="5400" dirty="0"/>
+          </a:p>
+        </p:txBody>
+      </p:sp>
+      <p:sp>
+        <p:nvSpPr>
+          <p:cNvPr id="8" name="TextBox 7"/>
+          <p:cNvSpPr txBox="1"/>
+          <p:nvPr/>
+        </p:nvSpPr>
+        <p:spPr>
+          <a:xfrm>
+            <a:off x="7731444" y="5278932"/>
+            <a:ext cx="2076450" cy="369332"/>
+          </a:xfrm>
+          <a:prstGeom prst="rect">
+            <a:avLst/>
+          </a:prstGeom>
+          <a:noFill/>
+        </p:spPr>
+        <p:txBody>
+          <a:bodyPr wrap="square" rtlCol="0">
+            <a:spAutoFit/>
+          </a:bodyPr>
+          <a:lstStyle/>
+          <a:p>
+            <a:pPr algn="ctr"/>
+            <a:r>
+              <a:rPr lang="en-US" dirty="0" smtClean="0"/>
+              <a:t>Feb. 3, 2020</a:t>
+            </a:r>
+            <a:endParaRPr lang="en-US" dirty="0"/>
+          </a:p>
+        </p:txBody>
+      </p:sp>
+      <p:sp>
+        <p:nvSpPr>
+          <p:cNvPr id="9" name="TextBox 8"/>
+          <p:cNvSpPr txBox="1"/>
+          <p:nvPr/>
+        </p:nvSpPr>
+        <p:spPr>
+          <a:xfrm>
+            <a:off x="2035110" y="3043759"/>
+            <a:ext cx="5005769" cy="2585323"/>
+          </a:xfrm>
+          <a:prstGeom prst="rect">
+            <a:avLst/>
+          </a:prstGeom>
+          <a:noFill/>
+        </p:spPr>
+        <p:txBody>
+          <a:bodyPr wrap="square" rtlCol="0">
+            <a:spAutoFit/>
+          </a:bodyPr>
+          <a:lstStyle/>
+          <a:p>
+            <a:pPr algn="ctr"/>
+            <a:r>
+              <a:rPr lang="en-US" dirty="0"/>
+              <a:t>Chapter </a:t>
+            </a:r>
+            <a:r>
+              <a:rPr lang="en-US" dirty="0" smtClean="0"/>
+              <a:t>5</a:t>
+            </a:r>
+            <a:endParaRPr lang="en-US" dirty="0"/>
+          </a:p>
+          <a:p>
+            <a:pPr algn="ctr"/>
+            <a:r>
+              <a:rPr lang="en-US" b="1" u="sng" dirty="0" smtClean="0"/>
+              <a:t>Intro to Hypothesis Testing: 1 sample z-Test</a:t>
+            </a:r>
+            <a:endParaRPr lang="en-US" b="1" u="sng" dirty="0"/>
+          </a:p>
+          <a:p>
+            <a:pPr algn="ctr"/>
+            <a:r>
+              <a:rPr lang="en-US" i="1" dirty="0" smtClean="0"/>
+              <a:t>Finish </a:t>
+            </a:r>
+            <a:r>
+              <a:rPr lang="en-US" i="1" dirty="0"/>
+              <a:t>discussion</a:t>
+            </a:r>
+          </a:p>
+          <a:p>
+            <a:pPr algn="ctr"/>
+            <a:r>
+              <a:rPr lang="en-US" i="1" dirty="0"/>
+              <a:t>Homework questions</a:t>
+            </a:r>
+          </a:p>
+          <a:p>
+            <a:pPr algn="ctr"/>
+            <a:endParaRPr lang="en-US" i="1" dirty="0"/>
+          </a:p>
+          <a:p>
+            <a:pPr algn="ctr"/>
+            <a:r>
+              <a:rPr lang="en-US" dirty="0"/>
+              <a:t>Chapter 6</a:t>
+            </a:r>
+          </a:p>
+          <a:p>
+            <a:pPr algn="ctr"/>
+            <a:r>
+              <a:rPr lang="en-US" b="1" u="sng" dirty="0" smtClean="0"/>
+              <a:t>Confidence Interval Estimation: The t Distribution</a:t>
+            </a:r>
+            <a:endParaRPr lang="en-US" b="1" u="sng" dirty="0"/>
+          </a:p>
+          <a:p>
+            <a:pPr algn="ctr"/>
+            <a:r>
+              <a:rPr lang="en-US" i="1" dirty="0" smtClean="0"/>
+              <a:t>Lecture slides</a:t>
+            </a:r>
+            <a:endParaRPr lang="en-US" i="1" dirty="0"/>
+          </a:p>
+          <a:p>
+            <a:pPr algn="ctr"/>
+            <a:r>
+              <a:rPr lang="en-US" i="1" dirty="0" smtClean="0"/>
+              <a:t>(first half)</a:t>
+            </a:r>
+            <a:endParaRPr lang="en-US" i="1" dirty="0"/>
+          </a:p>
+        </p:txBody>
+      </p:sp>
+      <p:grpSp>
+        <p:nvGrpSpPr>
+          <p:cNvPr id="14" name="Group 13"/>
+          <p:cNvGrpSpPr/>
+          <p:nvPr/>
+        </p:nvGrpSpPr>
+        <p:grpSpPr>
+          <a:xfrm>
+            <a:off x="7198839" y="2137179"/>
+            <a:ext cx="3141660" cy="3193339"/>
+            <a:chOff x="7047391" y="1961976"/>
+            <a:chExt cx="3141660" cy="3193339"/>
+          </a:xfrm>
+        </p:grpSpPr>
+        <p:pic>
+          <p:nvPicPr>
+            <p:cNvPr id="2" name="Picture 1"/>
+            <p:cNvPicPr>
+              <a:picLocks noChangeAspect="1"/>
+            </p:cNvPicPr>
+            <p:nvPr/>
+          </p:nvPicPr>
+          <p:blipFill>
+            <a:blip r:embed="rId2" cstate="print">
+              <a:extLst>
+                <a:ext uri="{28A0092B-C50C-407E-A947-70E740481C1C}">
+                  <a14:useLocalDpi xmlns:a14="http://schemas.microsoft.com/office/drawing/2010/main" val="0"/>
+                </a:ext>
+              </a:extLst>
+            </a:blip>
+            <a:stretch>
+              <a:fillRect/>
+            </a:stretch>
+          </p:blipFill>
+          <p:spPr>
+            <a:xfrm>
+              <a:off x="7047391" y="3320161"/>
+              <a:ext cx="1578867" cy="1828804"/>
+            </a:xfrm>
+            <a:prstGeom prst="rect">
+              <a:avLst/>
+            </a:prstGeom>
+          </p:spPr>
+        </p:pic>
+        <p:pic>
+          <p:nvPicPr>
+            <p:cNvPr id="3" name="Picture 2"/>
+            <p:cNvPicPr>
+              <a:picLocks noChangeAspect="1"/>
+            </p:cNvPicPr>
+            <p:nvPr/>
+          </p:nvPicPr>
+          <p:blipFill>
+            <a:blip r:embed="rId3" cstate="print">
+              <a:extLst>
+                <a:ext uri="{28A0092B-C50C-407E-A947-70E740481C1C}">
+                  <a14:useLocalDpi xmlns:a14="http://schemas.microsoft.com/office/drawing/2010/main" val="0"/>
+                </a:ext>
+              </a:extLst>
+            </a:blip>
+            <a:stretch>
+              <a:fillRect/>
+            </a:stretch>
+          </p:blipFill>
+          <p:spPr>
+            <a:xfrm>
+              <a:off x="7830475" y="1961976"/>
+              <a:ext cx="1578867" cy="1828804"/>
+            </a:xfrm>
+            <a:prstGeom prst="rect">
+              <a:avLst/>
+            </a:prstGeom>
+          </p:spPr>
+        </p:pic>
+        <p:pic>
+          <p:nvPicPr>
+            <p:cNvPr id="11" name="Picture 10"/>
+            <p:cNvPicPr>
+              <a:picLocks noChangeAspect="1"/>
+            </p:cNvPicPr>
+            <p:nvPr/>
+          </p:nvPicPr>
+          <p:blipFill>
+            <a:blip r:embed="rId4" cstate="print">
+              <a:extLst>
+                <a:ext uri="{28A0092B-C50C-407E-A947-70E740481C1C}">
+                  <a14:useLocalDpi xmlns:a14="http://schemas.microsoft.com/office/drawing/2010/main" val="0"/>
+                </a:ext>
+              </a:extLst>
+            </a:blip>
+            <a:stretch>
+              <a:fillRect/>
+            </a:stretch>
+          </p:blipFill>
+          <p:spPr>
+            <a:xfrm>
+              <a:off x="8610184" y="3326511"/>
+              <a:ext cx="1578867" cy="1828804"/>
+            </a:xfrm>
+            <a:prstGeom prst="rect">
+              <a:avLst/>
+            </a:prstGeom>
+          </p:spPr>
+        </p:pic>
+      </p:grpSp>
+      <p:pic>
+        <p:nvPicPr>
+          <p:cNvPr id="12" name="Picture 11"/>
+          <p:cNvPicPr>
+            <a:picLocks noChangeAspect="1"/>
+          </p:cNvPicPr>
+          <p:nvPr/>
+        </p:nvPicPr>
+        <p:blipFill>
+          <a:blip r:embed="rId5" cstate="print">
+            <a:extLst>
+              <a:ext uri="{28A0092B-C50C-407E-A947-70E740481C1C}">
+                <a14:useLocalDpi xmlns:a14="http://schemas.microsoft.com/office/drawing/2010/main" val="0"/>
+              </a:ext>
+            </a:extLst>
+          </a:blip>
+          <a:stretch>
+            <a:fillRect/>
+          </a:stretch>
+        </p:blipFill>
+        <p:spPr>
+          <a:xfrm>
+            <a:off x="2035110" y="1019593"/>
+            <a:ext cx="1578867" cy="1828804"/>
+          </a:xfrm>
+          <a:prstGeom prst="rect">
+            <a:avLst/>
+          </a:prstGeom>
+        </p:spPr>
+      </p:pic>
+    </p:spTree>
+    <p:extLst>
+      <p:ext uri="{BB962C8B-B14F-4D97-AF65-F5344CB8AC3E}">
+        <p14:creationId xmlns:p14="http://schemas.microsoft.com/office/powerpoint/2010/main" val="1136618621"/>
       </p:ext>
     </p:extLst>
   </p:cSld>

</xml_diff>

<commit_message>
Add rest of slides (old versions)
</commit_message>
<xml_diff>
--- a/public/img/youtube_thumbnails/video_thumbnail_building.pptx
+++ b/public/img/youtube_thumbnails/video_thumbnail_building.pptx
@@ -8,15 +8,17 @@
     <p:sldId id="259" r:id="rId2"/>
     <p:sldId id="261" r:id="rId3"/>
     <p:sldId id="260" r:id="rId4"/>
-    <p:sldId id="267" r:id="rId5"/>
-    <p:sldId id="266" r:id="rId6"/>
-    <p:sldId id="265" r:id="rId7"/>
-    <p:sldId id="264" r:id="rId8"/>
-    <p:sldId id="263" r:id="rId9"/>
-    <p:sldId id="262" r:id="rId10"/>
-    <p:sldId id="257" r:id="rId11"/>
-    <p:sldId id="256" r:id="rId12"/>
-    <p:sldId id="258" r:id="rId13"/>
+    <p:sldId id="269" r:id="rId5"/>
+    <p:sldId id="268" r:id="rId6"/>
+    <p:sldId id="267" r:id="rId7"/>
+    <p:sldId id="266" r:id="rId8"/>
+    <p:sldId id="265" r:id="rId9"/>
+    <p:sldId id="264" r:id="rId10"/>
+    <p:sldId id="263" r:id="rId11"/>
+    <p:sldId id="262" r:id="rId12"/>
+    <p:sldId id="257" r:id="rId13"/>
+    <p:sldId id="256" r:id="rId14"/>
+    <p:sldId id="258" r:id="rId15"/>
   </p:sldIdLst>
   <p:sldSz cx="12192000" cy="6858000"/>
   <p:notesSz cx="6858000" cy="9144000"/>
@@ -254,7 +256,7 @@
           <a:p>
             <a:fld id="{3C68F153-927F-4ADA-A90F-AFD816292B90}" type="datetimeFigureOut">
               <a:rPr lang="en-US" smtClean="0"/>
-              <a:t>2/20/2020</a:t>
+              <a:t>3/14/2020</a:t>
             </a:fld>
             <a:endParaRPr lang="en-US"/>
           </a:p>
@@ -424,7 +426,7 @@
           <a:p>
             <a:fld id="{3C68F153-927F-4ADA-A90F-AFD816292B90}" type="datetimeFigureOut">
               <a:rPr lang="en-US" smtClean="0"/>
-              <a:t>2/20/2020</a:t>
+              <a:t>3/14/2020</a:t>
             </a:fld>
             <a:endParaRPr lang="en-US"/>
           </a:p>
@@ -604,7 +606,7 @@
           <a:p>
             <a:fld id="{3C68F153-927F-4ADA-A90F-AFD816292B90}" type="datetimeFigureOut">
               <a:rPr lang="en-US" smtClean="0"/>
-              <a:t>2/20/2020</a:t>
+              <a:t>3/14/2020</a:t>
             </a:fld>
             <a:endParaRPr lang="en-US"/>
           </a:p>
@@ -774,7 +776,7 @@
           <a:p>
             <a:fld id="{3C68F153-927F-4ADA-A90F-AFD816292B90}" type="datetimeFigureOut">
               <a:rPr lang="en-US" smtClean="0"/>
-              <a:t>2/20/2020</a:t>
+              <a:t>3/14/2020</a:t>
             </a:fld>
             <a:endParaRPr lang="en-US"/>
           </a:p>
@@ -1020,7 +1022,7 @@
           <a:p>
             <a:fld id="{3C68F153-927F-4ADA-A90F-AFD816292B90}" type="datetimeFigureOut">
               <a:rPr lang="en-US" smtClean="0"/>
-              <a:t>2/20/2020</a:t>
+              <a:t>3/14/2020</a:t>
             </a:fld>
             <a:endParaRPr lang="en-US"/>
           </a:p>
@@ -1252,7 +1254,7 @@
           <a:p>
             <a:fld id="{3C68F153-927F-4ADA-A90F-AFD816292B90}" type="datetimeFigureOut">
               <a:rPr lang="en-US" smtClean="0"/>
-              <a:t>2/20/2020</a:t>
+              <a:t>3/14/2020</a:t>
             </a:fld>
             <a:endParaRPr lang="en-US"/>
           </a:p>
@@ -1619,7 +1621,7 @@
           <a:p>
             <a:fld id="{3C68F153-927F-4ADA-A90F-AFD816292B90}" type="datetimeFigureOut">
               <a:rPr lang="en-US" smtClean="0"/>
-              <a:t>2/20/2020</a:t>
+              <a:t>3/14/2020</a:t>
             </a:fld>
             <a:endParaRPr lang="en-US"/>
           </a:p>
@@ -1737,7 +1739,7 @@
           <a:p>
             <a:fld id="{3C68F153-927F-4ADA-A90F-AFD816292B90}" type="datetimeFigureOut">
               <a:rPr lang="en-US" smtClean="0"/>
-              <a:t>2/20/2020</a:t>
+              <a:t>3/14/2020</a:t>
             </a:fld>
             <a:endParaRPr lang="en-US"/>
           </a:p>
@@ -1832,7 +1834,7 @@
           <a:p>
             <a:fld id="{3C68F153-927F-4ADA-A90F-AFD816292B90}" type="datetimeFigureOut">
               <a:rPr lang="en-US" smtClean="0"/>
-              <a:t>2/20/2020</a:t>
+              <a:t>3/14/2020</a:t>
             </a:fld>
             <a:endParaRPr lang="en-US"/>
           </a:p>
@@ -2109,7 +2111,7 @@
           <a:p>
             <a:fld id="{3C68F153-927F-4ADA-A90F-AFD816292B90}" type="datetimeFigureOut">
               <a:rPr lang="en-US" smtClean="0"/>
-              <a:t>2/20/2020</a:t>
+              <a:t>3/14/2020</a:t>
             </a:fld>
             <a:endParaRPr lang="en-US"/>
           </a:p>
@@ -2362,7 +2364,7 @@
           <a:p>
             <a:fld id="{3C68F153-927F-4ADA-A90F-AFD816292B90}" type="datetimeFigureOut">
               <a:rPr lang="en-US" smtClean="0"/>
-              <a:t>2/20/2020</a:t>
+              <a:t>3/14/2020</a:t>
             </a:fld>
             <a:endParaRPr lang="en-US"/>
           </a:p>
@@ -2575,7 +2577,7 @@
           <a:p>
             <a:fld id="{3C68F153-927F-4ADA-A90F-AFD816292B90}" type="datetimeFigureOut">
               <a:rPr lang="en-US" smtClean="0"/>
-              <a:t>2/20/2020</a:t>
+              <a:t>3/14/2020</a:t>
             </a:fld>
             <a:endParaRPr lang="en-US"/>
           </a:p>
@@ -3416,7 +3418,7 @@
             <a:pPr algn="ctr"/>
             <a:r>
               <a:rPr lang="en-US" dirty="0" smtClean="0"/>
-              <a:t>Jan. 22, 2020</a:t>
+              <a:t>Feb. 5, 2020</a:t>
             </a:r>
             <a:endParaRPr lang="en-US" dirty="0"/>
           </a:p>
@@ -3431,7 +3433,7 @@
         <p:spPr>
           <a:xfrm>
             <a:off x="2035110" y="3043759"/>
-            <a:ext cx="5005769" cy="2585323"/>
+            <a:ext cx="5005769" cy="1477328"/>
           </a:xfrm>
           <a:prstGeom prst="rect">
             <a:avLst/>
@@ -3446,56 +3448,19 @@
           <a:p>
             <a:pPr algn="ctr"/>
             <a:r>
+              <a:rPr lang="en-US" dirty="0" smtClean="0"/>
+              <a:t>Chapter </a:t>
+            </a:r>
+            <a:r>
               <a:rPr lang="en-US" dirty="0"/>
-              <a:t>Chapter 3</a:t>
-            </a:r>
-          </a:p>
-          <a:p>
-            <a:pPr algn="ctr"/>
-            <a:r>
-              <a:rPr lang="en-US" b="1" u="sng" dirty="0"/>
-              <a:t>Variable/Scale, Rounding &amp; Summation</a:t>
-            </a:r>
-          </a:p>
-          <a:p>
-            <a:pPr algn="ctr"/>
-            <a:r>
-              <a:rPr lang="en-US" i="1" dirty="0" smtClean="0"/>
-              <a:t>Finish </a:t>
-            </a:r>
-            <a:r>
-              <a:rPr lang="en-US" i="1" dirty="0"/>
-              <a:t>discussion</a:t>
-            </a:r>
-          </a:p>
-          <a:p>
-            <a:pPr algn="ctr"/>
-            <a:r>
-              <a:rPr lang="en-US" i="1" dirty="0"/>
-              <a:t>Homework questions</a:t>
-            </a:r>
-          </a:p>
-          <a:p>
-            <a:pPr algn="ctr"/>
-            <a:endParaRPr lang="en-US" i="1" dirty="0"/>
-          </a:p>
-          <a:p>
-            <a:pPr algn="ctr"/>
-            <a:r>
-              <a:rPr lang="en-US" dirty="0"/>
-              <a:t>Chapter </a:t>
-            </a:r>
-            <a:r>
-              <a:rPr lang="en-US" dirty="0" smtClean="0"/>
-              <a:t>4</a:t>
-            </a:r>
-            <a:endParaRPr lang="en-US" dirty="0"/>
+              <a:t>6</a:t>
+            </a:r>
           </a:p>
           <a:p>
             <a:pPr algn="ctr"/>
             <a:r>
               <a:rPr lang="en-US" b="1" u="sng" dirty="0" smtClean="0"/>
-              <a:t>Standardized Scores &amp; the Normal Distribution</a:t>
+              <a:t>Confidence Interval Estimation: The t Distribution</a:t>
             </a:r>
             <a:endParaRPr lang="en-US" b="1" u="sng" dirty="0"/>
           </a:p>
@@ -3511,7 +3476,14 @@
             <a:pPr algn="ctr"/>
             <a:r>
               <a:rPr lang="en-US" i="1" dirty="0" smtClean="0"/>
-              <a:t>(first half)</a:t>
+              <a:t>(second half)</a:t>
+            </a:r>
+          </a:p>
+          <a:p>
+            <a:pPr algn="ctr"/>
+            <a:r>
+              <a:rPr lang="en-US" i="1" dirty="0" smtClean="0"/>
+              <a:t>Homework Helps</a:t>
             </a:r>
             <a:endParaRPr lang="en-US" i="1" dirty="0"/>
           </a:p>
@@ -3655,7 +3627,7 @@
     </p:spTree>
     <p:extLst>
       <p:ext uri="{BB962C8B-B14F-4D97-AF65-F5344CB8AC3E}">
-        <p14:creationId xmlns:p14="http://schemas.microsoft.com/office/powerpoint/2010/main" val="2900019700"/>
+        <p14:creationId xmlns:p14="http://schemas.microsoft.com/office/powerpoint/2010/main" val="4154058086"/>
       </p:ext>
     </p:extLst>
   </p:cSld>
@@ -3783,7 +3755,7 @@
             <a:pPr algn="ctr"/>
             <a:r>
               <a:rPr lang="en-US" dirty="0" smtClean="0"/>
-              <a:t>Jan. 15, 2020</a:t>
+              <a:t>Feb. 3, 2020</a:t>
             </a:r>
             <a:endParaRPr lang="en-US" dirty="0"/>
           </a:p>
@@ -3797,8 +3769,8 @@
         </p:nvSpPr>
         <p:spPr>
           <a:xfrm>
-            <a:off x="2318419" y="3043759"/>
-            <a:ext cx="4212906" cy="2585323"/>
+            <a:off x="2035110" y="3043759"/>
+            <a:ext cx="5005769" cy="2585323"/>
           </a:xfrm>
           <a:prstGeom prst="rect">
             <a:avLst/>
@@ -3813,48 +3785,59 @@
           <a:p>
             <a:pPr algn="ctr"/>
             <a:r>
+              <a:rPr lang="en-US" dirty="0"/>
+              <a:t>Chapter </a:t>
+            </a:r>
+            <a:r>
               <a:rPr lang="en-US" dirty="0" smtClean="0"/>
-              <a:t>Chapter 1</a:t>
-            </a:r>
+              <a:t>5</a:t>
+            </a:r>
+            <a:endParaRPr lang="en-US" dirty="0"/>
           </a:p>
           <a:p>
             <a:pPr algn="ctr"/>
             <a:r>
               <a:rPr lang="en-US" b="1" u="sng" dirty="0" smtClean="0"/>
-              <a:t>Variable/Scale, Rounding &amp; Summation</a:t>
-            </a:r>
+              <a:t>Intro to Hypothesis Testing: 1 sample z-Test</a:t>
+            </a:r>
+            <a:endParaRPr lang="en-US" b="1" u="sng" dirty="0"/>
           </a:p>
           <a:p>
             <a:pPr algn="ctr"/>
             <a:r>
               <a:rPr lang="en-US" i="1" dirty="0" smtClean="0"/>
-              <a:t>Finish discussion</a:t>
-            </a:r>
-          </a:p>
-          <a:p>
-            <a:pPr algn="ctr"/>
-            <a:r>
-              <a:rPr lang="en-US" i="1" dirty="0" smtClean="0"/>
+              <a:t>Finish </a:t>
+            </a:r>
+            <a:r>
+              <a:rPr lang="en-US" i="1" dirty="0"/>
+              <a:t>discussion</a:t>
+            </a:r>
+          </a:p>
+          <a:p>
+            <a:pPr algn="ctr"/>
+            <a:r>
+              <a:rPr lang="en-US" i="1" dirty="0"/>
               <a:t>Homework questions</a:t>
             </a:r>
           </a:p>
           <a:p>
             <a:pPr algn="ctr"/>
-            <a:endParaRPr lang="en-US" i="1" dirty="0" smtClean="0"/>
+            <a:endParaRPr lang="en-US" i="1" dirty="0"/>
           </a:p>
           <a:p>
             <a:pPr algn="ctr"/>
             <a:r>
               <a:rPr lang="en-US" dirty="0"/>
-              <a:t>Chapter 2 </a:t>
-            </a:r>
-          </a:p>
-          <a:p>
-            <a:pPr algn="ctr"/>
-            <a:r>
-              <a:rPr lang="en-US" b="1" u="sng" dirty="0"/>
-              <a:t>Exploring Data with Plots</a:t>
-            </a:r>
+              <a:t>Chapter 6</a:t>
+            </a:r>
+          </a:p>
+          <a:p>
+            <a:pPr algn="ctr"/>
+            <a:r>
+              <a:rPr lang="en-US" b="1" u="sng" dirty="0" smtClean="0"/>
+              <a:t>Confidence Interval Estimation: The t Distribution</a:t>
+            </a:r>
+            <a:endParaRPr lang="en-US" b="1" u="sng" dirty="0"/>
           </a:p>
           <a:p>
             <a:pPr algn="ctr"/>
@@ -3867,12 +3850,8 @@
           <a:p>
             <a:pPr algn="ctr"/>
             <a:r>
-              <a:rPr lang="en-US" i="1" dirty="0"/>
-              <a:t>Homework </a:t>
-            </a:r>
-            <a:r>
               <a:rPr lang="en-US" i="1" dirty="0" smtClean="0"/>
-              <a:t>questions</a:t>
+              <a:t>(first half)</a:t>
             </a:r>
             <a:endParaRPr lang="en-US" i="1" dirty="0"/>
           </a:p>
@@ -4016,7 +3995,7 @@
     </p:spTree>
     <p:extLst>
       <p:ext uri="{BB962C8B-B14F-4D97-AF65-F5344CB8AC3E}">
-        <p14:creationId xmlns:p14="http://schemas.microsoft.com/office/powerpoint/2010/main" val="3290463226"/>
+        <p14:creationId xmlns:p14="http://schemas.microsoft.com/office/powerpoint/2010/main" val="1136618621"/>
       </p:ext>
     </p:extLst>
   </p:cSld>
@@ -4043,51 +4022,26 @@
           <a:chExt cx="0" cy="0"/>
         </a:xfrm>
       </p:grpSpPr>
-      <p:pic>
-        <p:nvPicPr>
-          <p:cNvPr id="2" name="Picture 1"/>
-          <p:cNvPicPr>
-            <a:picLocks noChangeAspect="1"/>
-          </p:cNvPicPr>
-          <p:nvPr/>
-        </p:nvPicPr>
-        <p:blipFill>
-          <a:blip r:embed="rId2" cstate="print">
-            <a:extLst>
-              <a:ext uri="{28A0092B-C50C-407E-A947-70E740481C1C}">
-                <a14:useLocalDpi xmlns:a14="http://schemas.microsoft.com/office/drawing/2010/main" val="0"/>
-              </a:ext>
-            </a:extLst>
-          </a:blip>
-          <a:stretch>
-            <a:fillRect/>
-          </a:stretch>
-        </p:blipFill>
-        <p:spPr>
-          <a:xfrm>
-            <a:off x="5306566" y="2514598"/>
-            <a:ext cx="1578867" cy="1828804"/>
+      <p:sp>
+        <p:nvSpPr>
+          <p:cNvPr id="4" name="Rectangle 3"/>
+          <p:cNvSpPr/>
+          <p:nvPr/>
+        </p:nvSpPr>
+        <p:spPr>
+          <a:xfrm>
+            <a:off x="1808702" y="824230"/>
+            <a:ext cx="8778240" cy="5010912"/>
           </a:xfrm>
           <a:prstGeom prst="rect">
             <a:avLst/>
           </a:prstGeom>
-        </p:spPr>
-      </p:pic>
-      <p:sp>
-        <p:nvSpPr>
-          <p:cNvPr id="3" name="Rectangle 2"/>
-          <p:cNvSpPr/>
-          <p:nvPr/>
-        </p:nvSpPr>
-        <p:spPr>
-          <a:xfrm>
-            <a:off x="5054138" y="2394066"/>
-            <a:ext cx="2094807" cy="2078182"/>
-          </a:xfrm>
-          <a:prstGeom prst="rect">
-            <a:avLst/>
-          </a:prstGeom>
-          <a:noFill/>
+          <a:solidFill>
+            <a:schemeClr val="bg1">
+              <a:lumMod val="95000"/>
+            </a:schemeClr>
+          </a:solidFill>
+          <a:ln w="38100"/>
         </p:spPr>
         <p:style>
           <a:lnRef idx="2">
@@ -4114,82 +4068,6 @@
           </a:p>
         </p:txBody>
       </p:sp>
-    </p:spTree>
-    <p:extLst>
-      <p:ext uri="{BB962C8B-B14F-4D97-AF65-F5344CB8AC3E}">
-        <p14:creationId xmlns:p14="http://schemas.microsoft.com/office/powerpoint/2010/main" val="2048573925"/>
-      </p:ext>
-    </p:extLst>
-  </p:cSld>
-  <p:clrMapOvr>
-    <a:masterClrMapping/>
-  </p:clrMapOvr>
-</p:sld>
-</file>
-
-<file path=ppt/slides/slide2.xml><?xml version="1.0" encoding="utf-8"?>
-<p:sld xmlns:a="http://schemas.openxmlformats.org/drawingml/2006/main" xmlns:r="http://schemas.openxmlformats.org/officeDocument/2006/relationships" xmlns:p="http://schemas.openxmlformats.org/presentationml/2006/main">
-  <p:cSld>
-    <p:spTree>
-      <p:nvGrpSpPr>
-        <p:cNvPr id="1" name=""/>
-        <p:cNvGrpSpPr/>
-        <p:nvPr/>
-      </p:nvGrpSpPr>
-      <p:grpSpPr>
-        <a:xfrm>
-          <a:off x="0" y="0"/>
-          <a:ext cx="0" cy="0"/>
-          <a:chOff x="0" y="0"/>
-          <a:chExt cx="0" cy="0"/>
-        </a:xfrm>
-      </p:grpSpPr>
-      <p:sp>
-        <p:nvSpPr>
-          <p:cNvPr id="4" name="Rectangle 3"/>
-          <p:cNvSpPr/>
-          <p:nvPr/>
-        </p:nvSpPr>
-        <p:spPr>
-          <a:xfrm>
-            <a:off x="1808702" y="824230"/>
-            <a:ext cx="8778240" cy="5010912"/>
-          </a:xfrm>
-          <a:prstGeom prst="rect">
-            <a:avLst/>
-          </a:prstGeom>
-          <a:solidFill>
-            <a:schemeClr val="bg1">
-              <a:lumMod val="95000"/>
-            </a:schemeClr>
-          </a:solidFill>
-          <a:ln w="38100"/>
-        </p:spPr>
-        <p:style>
-          <a:lnRef idx="2">
-            <a:schemeClr val="accent1">
-              <a:shade val="50000"/>
-            </a:schemeClr>
-          </a:lnRef>
-          <a:fillRef idx="1">
-            <a:schemeClr val="accent1"/>
-          </a:fillRef>
-          <a:effectRef idx="0">
-            <a:schemeClr val="accent1"/>
-          </a:effectRef>
-          <a:fontRef idx="minor">
-            <a:schemeClr val="lt1"/>
-          </a:fontRef>
-        </p:style>
-        <p:txBody>
-          <a:bodyPr rtlCol="0" anchor="ctr"/>
-          <a:lstStyle/>
-          <a:p>
-            <a:pPr algn="ctr"/>
-            <a:endParaRPr lang="en-US"/>
-          </a:p>
-        </p:txBody>
-      </p:sp>
       <p:sp>
         <p:nvSpPr>
           <p:cNvPr id="7" name="TextBox 6"/>
@@ -4198,8 +4076,8 @@
         </p:nvSpPr>
         <p:spPr>
           <a:xfrm>
-            <a:off x="4003824" y="1483154"/>
-            <a:ext cx="5712369" cy="1754326"/>
+            <a:off x="3840385" y="1213849"/>
+            <a:ext cx="5712369" cy="923330"/>
           </a:xfrm>
           <a:prstGeom prst="rect">
             <a:avLst/>
@@ -4214,7 +4092,7 @@
           <a:p>
             <a:r>
               <a:rPr lang="en-US" sz="5400" dirty="0" smtClean="0"/>
-              <a:t>OUT-OF-CLASS LECTURES</a:t>
+              <a:t>INCLASS LECTURES</a:t>
             </a:r>
             <a:endParaRPr lang="en-US" sz="5400" dirty="0"/>
           </a:p>
@@ -4245,7 +4123,7 @@
             <a:pPr algn="ctr"/>
             <a:r>
               <a:rPr lang="en-US" dirty="0" smtClean="0"/>
-              <a:t>Jan. 24, 2020</a:t>
+              <a:t>Jan. 22, 2020</a:t>
             </a:r>
             <a:endParaRPr lang="en-US" dirty="0"/>
           </a:p>
@@ -4259,8 +4137,8 @@
         </p:nvSpPr>
         <p:spPr>
           <a:xfrm>
-            <a:off x="2000886" y="3743671"/>
-            <a:ext cx="5005769" cy="923330"/>
+            <a:off x="2035110" y="3043759"/>
+            <a:ext cx="5005769" cy="2585323"/>
           </a:xfrm>
           <a:prstGeom prst="rect">
             <a:avLst/>
@@ -4275,8 +4153,48 @@
           <a:p>
             <a:pPr algn="ctr"/>
             <a:r>
+              <a:rPr lang="en-US" dirty="0"/>
+              <a:t>Chapter 3</a:t>
+            </a:r>
+          </a:p>
+          <a:p>
+            <a:pPr algn="ctr"/>
+            <a:r>
+              <a:rPr lang="en-US" b="1" u="sng" dirty="0"/>
+              <a:t>Variable/Scale, Rounding &amp; Summation</a:t>
+            </a:r>
+          </a:p>
+          <a:p>
+            <a:pPr algn="ctr"/>
+            <a:r>
+              <a:rPr lang="en-US" i="1" dirty="0" smtClean="0"/>
+              <a:t>Finish </a:t>
+            </a:r>
+            <a:r>
+              <a:rPr lang="en-US" i="1" dirty="0"/>
+              <a:t>discussion</a:t>
+            </a:r>
+          </a:p>
+          <a:p>
+            <a:pPr algn="ctr"/>
+            <a:r>
+              <a:rPr lang="en-US" i="1" dirty="0"/>
+              <a:t>Homework questions</a:t>
+            </a:r>
+          </a:p>
+          <a:p>
+            <a:pPr algn="ctr"/>
+            <a:endParaRPr lang="en-US" i="1" dirty="0"/>
+          </a:p>
+          <a:p>
+            <a:pPr algn="ctr"/>
+            <a:r>
+              <a:rPr lang="en-US" dirty="0"/>
+              <a:t>Chapter </a:t>
+            </a:r>
+            <a:r>
               <a:rPr lang="en-US" dirty="0" smtClean="0"/>
-              <a:t>Chapter 4</a:t>
+              <a:t>4</a:t>
             </a:r>
             <a:endParaRPr lang="en-US" dirty="0"/>
           </a:p>
@@ -4292,8 +4210,17 @@
             <a:pPr algn="ctr"/>
             <a:r>
               <a:rPr lang="en-US" i="1" dirty="0" smtClean="0"/>
-              <a:t>Lecture Slide Examples Worked</a:t>
-            </a:r>
+              <a:t>Lecture slides</a:t>
+            </a:r>
+            <a:endParaRPr lang="en-US" i="1" dirty="0"/>
+          </a:p>
+          <a:p>
+            <a:pPr algn="ctr"/>
+            <a:r>
+              <a:rPr lang="en-US" i="1" dirty="0" smtClean="0"/>
+              <a:t>(first half)</a:t>
+            </a:r>
+            <a:endParaRPr lang="en-US" i="1" dirty="0"/>
           </a:p>
         </p:txBody>
       </p:sp>
@@ -4435,7 +4362,7 @@
     </p:spTree>
     <p:extLst>
       <p:ext uri="{BB962C8B-B14F-4D97-AF65-F5344CB8AC3E}">
-        <p14:creationId xmlns:p14="http://schemas.microsoft.com/office/powerpoint/2010/main" val="267042058"/>
+        <p14:creationId xmlns:p14="http://schemas.microsoft.com/office/powerpoint/2010/main" val="2900019700"/>
       </p:ext>
     </p:extLst>
   </p:cSld>
@@ -4445,7 +4372,7 @@
 </p:sld>
 </file>
 
-<file path=ppt/slides/slide3.xml><?xml version="1.0" encoding="utf-8"?>
+<file path=ppt/slides/slide13.xml><?xml version="1.0" encoding="utf-8"?>
 <p:sld xmlns:a="http://schemas.openxmlformats.org/drawingml/2006/main" xmlns:r="http://schemas.openxmlformats.org/officeDocument/2006/relationships" xmlns:p="http://schemas.openxmlformats.org/presentationml/2006/main">
   <p:cSld>
     <p:spTree>
@@ -4516,8 +4443,8 @@
         </p:nvSpPr>
         <p:spPr>
           <a:xfrm>
-            <a:off x="4184694" y="1065121"/>
-            <a:ext cx="5712369" cy="1754326"/>
+            <a:off x="3840385" y="1213849"/>
+            <a:ext cx="5712369" cy="923330"/>
           </a:xfrm>
           <a:prstGeom prst="rect">
             <a:avLst/>
@@ -4532,7 +4459,7 @@
           <a:p>
             <a:r>
               <a:rPr lang="en-US" sz="5400" dirty="0" smtClean="0"/>
-              <a:t>OUT-OF-CLASS LECTURES</a:t>
+              <a:t>INCLASS LECTURES</a:t>
             </a:r>
             <a:endParaRPr lang="en-US" sz="5400" dirty="0"/>
           </a:p>
@@ -4563,7 +4490,7 @@
             <a:pPr algn="ctr"/>
             <a:r>
               <a:rPr lang="en-US" dirty="0" smtClean="0"/>
-              <a:t>Jan. 24, 2020</a:t>
+              <a:t>Jan. 15, 2020</a:t>
             </a:r>
             <a:endParaRPr lang="en-US" dirty="0"/>
           </a:p>
@@ -4577,8 +4504,8 @@
         </p:nvSpPr>
         <p:spPr>
           <a:xfrm>
-            <a:off x="2035110" y="3043759"/>
-            <a:ext cx="5005769" cy="1200329"/>
+            <a:off x="2318419" y="3043759"/>
+            <a:ext cx="4212906" cy="2585323"/>
           </a:xfrm>
           <a:prstGeom prst="rect">
             <a:avLst/>
@@ -4594,31 +4521,65 @@
             <a:pPr algn="ctr"/>
             <a:r>
               <a:rPr lang="en-US" dirty="0" smtClean="0"/>
-              <a:t>Chapter 4</a:t>
-            </a:r>
-            <a:endParaRPr lang="en-US" dirty="0"/>
+              <a:t>Chapter 1</a:t>
+            </a:r>
           </a:p>
           <a:p>
             <a:pPr algn="ctr"/>
             <a:r>
               <a:rPr lang="en-US" b="1" u="sng" dirty="0" smtClean="0"/>
-              <a:t>Standardized Scores &amp; the Normal Distribution</a:t>
-            </a:r>
-            <a:endParaRPr lang="en-US" b="1" u="sng" dirty="0"/>
+              <a:t>Variable/Scale, Rounding &amp; Summation</a:t>
+            </a:r>
           </a:p>
           <a:p>
             <a:pPr algn="ctr"/>
             <a:r>
               <a:rPr lang="en-US" i="1" dirty="0" smtClean="0"/>
-              <a:t>Lecture slides 25-43</a:t>
+              <a:t>Finish discussion</a:t>
+            </a:r>
+          </a:p>
+          <a:p>
+            <a:pPr algn="ctr"/>
+            <a:r>
+              <a:rPr lang="en-US" i="1" dirty="0" smtClean="0"/>
+              <a:t>Homework questions</a:t>
+            </a:r>
+          </a:p>
+          <a:p>
+            <a:pPr algn="ctr"/>
+            <a:endParaRPr lang="en-US" i="1" dirty="0" smtClean="0"/>
+          </a:p>
+          <a:p>
+            <a:pPr algn="ctr"/>
+            <a:r>
+              <a:rPr lang="en-US" dirty="0"/>
+              <a:t>Chapter 2 </a:t>
+            </a:r>
+          </a:p>
+          <a:p>
+            <a:pPr algn="ctr"/>
+            <a:r>
+              <a:rPr lang="en-US" b="1" u="sng" dirty="0"/>
+              <a:t>Exploring Data with Plots</a:t>
+            </a:r>
+          </a:p>
+          <a:p>
+            <a:pPr algn="ctr"/>
+            <a:r>
+              <a:rPr lang="en-US" i="1" dirty="0" smtClean="0"/>
+              <a:t>Lecture slides</a:t>
             </a:r>
             <a:endParaRPr lang="en-US" i="1" dirty="0"/>
           </a:p>
           <a:p>
             <a:pPr algn="ctr"/>
             <a:r>
+              <a:rPr lang="en-US" i="1" dirty="0"/>
+              <a:t>Homework </a:t>
+            </a:r>
+            <a:r>
               <a:rPr lang="en-US" i="1" dirty="0" smtClean="0"/>
-              <a:t>(Second half)</a:t>
+              <a:t>questions</a:t>
             </a:r>
             <a:endParaRPr lang="en-US" i="1" dirty="0"/>
           </a:p>
@@ -4762,7 +4723,7 @@
     </p:spTree>
     <p:extLst>
       <p:ext uri="{BB962C8B-B14F-4D97-AF65-F5344CB8AC3E}">
-        <p14:creationId xmlns:p14="http://schemas.microsoft.com/office/powerpoint/2010/main" val="1429724622"/>
+        <p14:creationId xmlns:p14="http://schemas.microsoft.com/office/powerpoint/2010/main" val="3290463226"/>
       </p:ext>
     </p:extLst>
   </p:cSld>
@@ -4772,7 +4733,7 @@
 </p:sld>
 </file>
 
-<file path=ppt/slides/slide4.xml><?xml version="1.0" encoding="utf-8"?>
+<file path=ppt/slides/slide14.xml><?xml version="1.0" encoding="utf-8"?>
 <p:sld xmlns:a="http://schemas.openxmlformats.org/drawingml/2006/main" xmlns:r="http://schemas.openxmlformats.org/officeDocument/2006/relationships" xmlns:p="http://schemas.openxmlformats.org/presentationml/2006/main">
   <p:cSld>
     <p:spTree>
@@ -4789,26 +4750,51 @@
           <a:chExt cx="0" cy="0"/>
         </a:xfrm>
       </p:grpSpPr>
-      <p:sp>
-        <p:nvSpPr>
-          <p:cNvPr id="4" name="Rectangle 3"/>
-          <p:cNvSpPr/>
-          <p:nvPr/>
-        </p:nvSpPr>
-        <p:spPr>
-          <a:xfrm>
-            <a:off x="1808702" y="824230"/>
-            <a:ext cx="8778240" cy="5010912"/>
+      <p:pic>
+        <p:nvPicPr>
+          <p:cNvPr id="2" name="Picture 1"/>
+          <p:cNvPicPr>
+            <a:picLocks noChangeAspect="1"/>
+          </p:cNvPicPr>
+          <p:nvPr/>
+        </p:nvPicPr>
+        <p:blipFill>
+          <a:blip r:embed="rId2" cstate="print">
+            <a:extLst>
+              <a:ext uri="{28A0092B-C50C-407E-A947-70E740481C1C}">
+                <a14:useLocalDpi xmlns:a14="http://schemas.microsoft.com/office/drawing/2010/main" val="0"/>
+              </a:ext>
+            </a:extLst>
+          </a:blip>
+          <a:stretch>
+            <a:fillRect/>
+          </a:stretch>
+        </p:blipFill>
+        <p:spPr>
+          <a:xfrm>
+            <a:off x="5306566" y="2514598"/>
+            <a:ext cx="1578867" cy="1828804"/>
           </a:xfrm>
           <a:prstGeom prst="rect">
             <a:avLst/>
           </a:prstGeom>
-          <a:solidFill>
-            <a:schemeClr val="bg1">
-              <a:lumMod val="95000"/>
-            </a:schemeClr>
-          </a:solidFill>
-          <a:ln w="38100"/>
+        </p:spPr>
+      </p:pic>
+      <p:sp>
+        <p:nvSpPr>
+          <p:cNvPr id="3" name="Rectangle 2"/>
+          <p:cNvSpPr/>
+          <p:nvPr/>
+        </p:nvSpPr>
+        <p:spPr>
+          <a:xfrm>
+            <a:off x="5054138" y="2394066"/>
+            <a:ext cx="2094807" cy="2078182"/>
+          </a:xfrm>
+          <a:prstGeom prst="rect">
+            <a:avLst/>
+          </a:prstGeom>
+          <a:noFill/>
         </p:spPr>
         <p:style>
           <a:lnRef idx="2">
@@ -4835,6 +4821,82 @@
           </a:p>
         </p:txBody>
       </p:sp>
+    </p:spTree>
+    <p:extLst>
+      <p:ext uri="{BB962C8B-B14F-4D97-AF65-F5344CB8AC3E}">
+        <p14:creationId xmlns:p14="http://schemas.microsoft.com/office/powerpoint/2010/main" val="2048573925"/>
+      </p:ext>
+    </p:extLst>
+  </p:cSld>
+  <p:clrMapOvr>
+    <a:masterClrMapping/>
+  </p:clrMapOvr>
+</p:sld>
+</file>
+
+<file path=ppt/slides/slide2.xml><?xml version="1.0" encoding="utf-8"?>
+<p:sld xmlns:a="http://schemas.openxmlformats.org/drawingml/2006/main" xmlns:r="http://schemas.openxmlformats.org/officeDocument/2006/relationships" xmlns:p="http://schemas.openxmlformats.org/presentationml/2006/main">
+  <p:cSld>
+    <p:spTree>
+      <p:nvGrpSpPr>
+        <p:cNvPr id="1" name=""/>
+        <p:cNvGrpSpPr/>
+        <p:nvPr/>
+      </p:nvGrpSpPr>
+      <p:grpSpPr>
+        <a:xfrm>
+          <a:off x="0" y="0"/>
+          <a:ext cx="0" cy="0"/>
+          <a:chOff x="0" y="0"/>
+          <a:chExt cx="0" cy="0"/>
+        </a:xfrm>
+      </p:grpSpPr>
+      <p:sp>
+        <p:nvSpPr>
+          <p:cNvPr id="4" name="Rectangle 3"/>
+          <p:cNvSpPr/>
+          <p:nvPr/>
+        </p:nvSpPr>
+        <p:spPr>
+          <a:xfrm>
+            <a:off x="1808702" y="824230"/>
+            <a:ext cx="8778240" cy="5010912"/>
+          </a:xfrm>
+          <a:prstGeom prst="rect">
+            <a:avLst/>
+          </a:prstGeom>
+          <a:solidFill>
+            <a:schemeClr val="bg1">
+              <a:lumMod val="95000"/>
+            </a:schemeClr>
+          </a:solidFill>
+          <a:ln w="38100"/>
+        </p:spPr>
+        <p:style>
+          <a:lnRef idx="2">
+            <a:schemeClr val="accent1">
+              <a:shade val="50000"/>
+            </a:schemeClr>
+          </a:lnRef>
+          <a:fillRef idx="1">
+            <a:schemeClr val="accent1"/>
+          </a:fillRef>
+          <a:effectRef idx="0">
+            <a:schemeClr val="accent1"/>
+          </a:effectRef>
+          <a:fontRef idx="minor">
+            <a:schemeClr val="lt1"/>
+          </a:fontRef>
+        </p:style>
+        <p:txBody>
+          <a:bodyPr rtlCol="0" anchor="ctr"/>
+          <a:lstStyle/>
+          <a:p>
+            <a:pPr algn="ctr"/>
+            <a:endParaRPr lang="en-US"/>
+          </a:p>
+        </p:txBody>
+      </p:sp>
       <p:sp>
         <p:nvSpPr>
           <p:cNvPr id="7" name="TextBox 6"/>
@@ -4843,8 +4905,8 @@
         </p:nvSpPr>
         <p:spPr>
           <a:xfrm>
-            <a:off x="3840385" y="1213849"/>
-            <a:ext cx="5712369" cy="923330"/>
+            <a:off x="4003824" y="1483154"/>
+            <a:ext cx="5712369" cy="1754326"/>
           </a:xfrm>
           <a:prstGeom prst="rect">
             <a:avLst/>
@@ -4859,7 +4921,7 @@
           <a:p>
             <a:r>
               <a:rPr lang="en-US" sz="5400" dirty="0" smtClean="0"/>
-              <a:t>INCLASS LECTURES</a:t>
+              <a:t>OUT-OF-CLASS LECTURES</a:t>
             </a:r>
             <a:endParaRPr lang="en-US" sz="5400" dirty="0"/>
           </a:p>
@@ -4890,15 +4952,7 @@
             <a:pPr algn="ctr"/>
             <a:r>
               <a:rPr lang="en-US" dirty="0" smtClean="0"/>
-              <a:t>Feb. </a:t>
-            </a:r>
-            <a:r>
-              <a:rPr lang="en-US" dirty="0" smtClean="0"/>
-              <a:t>19, </a:t>
-            </a:r>
-            <a:r>
-              <a:rPr lang="en-US" dirty="0" smtClean="0"/>
-              <a:t>2020</a:t>
+              <a:t>Jan. 24, 2020</a:t>
             </a:r>
             <a:endParaRPr lang="en-US" dirty="0"/>
           </a:p>
@@ -4912,7 +4966,7 @@
         </p:nvSpPr>
         <p:spPr>
           <a:xfrm>
-            <a:off x="2130478" y="2956774"/>
+            <a:off x="2000886" y="3743671"/>
             <a:ext cx="5005769" cy="923330"/>
           </a:xfrm>
           <a:prstGeom prst="rect">
@@ -4929,34 +4983,23 @@
             <a:pPr algn="ctr"/>
             <a:r>
               <a:rPr lang="en-US" dirty="0" smtClean="0"/>
-              <a:t>Chapter </a:t>
-            </a:r>
-            <a:r>
-              <a:rPr lang="en-US" dirty="0"/>
-              <a:t>9</a:t>
-            </a:r>
+              <a:t>Chapter 4</a:t>
+            </a:r>
+            <a:endParaRPr lang="en-US" dirty="0"/>
           </a:p>
           <a:p>
             <a:pPr algn="ctr"/>
             <a:r>
               <a:rPr lang="en-US" b="1" u="sng" dirty="0" smtClean="0"/>
-              <a:t>Correlation</a:t>
-            </a:r>
-            <a:endParaRPr lang="en-US" dirty="0" smtClean="0"/>
+              <a:t>Standardized Scores &amp; the Normal Distribution</a:t>
+            </a:r>
+            <a:endParaRPr lang="en-US" b="1" u="sng" dirty="0"/>
           </a:p>
           <a:p>
             <a:pPr algn="ctr"/>
             <a:r>
               <a:rPr lang="en-US" i="1" dirty="0" smtClean="0"/>
-              <a:t>Second </a:t>
-            </a:r>
-            <a:r>
-              <a:rPr lang="en-US" i="1" dirty="0" smtClean="0"/>
-              <a:t>half</a:t>
-            </a:r>
-            <a:r>
-              <a:rPr lang="en-US" i="1" dirty="0" smtClean="0"/>
-              <a:t>, chapter slides</a:t>
+              <a:t>Lecture Slide Examples Worked</a:t>
             </a:r>
           </a:p>
         </p:txBody>
@@ -5096,65 +5139,10 @@
           </a:prstGeom>
         </p:spPr>
       </p:pic>
-      <p:sp>
-        <p:nvSpPr>
-          <p:cNvPr id="15" name="TextBox 14"/>
-          <p:cNvSpPr txBox="1"/>
-          <p:nvPr/>
-        </p:nvSpPr>
-        <p:spPr>
-          <a:xfrm>
-            <a:off x="2107241" y="4130160"/>
-            <a:ext cx="5005769" cy="923330"/>
-          </a:xfrm>
-          <a:prstGeom prst="rect">
-            <a:avLst/>
-          </a:prstGeom>
-          <a:noFill/>
-        </p:spPr>
-        <p:txBody>
-          <a:bodyPr wrap="square" rtlCol="0">
-            <a:spAutoFit/>
-          </a:bodyPr>
-          <a:lstStyle/>
-          <a:p>
-            <a:pPr algn="ctr"/>
-            <a:r>
-              <a:rPr lang="en-US" dirty="0" smtClean="0"/>
-              <a:t>Chapter </a:t>
-            </a:r>
-            <a:r>
-              <a:rPr lang="en-US" dirty="0" smtClean="0"/>
-              <a:t>10</a:t>
-            </a:r>
-            <a:endParaRPr lang="en-US" dirty="0"/>
-          </a:p>
-          <a:p>
-            <a:pPr algn="ctr"/>
-            <a:r>
-              <a:rPr lang="en-US" b="1" u="sng" dirty="0" smtClean="0"/>
-              <a:t>Simple Linear </a:t>
-            </a:r>
-            <a:r>
-              <a:rPr lang="en-US" b="1" u="sng" dirty="0" smtClean="0"/>
-              <a:t>Regression</a:t>
-            </a:r>
-            <a:endParaRPr lang="en-US" dirty="0" smtClean="0"/>
-          </a:p>
-          <a:p>
-            <a:pPr algn="ctr"/>
-            <a:r>
-              <a:rPr lang="en-US" i="1" dirty="0" smtClean="0"/>
-              <a:t>chapter slides (majority)</a:t>
-            </a:r>
-            <a:endParaRPr lang="en-US" i="1" dirty="0" smtClean="0"/>
-          </a:p>
-        </p:txBody>
-      </p:sp>
     </p:spTree>
     <p:extLst>
       <p:ext uri="{BB962C8B-B14F-4D97-AF65-F5344CB8AC3E}">
-        <p14:creationId xmlns:p14="http://schemas.microsoft.com/office/powerpoint/2010/main" val="2730707931"/>
+        <p14:creationId xmlns:p14="http://schemas.microsoft.com/office/powerpoint/2010/main" val="267042058"/>
       </p:ext>
     </p:extLst>
   </p:cSld>
@@ -5164,7 +5152,7 @@
 </p:sld>
 </file>
 
-<file path=ppt/slides/slide5.xml><?xml version="1.0" encoding="utf-8"?>
+<file path=ppt/slides/slide3.xml><?xml version="1.0" encoding="utf-8"?>
 <p:sld xmlns:a="http://schemas.openxmlformats.org/drawingml/2006/main" xmlns:r="http://schemas.openxmlformats.org/officeDocument/2006/relationships" xmlns:p="http://schemas.openxmlformats.org/presentationml/2006/main">
   <p:cSld>
     <p:spTree>
@@ -5235,8 +5223,8 @@
         </p:nvSpPr>
         <p:spPr>
           <a:xfrm>
-            <a:off x="3840385" y="1213849"/>
-            <a:ext cx="5712369" cy="923330"/>
+            <a:off x="4184694" y="1065121"/>
+            <a:ext cx="5712369" cy="1754326"/>
           </a:xfrm>
           <a:prstGeom prst="rect">
             <a:avLst/>
@@ -5251,7 +5239,7 @@
           <a:p>
             <a:r>
               <a:rPr lang="en-US" sz="5400" dirty="0" smtClean="0"/>
-              <a:t>INCLASS LECTURES</a:t>
+              <a:t>OUT-OF-CLASS LECTURES</a:t>
             </a:r>
             <a:endParaRPr lang="en-US" sz="5400" dirty="0"/>
           </a:p>
@@ -5282,7 +5270,7 @@
             <a:pPr algn="ctr"/>
             <a:r>
               <a:rPr lang="en-US" dirty="0" smtClean="0"/>
-              <a:t>Feb. 12, 2020</a:t>
+              <a:t>Jan. 24, 2020</a:t>
             </a:r>
             <a:endParaRPr lang="en-US" dirty="0"/>
           </a:p>
@@ -5296,8 +5284,8 @@
         </p:nvSpPr>
         <p:spPr>
           <a:xfrm>
-            <a:off x="2175357" y="4235713"/>
-            <a:ext cx="5005769" cy="923330"/>
+            <a:off x="2035110" y="3043759"/>
+            <a:ext cx="5005769" cy="1200329"/>
           </a:xfrm>
           <a:prstGeom prst="rect">
             <a:avLst/>
@@ -5313,27 +5301,33 @@
             <a:pPr algn="ctr"/>
             <a:r>
               <a:rPr lang="en-US" dirty="0" smtClean="0"/>
-              <a:t>Chapter </a:t>
-            </a:r>
-            <a:r>
-              <a:rPr lang="en-US" dirty="0"/>
-              <a:t>9</a:t>
-            </a:r>
+              <a:t>Chapter 4</a:t>
+            </a:r>
+            <a:endParaRPr lang="en-US" dirty="0"/>
           </a:p>
           <a:p>
             <a:pPr algn="ctr"/>
             <a:r>
               <a:rPr lang="en-US" b="1" u="sng" dirty="0" smtClean="0"/>
-              <a:t>Correlation</a:t>
-            </a:r>
-            <a:endParaRPr lang="en-US" dirty="0" smtClean="0"/>
+              <a:t>Standardized Scores &amp; the Normal Distribution</a:t>
+            </a:r>
+            <a:endParaRPr lang="en-US" b="1" u="sng" dirty="0"/>
           </a:p>
           <a:p>
             <a:pPr algn="ctr"/>
             <a:r>
               <a:rPr lang="en-US" i="1" dirty="0" smtClean="0"/>
-              <a:t>First half, chapter slides</a:t>
-            </a:r>
+              <a:t>Lecture slides 25-43</a:t>
+            </a:r>
+            <a:endParaRPr lang="en-US" i="1" dirty="0"/>
+          </a:p>
+          <a:p>
+            <a:pPr algn="ctr"/>
+            <a:r>
+              <a:rPr lang="en-US" i="1" dirty="0" smtClean="0"/>
+              <a:t>(Second half)</a:t>
+            </a:r>
+            <a:endParaRPr lang="en-US" i="1" dirty="0"/>
           </a:p>
         </p:txBody>
       </p:sp>
@@ -5472,73 +5466,10 @@
           </a:prstGeom>
         </p:spPr>
       </p:pic>
-      <p:sp>
-        <p:nvSpPr>
-          <p:cNvPr id="13" name="TextBox 12"/>
-          <p:cNvSpPr txBox="1"/>
-          <p:nvPr/>
-        </p:nvSpPr>
-        <p:spPr>
-          <a:xfrm>
-            <a:off x="2175358" y="2646127"/>
-            <a:ext cx="5005769" cy="1477328"/>
-          </a:xfrm>
-          <a:prstGeom prst="rect">
-            <a:avLst/>
-          </a:prstGeom>
-          <a:noFill/>
-        </p:spPr>
-        <p:txBody>
-          <a:bodyPr wrap="square" rtlCol="0">
-            <a:spAutoFit/>
-          </a:bodyPr>
-          <a:lstStyle/>
-          <a:p>
-            <a:pPr algn="ctr"/>
-            <a:r>
-              <a:rPr lang="en-US" dirty="0" smtClean="0"/>
-              <a:t>Chapter </a:t>
-            </a:r>
-            <a:r>
-              <a:rPr lang="en-US" dirty="0"/>
-              <a:t>8</a:t>
-            </a:r>
-          </a:p>
-          <a:p>
-            <a:pPr algn="ctr"/>
-            <a:r>
-              <a:rPr lang="en-US" b="1" u="sng" dirty="0" smtClean="0"/>
-              <a:t>Effect Size &amp; Power Analysis</a:t>
-            </a:r>
-            <a:endParaRPr lang="en-US" dirty="0" smtClean="0"/>
-          </a:p>
-          <a:p>
-            <a:pPr algn="ctr"/>
-            <a:r>
-              <a:rPr lang="en-US" i="1" dirty="0" smtClean="0"/>
-              <a:t>Chapter slides</a:t>
-            </a:r>
-          </a:p>
-          <a:p>
-            <a:pPr algn="ctr"/>
-            <a:r>
-              <a:rPr lang="en-US" i="1" dirty="0" smtClean="0"/>
-              <a:t>Demo G*Power software</a:t>
-            </a:r>
-          </a:p>
-          <a:p>
-            <a:pPr algn="ctr"/>
-            <a:r>
-              <a:rPr lang="en-US" i="1" dirty="0" smtClean="0"/>
-              <a:t>Homework Help</a:t>
-            </a:r>
-          </a:p>
-        </p:txBody>
-      </p:sp>
     </p:spTree>
     <p:extLst>
       <p:ext uri="{BB962C8B-B14F-4D97-AF65-F5344CB8AC3E}">
-        <p14:creationId xmlns:p14="http://schemas.microsoft.com/office/powerpoint/2010/main" val="3221510669"/>
+        <p14:creationId xmlns:p14="http://schemas.microsoft.com/office/powerpoint/2010/main" val="1429724622"/>
       </p:ext>
     </p:extLst>
   </p:cSld>
@@ -5548,7 +5479,7 @@
 </p:sld>
 </file>
 
-<file path=ppt/slides/slide6.xml><?xml version="1.0" encoding="utf-8"?>
+<file path=ppt/slides/slide4.xml><?xml version="1.0" encoding="utf-8"?>
 <p:sld xmlns:a="http://schemas.openxmlformats.org/drawingml/2006/main" xmlns:r="http://schemas.openxmlformats.org/officeDocument/2006/relationships" xmlns:p="http://schemas.openxmlformats.org/presentationml/2006/main">
   <p:cSld>
     <p:spTree>
@@ -5666,7 +5597,15 @@
             <a:pPr algn="ctr"/>
             <a:r>
               <a:rPr lang="en-US" dirty="0" smtClean="0"/>
-              <a:t>Feb. 10, 2020</a:t>
+              <a:t>March</a:t>
+            </a:r>
+            <a:r>
+              <a:rPr lang="en-US" dirty="0" smtClean="0"/>
+              <a:t> 11, </a:t>
+            </a:r>
+            <a:r>
+              <a:rPr lang="en-US" dirty="0" smtClean="0"/>
+              <a:t>2020</a:t>
             </a:r>
             <a:endParaRPr lang="en-US" dirty="0"/>
           </a:p>
@@ -5680,8 +5619,8 @@
         </p:nvSpPr>
         <p:spPr>
           <a:xfrm>
-            <a:off x="2035110" y="3043759"/>
-            <a:ext cx="5005769" cy="923330"/>
+            <a:off x="2175358" y="3486436"/>
+            <a:ext cx="5005769" cy="1200329"/>
           </a:xfrm>
           <a:prstGeom prst="rect">
             <a:avLst/>
@@ -5700,28 +5639,45 @@
               <a:t>Chapter </a:t>
             </a:r>
             <a:r>
-              <a:rPr lang="en-US" dirty="0"/>
-              <a:t>7</a:t>
-            </a:r>
-          </a:p>
-          <a:p>
-            <a:pPr algn="ctr"/>
-            <a:r>
-              <a:rPr lang="en-US" b="1" u="sng" dirty="0"/>
-              <a:t>Independent Samples t-Test for </a:t>
-            </a:r>
+              <a:rPr lang="en-US" dirty="0" smtClean="0"/>
+              <a:t>12</a:t>
+            </a:r>
+            <a:endParaRPr lang="en-US" dirty="0"/>
+          </a:p>
+          <a:p>
+            <a:pPr algn="ctr"/>
             <a:r>
               <a:rPr lang="en-US" b="1" u="sng" dirty="0" smtClean="0"/>
-              <a:t>Means</a:t>
-            </a:r>
+              <a:t>One-way Independent Groups ANOVA</a:t>
+            </a:r>
+            <a:endParaRPr lang="en-US" dirty="0" smtClean="0"/>
           </a:p>
           <a:p>
             <a:pPr algn="ctr"/>
             <a:r>
               <a:rPr lang="en-US" i="1" dirty="0" smtClean="0"/>
-              <a:t>Mostly Homework Helps</a:t>
-            </a:r>
-            <a:endParaRPr lang="en-US" i="1" dirty="0"/>
+              <a:t>Second</a:t>
+            </a:r>
+            <a:r>
+              <a:rPr lang="en-US" i="1" dirty="0" smtClean="0"/>
+              <a:t> </a:t>
+            </a:r>
+            <a:r>
+              <a:rPr lang="en-US" i="1" dirty="0" smtClean="0"/>
+              <a:t>half, chapter </a:t>
+            </a:r>
+            <a:r>
+              <a:rPr lang="en-US" i="1" dirty="0" smtClean="0"/>
+              <a:t>slides</a:t>
+            </a:r>
+          </a:p>
+          <a:p>
+            <a:pPr algn="ctr"/>
+            <a:r>
+              <a:rPr lang="en-US" i="1" dirty="0" smtClean="0"/>
+              <a:t>Mostly Examples, Using R, and HW Help</a:t>
+            </a:r>
+            <a:endParaRPr lang="en-US" i="1" dirty="0" smtClean="0"/>
           </a:p>
         </p:txBody>
       </p:sp>
@@ -5863,7 +5819,7 @@
     </p:spTree>
     <p:extLst>
       <p:ext uri="{BB962C8B-B14F-4D97-AF65-F5344CB8AC3E}">
-        <p14:creationId xmlns:p14="http://schemas.microsoft.com/office/powerpoint/2010/main" val="2916572011"/>
+        <p14:creationId xmlns:p14="http://schemas.microsoft.com/office/powerpoint/2010/main" val="928580799"/>
       </p:ext>
     </p:extLst>
   </p:cSld>
@@ -5873,7 +5829,7 @@
 </p:sld>
 </file>
 
-<file path=ppt/slides/slide7.xml><?xml version="1.0" encoding="utf-8"?>
+<file path=ppt/slides/slide5.xml><?xml version="1.0" encoding="utf-8"?>
 <p:sld xmlns:a="http://schemas.openxmlformats.org/drawingml/2006/main" xmlns:r="http://schemas.openxmlformats.org/officeDocument/2006/relationships" xmlns:p="http://schemas.openxmlformats.org/presentationml/2006/main">
   <p:cSld>
     <p:spTree>
@@ -5991,7 +5947,15 @@
             <a:pPr algn="ctr"/>
             <a:r>
               <a:rPr lang="en-US" dirty="0" smtClean="0"/>
-              <a:t>Feb. 5, 2020</a:t>
+              <a:t>March</a:t>
+            </a:r>
+            <a:r>
+              <a:rPr lang="en-US" dirty="0" smtClean="0"/>
+              <a:t> 9</a:t>
+            </a:r>
+            <a:r>
+              <a:rPr lang="en-US" dirty="0" smtClean="0"/>
+              <a:t>, 2020</a:t>
             </a:r>
             <a:endParaRPr lang="en-US" dirty="0"/>
           </a:p>
@@ -6005,8 +5969,8 @@
         </p:nvSpPr>
         <p:spPr>
           <a:xfrm>
-            <a:off x="2035110" y="3043759"/>
-            <a:ext cx="5005769" cy="1477328"/>
+            <a:off x="2175358" y="3486436"/>
+            <a:ext cx="5005769" cy="1200329"/>
           </a:xfrm>
           <a:prstGeom prst="rect">
             <a:avLst/>
@@ -6025,40 +5989,45 @@
               <a:t>Chapter </a:t>
             </a:r>
             <a:r>
-              <a:rPr lang="en-US" dirty="0"/>
-              <a:t>6</a:t>
-            </a:r>
+              <a:rPr lang="en-US" dirty="0" smtClean="0"/>
+              <a:t>12</a:t>
+            </a:r>
+            <a:endParaRPr lang="en-US" dirty="0"/>
           </a:p>
           <a:p>
             <a:pPr algn="ctr"/>
             <a:r>
               <a:rPr lang="en-US" b="1" u="sng" dirty="0" smtClean="0"/>
-              <a:t>Confidence Interval Estimation: The t Distribution</a:t>
-            </a:r>
-            <a:endParaRPr lang="en-US" b="1" u="sng" dirty="0"/>
+              <a:t>One-way Independent Groups ANOVA</a:t>
+            </a:r>
+            <a:endParaRPr lang="en-US" dirty="0" smtClean="0"/>
           </a:p>
           <a:p>
             <a:pPr algn="ctr"/>
             <a:r>
               <a:rPr lang="en-US" i="1" dirty="0" smtClean="0"/>
-              <a:t>Lecture slides</a:t>
-            </a:r>
-            <a:endParaRPr lang="en-US" i="1" dirty="0"/>
-          </a:p>
-          <a:p>
-            <a:pPr algn="ctr"/>
+              <a:t>First</a:t>
+            </a:r>
             <a:r>
               <a:rPr lang="en-US" i="1" dirty="0" smtClean="0"/>
-              <a:t>(second half)</a:t>
-            </a:r>
-          </a:p>
-          <a:p>
-            <a:pPr algn="ctr"/>
+              <a:t> </a:t>
+            </a:r>
             <a:r>
               <a:rPr lang="en-US" i="1" dirty="0" smtClean="0"/>
-              <a:t>Homework Helps</a:t>
-            </a:r>
-            <a:endParaRPr lang="en-US" i="1" dirty="0"/>
+              <a:t>half, chapter </a:t>
+            </a:r>
+            <a:r>
+              <a:rPr lang="en-US" i="1" dirty="0" smtClean="0"/>
+              <a:t>slides</a:t>
+            </a:r>
+          </a:p>
+          <a:p>
+            <a:pPr algn="ctr"/>
+            <a:r>
+              <a:rPr lang="en-US" i="1" dirty="0" smtClean="0"/>
+              <a:t>Mostly New Material Presentation</a:t>
+            </a:r>
+            <a:endParaRPr lang="en-US" i="1" dirty="0" smtClean="0"/>
           </a:p>
         </p:txBody>
       </p:sp>
@@ -6200,7 +6169,7 @@
     </p:spTree>
     <p:extLst>
       <p:ext uri="{BB962C8B-B14F-4D97-AF65-F5344CB8AC3E}">
-        <p14:creationId xmlns:p14="http://schemas.microsoft.com/office/powerpoint/2010/main" val="3019460125"/>
+        <p14:creationId xmlns:p14="http://schemas.microsoft.com/office/powerpoint/2010/main" val="2758197068"/>
       </p:ext>
     </p:extLst>
   </p:cSld>
@@ -6210,7 +6179,7 @@
 </p:sld>
 </file>
 
-<file path=ppt/slides/slide8.xml><?xml version="1.0" encoding="utf-8"?>
+<file path=ppt/slides/slide6.xml><?xml version="1.0" encoding="utf-8"?>
 <p:sld xmlns:a="http://schemas.openxmlformats.org/drawingml/2006/main" xmlns:r="http://schemas.openxmlformats.org/officeDocument/2006/relationships" xmlns:p="http://schemas.openxmlformats.org/presentationml/2006/main">
   <p:cSld>
     <p:spTree>
@@ -6328,7 +6297,7 @@
             <a:pPr algn="ctr"/>
             <a:r>
               <a:rPr lang="en-US" dirty="0" smtClean="0"/>
-              <a:t>Feb. 5, 2020</a:t>
+              <a:t>Feb. 19, 2020</a:t>
             </a:r>
             <a:endParaRPr lang="en-US" dirty="0"/>
           </a:p>
@@ -6342,8 +6311,8 @@
         </p:nvSpPr>
         <p:spPr>
           <a:xfrm>
-            <a:off x="2035110" y="3043759"/>
-            <a:ext cx="5005769" cy="1477328"/>
+            <a:off x="2130478" y="2956774"/>
+            <a:ext cx="5005769" cy="923330"/>
           </a:xfrm>
           <a:prstGeom prst="rect">
             <a:avLst/>
@@ -6363,39 +6332,23 @@
             </a:r>
             <a:r>
               <a:rPr lang="en-US" dirty="0"/>
-              <a:t>6</a:t>
+              <a:t>9</a:t>
             </a:r>
           </a:p>
           <a:p>
             <a:pPr algn="ctr"/>
             <a:r>
               <a:rPr lang="en-US" b="1" u="sng" dirty="0" smtClean="0"/>
-              <a:t>Confidence Interval Estimation: The t Distribution</a:t>
-            </a:r>
-            <a:endParaRPr lang="en-US" b="1" u="sng" dirty="0"/>
+              <a:t>Correlation</a:t>
+            </a:r>
+            <a:endParaRPr lang="en-US" dirty="0" smtClean="0"/>
           </a:p>
           <a:p>
             <a:pPr algn="ctr"/>
             <a:r>
               <a:rPr lang="en-US" i="1" dirty="0" smtClean="0"/>
-              <a:t>Lecture slides</a:t>
-            </a:r>
-            <a:endParaRPr lang="en-US" i="1" dirty="0"/>
-          </a:p>
-          <a:p>
-            <a:pPr algn="ctr"/>
-            <a:r>
-              <a:rPr lang="en-US" i="1" dirty="0" smtClean="0"/>
-              <a:t>(second half)</a:t>
-            </a:r>
-          </a:p>
-          <a:p>
-            <a:pPr algn="ctr"/>
-            <a:r>
-              <a:rPr lang="en-US" i="1" dirty="0" smtClean="0"/>
-              <a:t>Homework Helps</a:t>
-            </a:r>
-            <a:endParaRPr lang="en-US" i="1" dirty="0"/>
+              <a:t>Second half, chapter slides</a:t>
+            </a:r>
           </a:p>
         </p:txBody>
       </p:sp>
@@ -6534,10 +6487,56 @@
           </a:prstGeom>
         </p:spPr>
       </p:pic>
+      <p:sp>
+        <p:nvSpPr>
+          <p:cNvPr id="15" name="TextBox 14"/>
+          <p:cNvSpPr txBox="1"/>
+          <p:nvPr/>
+        </p:nvSpPr>
+        <p:spPr>
+          <a:xfrm>
+            <a:off x="2107241" y="4130160"/>
+            <a:ext cx="5005769" cy="923330"/>
+          </a:xfrm>
+          <a:prstGeom prst="rect">
+            <a:avLst/>
+          </a:prstGeom>
+          <a:noFill/>
+        </p:spPr>
+        <p:txBody>
+          <a:bodyPr wrap="square" rtlCol="0">
+            <a:spAutoFit/>
+          </a:bodyPr>
+          <a:lstStyle/>
+          <a:p>
+            <a:pPr algn="ctr"/>
+            <a:r>
+              <a:rPr lang="en-US" dirty="0" smtClean="0"/>
+              <a:t>Chapter 10</a:t>
+            </a:r>
+            <a:endParaRPr lang="en-US" dirty="0"/>
+          </a:p>
+          <a:p>
+            <a:pPr algn="ctr"/>
+            <a:r>
+              <a:rPr lang="en-US" b="1" u="sng" dirty="0" smtClean="0"/>
+              <a:t>Simple Linear Regression</a:t>
+            </a:r>
+            <a:endParaRPr lang="en-US" dirty="0" smtClean="0"/>
+          </a:p>
+          <a:p>
+            <a:pPr algn="ctr"/>
+            <a:r>
+              <a:rPr lang="en-US" i="1" dirty="0" smtClean="0"/>
+              <a:t>chapter slides (majority)</a:t>
+            </a:r>
+          </a:p>
+        </p:txBody>
+      </p:sp>
     </p:spTree>
     <p:extLst>
       <p:ext uri="{BB962C8B-B14F-4D97-AF65-F5344CB8AC3E}">
-        <p14:creationId xmlns:p14="http://schemas.microsoft.com/office/powerpoint/2010/main" val="4154058086"/>
+        <p14:creationId xmlns:p14="http://schemas.microsoft.com/office/powerpoint/2010/main" val="2730707931"/>
       </p:ext>
     </p:extLst>
   </p:cSld>
@@ -6547,7 +6546,7 @@
 </p:sld>
 </file>
 
-<file path=ppt/slides/slide9.xml><?xml version="1.0" encoding="utf-8"?>
+<file path=ppt/slides/slide7.xml><?xml version="1.0" encoding="utf-8"?>
 <p:sld xmlns:a="http://schemas.openxmlformats.org/drawingml/2006/main" xmlns:r="http://schemas.openxmlformats.org/officeDocument/2006/relationships" xmlns:p="http://schemas.openxmlformats.org/presentationml/2006/main">
   <p:cSld>
     <p:spTree>
@@ -6665,7 +6664,7 @@
             <a:pPr algn="ctr"/>
             <a:r>
               <a:rPr lang="en-US" dirty="0" smtClean="0"/>
-              <a:t>Feb. 3, 2020</a:t>
+              <a:t>Feb. 12, 2020</a:t>
             </a:r>
             <a:endParaRPr lang="en-US" dirty="0"/>
           </a:p>
@@ -6679,8 +6678,8 @@
         </p:nvSpPr>
         <p:spPr>
           <a:xfrm>
-            <a:off x="2035110" y="3043759"/>
-            <a:ext cx="5005769" cy="2585323"/>
+            <a:off x="2175357" y="4235713"/>
+            <a:ext cx="5005769" cy="923330"/>
           </a:xfrm>
           <a:prstGeom prst="rect">
             <a:avLst/>
@@ -6695,75 +6694,28 @@
           <a:p>
             <a:pPr algn="ctr"/>
             <a:r>
+              <a:rPr lang="en-US" dirty="0" smtClean="0"/>
+              <a:t>Chapter </a:t>
+            </a:r>
+            <a:r>
               <a:rPr lang="en-US" dirty="0"/>
-              <a:t>Chapter </a:t>
-            </a:r>
-            <a:r>
-              <a:rPr lang="en-US" dirty="0" smtClean="0"/>
-              <a:t>5</a:t>
-            </a:r>
-            <a:endParaRPr lang="en-US" dirty="0"/>
+              <a:t>9</a:t>
+            </a:r>
           </a:p>
           <a:p>
             <a:pPr algn="ctr"/>
             <a:r>
               <a:rPr lang="en-US" b="1" u="sng" dirty="0" smtClean="0"/>
-              <a:t>Intro to Hypothesis Testing: 1 sample z-Test</a:t>
-            </a:r>
-            <a:endParaRPr lang="en-US" b="1" u="sng" dirty="0"/>
+              <a:t>Correlation</a:t>
+            </a:r>
+            <a:endParaRPr lang="en-US" dirty="0" smtClean="0"/>
           </a:p>
           <a:p>
             <a:pPr algn="ctr"/>
             <a:r>
               <a:rPr lang="en-US" i="1" dirty="0" smtClean="0"/>
-              <a:t>Finish </a:t>
-            </a:r>
-            <a:r>
-              <a:rPr lang="en-US" i="1" dirty="0"/>
-              <a:t>discussion</a:t>
-            </a:r>
-          </a:p>
-          <a:p>
-            <a:pPr algn="ctr"/>
-            <a:r>
-              <a:rPr lang="en-US" i="1" dirty="0"/>
-              <a:t>Homework questions</a:t>
-            </a:r>
-          </a:p>
-          <a:p>
-            <a:pPr algn="ctr"/>
-            <a:endParaRPr lang="en-US" i="1" dirty="0"/>
-          </a:p>
-          <a:p>
-            <a:pPr algn="ctr"/>
-            <a:r>
-              <a:rPr lang="en-US" dirty="0"/>
-              <a:t>Chapter 6</a:t>
-            </a:r>
-          </a:p>
-          <a:p>
-            <a:pPr algn="ctr"/>
-            <a:r>
-              <a:rPr lang="en-US" b="1" u="sng" dirty="0" smtClean="0"/>
-              <a:t>Confidence Interval Estimation: The t Distribution</a:t>
-            </a:r>
-            <a:endParaRPr lang="en-US" b="1" u="sng" dirty="0"/>
-          </a:p>
-          <a:p>
-            <a:pPr algn="ctr"/>
-            <a:r>
-              <a:rPr lang="en-US" i="1" dirty="0" smtClean="0"/>
-              <a:t>Lecture slides</a:t>
-            </a:r>
-            <a:endParaRPr lang="en-US" i="1" dirty="0"/>
-          </a:p>
-          <a:p>
-            <a:pPr algn="ctr"/>
-            <a:r>
-              <a:rPr lang="en-US" i="1" dirty="0" smtClean="0"/>
-              <a:t>(first half)</a:t>
-            </a:r>
-            <a:endParaRPr lang="en-US" i="1" dirty="0"/>
+              <a:t>First half, chapter slides</a:t>
+            </a:r>
           </a:p>
         </p:txBody>
       </p:sp>
@@ -6902,10 +6854,735 @@
           </a:prstGeom>
         </p:spPr>
       </p:pic>
+      <p:sp>
+        <p:nvSpPr>
+          <p:cNvPr id="13" name="TextBox 12"/>
+          <p:cNvSpPr txBox="1"/>
+          <p:nvPr/>
+        </p:nvSpPr>
+        <p:spPr>
+          <a:xfrm>
+            <a:off x="2175358" y="2646127"/>
+            <a:ext cx="5005769" cy="1477328"/>
+          </a:xfrm>
+          <a:prstGeom prst="rect">
+            <a:avLst/>
+          </a:prstGeom>
+          <a:noFill/>
+        </p:spPr>
+        <p:txBody>
+          <a:bodyPr wrap="square" rtlCol="0">
+            <a:spAutoFit/>
+          </a:bodyPr>
+          <a:lstStyle/>
+          <a:p>
+            <a:pPr algn="ctr"/>
+            <a:r>
+              <a:rPr lang="en-US" dirty="0" smtClean="0"/>
+              <a:t>Chapter </a:t>
+            </a:r>
+            <a:r>
+              <a:rPr lang="en-US" dirty="0"/>
+              <a:t>8</a:t>
+            </a:r>
+          </a:p>
+          <a:p>
+            <a:pPr algn="ctr"/>
+            <a:r>
+              <a:rPr lang="en-US" b="1" u="sng" dirty="0" smtClean="0"/>
+              <a:t>Effect Size &amp; Power Analysis</a:t>
+            </a:r>
+            <a:endParaRPr lang="en-US" dirty="0" smtClean="0"/>
+          </a:p>
+          <a:p>
+            <a:pPr algn="ctr"/>
+            <a:r>
+              <a:rPr lang="en-US" i="1" dirty="0" smtClean="0"/>
+              <a:t>Chapter slides</a:t>
+            </a:r>
+          </a:p>
+          <a:p>
+            <a:pPr algn="ctr"/>
+            <a:r>
+              <a:rPr lang="en-US" i="1" dirty="0" smtClean="0"/>
+              <a:t>Demo G*Power software</a:t>
+            </a:r>
+          </a:p>
+          <a:p>
+            <a:pPr algn="ctr"/>
+            <a:r>
+              <a:rPr lang="en-US" i="1" dirty="0" smtClean="0"/>
+              <a:t>Homework Help</a:t>
+            </a:r>
+          </a:p>
+        </p:txBody>
+      </p:sp>
     </p:spTree>
     <p:extLst>
       <p:ext uri="{BB962C8B-B14F-4D97-AF65-F5344CB8AC3E}">
-        <p14:creationId xmlns:p14="http://schemas.microsoft.com/office/powerpoint/2010/main" val="1136618621"/>
+        <p14:creationId xmlns:p14="http://schemas.microsoft.com/office/powerpoint/2010/main" val="3221510669"/>
+      </p:ext>
+    </p:extLst>
+  </p:cSld>
+  <p:clrMapOvr>
+    <a:masterClrMapping/>
+  </p:clrMapOvr>
+</p:sld>
+</file>
+
+<file path=ppt/slides/slide8.xml><?xml version="1.0" encoding="utf-8"?>
+<p:sld xmlns:a="http://schemas.openxmlformats.org/drawingml/2006/main" xmlns:r="http://schemas.openxmlformats.org/officeDocument/2006/relationships" xmlns:p="http://schemas.openxmlformats.org/presentationml/2006/main">
+  <p:cSld>
+    <p:spTree>
+      <p:nvGrpSpPr>
+        <p:cNvPr id="1" name=""/>
+        <p:cNvGrpSpPr/>
+        <p:nvPr/>
+      </p:nvGrpSpPr>
+      <p:grpSpPr>
+        <a:xfrm>
+          <a:off x="0" y="0"/>
+          <a:ext cx="0" cy="0"/>
+          <a:chOff x="0" y="0"/>
+          <a:chExt cx="0" cy="0"/>
+        </a:xfrm>
+      </p:grpSpPr>
+      <p:sp>
+        <p:nvSpPr>
+          <p:cNvPr id="4" name="Rectangle 3"/>
+          <p:cNvSpPr/>
+          <p:nvPr/>
+        </p:nvSpPr>
+        <p:spPr>
+          <a:xfrm>
+            <a:off x="1808702" y="824230"/>
+            <a:ext cx="8778240" cy="5010912"/>
+          </a:xfrm>
+          <a:prstGeom prst="rect">
+            <a:avLst/>
+          </a:prstGeom>
+          <a:solidFill>
+            <a:schemeClr val="bg1">
+              <a:lumMod val="95000"/>
+            </a:schemeClr>
+          </a:solidFill>
+          <a:ln w="38100"/>
+        </p:spPr>
+        <p:style>
+          <a:lnRef idx="2">
+            <a:schemeClr val="accent1">
+              <a:shade val="50000"/>
+            </a:schemeClr>
+          </a:lnRef>
+          <a:fillRef idx="1">
+            <a:schemeClr val="accent1"/>
+          </a:fillRef>
+          <a:effectRef idx="0">
+            <a:schemeClr val="accent1"/>
+          </a:effectRef>
+          <a:fontRef idx="minor">
+            <a:schemeClr val="lt1"/>
+          </a:fontRef>
+        </p:style>
+        <p:txBody>
+          <a:bodyPr rtlCol="0" anchor="ctr"/>
+          <a:lstStyle/>
+          <a:p>
+            <a:pPr algn="ctr"/>
+            <a:endParaRPr lang="en-US"/>
+          </a:p>
+        </p:txBody>
+      </p:sp>
+      <p:sp>
+        <p:nvSpPr>
+          <p:cNvPr id="7" name="TextBox 6"/>
+          <p:cNvSpPr txBox="1"/>
+          <p:nvPr/>
+        </p:nvSpPr>
+        <p:spPr>
+          <a:xfrm>
+            <a:off x="3840385" y="1213849"/>
+            <a:ext cx="5712369" cy="923330"/>
+          </a:xfrm>
+          <a:prstGeom prst="rect">
+            <a:avLst/>
+          </a:prstGeom>
+          <a:noFill/>
+        </p:spPr>
+        <p:txBody>
+          <a:bodyPr wrap="square" rtlCol="0">
+            <a:spAutoFit/>
+          </a:bodyPr>
+          <a:lstStyle/>
+          <a:p>
+            <a:r>
+              <a:rPr lang="en-US" sz="5400" dirty="0" smtClean="0"/>
+              <a:t>INCLASS LECTURES</a:t>
+            </a:r>
+            <a:endParaRPr lang="en-US" sz="5400" dirty="0"/>
+          </a:p>
+        </p:txBody>
+      </p:sp>
+      <p:sp>
+        <p:nvSpPr>
+          <p:cNvPr id="8" name="TextBox 7"/>
+          <p:cNvSpPr txBox="1"/>
+          <p:nvPr/>
+        </p:nvSpPr>
+        <p:spPr>
+          <a:xfrm>
+            <a:off x="7731444" y="5278932"/>
+            <a:ext cx="2076450" cy="369332"/>
+          </a:xfrm>
+          <a:prstGeom prst="rect">
+            <a:avLst/>
+          </a:prstGeom>
+          <a:noFill/>
+        </p:spPr>
+        <p:txBody>
+          <a:bodyPr wrap="square" rtlCol="0">
+            <a:spAutoFit/>
+          </a:bodyPr>
+          <a:lstStyle/>
+          <a:p>
+            <a:pPr algn="ctr"/>
+            <a:r>
+              <a:rPr lang="en-US" dirty="0" smtClean="0"/>
+              <a:t>Feb. 10, 2020</a:t>
+            </a:r>
+            <a:endParaRPr lang="en-US" dirty="0"/>
+          </a:p>
+        </p:txBody>
+      </p:sp>
+      <p:sp>
+        <p:nvSpPr>
+          <p:cNvPr id="9" name="TextBox 8"/>
+          <p:cNvSpPr txBox="1"/>
+          <p:nvPr/>
+        </p:nvSpPr>
+        <p:spPr>
+          <a:xfrm>
+            <a:off x="2035110" y="3043759"/>
+            <a:ext cx="5005769" cy="923330"/>
+          </a:xfrm>
+          <a:prstGeom prst="rect">
+            <a:avLst/>
+          </a:prstGeom>
+          <a:noFill/>
+        </p:spPr>
+        <p:txBody>
+          <a:bodyPr wrap="square" rtlCol="0">
+            <a:spAutoFit/>
+          </a:bodyPr>
+          <a:lstStyle/>
+          <a:p>
+            <a:pPr algn="ctr"/>
+            <a:r>
+              <a:rPr lang="en-US" dirty="0" smtClean="0"/>
+              <a:t>Chapter </a:t>
+            </a:r>
+            <a:r>
+              <a:rPr lang="en-US" dirty="0"/>
+              <a:t>7</a:t>
+            </a:r>
+          </a:p>
+          <a:p>
+            <a:pPr algn="ctr"/>
+            <a:r>
+              <a:rPr lang="en-US" b="1" u="sng" dirty="0"/>
+              <a:t>Independent Samples t-Test for </a:t>
+            </a:r>
+            <a:r>
+              <a:rPr lang="en-US" b="1" u="sng" dirty="0" smtClean="0"/>
+              <a:t>Means</a:t>
+            </a:r>
+          </a:p>
+          <a:p>
+            <a:pPr algn="ctr"/>
+            <a:r>
+              <a:rPr lang="en-US" i="1" dirty="0" smtClean="0"/>
+              <a:t>Mostly Homework Helps</a:t>
+            </a:r>
+            <a:endParaRPr lang="en-US" i="1" dirty="0"/>
+          </a:p>
+        </p:txBody>
+      </p:sp>
+      <p:grpSp>
+        <p:nvGrpSpPr>
+          <p:cNvPr id="14" name="Group 13"/>
+          <p:cNvGrpSpPr/>
+          <p:nvPr/>
+        </p:nvGrpSpPr>
+        <p:grpSpPr>
+          <a:xfrm>
+            <a:off x="7198839" y="2137179"/>
+            <a:ext cx="3141660" cy="3193339"/>
+            <a:chOff x="7047391" y="1961976"/>
+            <a:chExt cx="3141660" cy="3193339"/>
+          </a:xfrm>
+        </p:grpSpPr>
+        <p:pic>
+          <p:nvPicPr>
+            <p:cNvPr id="2" name="Picture 1"/>
+            <p:cNvPicPr>
+              <a:picLocks noChangeAspect="1"/>
+            </p:cNvPicPr>
+            <p:nvPr/>
+          </p:nvPicPr>
+          <p:blipFill>
+            <a:blip r:embed="rId2" cstate="print">
+              <a:extLst>
+                <a:ext uri="{28A0092B-C50C-407E-A947-70E740481C1C}">
+                  <a14:useLocalDpi xmlns:a14="http://schemas.microsoft.com/office/drawing/2010/main" val="0"/>
+                </a:ext>
+              </a:extLst>
+            </a:blip>
+            <a:stretch>
+              <a:fillRect/>
+            </a:stretch>
+          </p:blipFill>
+          <p:spPr>
+            <a:xfrm>
+              <a:off x="7047391" y="3320161"/>
+              <a:ext cx="1578867" cy="1828804"/>
+            </a:xfrm>
+            <a:prstGeom prst="rect">
+              <a:avLst/>
+            </a:prstGeom>
+          </p:spPr>
+        </p:pic>
+        <p:pic>
+          <p:nvPicPr>
+            <p:cNvPr id="3" name="Picture 2"/>
+            <p:cNvPicPr>
+              <a:picLocks noChangeAspect="1"/>
+            </p:cNvPicPr>
+            <p:nvPr/>
+          </p:nvPicPr>
+          <p:blipFill>
+            <a:blip r:embed="rId3" cstate="print">
+              <a:extLst>
+                <a:ext uri="{28A0092B-C50C-407E-A947-70E740481C1C}">
+                  <a14:useLocalDpi xmlns:a14="http://schemas.microsoft.com/office/drawing/2010/main" val="0"/>
+                </a:ext>
+              </a:extLst>
+            </a:blip>
+            <a:stretch>
+              <a:fillRect/>
+            </a:stretch>
+          </p:blipFill>
+          <p:spPr>
+            <a:xfrm>
+              <a:off x="7830475" y="1961976"/>
+              <a:ext cx="1578867" cy="1828804"/>
+            </a:xfrm>
+            <a:prstGeom prst="rect">
+              <a:avLst/>
+            </a:prstGeom>
+          </p:spPr>
+        </p:pic>
+        <p:pic>
+          <p:nvPicPr>
+            <p:cNvPr id="11" name="Picture 10"/>
+            <p:cNvPicPr>
+              <a:picLocks noChangeAspect="1"/>
+            </p:cNvPicPr>
+            <p:nvPr/>
+          </p:nvPicPr>
+          <p:blipFill>
+            <a:blip r:embed="rId4" cstate="print">
+              <a:extLst>
+                <a:ext uri="{28A0092B-C50C-407E-A947-70E740481C1C}">
+                  <a14:useLocalDpi xmlns:a14="http://schemas.microsoft.com/office/drawing/2010/main" val="0"/>
+                </a:ext>
+              </a:extLst>
+            </a:blip>
+            <a:stretch>
+              <a:fillRect/>
+            </a:stretch>
+          </p:blipFill>
+          <p:spPr>
+            <a:xfrm>
+              <a:off x="8610184" y="3326511"/>
+              <a:ext cx="1578867" cy="1828804"/>
+            </a:xfrm>
+            <a:prstGeom prst="rect">
+              <a:avLst/>
+            </a:prstGeom>
+          </p:spPr>
+        </p:pic>
+      </p:grpSp>
+      <p:pic>
+        <p:nvPicPr>
+          <p:cNvPr id="12" name="Picture 11"/>
+          <p:cNvPicPr>
+            <a:picLocks noChangeAspect="1"/>
+          </p:cNvPicPr>
+          <p:nvPr/>
+        </p:nvPicPr>
+        <p:blipFill>
+          <a:blip r:embed="rId5" cstate="print">
+            <a:extLst>
+              <a:ext uri="{28A0092B-C50C-407E-A947-70E740481C1C}">
+                <a14:useLocalDpi xmlns:a14="http://schemas.microsoft.com/office/drawing/2010/main" val="0"/>
+              </a:ext>
+            </a:extLst>
+          </a:blip>
+          <a:stretch>
+            <a:fillRect/>
+          </a:stretch>
+        </p:blipFill>
+        <p:spPr>
+          <a:xfrm>
+            <a:off x="2035110" y="1019593"/>
+            <a:ext cx="1578867" cy="1828804"/>
+          </a:xfrm>
+          <a:prstGeom prst="rect">
+            <a:avLst/>
+          </a:prstGeom>
+        </p:spPr>
+      </p:pic>
+    </p:spTree>
+    <p:extLst>
+      <p:ext uri="{BB962C8B-B14F-4D97-AF65-F5344CB8AC3E}">
+        <p14:creationId xmlns:p14="http://schemas.microsoft.com/office/powerpoint/2010/main" val="2916572011"/>
+      </p:ext>
+    </p:extLst>
+  </p:cSld>
+  <p:clrMapOvr>
+    <a:masterClrMapping/>
+  </p:clrMapOvr>
+</p:sld>
+</file>
+
+<file path=ppt/slides/slide9.xml><?xml version="1.0" encoding="utf-8"?>
+<p:sld xmlns:a="http://schemas.openxmlformats.org/drawingml/2006/main" xmlns:r="http://schemas.openxmlformats.org/officeDocument/2006/relationships" xmlns:p="http://schemas.openxmlformats.org/presentationml/2006/main">
+  <p:cSld>
+    <p:spTree>
+      <p:nvGrpSpPr>
+        <p:cNvPr id="1" name=""/>
+        <p:cNvGrpSpPr/>
+        <p:nvPr/>
+      </p:nvGrpSpPr>
+      <p:grpSpPr>
+        <a:xfrm>
+          <a:off x="0" y="0"/>
+          <a:ext cx="0" cy="0"/>
+          <a:chOff x="0" y="0"/>
+          <a:chExt cx="0" cy="0"/>
+        </a:xfrm>
+      </p:grpSpPr>
+      <p:sp>
+        <p:nvSpPr>
+          <p:cNvPr id="4" name="Rectangle 3"/>
+          <p:cNvSpPr/>
+          <p:nvPr/>
+        </p:nvSpPr>
+        <p:spPr>
+          <a:xfrm>
+            <a:off x="1808702" y="824230"/>
+            <a:ext cx="8778240" cy="5010912"/>
+          </a:xfrm>
+          <a:prstGeom prst="rect">
+            <a:avLst/>
+          </a:prstGeom>
+          <a:solidFill>
+            <a:schemeClr val="bg1">
+              <a:lumMod val="95000"/>
+            </a:schemeClr>
+          </a:solidFill>
+          <a:ln w="38100"/>
+        </p:spPr>
+        <p:style>
+          <a:lnRef idx="2">
+            <a:schemeClr val="accent1">
+              <a:shade val="50000"/>
+            </a:schemeClr>
+          </a:lnRef>
+          <a:fillRef idx="1">
+            <a:schemeClr val="accent1"/>
+          </a:fillRef>
+          <a:effectRef idx="0">
+            <a:schemeClr val="accent1"/>
+          </a:effectRef>
+          <a:fontRef idx="minor">
+            <a:schemeClr val="lt1"/>
+          </a:fontRef>
+        </p:style>
+        <p:txBody>
+          <a:bodyPr rtlCol="0" anchor="ctr"/>
+          <a:lstStyle/>
+          <a:p>
+            <a:pPr algn="ctr"/>
+            <a:endParaRPr lang="en-US"/>
+          </a:p>
+        </p:txBody>
+      </p:sp>
+      <p:sp>
+        <p:nvSpPr>
+          <p:cNvPr id="7" name="TextBox 6"/>
+          <p:cNvSpPr txBox="1"/>
+          <p:nvPr/>
+        </p:nvSpPr>
+        <p:spPr>
+          <a:xfrm>
+            <a:off x="3840385" y="1213849"/>
+            <a:ext cx="5712369" cy="923330"/>
+          </a:xfrm>
+          <a:prstGeom prst="rect">
+            <a:avLst/>
+          </a:prstGeom>
+          <a:noFill/>
+        </p:spPr>
+        <p:txBody>
+          <a:bodyPr wrap="square" rtlCol="0">
+            <a:spAutoFit/>
+          </a:bodyPr>
+          <a:lstStyle/>
+          <a:p>
+            <a:r>
+              <a:rPr lang="en-US" sz="5400" dirty="0" smtClean="0"/>
+              <a:t>INCLASS LECTURES</a:t>
+            </a:r>
+            <a:endParaRPr lang="en-US" sz="5400" dirty="0"/>
+          </a:p>
+        </p:txBody>
+      </p:sp>
+      <p:sp>
+        <p:nvSpPr>
+          <p:cNvPr id="8" name="TextBox 7"/>
+          <p:cNvSpPr txBox="1"/>
+          <p:nvPr/>
+        </p:nvSpPr>
+        <p:spPr>
+          <a:xfrm>
+            <a:off x="7731444" y="5278932"/>
+            <a:ext cx="2076450" cy="369332"/>
+          </a:xfrm>
+          <a:prstGeom prst="rect">
+            <a:avLst/>
+          </a:prstGeom>
+          <a:noFill/>
+        </p:spPr>
+        <p:txBody>
+          <a:bodyPr wrap="square" rtlCol="0">
+            <a:spAutoFit/>
+          </a:bodyPr>
+          <a:lstStyle/>
+          <a:p>
+            <a:pPr algn="ctr"/>
+            <a:r>
+              <a:rPr lang="en-US" dirty="0" smtClean="0"/>
+              <a:t>Feb. 5, 2020</a:t>
+            </a:r>
+            <a:endParaRPr lang="en-US" dirty="0"/>
+          </a:p>
+        </p:txBody>
+      </p:sp>
+      <p:sp>
+        <p:nvSpPr>
+          <p:cNvPr id="9" name="TextBox 8"/>
+          <p:cNvSpPr txBox="1"/>
+          <p:nvPr/>
+        </p:nvSpPr>
+        <p:spPr>
+          <a:xfrm>
+            <a:off x="2035110" y="3043759"/>
+            <a:ext cx="5005769" cy="1477328"/>
+          </a:xfrm>
+          <a:prstGeom prst="rect">
+            <a:avLst/>
+          </a:prstGeom>
+          <a:noFill/>
+        </p:spPr>
+        <p:txBody>
+          <a:bodyPr wrap="square" rtlCol="0">
+            <a:spAutoFit/>
+          </a:bodyPr>
+          <a:lstStyle/>
+          <a:p>
+            <a:pPr algn="ctr"/>
+            <a:r>
+              <a:rPr lang="en-US" dirty="0" smtClean="0"/>
+              <a:t>Chapter </a:t>
+            </a:r>
+            <a:r>
+              <a:rPr lang="en-US" dirty="0"/>
+              <a:t>6</a:t>
+            </a:r>
+          </a:p>
+          <a:p>
+            <a:pPr algn="ctr"/>
+            <a:r>
+              <a:rPr lang="en-US" b="1" u="sng" dirty="0" smtClean="0"/>
+              <a:t>Confidence Interval Estimation: The t Distribution</a:t>
+            </a:r>
+            <a:endParaRPr lang="en-US" b="1" u="sng" dirty="0"/>
+          </a:p>
+          <a:p>
+            <a:pPr algn="ctr"/>
+            <a:r>
+              <a:rPr lang="en-US" i="1" dirty="0" smtClean="0"/>
+              <a:t>Lecture slides</a:t>
+            </a:r>
+            <a:endParaRPr lang="en-US" i="1" dirty="0"/>
+          </a:p>
+          <a:p>
+            <a:pPr algn="ctr"/>
+            <a:r>
+              <a:rPr lang="en-US" i="1" dirty="0" smtClean="0"/>
+              <a:t>(second half)</a:t>
+            </a:r>
+          </a:p>
+          <a:p>
+            <a:pPr algn="ctr"/>
+            <a:r>
+              <a:rPr lang="en-US" i="1" dirty="0" smtClean="0"/>
+              <a:t>Homework Helps</a:t>
+            </a:r>
+            <a:endParaRPr lang="en-US" i="1" dirty="0"/>
+          </a:p>
+        </p:txBody>
+      </p:sp>
+      <p:grpSp>
+        <p:nvGrpSpPr>
+          <p:cNvPr id="14" name="Group 13"/>
+          <p:cNvGrpSpPr/>
+          <p:nvPr/>
+        </p:nvGrpSpPr>
+        <p:grpSpPr>
+          <a:xfrm>
+            <a:off x="7198839" y="2137179"/>
+            <a:ext cx="3141660" cy="3193339"/>
+            <a:chOff x="7047391" y="1961976"/>
+            <a:chExt cx="3141660" cy="3193339"/>
+          </a:xfrm>
+        </p:grpSpPr>
+        <p:pic>
+          <p:nvPicPr>
+            <p:cNvPr id="2" name="Picture 1"/>
+            <p:cNvPicPr>
+              <a:picLocks noChangeAspect="1"/>
+            </p:cNvPicPr>
+            <p:nvPr/>
+          </p:nvPicPr>
+          <p:blipFill>
+            <a:blip r:embed="rId2" cstate="print">
+              <a:extLst>
+                <a:ext uri="{28A0092B-C50C-407E-A947-70E740481C1C}">
+                  <a14:useLocalDpi xmlns:a14="http://schemas.microsoft.com/office/drawing/2010/main" val="0"/>
+                </a:ext>
+              </a:extLst>
+            </a:blip>
+            <a:stretch>
+              <a:fillRect/>
+            </a:stretch>
+          </p:blipFill>
+          <p:spPr>
+            <a:xfrm>
+              <a:off x="7047391" y="3320161"/>
+              <a:ext cx="1578867" cy="1828804"/>
+            </a:xfrm>
+            <a:prstGeom prst="rect">
+              <a:avLst/>
+            </a:prstGeom>
+          </p:spPr>
+        </p:pic>
+        <p:pic>
+          <p:nvPicPr>
+            <p:cNvPr id="3" name="Picture 2"/>
+            <p:cNvPicPr>
+              <a:picLocks noChangeAspect="1"/>
+            </p:cNvPicPr>
+            <p:nvPr/>
+          </p:nvPicPr>
+          <p:blipFill>
+            <a:blip r:embed="rId3" cstate="print">
+              <a:extLst>
+                <a:ext uri="{28A0092B-C50C-407E-A947-70E740481C1C}">
+                  <a14:useLocalDpi xmlns:a14="http://schemas.microsoft.com/office/drawing/2010/main" val="0"/>
+                </a:ext>
+              </a:extLst>
+            </a:blip>
+            <a:stretch>
+              <a:fillRect/>
+            </a:stretch>
+          </p:blipFill>
+          <p:spPr>
+            <a:xfrm>
+              <a:off x="7830475" y="1961976"/>
+              <a:ext cx="1578867" cy="1828804"/>
+            </a:xfrm>
+            <a:prstGeom prst="rect">
+              <a:avLst/>
+            </a:prstGeom>
+          </p:spPr>
+        </p:pic>
+        <p:pic>
+          <p:nvPicPr>
+            <p:cNvPr id="11" name="Picture 10"/>
+            <p:cNvPicPr>
+              <a:picLocks noChangeAspect="1"/>
+            </p:cNvPicPr>
+            <p:nvPr/>
+          </p:nvPicPr>
+          <p:blipFill>
+            <a:blip r:embed="rId4" cstate="print">
+              <a:extLst>
+                <a:ext uri="{28A0092B-C50C-407E-A947-70E740481C1C}">
+                  <a14:useLocalDpi xmlns:a14="http://schemas.microsoft.com/office/drawing/2010/main" val="0"/>
+                </a:ext>
+              </a:extLst>
+            </a:blip>
+            <a:stretch>
+              <a:fillRect/>
+            </a:stretch>
+          </p:blipFill>
+          <p:spPr>
+            <a:xfrm>
+              <a:off x="8610184" y="3326511"/>
+              <a:ext cx="1578867" cy="1828804"/>
+            </a:xfrm>
+            <a:prstGeom prst="rect">
+              <a:avLst/>
+            </a:prstGeom>
+          </p:spPr>
+        </p:pic>
+      </p:grpSp>
+      <p:pic>
+        <p:nvPicPr>
+          <p:cNvPr id="12" name="Picture 11"/>
+          <p:cNvPicPr>
+            <a:picLocks noChangeAspect="1"/>
+          </p:cNvPicPr>
+          <p:nvPr/>
+        </p:nvPicPr>
+        <p:blipFill>
+          <a:blip r:embed="rId5" cstate="print">
+            <a:extLst>
+              <a:ext uri="{28A0092B-C50C-407E-A947-70E740481C1C}">
+                <a14:useLocalDpi xmlns:a14="http://schemas.microsoft.com/office/drawing/2010/main" val="0"/>
+              </a:ext>
+            </a:extLst>
+          </a:blip>
+          <a:stretch>
+            <a:fillRect/>
+          </a:stretch>
+        </p:blipFill>
+        <p:spPr>
+          <a:xfrm>
+            <a:off x="2035110" y="1019593"/>
+            <a:ext cx="1578867" cy="1828804"/>
+          </a:xfrm>
+          <a:prstGeom prst="rect">
+            <a:avLst/>
+          </a:prstGeom>
+        </p:spPr>
+      </p:pic>
+    </p:spTree>
+    <p:extLst>
+      <p:ext uri="{BB962C8B-B14F-4D97-AF65-F5344CB8AC3E}">
+        <p14:creationId xmlns:p14="http://schemas.microsoft.com/office/powerpoint/2010/main" val="3019460125"/>
       </p:ext>
     </p:extLst>
   </p:cSld>

</xml_diff>

<commit_message>
update 6600 ch 14 ex pptx link
</commit_message>
<xml_diff>
--- a/public/img/youtube_thumbnails/video_thumbnail_building.pptx
+++ b/public/img/youtube_thumbnails/video_thumbnail_building.pptx
@@ -5,21 +5,23 @@
     <p:sldMasterId id="2147483648" r:id="rId1"/>
   </p:sldMasterIdLst>
   <p:sldIdLst>
-    <p:sldId id="270" r:id="rId2"/>
-    <p:sldId id="259" r:id="rId3"/>
-    <p:sldId id="261" r:id="rId4"/>
-    <p:sldId id="260" r:id="rId5"/>
-    <p:sldId id="269" r:id="rId6"/>
-    <p:sldId id="268" r:id="rId7"/>
-    <p:sldId id="267" r:id="rId8"/>
-    <p:sldId id="266" r:id="rId9"/>
-    <p:sldId id="265" r:id="rId10"/>
-    <p:sldId id="264" r:id="rId11"/>
-    <p:sldId id="263" r:id="rId12"/>
-    <p:sldId id="262" r:id="rId13"/>
-    <p:sldId id="257" r:id="rId14"/>
-    <p:sldId id="256" r:id="rId15"/>
-    <p:sldId id="258" r:id="rId16"/>
+    <p:sldId id="272" r:id="rId2"/>
+    <p:sldId id="271" r:id="rId3"/>
+    <p:sldId id="270" r:id="rId4"/>
+    <p:sldId id="259" r:id="rId5"/>
+    <p:sldId id="261" r:id="rId6"/>
+    <p:sldId id="260" r:id="rId7"/>
+    <p:sldId id="269" r:id="rId8"/>
+    <p:sldId id="268" r:id="rId9"/>
+    <p:sldId id="267" r:id="rId10"/>
+    <p:sldId id="266" r:id="rId11"/>
+    <p:sldId id="265" r:id="rId12"/>
+    <p:sldId id="264" r:id="rId13"/>
+    <p:sldId id="263" r:id="rId14"/>
+    <p:sldId id="262" r:id="rId15"/>
+    <p:sldId id="257" r:id="rId16"/>
+    <p:sldId id="256" r:id="rId17"/>
+    <p:sldId id="258" r:id="rId18"/>
   </p:sldIdLst>
   <p:sldSz cx="12192000" cy="6858000"/>
   <p:notesSz cx="6858000" cy="9144000"/>
@@ -257,7 +259,7 @@
           <a:p>
             <a:fld id="{3C68F153-927F-4ADA-A90F-AFD816292B90}" type="datetimeFigureOut">
               <a:rPr lang="en-US" smtClean="0"/>
-              <a:t>3/23/2020</a:t>
+              <a:t>3/25/2020</a:t>
             </a:fld>
             <a:endParaRPr lang="en-US"/>
           </a:p>
@@ -427,7 +429,7 @@
           <a:p>
             <a:fld id="{3C68F153-927F-4ADA-A90F-AFD816292B90}" type="datetimeFigureOut">
               <a:rPr lang="en-US" smtClean="0"/>
-              <a:t>3/23/2020</a:t>
+              <a:t>3/25/2020</a:t>
             </a:fld>
             <a:endParaRPr lang="en-US"/>
           </a:p>
@@ -607,7 +609,7 @@
           <a:p>
             <a:fld id="{3C68F153-927F-4ADA-A90F-AFD816292B90}" type="datetimeFigureOut">
               <a:rPr lang="en-US" smtClean="0"/>
-              <a:t>3/23/2020</a:t>
+              <a:t>3/25/2020</a:t>
             </a:fld>
             <a:endParaRPr lang="en-US"/>
           </a:p>
@@ -777,7 +779,7 @@
           <a:p>
             <a:fld id="{3C68F153-927F-4ADA-A90F-AFD816292B90}" type="datetimeFigureOut">
               <a:rPr lang="en-US" smtClean="0"/>
-              <a:t>3/23/2020</a:t>
+              <a:t>3/25/2020</a:t>
             </a:fld>
             <a:endParaRPr lang="en-US"/>
           </a:p>
@@ -1023,7 +1025,7 @@
           <a:p>
             <a:fld id="{3C68F153-927F-4ADA-A90F-AFD816292B90}" type="datetimeFigureOut">
               <a:rPr lang="en-US" smtClean="0"/>
-              <a:t>3/23/2020</a:t>
+              <a:t>3/25/2020</a:t>
             </a:fld>
             <a:endParaRPr lang="en-US"/>
           </a:p>
@@ -1255,7 +1257,7 @@
           <a:p>
             <a:fld id="{3C68F153-927F-4ADA-A90F-AFD816292B90}" type="datetimeFigureOut">
               <a:rPr lang="en-US" smtClean="0"/>
-              <a:t>3/23/2020</a:t>
+              <a:t>3/25/2020</a:t>
             </a:fld>
             <a:endParaRPr lang="en-US"/>
           </a:p>
@@ -1622,7 +1624,7 @@
           <a:p>
             <a:fld id="{3C68F153-927F-4ADA-A90F-AFD816292B90}" type="datetimeFigureOut">
               <a:rPr lang="en-US" smtClean="0"/>
-              <a:t>3/23/2020</a:t>
+              <a:t>3/25/2020</a:t>
             </a:fld>
             <a:endParaRPr lang="en-US"/>
           </a:p>
@@ -1740,7 +1742,7 @@
           <a:p>
             <a:fld id="{3C68F153-927F-4ADA-A90F-AFD816292B90}" type="datetimeFigureOut">
               <a:rPr lang="en-US" smtClean="0"/>
-              <a:t>3/23/2020</a:t>
+              <a:t>3/25/2020</a:t>
             </a:fld>
             <a:endParaRPr lang="en-US"/>
           </a:p>
@@ -1835,7 +1837,7 @@
           <a:p>
             <a:fld id="{3C68F153-927F-4ADA-A90F-AFD816292B90}" type="datetimeFigureOut">
               <a:rPr lang="en-US" smtClean="0"/>
-              <a:t>3/23/2020</a:t>
+              <a:t>3/25/2020</a:t>
             </a:fld>
             <a:endParaRPr lang="en-US"/>
           </a:p>
@@ -2112,7 +2114,7 @@
           <a:p>
             <a:fld id="{3C68F153-927F-4ADA-A90F-AFD816292B90}" type="datetimeFigureOut">
               <a:rPr lang="en-US" smtClean="0"/>
-              <a:t>3/23/2020</a:t>
+              <a:t>3/25/2020</a:t>
             </a:fld>
             <a:endParaRPr lang="en-US"/>
           </a:p>
@@ -2365,7 +2367,7 @@
           <a:p>
             <a:fld id="{3C68F153-927F-4ADA-A90F-AFD816292B90}" type="datetimeFigureOut">
               <a:rPr lang="en-US" smtClean="0"/>
-              <a:t>3/23/2020</a:t>
+              <a:t>3/25/2020</a:t>
             </a:fld>
             <a:endParaRPr lang="en-US"/>
           </a:p>
@@ -2578,7 +2580,7 @@
           <a:p>
             <a:fld id="{3C68F153-927F-4ADA-A90F-AFD816292B90}" type="datetimeFigureOut">
               <a:rPr lang="en-US" smtClean="0"/>
-              <a:t>3/23/2020</a:t>
+              <a:t>3/25/2020</a:t>
             </a:fld>
             <a:endParaRPr lang="en-US"/>
           </a:p>
@@ -2991,7 +2993,7 @@
         </p:nvSpPr>
         <p:spPr>
           <a:xfrm>
-            <a:off x="1808702" y="824230"/>
+            <a:off x="1853580" y="824230"/>
             <a:ext cx="8778240" cy="5010912"/>
           </a:xfrm>
           <a:prstGeom prst="rect">
@@ -3037,7 +3039,7 @@
         </p:nvSpPr>
         <p:spPr>
           <a:xfrm>
-            <a:off x="4184694" y="1065121"/>
+            <a:off x="3838696" y="1056832"/>
             <a:ext cx="5712369" cy="1754326"/>
           </a:xfrm>
           <a:prstGeom prst="rect">
@@ -3053,7 +3055,14 @@
           <a:p>
             <a:r>
               <a:rPr lang="en-US" sz="5400" dirty="0" smtClean="0"/>
-              <a:t>OUT-OF-CLASS LECTURES</a:t>
+              <a:t>Virtual </a:t>
+            </a:r>
+            <a:endParaRPr lang="en-US" sz="5400" dirty="0" smtClean="0"/>
+          </a:p>
+          <a:p>
+            <a:r>
+              <a:rPr lang="en-US" sz="5400" dirty="0" smtClean="0"/>
+              <a:t>Office Hours</a:t>
             </a:r>
             <a:endParaRPr lang="en-US" sz="5400" dirty="0"/>
           </a:p>
@@ -3088,7 +3097,7 @@
             </a:r>
             <a:r>
               <a:rPr lang="en-US" dirty="0" smtClean="0"/>
-              <a:t> 23, </a:t>
+              <a:t> 25, </a:t>
             </a:r>
             <a:r>
               <a:rPr lang="en-US" dirty="0" smtClean="0"/>
@@ -3106,7 +3115,7 @@
         </p:nvSpPr>
         <p:spPr>
           <a:xfrm>
-            <a:off x="2035110" y="3043759"/>
+            <a:off x="2023325" y="2848397"/>
             <a:ext cx="5005769" cy="1200329"/>
           </a:xfrm>
           <a:prstGeom prst="rect">
@@ -3123,11 +3132,11 @@
             <a:pPr algn="ctr"/>
             <a:r>
               <a:rPr lang="en-US" dirty="0" smtClean="0"/>
-              <a:t>Chapter </a:t>
+              <a:t>HW 13</a:t>
             </a:r>
             <a:r>
               <a:rPr lang="en-US" dirty="0" smtClean="0"/>
-              <a:t>13</a:t>
+              <a:t> </a:t>
             </a:r>
             <a:endParaRPr lang="en-US" dirty="0"/>
           </a:p>
@@ -3135,25 +3144,21 @@
             <a:pPr algn="ctr"/>
             <a:r>
               <a:rPr lang="en-US" b="1" u="sng" dirty="0" smtClean="0"/>
-              <a:t>Multiple Comparisons Procedures</a:t>
-            </a:r>
-            <a:endParaRPr lang="en-US" b="1" u="sng" dirty="0"/>
-          </a:p>
-          <a:p>
-            <a:pPr algn="ctr"/>
-            <a:r>
-              <a:rPr lang="en-US" i="1" dirty="0" smtClean="0"/>
-              <a:t>Lecture slides </a:t>
-            </a:r>
-            <a:endParaRPr lang="en-US" i="1" dirty="0" smtClean="0"/>
-          </a:p>
-          <a:p>
-            <a:pPr algn="ctr"/>
-            <a:r>
-              <a:rPr lang="en-US" i="1" dirty="0" smtClean="0"/>
-              <a:t>(excludes linear contrast statements)</a:t>
-            </a:r>
-            <a:endParaRPr lang="en-US" i="1" dirty="0"/>
+              <a:t>Multiple Comparisons: pairwise &amp; linear contrasts</a:t>
+            </a:r>
+            <a:endParaRPr lang="en-US" b="1" u="sng" dirty="0" smtClean="0"/>
+          </a:p>
+          <a:p>
+            <a:pPr algn="ctr"/>
+            <a:r>
+              <a:rPr lang="en-US" dirty="0" smtClean="0"/>
+              <a:t>Items # 5 &amp; 6</a:t>
+            </a:r>
+            <a:endParaRPr lang="en-US" dirty="0" smtClean="0"/>
+          </a:p>
+          <a:p>
+            <a:pPr algn="ctr"/>
+            <a:endParaRPr lang="en-US" b="1" dirty="0"/>
           </a:p>
         </p:txBody>
       </p:sp>
@@ -3292,94 +3297,89 @@
           </a:prstGeom>
         </p:spPr>
       </p:pic>
+      <p:sp>
+        <p:nvSpPr>
+          <p:cNvPr id="13" name="TextBox 12"/>
+          <p:cNvSpPr txBox="1"/>
+          <p:nvPr/>
+        </p:nvSpPr>
+        <p:spPr>
+          <a:xfrm>
+            <a:off x="2023324" y="3965983"/>
+            <a:ext cx="5005769" cy="1200329"/>
+          </a:xfrm>
+          <a:prstGeom prst="rect">
+            <a:avLst/>
+          </a:prstGeom>
+          <a:noFill/>
+        </p:spPr>
+        <p:txBody>
+          <a:bodyPr wrap="square" rtlCol="0">
+            <a:spAutoFit/>
+          </a:bodyPr>
+          <a:lstStyle/>
+          <a:p>
+            <a:pPr algn="ctr"/>
+            <a:r>
+              <a:rPr lang="en-US" dirty="0" smtClean="0"/>
+              <a:t>HW 12</a:t>
+            </a:r>
+            <a:r>
+              <a:rPr lang="en-US" dirty="0" smtClean="0"/>
+              <a:t> </a:t>
+            </a:r>
+            <a:endParaRPr lang="en-US" dirty="0"/>
+          </a:p>
+          <a:p>
+            <a:pPr algn="ctr"/>
+            <a:r>
+              <a:rPr lang="en-US" b="1" u="sng" dirty="0" smtClean="0"/>
+              <a:t>One-way, independent groups ANOVA</a:t>
+            </a:r>
+            <a:endParaRPr lang="en-US" b="1" u="sng" dirty="0" smtClean="0"/>
+          </a:p>
+          <a:p>
+            <a:pPr algn="ctr"/>
+            <a:r>
+              <a:rPr lang="en-US" dirty="0" smtClean="0"/>
+              <a:t>Items with APA methods/results</a:t>
+            </a:r>
+            <a:endParaRPr lang="en-US" dirty="0" smtClean="0"/>
+          </a:p>
+          <a:p>
+            <a:pPr algn="ctr"/>
+            <a:endParaRPr lang="en-US" b="1" dirty="0"/>
+          </a:p>
+        </p:txBody>
+      </p:sp>
       <p:pic>
         <p:nvPicPr>
-          <p:cNvPr id="1026" name="Picture 2" descr="Image result for virus"/>
+          <p:cNvPr id="5" name="Picture 4"/>
           <p:cNvPicPr>
-            <a:picLocks noChangeAspect="1" noChangeArrowheads="1"/>
+            <a:picLocks noChangeAspect="1"/>
           </p:cNvPicPr>
           <p:nvPr/>
         </p:nvPicPr>
         <p:blipFill>
-          <a:blip r:embed="rId6" cstate="print">
-            <a:extLst>
-              <a:ext uri="{28A0092B-C50C-407E-A947-70E740481C1C}">
-                <a14:useLocalDpi xmlns:a14="http://schemas.microsoft.com/office/drawing/2010/main" val="0"/>
-              </a:ext>
-            </a:extLst>
-          </a:blip>
-          <a:srcRect/>
+          <a:blip r:embed="rId6"/>
           <a:stretch>
             <a:fillRect/>
           </a:stretch>
         </p:blipFill>
-        <p:spPr bwMode="auto">
-          <a:xfrm>
-            <a:off x="1908176" y="4866721"/>
-            <a:ext cx="825034" cy="824421"/>
-          </a:xfrm>
-          <a:prstGeom prst="rect">
-            <a:avLst/>
-          </a:prstGeom>
-          <a:noFill/>
-          <a:extLst>
-            <a:ext uri="{909E8E84-426E-40DD-AFC4-6F175D3DCCD1}">
-              <a14:hiddenFill xmlns:a14="http://schemas.microsoft.com/office/drawing/2010/main">
-                <a:solidFill>
-                  <a:srgbClr val="FFFFFF"/>
-                </a:solidFill>
-              </a14:hiddenFill>
-            </a:ext>
-          </a:extLst>
+        <p:spPr>
+          <a:xfrm>
+            <a:off x="1985351" y="4872564"/>
+            <a:ext cx="1853345" cy="853514"/>
+          </a:xfrm>
+          <a:prstGeom prst="rect">
+            <a:avLst/>
+          </a:prstGeom>
         </p:spPr>
       </p:pic>
-      <p:sp>
-        <p:nvSpPr>
-          <p:cNvPr id="13" name="TextBox 12"/>
-          <p:cNvSpPr txBox="1"/>
-          <p:nvPr/>
-        </p:nvSpPr>
-        <p:spPr>
-          <a:xfrm>
-            <a:off x="2524444" y="5254195"/>
-            <a:ext cx="1238954" cy="369332"/>
-          </a:xfrm>
-          <a:prstGeom prst="rect">
-            <a:avLst/>
-          </a:prstGeom>
-          <a:noFill/>
-        </p:spPr>
-        <p:txBody>
-          <a:bodyPr wrap="square" rtlCol="0">
-            <a:spAutoFit/>
-          </a:bodyPr>
-          <a:lstStyle/>
-          <a:p>
-            <a:pPr algn="ctr"/>
-            <a:r>
-              <a:rPr lang="en-US" b="1" dirty="0" smtClean="0">
-                <a:solidFill>
-                  <a:schemeClr val="accent1">
-                    <a:lumMod val="75000"/>
-                  </a:schemeClr>
-                </a:solidFill>
-              </a:rPr>
-              <a:t>Covid-19</a:t>
-            </a:r>
-            <a:endParaRPr lang="en-US" b="1" dirty="0">
-              <a:solidFill>
-                <a:schemeClr val="accent1">
-                  <a:lumMod val="75000"/>
-                </a:schemeClr>
-              </a:solidFill>
-            </a:endParaRPr>
-          </a:p>
-        </p:txBody>
-      </p:sp>
     </p:spTree>
     <p:extLst>
       <p:ext uri="{BB962C8B-B14F-4D97-AF65-F5344CB8AC3E}">
-        <p14:creationId xmlns:p14="http://schemas.microsoft.com/office/powerpoint/2010/main" val="911328323"/>
+        <p14:creationId xmlns:p14="http://schemas.microsoft.com/office/powerpoint/2010/main" val="636154248"/>
       </p:ext>
     </p:extLst>
   </p:cSld>
@@ -3507,7 +3507,7 @@
             <a:pPr algn="ctr"/>
             <a:r>
               <a:rPr lang="en-US" dirty="0" smtClean="0"/>
-              <a:t>Feb. 5, 2020</a:t>
+              <a:t>Feb. 12, 2020</a:t>
             </a:r>
             <a:endParaRPr lang="en-US" dirty="0"/>
           </a:p>
@@ -3521,8 +3521,8 @@
         </p:nvSpPr>
         <p:spPr>
           <a:xfrm>
-            <a:off x="2035110" y="3043759"/>
-            <a:ext cx="5005769" cy="1477328"/>
+            <a:off x="2175357" y="4235713"/>
+            <a:ext cx="5005769" cy="923330"/>
           </a:xfrm>
           <a:prstGeom prst="rect">
             <a:avLst/>
@@ -3542,39 +3542,23 @@
             </a:r>
             <a:r>
               <a:rPr lang="en-US" dirty="0"/>
-              <a:t>6</a:t>
+              <a:t>9</a:t>
             </a:r>
           </a:p>
           <a:p>
             <a:pPr algn="ctr"/>
             <a:r>
               <a:rPr lang="en-US" b="1" u="sng" dirty="0" smtClean="0"/>
-              <a:t>Confidence Interval Estimation: The t Distribution</a:t>
-            </a:r>
-            <a:endParaRPr lang="en-US" b="1" u="sng" dirty="0"/>
+              <a:t>Correlation</a:t>
+            </a:r>
+            <a:endParaRPr lang="en-US" dirty="0" smtClean="0"/>
           </a:p>
           <a:p>
             <a:pPr algn="ctr"/>
             <a:r>
               <a:rPr lang="en-US" i="1" dirty="0" smtClean="0"/>
-              <a:t>Lecture slides</a:t>
-            </a:r>
-            <a:endParaRPr lang="en-US" i="1" dirty="0"/>
-          </a:p>
-          <a:p>
-            <a:pPr algn="ctr"/>
-            <a:r>
-              <a:rPr lang="en-US" i="1" dirty="0" smtClean="0"/>
-              <a:t>(second half)</a:t>
-            </a:r>
-          </a:p>
-          <a:p>
-            <a:pPr algn="ctr"/>
-            <a:r>
-              <a:rPr lang="en-US" i="1" dirty="0" smtClean="0"/>
-              <a:t>Homework Helps</a:t>
-            </a:r>
-            <a:endParaRPr lang="en-US" i="1" dirty="0"/>
+              <a:t>First half, chapter slides</a:t>
+            </a:r>
           </a:p>
         </p:txBody>
       </p:sp>
@@ -3713,10 +3697,73 @@
           </a:prstGeom>
         </p:spPr>
       </p:pic>
+      <p:sp>
+        <p:nvSpPr>
+          <p:cNvPr id="13" name="TextBox 12"/>
+          <p:cNvSpPr txBox="1"/>
+          <p:nvPr/>
+        </p:nvSpPr>
+        <p:spPr>
+          <a:xfrm>
+            <a:off x="2175358" y="2646127"/>
+            <a:ext cx="5005769" cy="1477328"/>
+          </a:xfrm>
+          <a:prstGeom prst="rect">
+            <a:avLst/>
+          </a:prstGeom>
+          <a:noFill/>
+        </p:spPr>
+        <p:txBody>
+          <a:bodyPr wrap="square" rtlCol="0">
+            <a:spAutoFit/>
+          </a:bodyPr>
+          <a:lstStyle/>
+          <a:p>
+            <a:pPr algn="ctr"/>
+            <a:r>
+              <a:rPr lang="en-US" dirty="0" smtClean="0"/>
+              <a:t>Chapter </a:t>
+            </a:r>
+            <a:r>
+              <a:rPr lang="en-US" dirty="0"/>
+              <a:t>8</a:t>
+            </a:r>
+          </a:p>
+          <a:p>
+            <a:pPr algn="ctr"/>
+            <a:r>
+              <a:rPr lang="en-US" b="1" u="sng" dirty="0" smtClean="0"/>
+              <a:t>Effect Size &amp; Power Analysis</a:t>
+            </a:r>
+            <a:endParaRPr lang="en-US" dirty="0" smtClean="0"/>
+          </a:p>
+          <a:p>
+            <a:pPr algn="ctr"/>
+            <a:r>
+              <a:rPr lang="en-US" i="1" dirty="0" smtClean="0"/>
+              <a:t>Chapter slides</a:t>
+            </a:r>
+          </a:p>
+          <a:p>
+            <a:pPr algn="ctr"/>
+            <a:r>
+              <a:rPr lang="en-US" i="1" dirty="0" smtClean="0"/>
+              <a:t>Demo G*Power software</a:t>
+            </a:r>
+          </a:p>
+          <a:p>
+            <a:pPr algn="ctr"/>
+            <a:r>
+              <a:rPr lang="en-US" i="1" dirty="0" smtClean="0"/>
+              <a:t>Homework Help</a:t>
+            </a:r>
+          </a:p>
+        </p:txBody>
+      </p:sp>
     </p:spTree>
     <p:extLst>
       <p:ext uri="{BB962C8B-B14F-4D97-AF65-F5344CB8AC3E}">
-        <p14:creationId xmlns:p14="http://schemas.microsoft.com/office/powerpoint/2010/main" val="3019460125"/>
+        <p14:creationId xmlns:p14="http://schemas.microsoft.com/office/powerpoint/2010/main" val="3221510669"/>
       </p:ext>
     </p:extLst>
   </p:cSld>
@@ -3844,7 +3891,7 @@
             <a:pPr algn="ctr"/>
             <a:r>
               <a:rPr lang="en-US" dirty="0" smtClean="0"/>
-              <a:t>Feb. 5, 2020</a:t>
+              <a:t>Feb. 10, 2020</a:t>
             </a:r>
             <a:endParaRPr lang="en-US" dirty="0"/>
           </a:p>
@@ -3859,7 +3906,7 @@
         <p:spPr>
           <a:xfrm>
             <a:off x="2035110" y="3043759"/>
-            <a:ext cx="5005769" cy="1477328"/>
+            <a:ext cx="5005769" cy="923330"/>
           </a:xfrm>
           <a:prstGeom prst="rect">
             <a:avLst/>
@@ -3879,37 +3926,25 @@
             </a:r>
             <a:r>
               <a:rPr lang="en-US" dirty="0"/>
-              <a:t>6</a:t>
-            </a:r>
-          </a:p>
-          <a:p>
-            <a:pPr algn="ctr"/>
+              <a:t>7</a:t>
+            </a:r>
+          </a:p>
+          <a:p>
+            <a:pPr algn="ctr"/>
+            <a:r>
+              <a:rPr lang="en-US" b="1" u="sng" dirty="0"/>
+              <a:t>Independent Samples t-Test for </a:t>
+            </a:r>
             <a:r>
               <a:rPr lang="en-US" b="1" u="sng" dirty="0" smtClean="0"/>
-              <a:t>Confidence Interval Estimation: The t Distribution</a:t>
-            </a:r>
-            <a:endParaRPr lang="en-US" b="1" u="sng" dirty="0"/>
+              <a:t>Means</a:t>
+            </a:r>
           </a:p>
           <a:p>
             <a:pPr algn="ctr"/>
             <a:r>
               <a:rPr lang="en-US" i="1" dirty="0" smtClean="0"/>
-              <a:t>Lecture slides</a:t>
-            </a:r>
-            <a:endParaRPr lang="en-US" i="1" dirty="0"/>
-          </a:p>
-          <a:p>
-            <a:pPr algn="ctr"/>
-            <a:r>
-              <a:rPr lang="en-US" i="1" dirty="0" smtClean="0"/>
-              <a:t>(second half)</a:t>
-            </a:r>
-          </a:p>
-          <a:p>
-            <a:pPr algn="ctr"/>
-            <a:r>
-              <a:rPr lang="en-US" i="1" dirty="0" smtClean="0"/>
-              <a:t>Homework Helps</a:t>
+              <a:t>Mostly Homework Helps</a:t>
             </a:r>
             <a:endParaRPr lang="en-US" i="1" dirty="0"/>
           </a:p>
@@ -4053,7 +4088,7 @@
     </p:spTree>
     <p:extLst>
       <p:ext uri="{BB962C8B-B14F-4D97-AF65-F5344CB8AC3E}">
-        <p14:creationId xmlns:p14="http://schemas.microsoft.com/office/powerpoint/2010/main" val="4154058086"/>
+        <p14:creationId xmlns:p14="http://schemas.microsoft.com/office/powerpoint/2010/main" val="2916572011"/>
       </p:ext>
     </p:extLst>
   </p:cSld>
@@ -4181,7 +4216,7 @@
             <a:pPr algn="ctr"/>
             <a:r>
               <a:rPr lang="en-US" dirty="0" smtClean="0"/>
-              <a:t>Feb. 3, 2020</a:t>
+              <a:t>Feb. 5, 2020</a:t>
             </a:r>
             <a:endParaRPr lang="en-US" dirty="0"/>
           </a:p>
@@ -4196,7 +4231,7 @@
         <p:spPr>
           <a:xfrm>
             <a:off x="2035110" y="3043759"/>
-            <a:ext cx="5005769" cy="2585323"/>
+            <a:ext cx="5005769" cy="1477328"/>
           </a:xfrm>
           <a:prstGeom prst="rect">
             <a:avLst/>
@@ -4211,50 +4246,12 @@
           <a:p>
             <a:pPr algn="ctr"/>
             <a:r>
+              <a:rPr lang="en-US" dirty="0" smtClean="0"/>
+              <a:t>Chapter </a:t>
+            </a:r>
+            <a:r>
               <a:rPr lang="en-US" dirty="0"/>
-              <a:t>Chapter </a:t>
-            </a:r>
-            <a:r>
-              <a:rPr lang="en-US" dirty="0" smtClean="0"/>
-              <a:t>5</a:t>
-            </a:r>
-            <a:endParaRPr lang="en-US" dirty="0"/>
-          </a:p>
-          <a:p>
-            <a:pPr algn="ctr"/>
-            <a:r>
-              <a:rPr lang="en-US" b="1" u="sng" dirty="0" smtClean="0"/>
-              <a:t>Intro to Hypothesis Testing: 1 sample z-Test</a:t>
-            </a:r>
-            <a:endParaRPr lang="en-US" b="1" u="sng" dirty="0"/>
-          </a:p>
-          <a:p>
-            <a:pPr algn="ctr"/>
-            <a:r>
-              <a:rPr lang="en-US" i="1" dirty="0" smtClean="0"/>
-              <a:t>Finish </a:t>
-            </a:r>
-            <a:r>
-              <a:rPr lang="en-US" i="1" dirty="0"/>
-              <a:t>discussion</a:t>
-            </a:r>
-          </a:p>
-          <a:p>
-            <a:pPr algn="ctr"/>
-            <a:r>
-              <a:rPr lang="en-US" i="1" dirty="0"/>
-              <a:t>Homework questions</a:t>
-            </a:r>
-          </a:p>
-          <a:p>
-            <a:pPr algn="ctr"/>
-            <a:endParaRPr lang="en-US" i="1" dirty="0"/>
-          </a:p>
-          <a:p>
-            <a:pPr algn="ctr"/>
-            <a:r>
-              <a:rPr lang="en-US" dirty="0"/>
-              <a:t>Chapter 6</a:t>
+              <a:t>6</a:t>
             </a:r>
           </a:p>
           <a:p>
@@ -4277,7 +4274,14 @@
             <a:pPr algn="ctr"/>
             <a:r>
               <a:rPr lang="en-US" i="1" dirty="0" smtClean="0"/>
-              <a:t>(first half)</a:t>
+              <a:t>(second half)</a:t>
+            </a:r>
+          </a:p>
+          <a:p>
+            <a:pPr algn="ctr"/>
+            <a:r>
+              <a:rPr lang="en-US" i="1" dirty="0" smtClean="0"/>
+              <a:t>Homework Helps</a:t>
             </a:r>
             <a:endParaRPr lang="en-US" i="1" dirty="0"/>
           </a:p>
@@ -4421,7 +4425,7 @@
     </p:spTree>
     <p:extLst>
       <p:ext uri="{BB962C8B-B14F-4D97-AF65-F5344CB8AC3E}">
-        <p14:creationId xmlns:p14="http://schemas.microsoft.com/office/powerpoint/2010/main" val="1136618621"/>
+        <p14:creationId xmlns:p14="http://schemas.microsoft.com/office/powerpoint/2010/main" val="3019460125"/>
       </p:ext>
     </p:extLst>
   </p:cSld>
@@ -4549,7 +4553,7 @@
             <a:pPr algn="ctr"/>
             <a:r>
               <a:rPr lang="en-US" dirty="0" smtClean="0"/>
-              <a:t>Jan. 22, 2020</a:t>
+              <a:t>Feb. 5, 2020</a:t>
             </a:r>
             <a:endParaRPr lang="en-US" dirty="0"/>
           </a:p>
@@ -4564,7 +4568,7 @@
         <p:spPr>
           <a:xfrm>
             <a:off x="2035110" y="3043759"/>
-            <a:ext cx="5005769" cy="2585323"/>
+            <a:ext cx="5005769" cy="1477328"/>
           </a:xfrm>
           <a:prstGeom prst="rect">
             <a:avLst/>
@@ -4579,56 +4583,19 @@
           <a:p>
             <a:pPr algn="ctr"/>
             <a:r>
+              <a:rPr lang="en-US" dirty="0" smtClean="0"/>
+              <a:t>Chapter </a:t>
+            </a:r>
+            <a:r>
               <a:rPr lang="en-US" dirty="0"/>
-              <a:t>Chapter 3</a:t>
-            </a:r>
-          </a:p>
-          <a:p>
-            <a:pPr algn="ctr"/>
-            <a:r>
-              <a:rPr lang="en-US" b="1" u="sng" dirty="0"/>
-              <a:t>Variable/Scale, Rounding &amp; Summation</a:t>
-            </a:r>
-          </a:p>
-          <a:p>
-            <a:pPr algn="ctr"/>
-            <a:r>
-              <a:rPr lang="en-US" i="1" dirty="0" smtClean="0"/>
-              <a:t>Finish </a:t>
-            </a:r>
-            <a:r>
-              <a:rPr lang="en-US" i="1" dirty="0"/>
-              <a:t>discussion</a:t>
-            </a:r>
-          </a:p>
-          <a:p>
-            <a:pPr algn="ctr"/>
-            <a:r>
-              <a:rPr lang="en-US" i="1" dirty="0"/>
-              <a:t>Homework questions</a:t>
-            </a:r>
-          </a:p>
-          <a:p>
-            <a:pPr algn="ctr"/>
-            <a:endParaRPr lang="en-US" i="1" dirty="0"/>
-          </a:p>
-          <a:p>
-            <a:pPr algn="ctr"/>
-            <a:r>
-              <a:rPr lang="en-US" dirty="0"/>
-              <a:t>Chapter </a:t>
-            </a:r>
-            <a:r>
-              <a:rPr lang="en-US" dirty="0" smtClean="0"/>
-              <a:t>4</a:t>
-            </a:r>
-            <a:endParaRPr lang="en-US" dirty="0"/>
+              <a:t>6</a:t>
+            </a:r>
           </a:p>
           <a:p>
             <a:pPr algn="ctr"/>
             <a:r>
               <a:rPr lang="en-US" b="1" u="sng" dirty="0" smtClean="0"/>
-              <a:t>Standardized Scores &amp; the Normal Distribution</a:t>
+              <a:t>Confidence Interval Estimation: The t Distribution</a:t>
             </a:r>
             <a:endParaRPr lang="en-US" b="1" u="sng" dirty="0"/>
           </a:p>
@@ -4644,7 +4611,14 @@
             <a:pPr algn="ctr"/>
             <a:r>
               <a:rPr lang="en-US" i="1" dirty="0" smtClean="0"/>
-              <a:t>(first half)</a:t>
+              <a:t>(second half)</a:t>
+            </a:r>
+          </a:p>
+          <a:p>
+            <a:pPr algn="ctr"/>
+            <a:r>
+              <a:rPr lang="en-US" i="1" dirty="0" smtClean="0"/>
+              <a:t>Homework Helps</a:t>
             </a:r>
             <a:endParaRPr lang="en-US" i="1" dirty="0"/>
           </a:p>
@@ -4788,7 +4762,7 @@
     </p:spTree>
     <p:extLst>
       <p:ext uri="{BB962C8B-B14F-4D97-AF65-F5344CB8AC3E}">
-        <p14:creationId xmlns:p14="http://schemas.microsoft.com/office/powerpoint/2010/main" val="2900019700"/>
+        <p14:creationId xmlns:p14="http://schemas.microsoft.com/office/powerpoint/2010/main" val="4154058086"/>
       </p:ext>
     </p:extLst>
   </p:cSld>
@@ -4916,7 +4890,7 @@
             <a:pPr algn="ctr"/>
             <a:r>
               <a:rPr lang="en-US" dirty="0" smtClean="0"/>
-              <a:t>Jan. 15, 2020</a:t>
+              <a:t>Feb. 3, 2020</a:t>
             </a:r>
             <a:endParaRPr lang="en-US" dirty="0"/>
           </a:p>
@@ -4930,8 +4904,8 @@
         </p:nvSpPr>
         <p:spPr>
           <a:xfrm>
-            <a:off x="2318419" y="3043759"/>
-            <a:ext cx="4212906" cy="2585323"/>
+            <a:off x="2035110" y="3043759"/>
+            <a:ext cx="5005769" cy="2585323"/>
           </a:xfrm>
           <a:prstGeom prst="rect">
             <a:avLst/>
@@ -4946,48 +4920,59 @@
           <a:p>
             <a:pPr algn="ctr"/>
             <a:r>
+              <a:rPr lang="en-US" dirty="0"/>
+              <a:t>Chapter </a:t>
+            </a:r>
+            <a:r>
               <a:rPr lang="en-US" dirty="0" smtClean="0"/>
-              <a:t>Chapter 1</a:t>
-            </a:r>
+              <a:t>5</a:t>
+            </a:r>
+            <a:endParaRPr lang="en-US" dirty="0"/>
           </a:p>
           <a:p>
             <a:pPr algn="ctr"/>
             <a:r>
               <a:rPr lang="en-US" b="1" u="sng" dirty="0" smtClean="0"/>
-              <a:t>Variable/Scale, Rounding &amp; Summation</a:t>
-            </a:r>
+              <a:t>Intro to Hypothesis Testing: 1 sample z-Test</a:t>
+            </a:r>
+            <a:endParaRPr lang="en-US" b="1" u="sng" dirty="0"/>
           </a:p>
           <a:p>
             <a:pPr algn="ctr"/>
             <a:r>
               <a:rPr lang="en-US" i="1" dirty="0" smtClean="0"/>
-              <a:t>Finish discussion</a:t>
-            </a:r>
-          </a:p>
-          <a:p>
-            <a:pPr algn="ctr"/>
-            <a:r>
-              <a:rPr lang="en-US" i="1" dirty="0" smtClean="0"/>
+              <a:t>Finish </a:t>
+            </a:r>
+            <a:r>
+              <a:rPr lang="en-US" i="1" dirty="0"/>
+              <a:t>discussion</a:t>
+            </a:r>
+          </a:p>
+          <a:p>
+            <a:pPr algn="ctr"/>
+            <a:r>
+              <a:rPr lang="en-US" i="1" dirty="0"/>
               <a:t>Homework questions</a:t>
             </a:r>
           </a:p>
           <a:p>
             <a:pPr algn="ctr"/>
-            <a:endParaRPr lang="en-US" i="1" dirty="0" smtClean="0"/>
+            <a:endParaRPr lang="en-US" i="1" dirty="0"/>
           </a:p>
           <a:p>
             <a:pPr algn="ctr"/>
             <a:r>
               <a:rPr lang="en-US" dirty="0"/>
-              <a:t>Chapter 2 </a:t>
-            </a:r>
-          </a:p>
-          <a:p>
-            <a:pPr algn="ctr"/>
-            <a:r>
-              <a:rPr lang="en-US" b="1" u="sng" dirty="0"/>
-              <a:t>Exploring Data with Plots</a:t>
-            </a:r>
+              <a:t>Chapter 6</a:t>
+            </a:r>
+          </a:p>
+          <a:p>
+            <a:pPr algn="ctr"/>
+            <a:r>
+              <a:rPr lang="en-US" b="1" u="sng" dirty="0" smtClean="0"/>
+              <a:t>Confidence Interval Estimation: The t Distribution</a:t>
+            </a:r>
+            <a:endParaRPr lang="en-US" b="1" u="sng" dirty="0"/>
           </a:p>
           <a:p>
             <a:pPr algn="ctr"/>
@@ -5000,12 +4985,8 @@
           <a:p>
             <a:pPr algn="ctr"/>
             <a:r>
-              <a:rPr lang="en-US" i="1" dirty="0"/>
-              <a:t>Homework </a:t>
-            </a:r>
-            <a:r>
               <a:rPr lang="en-US" i="1" dirty="0" smtClean="0"/>
-              <a:t>questions</a:t>
+              <a:t>(first half)</a:t>
             </a:r>
             <a:endParaRPr lang="en-US" i="1" dirty="0"/>
           </a:p>
@@ -5149,7 +5130,7 @@
     </p:spTree>
     <p:extLst>
       <p:ext uri="{BB962C8B-B14F-4D97-AF65-F5344CB8AC3E}">
-        <p14:creationId xmlns:p14="http://schemas.microsoft.com/office/powerpoint/2010/main" val="3290463226"/>
+        <p14:creationId xmlns:p14="http://schemas.microsoft.com/office/powerpoint/2010/main" val="1136618621"/>
       </p:ext>
     </p:extLst>
   </p:cSld>
@@ -5176,51 +5157,26 @@
           <a:chExt cx="0" cy="0"/>
         </a:xfrm>
       </p:grpSpPr>
-      <p:pic>
-        <p:nvPicPr>
-          <p:cNvPr id="2" name="Picture 1"/>
-          <p:cNvPicPr>
-            <a:picLocks noChangeAspect="1"/>
-          </p:cNvPicPr>
-          <p:nvPr/>
-        </p:nvPicPr>
-        <p:blipFill>
-          <a:blip r:embed="rId2" cstate="print">
-            <a:extLst>
-              <a:ext uri="{28A0092B-C50C-407E-A947-70E740481C1C}">
-                <a14:useLocalDpi xmlns:a14="http://schemas.microsoft.com/office/drawing/2010/main" val="0"/>
-              </a:ext>
-            </a:extLst>
-          </a:blip>
-          <a:stretch>
-            <a:fillRect/>
-          </a:stretch>
-        </p:blipFill>
-        <p:spPr>
-          <a:xfrm>
-            <a:off x="5306566" y="2514598"/>
-            <a:ext cx="1578867" cy="1828804"/>
-          </a:xfrm>
-          <a:prstGeom prst="rect">
-            <a:avLst/>
-          </a:prstGeom>
-        </p:spPr>
-      </p:pic>
-      <p:sp>
-        <p:nvSpPr>
-          <p:cNvPr id="3" name="Rectangle 2"/>
+      <p:sp>
+        <p:nvSpPr>
+          <p:cNvPr id="4" name="Rectangle 3"/>
           <p:cNvSpPr/>
           <p:nvPr/>
         </p:nvSpPr>
         <p:spPr>
           <a:xfrm>
-            <a:off x="5054138" y="2394066"/>
-            <a:ext cx="2094807" cy="2078182"/>
-          </a:xfrm>
-          <a:prstGeom prst="rect">
-            <a:avLst/>
-          </a:prstGeom>
-          <a:noFill/>
+            <a:off x="1808702" y="824230"/>
+            <a:ext cx="8778240" cy="5010912"/>
+          </a:xfrm>
+          <a:prstGeom prst="rect">
+            <a:avLst/>
+          </a:prstGeom>
+          <a:solidFill>
+            <a:schemeClr val="bg1">
+              <a:lumMod val="95000"/>
+            </a:schemeClr>
+          </a:solidFill>
+          <a:ln w="38100"/>
         </p:spPr>
         <p:style>
           <a:lnRef idx="2">
@@ -5247,82 +5203,6 @@
           </a:p>
         </p:txBody>
       </p:sp>
-    </p:spTree>
-    <p:extLst>
-      <p:ext uri="{BB962C8B-B14F-4D97-AF65-F5344CB8AC3E}">
-        <p14:creationId xmlns:p14="http://schemas.microsoft.com/office/powerpoint/2010/main" val="2048573925"/>
-      </p:ext>
-    </p:extLst>
-  </p:cSld>
-  <p:clrMapOvr>
-    <a:masterClrMapping/>
-  </p:clrMapOvr>
-</p:sld>
-</file>
-
-<file path=ppt/slides/slide2.xml><?xml version="1.0" encoding="utf-8"?>
-<p:sld xmlns:a="http://schemas.openxmlformats.org/drawingml/2006/main" xmlns:r="http://schemas.openxmlformats.org/officeDocument/2006/relationships" xmlns:p="http://schemas.openxmlformats.org/presentationml/2006/main">
-  <p:cSld>
-    <p:spTree>
-      <p:nvGrpSpPr>
-        <p:cNvPr id="1" name=""/>
-        <p:cNvGrpSpPr/>
-        <p:nvPr/>
-      </p:nvGrpSpPr>
-      <p:grpSpPr>
-        <a:xfrm>
-          <a:off x="0" y="0"/>
-          <a:ext cx="0" cy="0"/>
-          <a:chOff x="0" y="0"/>
-          <a:chExt cx="0" cy="0"/>
-        </a:xfrm>
-      </p:grpSpPr>
-      <p:sp>
-        <p:nvSpPr>
-          <p:cNvPr id="4" name="Rectangle 3"/>
-          <p:cNvSpPr/>
-          <p:nvPr/>
-        </p:nvSpPr>
-        <p:spPr>
-          <a:xfrm>
-            <a:off x="1808702" y="824230"/>
-            <a:ext cx="8778240" cy="5010912"/>
-          </a:xfrm>
-          <a:prstGeom prst="rect">
-            <a:avLst/>
-          </a:prstGeom>
-          <a:solidFill>
-            <a:schemeClr val="bg1">
-              <a:lumMod val="95000"/>
-            </a:schemeClr>
-          </a:solidFill>
-          <a:ln w="38100"/>
-        </p:spPr>
-        <p:style>
-          <a:lnRef idx="2">
-            <a:schemeClr val="accent1">
-              <a:shade val="50000"/>
-            </a:schemeClr>
-          </a:lnRef>
-          <a:fillRef idx="1">
-            <a:schemeClr val="accent1"/>
-          </a:fillRef>
-          <a:effectRef idx="0">
-            <a:schemeClr val="accent1"/>
-          </a:effectRef>
-          <a:fontRef idx="minor">
-            <a:schemeClr val="lt1"/>
-          </a:fontRef>
-        </p:style>
-        <p:txBody>
-          <a:bodyPr rtlCol="0" anchor="ctr"/>
-          <a:lstStyle/>
-          <a:p>
-            <a:pPr algn="ctr"/>
-            <a:endParaRPr lang="en-US"/>
-          </a:p>
-        </p:txBody>
-      </p:sp>
       <p:sp>
         <p:nvSpPr>
           <p:cNvPr id="7" name="TextBox 6"/>
@@ -5331,8 +5211,8 @@
         </p:nvSpPr>
         <p:spPr>
           <a:xfrm>
-            <a:off x="4003824" y="1483154"/>
-            <a:ext cx="5712369" cy="1754326"/>
+            <a:off x="3840385" y="1213849"/>
+            <a:ext cx="5712369" cy="923330"/>
           </a:xfrm>
           <a:prstGeom prst="rect">
             <a:avLst/>
@@ -5347,13 +5227,7 @@
           <a:p>
             <a:r>
               <a:rPr lang="en-US" sz="5400" dirty="0" smtClean="0"/>
-              <a:t>HOMEWORK</a:t>
-            </a:r>
-          </a:p>
-          <a:p>
-            <a:r>
-              <a:rPr lang="en-US" sz="5400" dirty="0" smtClean="0"/>
-              <a:t>HELP</a:t>
+              <a:t>INCLASS LECTURES</a:t>
             </a:r>
             <a:endParaRPr lang="en-US" sz="5400" dirty="0"/>
           </a:p>
@@ -5384,7 +5258,7 @@
             <a:pPr algn="ctr"/>
             <a:r>
               <a:rPr lang="en-US" dirty="0" smtClean="0"/>
-              <a:t>Jan. 24, 2020</a:t>
+              <a:t>Jan. 22, 2020</a:t>
             </a:r>
             <a:endParaRPr lang="en-US" dirty="0"/>
           </a:p>
@@ -5398,8 +5272,8 @@
         </p:nvSpPr>
         <p:spPr>
           <a:xfrm>
-            <a:off x="2000886" y="3743671"/>
-            <a:ext cx="5005769" cy="1200329"/>
+            <a:off x="2035110" y="3043759"/>
+            <a:ext cx="5005769" cy="2585323"/>
           </a:xfrm>
           <a:prstGeom prst="rect">
             <a:avLst/>
@@ -5414,8 +5288,48 @@
           <a:p>
             <a:pPr algn="ctr"/>
             <a:r>
+              <a:rPr lang="en-US" dirty="0"/>
+              <a:t>Chapter 3</a:t>
+            </a:r>
+          </a:p>
+          <a:p>
+            <a:pPr algn="ctr"/>
+            <a:r>
+              <a:rPr lang="en-US" b="1" u="sng" dirty="0"/>
+              <a:t>Variable/Scale, Rounding &amp; Summation</a:t>
+            </a:r>
+          </a:p>
+          <a:p>
+            <a:pPr algn="ctr"/>
+            <a:r>
+              <a:rPr lang="en-US" i="1" dirty="0" smtClean="0"/>
+              <a:t>Finish </a:t>
+            </a:r>
+            <a:r>
+              <a:rPr lang="en-US" i="1" dirty="0"/>
+              <a:t>discussion</a:t>
+            </a:r>
+          </a:p>
+          <a:p>
+            <a:pPr algn="ctr"/>
+            <a:r>
+              <a:rPr lang="en-US" i="1" dirty="0"/>
+              <a:t>Homework questions</a:t>
+            </a:r>
+          </a:p>
+          <a:p>
+            <a:pPr algn="ctr"/>
+            <a:endParaRPr lang="en-US" i="1" dirty="0"/>
+          </a:p>
+          <a:p>
+            <a:pPr algn="ctr"/>
+            <a:r>
+              <a:rPr lang="en-US" dirty="0"/>
+              <a:t>Chapter </a:t>
+            </a:r>
+            <a:r>
               <a:rPr lang="en-US" dirty="0" smtClean="0"/>
-              <a:t>Chapter 4</a:t>
+              <a:t>4</a:t>
             </a:r>
             <a:endParaRPr lang="en-US" dirty="0"/>
           </a:p>
@@ -5425,25 +5339,23 @@
               <a:rPr lang="en-US" b="1" u="sng" dirty="0" smtClean="0"/>
               <a:t>Standardized Scores &amp; the Normal Distribution</a:t>
             </a:r>
-          </a:p>
-          <a:p>
-            <a:pPr algn="ctr"/>
-            <a:r>
-              <a:rPr lang="en-US" b="1" dirty="0" smtClean="0"/>
-              <a:t>4B #6: IQ (mu = 100, </a:t>
-            </a:r>
-            <a:r>
-              <a:rPr lang="en-US" b="1" dirty="0" err="1" smtClean="0"/>
-              <a:t>sd</a:t>
-            </a:r>
-            <a:r>
-              <a:rPr lang="en-US" b="1" dirty="0" smtClean="0"/>
-              <a:t>=15) -&gt; sample w/M = 108</a:t>
-            </a:r>
-          </a:p>
-          <a:p>
-            <a:pPr algn="ctr"/>
-            <a:endParaRPr lang="en-US" b="1" dirty="0"/>
+            <a:endParaRPr lang="en-US" b="1" u="sng" dirty="0"/>
+          </a:p>
+          <a:p>
+            <a:pPr algn="ctr"/>
+            <a:r>
+              <a:rPr lang="en-US" i="1" dirty="0" smtClean="0"/>
+              <a:t>Lecture slides</a:t>
+            </a:r>
+            <a:endParaRPr lang="en-US" i="1" dirty="0"/>
+          </a:p>
+          <a:p>
+            <a:pPr algn="ctr"/>
+            <a:r>
+              <a:rPr lang="en-US" i="1" dirty="0" smtClean="0"/>
+              <a:t>(first half)</a:t>
+            </a:r>
+            <a:endParaRPr lang="en-US" i="1" dirty="0"/>
           </a:p>
         </p:txBody>
       </p:sp>
@@ -5585,7 +5497,7 @@
     </p:spTree>
     <p:extLst>
       <p:ext uri="{BB962C8B-B14F-4D97-AF65-F5344CB8AC3E}">
-        <p14:creationId xmlns:p14="http://schemas.microsoft.com/office/powerpoint/2010/main" val="3542266102"/>
+        <p14:creationId xmlns:p14="http://schemas.microsoft.com/office/powerpoint/2010/main" val="2900019700"/>
       </p:ext>
     </p:extLst>
   </p:cSld>
@@ -5595,7 +5507,7 @@
 </p:sld>
 </file>
 
-<file path=ppt/slides/slide3.xml><?xml version="1.0" encoding="utf-8"?>
+<file path=ppt/slides/slide16.xml><?xml version="1.0" encoding="utf-8"?>
 <p:sld xmlns:a="http://schemas.openxmlformats.org/drawingml/2006/main" xmlns:r="http://schemas.openxmlformats.org/officeDocument/2006/relationships" xmlns:p="http://schemas.openxmlformats.org/presentationml/2006/main">
   <p:cSld>
     <p:spTree>
@@ -5666,8 +5578,8 @@
         </p:nvSpPr>
         <p:spPr>
           <a:xfrm>
-            <a:off x="4003824" y="1483154"/>
-            <a:ext cx="5712369" cy="1754326"/>
+            <a:off x="3840385" y="1213849"/>
+            <a:ext cx="5712369" cy="923330"/>
           </a:xfrm>
           <a:prstGeom prst="rect">
             <a:avLst/>
@@ -5682,7 +5594,7 @@
           <a:p>
             <a:r>
               <a:rPr lang="en-US" sz="5400" dirty="0" smtClean="0"/>
-              <a:t>OUT-OF-CLASS LECTURES</a:t>
+              <a:t>INCLASS LECTURES</a:t>
             </a:r>
             <a:endParaRPr lang="en-US" sz="5400" dirty="0"/>
           </a:p>
@@ -5713,7 +5625,7 @@
             <a:pPr algn="ctr"/>
             <a:r>
               <a:rPr lang="en-US" dirty="0" smtClean="0"/>
-              <a:t>Jan. 24, 2020</a:t>
+              <a:t>Jan. 15, 2020</a:t>
             </a:r>
             <a:endParaRPr lang="en-US" dirty="0"/>
           </a:p>
@@ -5727,8 +5639,8 @@
         </p:nvSpPr>
         <p:spPr>
           <a:xfrm>
-            <a:off x="2000886" y="3743671"/>
-            <a:ext cx="5005769" cy="923330"/>
+            <a:off x="2318419" y="3043759"/>
+            <a:ext cx="4212906" cy="2585323"/>
           </a:xfrm>
           <a:prstGeom prst="rect">
             <a:avLst/>
@@ -5744,24 +5656,67 @@
             <a:pPr algn="ctr"/>
             <a:r>
               <a:rPr lang="en-US" dirty="0" smtClean="0"/>
-              <a:t>Chapter 4</a:t>
-            </a:r>
-            <a:endParaRPr lang="en-US" dirty="0"/>
+              <a:t>Chapter 1</a:t>
+            </a:r>
           </a:p>
           <a:p>
             <a:pPr algn="ctr"/>
             <a:r>
               <a:rPr lang="en-US" b="1" u="sng" dirty="0" smtClean="0"/>
-              <a:t>Standardized Scores &amp; the Normal Distribution</a:t>
-            </a:r>
-            <a:endParaRPr lang="en-US" b="1" u="sng" dirty="0"/>
+              <a:t>Variable/Scale, Rounding &amp; Summation</a:t>
+            </a:r>
           </a:p>
           <a:p>
             <a:pPr algn="ctr"/>
             <a:r>
               <a:rPr lang="en-US" i="1" dirty="0" smtClean="0"/>
-              <a:t>Lecture Slide Examples Worked</a:t>
-            </a:r>
+              <a:t>Finish discussion</a:t>
+            </a:r>
+          </a:p>
+          <a:p>
+            <a:pPr algn="ctr"/>
+            <a:r>
+              <a:rPr lang="en-US" i="1" dirty="0" smtClean="0"/>
+              <a:t>Homework questions</a:t>
+            </a:r>
+          </a:p>
+          <a:p>
+            <a:pPr algn="ctr"/>
+            <a:endParaRPr lang="en-US" i="1" dirty="0" smtClean="0"/>
+          </a:p>
+          <a:p>
+            <a:pPr algn="ctr"/>
+            <a:r>
+              <a:rPr lang="en-US" dirty="0"/>
+              <a:t>Chapter 2 </a:t>
+            </a:r>
+          </a:p>
+          <a:p>
+            <a:pPr algn="ctr"/>
+            <a:r>
+              <a:rPr lang="en-US" b="1" u="sng" dirty="0"/>
+              <a:t>Exploring Data with Plots</a:t>
+            </a:r>
+          </a:p>
+          <a:p>
+            <a:pPr algn="ctr"/>
+            <a:r>
+              <a:rPr lang="en-US" i="1" dirty="0" smtClean="0"/>
+              <a:t>Lecture slides</a:t>
+            </a:r>
+            <a:endParaRPr lang="en-US" i="1" dirty="0"/>
+          </a:p>
+          <a:p>
+            <a:pPr algn="ctr"/>
+            <a:r>
+              <a:rPr lang="en-US" i="1" dirty="0"/>
+              <a:t>Homework </a:t>
+            </a:r>
+            <a:r>
+              <a:rPr lang="en-US" i="1" dirty="0" smtClean="0"/>
+              <a:t>questions</a:t>
+            </a:r>
+            <a:endParaRPr lang="en-US" i="1" dirty="0"/>
           </a:p>
         </p:txBody>
       </p:sp>
@@ -5903,7 +5858,7 @@
     </p:spTree>
     <p:extLst>
       <p:ext uri="{BB962C8B-B14F-4D97-AF65-F5344CB8AC3E}">
-        <p14:creationId xmlns:p14="http://schemas.microsoft.com/office/powerpoint/2010/main" val="267042058"/>
+        <p14:creationId xmlns:p14="http://schemas.microsoft.com/office/powerpoint/2010/main" val="3290463226"/>
       </p:ext>
     </p:extLst>
   </p:cSld>
@@ -5913,7 +5868,7 @@
 </p:sld>
 </file>
 
-<file path=ppt/slides/slide4.xml><?xml version="1.0" encoding="utf-8"?>
+<file path=ppt/slides/slide17.xml><?xml version="1.0" encoding="utf-8"?>
 <p:sld xmlns:a="http://schemas.openxmlformats.org/drawingml/2006/main" xmlns:r="http://schemas.openxmlformats.org/officeDocument/2006/relationships" xmlns:p="http://schemas.openxmlformats.org/presentationml/2006/main">
   <p:cSld>
     <p:spTree>
@@ -5930,26 +5885,51 @@
           <a:chExt cx="0" cy="0"/>
         </a:xfrm>
       </p:grpSpPr>
-      <p:sp>
-        <p:nvSpPr>
-          <p:cNvPr id="4" name="Rectangle 3"/>
+      <p:pic>
+        <p:nvPicPr>
+          <p:cNvPr id="2" name="Picture 1"/>
+          <p:cNvPicPr>
+            <a:picLocks noChangeAspect="1"/>
+          </p:cNvPicPr>
+          <p:nvPr/>
+        </p:nvPicPr>
+        <p:blipFill>
+          <a:blip r:embed="rId2" cstate="print">
+            <a:extLst>
+              <a:ext uri="{28A0092B-C50C-407E-A947-70E740481C1C}">
+                <a14:useLocalDpi xmlns:a14="http://schemas.microsoft.com/office/drawing/2010/main" val="0"/>
+              </a:ext>
+            </a:extLst>
+          </a:blip>
+          <a:stretch>
+            <a:fillRect/>
+          </a:stretch>
+        </p:blipFill>
+        <p:spPr>
+          <a:xfrm>
+            <a:off x="5306566" y="2514598"/>
+            <a:ext cx="1578867" cy="1828804"/>
+          </a:xfrm>
+          <a:prstGeom prst="rect">
+            <a:avLst/>
+          </a:prstGeom>
+        </p:spPr>
+      </p:pic>
+      <p:sp>
+        <p:nvSpPr>
+          <p:cNvPr id="3" name="Rectangle 2"/>
           <p:cNvSpPr/>
           <p:nvPr/>
         </p:nvSpPr>
         <p:spPr>
           <a:xfrm>
-            <a:off x="1808702" y="824230"/>
-            <a:ext cx="8778240" cy="5010912"/>
-          </a:xfrm>
-          <a:prstGeom prst="rect">
-            <a:avLst/>
-          </a:prstGeom>
-          <a:solidFill>
-            <a:schemeClr val="bg1">
-              <a:lumMod val="95000"/>
-            </a:schemeClr>
-          </a:solidFill>
-          <a:ln w="38100"/>
+            <a:off x="5054138" y="2394066"/>
+            <a:ext cx="2094807" cy="2078182"/>
+          </a:xfrm>
+          <a:prstGeom prst="rect">
+            <a:avLst/>
+          </a:prstGeom>
+          <a:noFill/>
         </p:spPr>
         <p:style>
           <a:lnRef idx="2">
@@ -5976,6 +5956,82 @@
           </a:p>
         </p:txBody>
       </p:sp>
+    </p:spTree>
+    <p:extLst>
+      <p:ext uri="{BB962C8B-B14F-4D97-AF65-F5344CB8AC3E}">
+        <p14:creationId xmlns:p14="http://schemas.microsoft.com/office/powerpoint/2010/main" val="2048573925"/>
+      </p:ext>
+    </p:extLst>
+  </p:cSld>
+  <p:clrMapOvr>
+    <a:masterClrMapping/>
+  </p:clrMapOvr>
+</p:sld>
+</file>
+
+<file path=ppt/slides/slide2.xml><?xml version="1.0" encoding="utf-8"?>
+<p:sld xmlns:a="http://schemas.openxmlformats.org/drawingml/2006/main" xmlns:r="http://schemas.openxmlformats.org/officeDocument/2006/relationships" xmlns:p="http://schemas.openxmlformats.org/presentationml/2006/main">
+  <p:cSld>
+    <p:spTree>
+      <p:nvGrpSpPr>
+        <p:cNvPr id="1" name=""/>
+        <p:cNvGrpSpPr/>
+        <p:nvPr/>
+      </p:nvGrpSpPr>
+      <p:grpSpPr>
+        <a:xfrm>
+          <a:off x="0" y="0"/>
+          <a:ext cx="0" cy="0"/>
+          <a:chOff x="0" y="0"/>
+          <a:chExt cx="0" cy="0"/>
+        </a:xfrm>
+      </p:grpSpPr>
+      <p:sp>
+        <p:nvSpPr>
+          <p:cNvPr id="4" name="Rectangle 3"/>
+          <p:cNvSpPr/>
+          <p:nvPr/>
+        </p:nvSpPr>
+        <p:spPr>
+          <a:xfrm>
+            <a:off x="1808702" y="824230"/>
+            <a:ext cx="8778240" cy="5010912"/>
+          </a:xfrm>
+          <a:prstGeom prst="rect">
+            <a:avLst/>
+          </a:prstGeom>
+          <a:solidFill>
+            <a:schemeClr val="bg1">
+              <a:lumMod val="95000"/>
+            </a:schemeClr>
+          </a:solidFill>
+          <a:ln w="38100"/>
+        </p:spPr>
+        <p:style>
+          <a:lnRef idx="2">
+            <a:schemeClr val="accent1">
+              <a:shade val="50000"/>
+            </a:schemeClr>
+          </a:lnRef>
+          <a:fillRef idx="1">
+            <a:schemeClr val="accent1"/>
+          </a:fillRef>
+          <a:effectRef idx="0">
+            <a:schemeClr val="accent1"/>
+          </a:effectRef>
+          <a:fontRef idx="minor">
+            <a:schemeClr val="lt1"/>
+          </a:fontRef>
+        </p:style>
+        <p:txBody>
+          <a:bodyPr rtlCol="0" anchor="ctr"/>
+          <a:lstStyle/>
+          <a:p>
+            <a:pPr algn="ctr"/>
+            <a:endParaRPr lang="en-US"/>
+          </a:p>
+        </p:txBody>
+      </p:sp>
       <p:sp>
         <p:nvSpPr>
           <p:cNvPr id="7" name="TextBox 6"/>
@@ -6031,7 +6087,7 @@
             <a:pPr algn="ctr"/>
             <a:r>
               <a:rPr lang="en-US" dirty="0" smtClean="0"/>
-              <a:t>Jan. 24, 2020</a:t>
+              <a:t>March 23, 2020</a:t>
             </a:r>
             <a:endParaRPr lang="en-US" dirty="0"/>
           </a:p>
@@ -6046,7 +6102,7 @@
         <p:spPr>
           <a:xfrm>
             <a:off x="2035110" y="3043759"/>
-            <a:ext cx="5005769" cy="1200329"/>
+            <a:ext cx="5005769" cy="1477328"/>
           </a:xfrm>
           <a:prstGeom prst="rect">
             <a:avLst/>
@@ -6062,7 +6118,7 @@
             <a:pPr algn="ctr"/>
             <a:r>
               <a:rPr lang="en-US" dirty="0" smtClean="0"/>
-              <a:t>Chapter 4</a:t>
+              <a:t>Chapter 13</a:t>
             </a:r>
             <a:endParaRPr lang="en-US" dirty="0"/>
           </a:p>
@@ -6070,7 +6126,7 @@
             <a:pPr algn="ctr"/>
             <a:r>
               <a:rPr lang="en-US" b="1" u="sng" dirty="0" smtClean="0"/>
-              <a:t>Standardized Scores &amp; the Normal Distribution</a:t>
+              <a:t>Multiple Comparisons Procedures</a:t>
             </a:r>
             <a:endParaRPr lang="en-US" b="1" u="sng" dirty="0"/>
           </a:p>
@@ -6078,15 +6134,37 @@
             <a:pPr algn="ctr"/>
             <a:r>
               <a:rPr lang="en-US" i="1" dirty="0" smtClean="0"/>
-              <a:t>Lecture slides 25-43</a:t>
-            </a:r>
-            <a:endParaRPr lang="en-US" i="1" dirty="0"/>
+              <a:t>Lecture slides, part 2 of 2</a:t>
+            </a:r>
           </a:p>
           <a:p>
             <a:pPr algn="ctr"/>
             <a:r>
               <a:rPr lang="en-US" i="1" dirty="0" smtClean="0"/>
-              <a:t>(Second half)</a:t>
+              <a:t>Includes example in R (</a:t>
+            </a:r>
+            <a:r>
+              <a:rPr lang="en-US" i="1" dirty="0" err="1" smtClean="0"/>
+              <a:t>afex</a:t>
+            </a:r>
+            <a:r>
+              <a:rPr lang="en-US" i="1" dirty="0" smtClean="0"/>
+              <a:t> &amp; </a:t>
+            </a:r>
+            <a:r>
+              <a:rPr lang="en-US" i="1" dirty="0" err="1" smtClean="0"/>
+              <a:t>emmeans</a:t>
+            </a:r>
+            <a:r>
+              <a:rPr lang="en-US" i="1" dirty="0" smtClean="0"/>
+              <a:t>)</a:t>
+            </a:r>
+          </a:p>
+          <a:p>
+            <a:pPr algn="ctr"/>
+            <a:r>
+              <a:rPr lang="en-US" i="1" dirty="0" smtClean="0"/>
+              <a:t>linear contrast statements: by hand and code</a:t>
             </a:r>
             <a:endParaRPr lang="en-US" i="1" dirty="0"/>
           </a:p>
@@ -6227,10 +6305,109 @@
           </a:prstGeom>
         </p:spPr>
       </p:pic>
+      <p:grpSp>
+        <p:nvGrpSpPr>
+          <p:cNvPr id="5" name="Group 4"/>
+          <p:cNvGrpSpPr/>
+          <p:nvPr/>
+        </p:nvGrpSpPr>
+        <p:grpSpPr>
+          <a:xfrm>
+            <a:off x="1908176" y="4866721"/>
+            <a:ext cx="1855222" cy="824421"/>
+            <a:chOff x="1908176" y="4866721"/>
+            <a:chExt cx="1855222" cy="824421"/>
+          </a:xfrm>
+        </p:grpSpPr>
+        <p:pic>
+          <p:nvPicPr>
+            <p:cNvPr id="1026" name="Picture 2" descr="Image result for virus"/>
+            <p:cNvPicPr>
+              <a:picLocks noChangeAspect="1" noChangeArrowheads="1"/>
+            </p:cNvPicPr>
+            <p:nvPr/>
+          </p:nvPicPr>
+          <p:blipFill>
+            <a:blip r:embed="rId6" cstate="print">
+              <a:extLst>
+                <a:ext uri="{28A0092B-C50C-407E-A947-70E740481C1C}">
+                  <a14:useLocalDpi xmlns:a14="http://schemas.microsoft.com/office/drawing/2010/main" val="0"/>
+                </a:ext>
+              </a:extLst>
+            </a:blip>
+            <a:srcRect/>
+            <a:stretch>
+              <a:fillRect/>
+            </a:stretch>
+          </p:blipFill>
+          <p:spPr bwMode="auto">
+            <a:xfrm>
+              <a:off x="1908176" y="4866721"/>
+              <a:ext cx="825034" cy="824421"/>
+            </a:xfrm>
+            <a:prstGeom prst="rect">
+              <a:avLst/>
+            </a:prstGeom>
+            <a:noFill/>
+            <a:extLst>
+              <a:ext uri="{909E8E84-426E-40DD-AFC4-6F175D3DCCD1}">
+                <a14:hiddenFill xmlns:a14="http://schemas.microsoft.com/office/drawing/2010/main">
+                  <a:solidFill>
+                    <a:srgbClr val="FFFFFF"/>
+                  </a:solidFill>
+                </a14:hiddenFill>
+              </a:ext>
+            </a:extLst>
+          </p:spPr>
+        </p:pic>
+        <p:sp>
+          <p:nvSpPr>
+            <p:cNvPr id="13" name="TextBox 12"/>
+            <p:cNvSpPr txBox="1"/>
+            <p:nvPr/>
+          </p:nvSpPr>
+          <p:spPr>
+            <a:xfrm>
+              <a:off x="2524444" y="5254195"/>
+              <a:ext cx="1238954" cy="369332"/>
+            </a:xfrm>
+            <a:prstGeom prst="rect">
+              <a:avLst/>
+            </a:prstGeom>
+            <a:noFill/>
+          </p:spPr>
+          <p:txBody>
+            <a:bodyPr wrap="square" rtlCol="0">
+              <a:spAutoFit/>
+            </a:bodyPr>
+            <a:lstStyle/>
+            <a:p>
+              <a:pPr algn="ctr"/>
+              <a:r>
+                <a:rPr lang="en-US" b="1" dirty="0" smtClean="0">
+                  <a:solidFill>
+                    <a:schemeClr val="accent1">
+                      <a:lumMod val="75000"/>
+                    </a:schemeClr>
+                  </a:solidFill>
+                </a:rPr>
+                <a:t>Covid-19</a:t>
+              </a:r>
+              <a:endParaRPr lang="en-US" b="1" dirty="0">
+                <a:solidFill>
+                  <a:schemeClr val="accent1">
+                    <a:lumMod val="75000"/>
+                  </a:schemeClr>
+                </a:solidFill>
+              </a:endParaRPr>
+            </a:p>
+          </p:txBody>
+        </p:sp>
+      </p:grpSp>
     </p:spTree>
     <p:extLst>
       <p:ext uri="{BB962C8B-B14F-4D97-AF65-F5344CB8AC3E}">
-        <p14:creationId xmlns:p14="http://schemas.microsoft.com/office/powerpoint/2010/main" val="1429724622"/>
+        <p14:creationId xmlns:p14="http://schemas.microsoft.com/office/powerpoint/2010/main" val="3788962138"/>
       </p:ext>
     </p:extLst>
   </p:cSld>
@@ -6240,7 +6417,7 @@
 </p:sld>
 </file>
 
-<file path=ppt/slides/slide5.xml><?xml version="1.0" encoding="utf-8"?>
+<file path=ppt/slides/slide3.xml><?xml version="1.0" encoding="utf-8"?>
 <p:sld xmlns:a="http://schemas.openxmlformats.org/drawingml/2006/main" xmlns:r="http://schemas.openxmlformats.org/officeDocument/2006/relationships" xmlns:p="http://schemas.openxmlformats.org/presentationml/2006/main">
   <p:cSld>
     <p:spTree>
@@ -6311,8 +6488,8 @@
         </p:nvSpPr>
         <p:spPr>
           <a:xfrm>
-            <a:off x="3840385" y="1213849"/>
-            <a:ext cx="5712369" cy="923330"/>
+            <a:off x="4184694" y="1065121"/>
+            <a:ext cx="5712369" cy="1754326"/>
           </a:xfrm>
           <a:prstGeom prst="rect">
             <a:avLst/>
@@ -6327,7 +6504,7 @@
           <a:p>
             <a:r>
               <a:rPr lang="en-US" sz="5400" dirty="0" smtClean="0"/>
-              <a:t>INCLASS LECTURES</a:t>
+              <a:t>OUT-OF-CLASS LECTURES</a:t>
             </a:r>
             <a:endParaRPr lang="en-US" sz="5400" dirty="0"/>
           </a:p>
@@ -6358,7 +6535,7 @@
             <a:pPr algn="ctr"/>
             <a:r>
               <a:rPr lang="en-US" dirty="0" smtClean="0"/>
-              <a:t>March 11, 2020</a:t>
+              <a:t>March 23, 2020</a:t>
             </a:r>
             <a:endParaRPr lang="en-US" dirty="0"/>
           </a:p>
@@ -6372,7 +6549,7 @@
         </p:nvSpPr>
         <p:spPr>
           <a:xfrm>
-            <a:off x="2175358" y="3486436"/>
+            <a:off x="2035110" y="3043759"/>
             <a:ext cx="5005769" cy="1200329"/>
           </a:xfrm>
           <a:prstGeom prst="rect">
@@ -6389,7 +6566,7 @@
             <a:pPr algn="ctr"/>
             <a:r>
               <a:rPr lang="en-US" dirty="0" smtClean="0"/>
-              <a:t>Chapter 12</a:t>
+              <a:t>Chapter 13</a:t>
             </a:r>
             <a:endParaRPr lang="en-US" dirty="0"/>
           </a:p>
@@ -6397,23 +6574,24 @@
             <a:pPr algn="ctr"/>
             <a:r>
               <a:rPr lang="en-US" b="1" u="sng" dirty="0" smtClean="0"/>
-              <a:t>One-way Independent Groups ANOVA</a:t>
-            </a:r>
-            <a:endParaRPr lang="en-US" dirty="0" smtClean="0"/>
+              <a:t>Multiple Comparisons Procedures</a:t>
+            </a:r>
+            <a:endParaRPr lang="en-US" b="1" u="sng" dirty="0"/>
           </a:p>
           <a:p>
             <a:pPr algn="ctr"/>
             <a:r>
               <a:rPr lang="en-US" i="1" dirty="0" smtClean="0"/>
-              <a:t>Second half, chapter slides</a:t>
+              <a:t>Lecture slides </a:t>
             </a:r>
           </a:p>
           <a:p>
             <a:pPr algn="ctr"/>
             <a:r>
               <a:rPr lang="en-US" i="1" dirty="0" smtClean="0"/>
-              <a:t>Mostly Examples, Using R, and HW Help</a:t>
-            </a:r>
+              <a:t>(excludes linear contrast statements)</a:t>
+            </a:r>
+            <a:endParaRPr lang="en-US" i="1" dirty="0"/>
           </a:p>
         </p:txBody>
       </p:sp>
@@ -6552,10 +6730,94 @@
           </a:prstGeom>
         </p:spPr>
       </p:pic>
+      <p:pic>
+        <p:nvPicPr>
+          <p:cNvPr id="1026" name="Picture 2" descr="Image result for virus"/>
+          <p:cNvPicPr>
+            <a:picLocks noChangeAspect="1" noChangeArrowheads="1"/>
+          </p:cNvPicPr>
+          <p:nvPr/>
+        </p:nvPicPr>
+        <p:blipFill>
+          <a:blip r:embed="rId6" cstate="print">
+            <a:extLst>
+              <a:ext uri="{28A0092B-C50C-407E-A947-70E740481C1C}">
+                <a14:useLocalDpi xmlns:a14="http://schemas.microsoft.com/office/drawing/2010/main" val="0"/>
+              </a:ext>
+            </a:extLst>
+          </a:blip>
+          <a:srcRect/>
+          <a:stretch>
+            <a:fillRect/>
+          </a:stretch>
+        </p:blipFill>
+        <p:spPr bwMode="auto">
+          <a:xfrm>
+            <a:off x="1908176" y="4866721"/>
+            <a:ext cx="825034" cy="824421"/>
+          </a:xfrm>
+          <a:prstGeom prst="rect">
+            <a:avLst/>
+          </a:prstGeom>
+          <a:noFill/>
+          <a:extLst>
+            <a:ext uri="{909E8E84-426E-40DD-AFC4-6F175D3DCCD1}">
+              <a14:hiddenFill xmlns:a14="http://schemas.microsoft.com/office/drawing/2010/main">
+                <a:solidFill>
+                  <a:srgbClr val="FFFFFF"/>
+                </a:solidFill>
+              </a14:hiddenFill>
+            </a:ext>
+          </a:extLst>
+        </p:spPr>
+      </p:pic>
+      <p:sp>
+        <p:nvSpPr>
+          <p:cNvPr id="13" name="TextBox 12"/>
+          <p:cNvSpPr txBox="1"/>
+          <p:nvPr/>
+        </p:nvSpPr>
+        <p:spPr>
+          <a:xfrm>
+            <a:off x="2524444" y="5254195"/>
+            <a:ext cx="1238954" cy="369332"/>
+          </a:xfrm>
+          <a:prstGeom prst="rect">
+            <a:avLst/>
+          </a:prstGeom>
+          <a:noFill/>
+        </p:spPr>
+        <p:txBody>
+          <a:bodyPr wrap="square" rtlCol="0">
+            <a:spAutoFit/>
+          </a:bodyPr>
+          <a:lstStyle/>
+          <a:p>
+            <a:pPr algn="ctr"/>
+            <a:r>
+              <a:rPr lang="en-US" b="1" dirty="0" smtClean="0">
+                <a:solidFill>
+                  <a:schemeClr val="accent1">
+                    <a:lumMod val="75000"/>
+                  </a:schemeClr>
+                </a:solidFill>
+              </a:rPr>
+              <a:t>Covid-19</a:t>
+            </a:r>
+            <a:endParaRPr lang="en-US" b="1" dirty="0">
+              <a:solidFill>
+                <a:schemeClr val="accent1">
+                  <a:lumMod val="75000"/>
+                </a:schemeClr>
+              </a:solidFill>
+            </a:endParaRPr>
+          </a:p>
+        </p:txBody>
+      </p:sp>
     </p:spTree>
     <p:extLst>
       <p:ext uri="{BB962C8B-B14F-4D97-AF65-F5344CB8AC3E}">
-        <p14:creationId xmlns:p14="http://schemas.microsoft.com/office/powerpoint/2010/main" val="928580799"/>
+        <p14:creationId xmlns:p14="http://schemas.microsoft.com/office/powerpoint/2010/main" val="911328323"/>
       </p:ext>
     </p:extLst>
   </p:cSld>
@@ -6565,7 +6827,7 @@
 </p:sld>
 </file>
 
-<file path=ppt/slides/slide6.xml><?xml version="1.0" encoding="utf-8"?>
+<file path=ppt/slides/slide4.xml><?xml version="1.0" encoding="utf-8"?>
 <p:sld xmlns:a="http://schemas.openxmlformats.org/drawingml/2006/main" xmlns:r="http://schemas.openxmlformats.org/officeDocument/2006/relationships" xmlns:p="http://schemas.openxmlformats.org/presentationml/2006/main">
   <p:cSld>
     <p:spTree>
@@ -6636,8 +6898,8 @@
         </p:nvSpPr>
         <p:spPr>
           <a:xfrm>
-            <a:off x="3840385" y="1213849"/>
-            <a:ext cx="5712369" cy="923330"/>
+            <a:off x="4003824" y="1483154"/>
+            <a:ext cx="5712369" cy="1754326"/>
           </a:xfrm>
           <a:prstGeom prst="rect">
             <a:avLst/>
@@ -6652,7 +6914,13 @@
           <a:p>
             <a:r>
               <a:rPr lang="en-US" sz="5400" dirty="0" smtClean="0"/>
-              <a:t>INCLASS LECTURES</a:t>
+              <a:t>HOMEWORK</a:t>
+            </a:r>
+          </a:p>
+          <a:p>
+            <a:r>
+              <a:rPr lang="en-US" sz="5400" dirty="0" smtClean="0"/>
+              <a:t>HELP</a:t>
             </a:r>
             <a:endParaRPr lang="en-US" sz="5400" dirty="0"/>
           </a:p>
@@ -6683,7 +6951,7 @@
             <a:pPr algn="ctr"/>
             <a:r>
               <a:rPr lang="en-US" dirty="0" smtClean="0"/>
-              <a:t>March 9, 2020</a:t>
+              <a:t>Jan. 24, 2020</a:t>
             </a:r>
             <a:endParaRPr lang="en-US" dirty="0"/>
           </a:p>
@@ -6697,7 +6965,7 @@
         </p:nvSpPr>
         <p:spPr>
           <a:xfrm>
-            <a:off x="2175358" y="3486436"/>
+            <a:off x="2000886" y="3743671"/>
             <a:ext cx="5005769" cy="1200329"/>
           </a:xfrm>
           <a:prstGeom prst="rect">
@@ -6714,7 +6982,7 @@
             <a:pPr algn="ctr"/>
             <a:r>
               <a:rPr lang="en-US" dirty="0" smtClean="0"/>
-              <a:t>Chapter 12</a:t>
+              <a:t>Chapter 4</a:t>
             </a:r>
             <a:endParaRPr lang="en-US" dirty="0"/>
           </a:p>
@@ -6722,23 +6990,27 @@
             <a:pPr algn="ctr"/>
             <a:r>
               <a:rPr lang="en-US" b="1" u="sng" dirty="0" smtClean="0"/>
-              <a:t>One-way Independent Groups ANOVA</a:t>
-            </a:r>
-            <a:endParaRPr lang="en-US" dirty="0" smtClean="0"/>
-          </a:p>
-          <a:p>
-            <a:pPr algn="ctr"/>
-            <a:r>
-              <a:rPr lang="en-US" i="1" dirty="0" smtClean="0"/>
-              <a:t>First half, chapter slides</a:t>
-            </a:r>
-          </a:p>
-          <a:p>
-            <a:pPr algn="ctr"/>
-            <a:r>
-              <a:rPr lang="en-US" i="1" dirty="0" smtClean="0"/>
-              <a:t>Mostly New Material Presentation</a:t>
-            </a:r>
+              <a:t>Standardized Scores &amp; the Normal Distribution</a:t>
+            </a:r>
+          </a:p>
+          <a:p>
+            <a:pPr algn="ctr"/>
+            <a:r>
+              <a:rPr lang="en-US" b="1" dirty="0" smtClean="0"/>
+              <a:t>4B #6: IQ (mu = 100, </a:t>
+            </a:r>
+            <a:r>
+              <a:rPr lang="en-US" b="1" dirty="0" err="1" smtClean="0"/>
+              <a:t>sd</a:t>
+            </a:r>
+            <a:r>
+              <a:rPr lang="en-US" b="1" dirty="0" smtClean="0"/>
+              <a:t>=15) -&gt; sample w/M = 108</a:t>
+            </a:r>
+          </a:p>
+          <a:p>
+            <a:pPr algn="ctr"/>
+            <a:endParaRPr lang="en-US" b="1" dirty="0"/>
           </a:p>
         </p:txBody>
       </p:sp>
@@ -6880,7 +7152,7 @@
     </p:spTree>
     <p:extLst>
       <p:ext uri="{BB962C8B-B14F-4D97-AF65-F5344CB8AC3E}">
-        <p14:creationId xmlns:p14="http://schemas.microsoft.com/office/powerpoint/2010/main" val="2758197068"/>
+        <p14:creationId xmlns:p14="http://schemas.microsoft.com/office/powerpoint/2010/main" val="3542266102"/>
       </p:ext>
     </p:extLst>
   </p:cSld>
@@ -6890,7 +7162,7 @@
 </p:sld>
 </file>
 
-<file path=ppt/slides/slide7.xml><?xml version="1.0" encoding="utf-8"?>
+<file path=ppt/slides/slide5.xml><?xml version="1.0" encoding="utf-8"?>
 <p:sld xmlns:a="http://schemas.openxmlformats.org/drawingml/2006/main" xmlns:r="http://schemas.openxmlformats.org/officeDocument/2006/relationships" xmlns:p="http://schemas.openxmlformats.org/presentationml/2006/main">
   <p:cSld>
     <p:spTree>
@@ -6961,8 +7233,8 @@
         </p:nvSpPr>
         <p:spPr>
           <a:xfrm>
-            <a:off x="3840385" y="1213849"/>
-            <a:ext cx="5712369" cy="923330"/>
+            <a:off x="4003824" y="1483154"/>
+            <a:ext cx="5712369" cy="1754326"/>
           </a:xfrm>
           <a:prstGeom prst="rect">
             <a:avLst/>
@@ -6977,7 +7249,7 @@
           <a:p>
             <a:r>
               <a:rPr lang="en-US" sz="5400" dirty="0" smtClean="0"/>
-              <a:t>INCLASS LECTURES</a:t>
+              <a:t>OUT-OF-CLASS LECTURES</a:t>
             </a:r>
             <a:endParaRPr lang="en-US" sz="5400" dirty="0"/>
           </a:p>
@@ -7008,7 +7280,7 @@
             <a:pPr algn="ctr"/>
             <a:r>
               <a:rPr lang="en-US" dirty="0" smtClean="0"/>
-              <a:t>Feb. 19, 2020</a:t>
+              <a:t>Jan. 24, 2020</a:t>
             </a:r>
             <a:endParaRPr lang="en-US" dirty="0"/>
           </a:p>
@@ -7022,7 +7294,7 @@
         </p:nvSpPr>
         <p:spPr>
           <a:xfrm>
-            <a:off x="2130478" y="2956774"/>
+            <a:off x="2000886" y="3743671"/>
             <a:ext cx="5005769" cy="923330"/>
           </a:xfrm>
           <a:prstGeom prst="rect">
@@ -7039,26 +7311,23 @@
             <a:pPr algn="ctr"/>
             <a:r>
               <a:rPr lang="en-US" dirty="0" smtClean="0"/>
-              <a:t>Chapter </a:t>
-            </a:r>
-            <a:r>
-              <a:rPr lang="en-US" dirty="0"/>
-              <a:t>9</a:t>
-            </a:r>
+              <a:t>Chapter 4</a:t>
+            </a:r>
+            <a:endParaRPr lang="en-US" dirty="0"/>
           </a:p>
           <a:p>
             <a:pPr algn="ctr"/>
             <a:r>
               <a:rPr lang="en-US" b="1" u="sng" dirty="0" smtClean="0"/>
-              <a:t>Correlation</a:t>
-            </a:r>
-            <a:endParaRPr lang="en-US" dirty="0" smtClean="0"/>
+              <a:t>Standardized Scores &amp; the Normal Distribution</a:t>
+            </a:r>
+            <a:endParaRPr lang="en-US" b="1" u="sng" dirty="0"/>
           </a:p>
           <a:p>
             <a:pPr algn="ctr"/>
             <a:r>
               <a:rPr lang="en-US" i="1" dirty="0" smtClean="0"/>
-              <a:t>Second half, chapter slides</a:t>
+              <a:t>Lecture Slide Examples Worked</a:t>
             </a:r>
           </a:p>
         </p:txBody>
@@ -7198,56 +7467,10 @@
           </a:prstGeom>
         </p:spPr>
       </p:pic>
-      <p:sp>
-        <p:nvSpPr>
-          <p:cNvPr id="15" name="TextBox 14"/>
-          <p:cNvSpPr txBox="1"/>
-          <p:nvPr/>
-        </p:nvSpPr>
-        <p:spPr>
-          <a:xfrm>
-            <a:off x="2107241" y="4130160"/>
-            <a:ext cx="5005769" cy="923330"/>
-          </a:xfrm>
-          <a:prstGeom prst="rect">
-            <a:avLst/>
-          </a:prstGeom>
-          <a:noFill/>
-        </p:spPr>
-        <p:txBody>
-          <a:bodyPr wrap="square" rtlCol="0">
-            <a:spAutoFit/>
-          </a:bodyPr>
-          <a:lstStyle/>
-          <a:p>
-            <a:pPr algn="ctr"/>
-            <a:r>
-              <a:rPr lang="en-US" dirty="0" smtClean="0"/>
-              <a:t>Chapter 10</a:t>
-            </a:r>
-            <a:endParaRPr lang="en-US" dirty="0"/>
-          </a:p>
-          <a:p>
-            <a:pPr algn="ctr"/>
-            <a:r>
-              <a:rPr lang="en-US" b="1" u="sng" dirty="0" smtClean="0"/>
-              <a:t>Simple Linear Regression</a:t>
-            </a:r>
-            <a:endParaRPr lang="en-US" dirty="0" smtClean="0"/>
-          </a:p>
-          <a:p>
-            <a:pPr algn="ctr"/>
-            <a:r>
-              <a:rPr lang="en-US" i="1" dirty="0" smtClean="0"/>
-              <a:t>chapter slides (majority)</a:t>
-            </a:r>
-          </a:p>
-        </p:txBody>
-      </p:sp>
     </p:spTree>
     <p:extLst>
       <p:ext uri="{BB962C8B-B14F-4D97-AF65-F5344CB8AC3E}">
-        <p14:creationId xmlns:p14="http://schemas.microsoft.com/office/powerpoint/2010/main" val="2730707931"/>
+        <p14:creationId xmlns:p14="http://schemas.microsoft.com/office/powerpoint/2010/main" val="267042058"/>
       </p:ext>
     </p:extLst>
   </p:cSld>
@@ -7257,7 +7480,7 @@
 </p:sld>
 </file>
 
-<file path=ppt/slides/slide8.xml><?xml version="1.0" encoding="utf-8"?>
+<file path=ppt/slides/slide6.xml><?xml version="1.0" encoding="utf-8"?>
 <p:sld xmlns:a="http://schemas.openxmlformats.org/drawingml/2006/main" xmlns:r="http://schemas.openxmlformats.org/officeDocument/2006/relationships" xmlns:p="http://schemas.openxmlformats.org/presentationml/2006/main">
   <p:cSld>
     <p:spTree>
@@ -7328,8 +7551,8 @@
         </p:nvSpPr>
         <p:spPr>
           <a:xfrm>
-            <a:off x="3840385" y="1213849"/>
-            <a:ext cx="5712369" cy="923330"/>
+            <a:off x="4184694" y="1065121"/>
+            <a:ext cx="5712369" cy="1754326"/>
           </a:xfrm>
           <a:prstGeom prst="rect">
             <a:avLst/>
@@ -7344,7 +7567,7 @@
           <a:p>
             <a:r>
               <a:rPr lang="en-US" sz="5400" dirty="0" smtClean="0"/>
-              <a:t>INCLASS LECTURES</a:t>
+              <a:t>OUT-OF-CLASS LECTURES</a:t>
             </a:r>
             <a:endParaRPr lang="en-US" sz="5400" dirty="0"/>
           </a:p>
@@ -7375,7 +7598,7 @@
             <a:pPr algn="ctr"/>
             <a:r>
               <a:rPr lang="en-US" dirty="0" smtClean="0"/>
-              <a:t>Feb. 12, 2020</a:t>
+              <a:t>Jan. 24, 2020</a:t>
             </a:r>
             <a:endParaRPr lang="en-US" dirty="0"/>
           </a:p>
@@ -7389,8 +7612,8 @@
         </p:nvSpPr>
         <p:spPr>
           <a:xfrm>
-            <a:off x="2175357" y="4235713"/>
-            <a:ext cx="5005769" cy="923330"/>
+            <a:off x="2035110" y="3043759"/>
+            <a:ext cx="5005769" cy="1200329"/>
           </a:xfrm>
           <a:prstGeom prst="rect">
             <a:avLst/>
@@ -7406,27 +7629,33 @@
             <a:pPr algn="ctr"/>
             <a:r>
               <a:rPr lang="en-US" dirty="0" smtClean="0"/>
-              <a:t>Chapter </a:t>
-            </a:r>
-            <a:r>
-              <a:rPr lang="en-US" dirty="0"/>
-              <a:t>9</a:t>
-            </a:r>
+              <a:t>Chapter 4</a:t>
+            </a:r>
+            <a:endParaRPr lang="en-US" dirty="0"/>
           </a:p>
           <a:p>
             <a:pPr algn="ctr"/>
             <a:r>
               <a:rPr lang="en-US" b="1" u="sng" dirty="0" smtClean="0"/>
-              <a:t>Correlation</a:t>
-            </a:r>
-            <a:endParaRPr lang="en-US" dirty="0" smtClean="0"/>
+              <a:t>Standardized Scores &amp; the Normal Distribution</a:t>
+            </a:r>
+            <a:endParaRPr lang="en-US" b="1" u="sng" dirty="0"/>
           </a:p>
           <a:p>
             <a:pPr algn="ctr"/>
             <a:r>
               <a:rPr lang="en-US" i="1" dirty="0" smtClean="0"/>
-              <a:t>First half, chapter slides</a:t>
-            </a:r>
+              <a:t>Lecture slides 25-43</a:t>
+            </a:r>
+            <a:endParaRPr lang="en-US" i="1" dirty="0"/>
+          </a:p>
+          <a:p>
+            <a:pPr algn="ctr"/>
+            <a:r>
+              <a:rPr lang="en-US" i="1" dirty="0" smtClean="0"/>
+              <a:t>(Second half)</a:t>
+            </a:r>
+            <a:endParaRPr lang="en-US" i="1" dirty="0"/>
           </a:p>
         </p:txBody>
       </p:sp>
@@ -7565,73 +7794,10 @@
           </a:prstGeom>
         </p:spPr>
       </p:pic>
-      <p:sp>
-        <p:nvSpPr>
-          <p:cNvPr id="13" name="TextBox 12"/>
-          <p:cNvSpPr txBox="1"/>
-          <p:nvPr/>
-        </p:nvSpPr>
-        <p:spPr>
-          <a:xfrm>
-            <a:off x="2175358" y="2646127"/>
-            <a:ext cx="5005769" cy="1477328"/>
-          </a:xfrm>
-          <a:prstGeom prst="rect">
-            <a:avLst/>
-          </a:prstGeom>
-          <a:noFill/>
-        </p:spPr>
-        <p:txBody>
-          <a:bodyPr wrap="square" rtlCol="0">
-            <a:spAutoFit/>
-          </a:bodyPr>
-          <a:lstStyle/>
-          <a:p>
-            <a:pPr algn="ctr"/>
-            <a:r>
-              <a:rPr lang="en-US" dirty="0" smtClean="0"/>
-              <a:t>Chapter </a:t>
-            </a:r>
-            <a:r>
-              <a:rPr lang="en-US" dirty="0"/>
-              <a:t>8</a:t>
-            </a:r>
-          </a:p>
-          <a:p>
-            <a:pPr algn="ctr"/>
-            <a:r>
-              <a:rPr lang="en-US" b="1" u="sng" dirty="0" smtClean="0"/>
-              <a:t>Effect Size &amp; Power Analysis</a:t>
-            </a:r>
-            <a:endParaRPr lang="en-US" dirty="0" smtClean="0"/>
-          </a:p>
-          <a:p>
-            <a:pPr algn="ctr"/>
-            <a:r>
-              <a:rPr lang="en-US" i="1" dirty="0" smtClean="0"/>
-              <a:t>Chapter slides</a:t>
-            </a:r>
-          </a:p>
-          <a:p>
-            <a:pPr algn="ctr"/>
-            <a:r>
-              <a:rPr lang="en-US" i="1" dirty="0" smtClean="0"/>
-              <a:t>Demo G*Power software</a:t>
-            </a:r>
-          </a:p>
-          <a:p>
-            <a:pPr algn="ctr"/>
-            <a:r>
-              <a:rPr lang="en-US" i="1" dirty="0" smtClean="0"/>
-              <a:t>Homework Help</a:t>
-            </a:r>
-          </a:p>
-        </p:txBody>
-      </p:sp>
     </p:spTree>
     <p:extLst>
       <p:ext uri="{BB962C8B-B14F-4D97-AF65-F5344CB8AC3E}">
-        <p14:creationId xmlns:p14="http://schemas.microsoft.com/office/powerpoint/2010/main" val="3221510669"/>
+        <p14:creationId xmlns:p14="http://schemas.microsoft.com/office/powerpoint/2010/main" val="1429724622"/>
       </p:ext>
     </p:extLst>
   </p:cSld>
@@ -7641,7 +7807,7 @@
 </p:sld>
 </file>
 
-<file path=ppt/slides/slide9.xml><?xml version="1.0" encoding="utf-8"?>
+<file path=ppt/slides/slide7.xml><?xml version="1.0" encoding="utf-8"?>
 <p:sld xmlns:a="http://schemas.openxmlformats.org/drawingml/2006/main" xmlns:r="http://schemas.openxmlformats.org/officeDocument/2006/relationships" xmlns:p="http://schemas.openxmlformats.org/presentationml/2006/main">
   <p:cSld>
     <p:spTree>
@@ -7759,7 +7925,7 @@
             <a:pPr algn="ctr"/>
             <a:r>
               <a:rPr lang="en-US" dirty="0" smtClean="0"/>
-              <a:t>Feb. 10, 2020</a:t>
+              <a:t>March 11, 2020</a:t>
             </a:r>
             <a:endParaRPr lang="en-US" dirty="0"/>
           </a:p>
@@ -7773,8 +7939,8 @@
         </p:nvSpPr>
         <p:spPr>
           <a:xfrm>
-            <a:off x="2035110" y="3043759"/>
-            <a:ext cx="5005769" cy="923330"/>
+            <a:off x="2175358" y="3486436"/>
+            <a:ext cx="5005769" cy="1200329"/>
           </a:xfrm>
           <a:prstGeom prst="rect">
             <a:avLst/>
@@ -7790,31 +7956,31 @@
             <a:pPr algn="ctr"/>
             <a:r>
               <a:rPr lang="en-US" dirty="0" smtClean="0"/>
-              <a:t>Chapter </a:t>
-            </a:r>
-            <a:r>
-              <a:rPr lang="en-US" dirty="0"/>
-              <a:t>7</a:t>
-            </a:r>
-          </a:p>
-          <a:p>
-            <a:pPr algn="ctr"/>
-            <a:r>
-              <a:rPr lang="en-US" b="1" u="sng" dirty="0"/>
-              <a:t>Independent Samples t-Test for </a:t>
-            </a:r>
+              <a:t>Chapter 12</a:t>
+            </a:r>
+            <a:endParaRPr lang="en-US" dirty="0"/>
+          </a:p>
+          <a:p>
+            <a:pPr algn="ctr"/>
             <a:r>
               <a:rPr lang="en-US" b="1" u="sng" dirty="0" smtClean="0"/>
-              <a:t>Means</a:t>
-            </a:r>
+              <a:t>One-way Independent Groups ANOVA</a:t>
+            </a:r>
+            <a:endParaRPr lang="en-US" dirty="0" smtClean="0"/>
           </a:p>
           <a:p>
             <a:pPr algn="ctr"/>
             <a:r>
               <a:rPr lang="en-US" i="1" dirty="0" smtClean="0"/>
-              <a:t>Mostly Homework Helps</a:t>
-            </a:r>
-            <a:endParaRPr lang="en-US" i="1" dirty="0"/>
+              <a:t>Second half, chapter slides</a:t>
+            </a:r>
+          </a:p>
+          <a:p>
+            <a:pPr algn="ctr"/>
+            <a:r>
+              <a:rPr lang="en-US" i="1" dirty="0" smtClean="0"/>
+              <a:t>Mostly Examples, Using R, and HW Help</a:t>
+            </a:r>
           </a:p>
         </p:txBody>
       </p:sp>
@@ -7956,7 +8122,699 @@
     </p:spTree>
     <p:extLst>
       <p:ext uri="{BB962C8B-B14F-4D97-AF65-F5344CB8AC3E}">
-        <p14:creationId xmlns:p14="http://schemas.microsoft.com/office/powerpoint/2010/main" val="2916572011"/>
+        <p14:creationId xmlns:p14="http://schemas.microsoft.com/office/powerpoint/2010/main" val="928580799"/>
+      </p:ext>
+    </p:extLst>
+  </p:cSld>
+  <p:clrMapOvr>
+    <a:masterClrMapping/>
+  </p:clrMapOvr>
+</p:sld>
+</file>
+
+<file path=ppt/slides/slide8.xml><?xml version="1.0" encoding="utf-8"?>
+<p:sld xmlns:a="http://schemas.openxmlformats.org/drawingml/2006/main" xmlns:r="http://schemas.openxmlformats.org/officeDocument/2006/relationships" xmlns:p="http://schemas.openxmlformats.org/presentationml/2006/main">
+  <p:cSld>
+    <p:spTree>
+      <p:nvGrpSpPr>
+        <p:cNvPr id="1" name=""/>
+        <p:cNvGrpSpPr/>
+        <p:nvPr/>
+      </p:nvGrpSpPr>
+      <p:grpSpPr>
+        <a:xfrm>
+          <a:off x="0" y="0"/>
+          <a:ext cx="0" cy="0"/>
+          <a:chOff x="0" y="0"/>
+          <a:chExt cx="0" cy="0"/>
+        </a:xfrm>
+      </p:grpSpPr>
+      <p:sp>
+        <p:nvSpPr>
+          <p:cNvPr id="4" name="Rectangle 3"/>
+          <p:cNvSpPr/>
+          <p:nvPr/>
+        </p:nvSpPr>
+        <p:spPr>
+          <a:xfrm>
+            <a:off x="1808702" y="824230"/>
+            <a:ext cx="8778240" cy="5010912"/>
+          </a:xfrm>
+          <a:prstGeom prst="rect">
+            <a:avLst/>
+          </a:prstGeom>
+          <a:solidFill>
+            <a:schemeClr val="bg1">
+              <a:lumMod val="95000"/>
+            </a:schemeClr>
+          </a:solidFill>
+          <a:ln w="38100"/>
+        </p:spPr>
+        <p:style>
+          <a:lnRef idx="2">
+            <a:schemeClr val="accent1">
+              <a:shade val="50000"/>
+            </a:schemeClr>
+          </a:lnRef>
+          <a:fillRef idx="1">
+            <a:schemeClr val="accent1"/>
+          </a:fillRef>
+          <a:effectRef idx="0">
+            <a:schemeClr val="accent1"/>
+          </a:effectRef>
+          <a:fontRef idx="minor">
+            <a:schemeClr val="lt1"/>
+          </a:fontRef>
+        </p:style>
+        <p:txBody>
+          <a:bodyPr rtlCol="0" anchor="ctr"/>
+          <a:lstStyle/>
+          <a:p>
+            <a:pPr algn="ctr"/>
+            <a:endParaRPr lang="en-US"/>
+          </a:p>
+        </p:txBody>
+      </p:sp>
+      <p:sp>
+        <p:nvSpPr>
+          <p:cNvPr id="7" name="TextBox 6"/>
+          <p:cNvSpPr txBox="1"/>
+          <p:nvPr/>
+        </p:nvSpPr>
+        <p:spPr>
+          <a:xfrm>
+            <a:off x="3840385" y="1213849"/>
+            <a:ext cx="5712369" cy="923330"/>
+          </a:xfrm>
+          <a:prstGeom prst="rect">
+            <a:avLst/>
+          </a:prstGeom>
+          <a:noFill/>
+        </p:spPr>
+        <p:txBody>
+          <a:bodyPr wrap="square" rtlCol="0">
+            <a:spAutoFit/>
+          </a:bodyPr>
+          <a:lstStyle/>
+          <a:p>
+            <a:r>
+              <a:rPr lang="en-US" sz="5400" dirty="0" smtClean="0"/>
+              <a:t>INCLASS LECTURES</a:t>
+            </a:r>
+            <a:endParaRPr lang="en-US" sz="5400" dirty="0"/>
+          </a:p>
+        </p:txBody>
+      </p:sp>
+      <p:sp>
+        <p:nvSpPr>
+          <p:cNvPr id="8" name="TextBox 7"/>
+          <p:cNvSpPr txBox="1"/>
+          <p:nvPr/>
+        </p:nvSpPr>
+        <p:spPr>
+          <a:xfrm>
+            <a:off x="7731444" y="5278932"/>
+            <a:ext cx="2076450" cy="369332"/>
+          </a:xfrm>
+          <a:prstGeom prst="rect">
+            <a:avLst/>
+          </a:prstGeom>
+          <a:noFill/>
+        </p:spPr>
+        <p:txBody>
+          <a:bodyPr wrap="square" rtlCol="0">
+            <a:spAutoFit/>
+          </a:bodyPr>
+          <a:lstStyle/>
+          <a:p>
+            <a:pPr algn="ctr"/>
+            <a:r>
+              <a:rPr lang="en-US" dirty="0" smtClean="0"/>
+              <a:t>March 9, 2020</a:t>
+            </a:r>
+            <a:endParaRPr lang="en-US" dirty="0"/>
+          </a:p>
+        </p:txBody>
+      </p:sp>
+      <p:sp>
+        <p:nvSpPr>
+          <p:cNvPr id="9" name="TextBox 8"/>
+          <p:cNvSpPr txBox="1"/>
+          <p:nvPr/>
+        </p:nvSpPr>
+        <p:spPr>
+          <a:xfrm>
+            <a:off x="2175358" y="3486436"/>
+            <a:ext cx="5005769" cy="1200329"/>
+          </a:xfrm>
+          <a:prstGeom prst="rect">
+            <a:avLst/>
+          </a:prstGeom>
+          <a:noFill/>
+        </p:spPr>
+        <p:txBody>
+          <a:bodyPr wrap="square" rtlCol="0">
+            <a:spAutoFit/>
+          </a:bodyPr>
+          <a:lstStyle/>
+          <a:p>
+            <a:pPr algn="ctr"/>
+            <a:r>
+              <a:rPr lang="en-US" dirty="0" smtClean="0"/>
+              <a:t>Chapter 12</a:t>
+            </a:r>
+            <a:endParaRPr lang="en-US" dirty="0"/>
+          </a:p>
+          <a:p>
+            <a:pPr algn="ctr"/>
+            <a:r>
+              <a:rPr lang="en-US" b="1" u="sng" dirty="0" smtClean="0"/>
+              <a:t>One-way Independent Groups ANOVA</a:t>
+            </a:r>
+            <a:endParaRPr lang="en-US" dirty="0" smtClean="0"/>
+          </a:p>
+          <a:p>
+            <a:pPr algn="ctr"/>
+            <a:r>
+              <a:rPr lang="en-US" i="1" dirty="0" smtClean="0"/>
+              <a:t>First half, chapter slides</a:t>
+            </a:r>
+          </a:p>
+          <a:p>
+            <a:pPr algn="ctr"/>
+            <a:r>
+              <a:rPr lang="en-US" i="1" dirty="0" smtClean="0"/>
+              <a:t>Mostly New Material Presentation</a:t>
+            </a:r>
+          </a:p>
+        </p:txBody>
+      </p:sp>
+      <p:grpSp>
+        <p:nvGrpSpPr>
+          <p:cNvPr id="14" name="Group 13"/>
+          <p:cNvGrpSpPr/>
+          <p:nvPr/>
+        </p:nvGrpSpPr>
+        <p:grpSpPr>
+          <a:xfrm>
+            <a:off x="7198839" y="2137179"/>
+            <a:ext cx="3141660" cy="3193339"/>
+            <a:chOff x="7047391" y="1961976"/>
+            <a:chExt cx="3141660" cy="3193339"/>
+          </a:xfrm>
+        </p:grpSpPr>
+        <p:pic>
+          <p:nvPicPr>
+            <p:cNvPr id="2" name="Picture 1"/>
+            <p:cNvPicPr>
+              <a:picLocks noChangeAspect="1"/>
+            </p:cNvPicPr>
+            <p:nvPr/>
+          </p:nvPicPr>
+          <p:blipFill>
+            <a:blip r:embed="rId2" cstate="print">
+              <a:extLst>
+                <a:ext uri="{28A0092B-C50C-407E-A947-70E740481C1C}">
+                  <a14:useLocalDpi xmlns:a14="http://schemas.microsoft.com/office/drawing/2010/main" val="0"/>
+                </a:ext>
+              </a:extLst>
+            </a:blip>
+            <a:stretch>
+              <a:fillRect/>
+            </a:stretch>
+          </p:blipFill>
+          <p:spPr>
+            <a:xfrm>
+              <a:off x="7047391" y="3320161"/>
+              <a:ext cx="1578867" cy="1828804"/>
+            </a:xfrm>
+            <a:prstGeom prst="rect">
+              <a:avLst/>
+            </a:prstGeom>
+          </p:spPr>
+        </p:pic>
+        <p:pic>
+          <p:nvPicPr>
+            <p:cNvPr id="3" name="Picture 2"/>
+            <p:cNvPicPr>
+              <a:picLocks noChangeAspect="1"/>
+            </p:cNvPicPr>
+            <p:nvPr/>
+          </p:nvPicPr>
+          <p:blipFill>
+            <a:blip r:embed="rId3" cstate="print">
+              <a:extLst>
+                <a:ext uri="{28A0092B-C50C-407E-A947-70E740481C1C}">
+                  <a14:useLocalDpi xmlns:a14="http://schemas.microsoft.com/office/drawing/2010/main" val="0"/>
+                </a:ext>
+              </a:extLst>
+            </a:blip>
+            <a:stretch>
+              <a:fillRect/>
+            </a:stretch>
+          </p:blipFill>
+          <p:spPr>
+            <a:xfrm>
+              <a:off x="7830475" y="1961976"/>
+              <a:ext cx="1578867" cy="1828804"/>
+            </a:xfrm>
+            <a:prstGeom prst="rect">
+              <a:avLst/>
+            </a:prstGeom>
+          </p:spPr>
+        </p:pic>
+        <p:pic>
+          <p:nvPicPr>
+            <p:cNvPr id="11" name="Picture 10"/>
+            <p:cNvPicPr>
+              <a:picLocks noChangeAspect="1"/>
+            </p:cNvPicPr>
+            <p:nvPr/>
+          </p:nvPicPr>
+          <p:blipFill>
+            <a:blip r:embed="rId4" cstate="print">
+              <a:extLst>
+                <a:ext uri="{28A0092B-C50C-407E-A947-70E740481C1C}">
+                  <a14:useLocalDpi xmlns:a14="http://schemas.microsoft.com/office/drawing/2010/main" val="0"/>
+                </a:ext>
+              </a:extLst>
+            </a:blip>
+            <a:stretch>
+              <a:fillRect/>
+            </a:stretch>
+          </p:blipFill>
+          <p:spPr>
+            <a:xfrm>
+              <a:off x="8610184" y="3326511"/>
+              <a:ext cx="1578867" cy="1828804"/>
+            </a:xfrm>
+            <a:prstGeom prst="rect">
+              <a:avLst/>
+            </a:prstGeom>
+          </p:spPr>
+        </p:pic>
+      </p:grpSp>
+      <p:pic>
+        <p:nvPicPr>
+          <p:cNvPr id="12" name="Picture 11"/>
+          <p:cNvPicPr>
+            <a:picLocks noChangeAspect="1"/>
+          </p:cNvPicPr>
+          <p:nvPr/>
+        </p:nvPicPr>
+        <p:blipFill>
+          <a:blip r:embed="rId5" cstate="print">
+            <a:extLst>
+              <a:ext uri="{28A0092B-C50C-407E-A947-70E740481C1C}">
+                <a14:useLocalDpi xmlns:a14="http://schemas.microsoft.com/office/drawing/2010/main" val="0"/>
+              </a:ext>
+            </a:extLst>
+          </a:blip>
+          <a:stretch>
+            <a:fillRect/>
+          </a:stretch>
+        </p:blipFill>
+        <p:spPr>
+          <a:xfrm>
+            <a:off x="2035110" y="1019593"/>
+            <a:ext cx="1578867" cy="1828804"/>
+          </a:xfrm>
+          <a:prstGeom prst="rect">
+            <a:avLst/>
+          </a:prstGeom>
+        </p:spPr>
+      </p:pic>
+    </p:spTree>
+    <p:extLst>
+      <p:ext uri="{BB962C8B-B14F-4D97-AF65-F5344CB8AC3E}">
+        <p14:creationId xmlns:p14="http://schemas.microsoft.com/office/powerpoint/2010/main" val="2758197068"/>
+      </p:ext>
+    </p:extLst>
+  </p:cSld>
+  <p:clrMapOvr>
+    <a:masterClrMapping/>
+  </p:clrMapOvr>
+</p:sld>
+</file>
+
+<file path=ppt/slides/slide9.xml><?xml version="1.0" encoding="utf-8"?>
+<p:sld xmlns:a="http://schemas.openxmlformats.org/drawingml/2006/main" xmlns:r="http://schemas.openxmlformats.org/officeDocument/2006/relationships" xmlns:p="http://schemas.openxmlformats.org/presentationml/2006/main">
+  <p:cSld>
+    <p:spTree>
+      <p:nvGrpSpPr>
+        <p:cNvPr id="1" name=""/>
+        <p:cNvGrpSpPr/>
+        <p:nvPr/>
+      </p:nvGrpSpPr>
+      <p:grpSpPr>
+        <a:xfrm>
+          <a:off x="0" y="0"/>
+          <a:ext cx="0" cy="0"/>
+          <a:chOff x="0" y="0"/>
+          <a:chExt cx="0" cy="0"/>
+        </a:xfrm>
+      </p:grpSpPr>
+      <p:sp>
+        <p:nvSpPr>
+          <p:cNvPr id="4" name="Rectangle 3"/>
+          <p:cNvSpPr/>
+          <p:nvPr/>
+        </p:nvSpPr>
+        <p:spPr>
+          <a:xfrm>
+            <a:off x="1808702" y="824230"/>
+            <a:ext cx="8778240" cy="5010912"/>
+          </a:xfrm>
+          <a:prstGeom prst="rect">
+            <a:avLst/>
+          </a:prstGeom>
+          <a:solidFill>
+            <a:schemeClr val="bg1">
+              <a:lumMod val="95000"/>
+            </a:schemeClr>
+          </a:solidFill>
+          <a:ln w="38100"/>
+        </p:spPr>
+        <p:style>
+          <a:lnRef idx="2">
+            <a:schemeClr val="accent1">
+              <a:shade val="50000"/>
+            </a:schemeClr>
+          </a:lnRef>
+          <a:fillRef idx="1">
+            <a:schemeClr val="accent1"/>
+          </a:fillRef>
+          <a:effectRef idx="0">
+            <a:schemeClr val="accent1"/>
+          </a:effectRef>
+          <a:fontRef idx="minor">
+            <a:schemeClr val="lt1"/>
+          </a:fontRef>
+        </p:style>
+        <p:txBody>
+          <a:bodyPr rtlCol="0" anchor="ctr"/>
+          <a:lstStyle/>
+          <a:p>
+            <a:pPr algn="ctr"/>
+            <a:endParaRPr lang="en-US"/>
+          </a:p>
+        </p:txBody>
+      </p:sp>
+      <p:sp>
+        <p:nvSpPr>
+          <p:cNvPr id="7" name="TextBox 6"/>
+          <p:cNvSpPr txBox="1"/>
+          <p:nvPr/>
+        </p:nvSpPr>
+        <p:spPr>
+          <a:xfrm>
+            <a:off x="3840385" y="1213849"/>
+            <a:ext cx="5712369" cy="923330"/>
+          </a:xfrm>
+          <a:prstGeom prst="rect">
+            <a:avLst/>
+          </a:prstGeom>
+          <a:noFill/>
+        </p:spPr>
+        <p:txBody>
+          <a:bodyPr wrap="square" rtlCol="0">
+            <a:spAutoFit/>
+          </a:bodyPr>
+          <a:lstStyle/>
+          <a:p>
+            <a:r>
+              <a:rPr lang="en-US" sz="5400" dirty="0" smtClean="0"/>
+              <a:t>INCLASS LECTURES</a:t>
+            </a:r>
+            <a:endParaRPr lang="en-US" sz="5400" dirty="0"/>
+          </a:p>
+        </p:txBody>
+      </p:sp>
+      <p:sp>
+        <p:nvSpPr>
+          <p:cNvPr id="8" name="TextBox 7"/>
+          <p:cNvSpPr txBox="1"/>
+          <p:nvPr/>
+        </p:nvSpPr>
+        <p:spPr>
+          <a:xfrm>
+            <a:off x="7731444" y="5278932"/>
+            <a:ext cx="2076450" cy="369332"/>
+          </a:xfrm>
+          <a:prstGeom prst="rect">
+            <a:avLst/>
+          </a:prstGeom>
+          <a:noFill/>
+        </p:spPr>
+        <p:txBody>
+          <a:bodyPr wrap="square" rtlCol="0">
+            <a:spAutoFit/>
+          </a:bodyPr>
+          <a:lstStyle/>
+          <a:p>
+            <a:pPr algn="ctr"/>
+            <a:r>
+              <a:rPr lang="en-US" dirty="0" smtClean="0"/>
+              <a:t>Feb. 19, 2020</a:t>
+            </a:r>
+            <a:endParaRPr lang="en-US" dirty="0"/>
+          </a:p>
+        </p:txBody>
+      </p:sp>
+      <p:sp>
+        <p:nvSpPr>
+          <p:cNvPr id="9" name="TextBox 8"/>
+          <p:cNvSpPr txBox="1"/>
+          <p:nvPr/>
+        </p:nvSpPr>
+        <p:spPr>
+          <a:xfrm>
+            <a:off x="2130478" y="2956774"/>
+            <a:ext cx="5005769" cy="923330"/>
+          </a:xfrm>
+          <a:prstGeom prst="rect">
+            <a:avLst/>
+          </a:prstGeom>
+          <a:noFill/>
+        </p:spPr>
+        <p:txBody>
+          <a:bodyPr wrap="square" rtlCol="0">
+            <a:spAutoFit/>
+          </a:bodyPr>
+          <a:lstStyle/>
+          <a:p>
+            <a:pPr algn="ctr"/>
+            <a:r>
+              <a:rPr lang="en-US" dirty="0" smtClean="0"/>
+              <a:t>Chapter </a:t>
+            </a:r>
+            <a:r>
+              <a:rPr lang="en-US" dirty="0"/>
+              <a:t>9</a:t>
+            </a:r>
+          </a:p>
+          <a:p>
+            <a:pPr algn="ctr"/>
+            <a:r>
+              <a:rPr lang="en-US" b="1" u="sng" dirty="0" smtClean="0"/>
+              <a:t>Correlation</a:t>
+            </a:r>
+            <a:endParaRPr lang="en-US" dirty="0" smtClean="0"/>
+          </a:p>
+          <a:p>
+            <a:pPr algn="ctr"/>
+            <a:r>
+              <a:rPr lang="en-US" i="1" dirty="0" smtClean="0"/>
+              <a:t>Second half, chapter slides</a:t>
+            </a:r>
+          </a:p>
+        </p:txBody>
+      </p:sp>
+      <p:grpSp>
+        <p:nvGrpSpPr>
+          <p:cNvPr id="14" name="Group 13"/>
+          <p:cNvGrpSpPr/>
+          <p:nvPr/>
+        </p:nvGrpSpPr>
+        <p:grpSpPr>
+          <a:xfrm>
+            <a:off x="7198839" y="2137179"/>
+            <a:ext cx="3141660" cy="3193339"/>
+            <a:chOff x="7047391" y="1961976"/>
+            <a:chExt cx="3141660" cy="3193339"/>
+          </a:xfrm>
+        </p:grpSpPr>
+        <p:pic>
+          <p:nvPicPr>
+            <p:cNvPr id="2" name="Picture 1"/>
+            <p:cNvPicPr>
+              <a:picLocks noChangeAspect="1"/>
+            </p:cNvPicPr>
+            <p:nvPr/>
+          </p:nvPicPr>
+          <p:blipFill>
+            <a:blip r:embed="rId2" cstate="print">
+              <a:extLst>
+                <a:ext uri="{28A0092B-C50C-407E-A947-70E740481C1C}">
+                  <a14:useLocalDpi xmlns:a14="http://schemas.microsoft.com/office/drawing/2010/main" val="0"/>
+                </a:ext>
+              </a:extLst>
+            </a:blip>
+            <a:stretch>
+              <a:fillRect/>
+            </a:stretch>
+          </p:blipFill>
+          <p:spPr>
+            <a:xfrm>
+              <a:off x="7047391" y="3320161"/>
+              <a:ext cx="1578867" cy="1828804"/>
+            </a:xfrm>
+            <a:prstGeom prst="rect">
+              <a:avLst/>
+            </a:prstGeom>
+          </p:spPr>
+        </p:pic>
+        <p:pic>
+          <p:nvPicPr>
+            <p:cNvPr id="3" name="Picture 2"/>
+            <p:cNvPicPr>
+              <a:picLocks noChangeAspect="1"/>
+            </p:cNvPicPr>
+            <p:nvPr/>
+          </p:nvPicPr>
+          <p:blipFill>
+            <a:blip r:embed="rId3" cstate="print">
+              <a:extLst>
+                <a:ext uri="{28A0092B-C50C-407E-A947-70E740481C1C}">
+                  <a14:useLocalDpi xmlns:a14="http://schemas.microsoft.com/office/drawing/2010/main" val="0"/>
+                </a:ext>
+              </a:extLst>
+            </a:blip>
+            <a:stretch>
+              <a:fillRect/>
+            </a:stretch>
+          </p:blipFill>
+          <p:spPr>
+            <a:xfrm>
+              <a:off x="7830475" y="1961976"/>
+              <a:ext cx="1578867" cy="1828804"/>
+            </a:xfrm>
+            <a:prstGeom prst="rect">
+              <a:avLst/>
+            </a:prstGeom>
+          </p:spPr>
+        </p:pic>
+        <p:pic>
+          <p:nvPicPr>
+            <p:cNvPr id="11" name="Picture 10"/>
+            <p:cNvPicPr>
+              <a:picLocks noChangeAspect="1"/>
+            </p:cNvPicPr>
+            <p:nvPr/>
+          </p:nvPicPr>
+          <p:blipFill>
+            <a:blip r:embed="rId4" cstate="print">
+              <a:extLst>
+                <a:ext uri="{28A0092B-C50C-407E-A947-70E740481C1C}">
+                  <a14:useLocalDpi xmlns:a14="http://schemas.microsoft.com/office/drawing/2010/main" val="0"/>
+                </a:ext>
+              </a:extLst>
+            </a:blip>
+            <a:stretch>
+              <a:fillRect/>
+            </a:stretch>
+          </p:blipFill>
+          <p:spPr>
+            <a:xfrm>
+              <a:off x="8610184" y="3326511"/>
+              <a:ext cx="1578867" cy="1828804"/>
+            </a:xfrm>
+            <a:prstGeom prst="rect">
+              <a:avLst/>
+            </a:prstGeom>
+          </p:spPr>
+        </p:pic>
+      </p:grpSp>
+      <p:pic>
+        <p:nvPicPr>
+          <p:cNvPr id="12" name="Picture 11"/>
+          <p:cNvPicPr>
+            <a:picLocks noChangeAspect="1"/>
+          </p:cNvPicPr>
+          <p:nvPr/>
+        </p:nvPicPr>
+        <p:blipFill>
+          <a:blip r:embed="rId5" cstate="print">
+            <a:extLst>
+              <a:ext uri="{28A0092B-C50C-407E-A947-70E740481C1C}">
+                <a14:useLocalDpi xmlns:a14="http://schemas.microsoft.com/office/drawing/2010/main" val="0"/>
+              </a:ext>
+            </a:extLst>
+          </a:blip>
+          <a:stretch>
+            <a:fillRect/>
+          </a:stretch>
+        </p:blipFill>
+        <p:spPr>
+          <a:xfrm>
+            <a:off x="2035110" y="1019593"/>
+            <a:ext cx="1578867" cy="1828804"/>
+          </a:xfrm>
+          <a:prstGeom prst="rect">
+            <a:avLst/>
+          </a:prstGeom>
+        </p:spPr>
+      </p:pic>
+      <p:sp>
+        <p:nvSpPr>
+          <p:cNvPr id="15" name="TextBox 14"/>
+          <p:cNvSpPr txBox="1"/>
+          <p:nvPr/>
+        </p:nvSpPr>
+        <p:spPr>
+          <a:xfrm>
+            <a:off x="2107241" y="4130160"/>
+            <a:ext cx="5005769" cy="923330"/>
+          </a:xfrm>
+          <a:prstGeom prst="rect">
+            <a:avLst/>
+          </a:prstGeom>
+          <a:noFill/>
+        </p:spPr>
+        <p:txBody>
+          <a:bodyPr wrap="square" rtlCol="0">
+            <a:spAutoFit/>
+          </a:bodyPr>
+          <a:lstStyle/>
+          <a:p>
+            <a:pPr algn="ctr"/>
+            <a:r>
+              <a:rPr lang="en-US" dirty="0" smtClean="0"/>
+              <a:t>Chapter 10</a:t>
+            </a:r>
+            <a:endParaRPr lang="en-US" dirty="0"/>
+          </a:p>
+          <a:p>
+            <a:pPr algn="ctr"/>
+            <a:r>
+              <a:rPr lang="en-US" b="1" u="sng" dirty="0" smtClean="0"/>
+              <a:t>Simple Linear Regression</a:t>
+            </a:r>
+            <a:endParaRPr lang="en-US" dirty="0" smtClean="0"/>
+          </a:p>
+          <a:p>
+            <a:pPr algn="ctr"/>
+            <a:r>
+              <a:rPr lang="en-US" i="1" dirty="0" smtClean="0"/>
+              <a:t>chapter slides (majority)</a:t>
+            </a:r>
+          </a:p>
+        </p:txBody>
+      </p:sp>
+    </p:spTree>
+    <p:extLst>
+      <p:ext uri="{BB962C8B-B14F-4D97-AF65-F5344CB8AC3E}">
+        <p14:creationId xmlns:p14="http://schemas.microsoft.com/office/powerpoint/2010/main" val="2730707931"/>
       </p:ext>
     </p:extLst>
   </p:cSld>

</xml_diff>